<commit_message>
Updated and added a lot more content.
</commit_message>
<xml_diff>
--- a/Documents/Object Property Design and Binding.pptx
+++ b/Documents/Object Property Design and Binding.pptx
@@ -13,6 +13,11 @@
     <p:sldId id="260" r:id="rId7"/>
     <p:sldId id="261" r:id="rId8"/>
     <p:sldId id="263" r:id="rId9"/>
+    <p:sldId id="264" r:id="rId10"/>
+    <p:sldId id="265" r:id="rId11"/>
+    <p:sldId id="266" r:id="rId12"/>
+    <p:sldId id="267" r:id="rId13"/>
+    <p:sldId id="268" r:id="rId14"/>
   </p:sldIdLst>
   <p:sldSz cx="12192000" cy="6858000"/>
   <p:notesSz cx="6858000" cy="9144000"/>
@@ -111,6 +116,11 @@
       </a:defRPr>
     </a:lvl9pPr>
   </p:defaultTextStyle>
+  <p:extLst>
+    <p:ext uri="{EFAFB233-063F-42B5-8137-9DF3F51BA10A}">
+      <p15:sldGuideLst xmlns:p15="http://schemas.microsoft.com/office/powerpoint/2012/main"/>
+    </p:ext>
+  </p:extLst>
 </p:presentation>
 </file>
 
@@ -3397,6 +3407,1940 @@
 </p:sld>
 </file>
 
+<file path=ppt/slides/slide10.xml><?xml version="1.0" encoding="utf-8"?>
+<p:sld xmlns:a="http://schemas.openxmlformats.org/drawingml/2006/main" xmlns:r="http://schemas.openxmlformats.org/officeDocument/2006/relationships" xmlns:p="http://schemas.openxmlformats.org/presentationml/2006/main">
+  <p:cSld>
+    <p:spTree>
+      <p:nvGrpSpPr>
+        <p:cNvPr id="1" name=""/>
+        <p:cNvGrpSpPr/>
+        <p:nvPr/>
+      </p:nvGrpSpPr>
+      <p:grpSpPr>
+        <a:xfrm>
+          <a:off x="0" y="0"/>
+          <a:ext cx="0" cy="0"/>
+          <a:chOff x="0" y="0"/>
+          <a:chExt cx="0" cy="0"/>
+        </a:xfrm>
+      </p:grpSpPr>
+      <p:sp>
+        <p:nvSpPr>
+          <p:cNvPr id="2" name="Title 1">
+            <a:extLst>
+              <a:ext uri="{FF2B5EF4-FFF2-40B4-BE49-F238E27FC236}">
+                <a16:creationId xmlns:a16="http://schemas.microsoft.com/office/drawing/2014/main" id="{FF4D2314-9444-78BC-7431-72B0112244EC}"/>
+              </a:ext>
+            </a:extLst>
+          </p:cNvPr>
+          <p:cNvSpPr>
+            <a:spLocks noGrp="1"/>
+          </p:cNvSpPr>
+          <p:nvPr>
+            <p:ph type="title"/>
+          </p:nvPr>
+        </p:nvSpPr>
+        <p:spPr/>
+        <p:txBody>
+          <a:bodyPr/>
+          <a:lstStyle/>
+          <a:p>
+            <a:r>
+              <a:rPr lang="en-US" dirty="0"/>
+              <a:t>Game Pack Object Example</a:t>
+            </a:r>
+          </a:p>
+        </p:txBody>
+      </p:sp>
+      <p:sp>
+        <p:nvSpPr>
+          <p:cNvPr id="3" name="Content Placeholder 2">
+            <a:extLst>
+              <a:ext uri="{FF2B5EF4-FFF2-40B4-BE49-F238E27FC236}">
+                <a16:creationId xmlns:a16="http://schemas.microsoft.com/office/drawing/2014/main" id="{E31363C7-035C-692A-68AA-69274F4FDB09}"/>
+              </a:ext>
+            </a:extLst>
+          </p:cNvPr>
+          <p:cNvSpPr>
+            <a:spLocks noGrp="1"/>
+          </p:cNvSpPr>
+          <p:nvPr>
+            <p:ph idx="1"/>
+          </p:nvPr>
+        </p:nvSpPr>
+        <p:spPr/>
+        <p:txBody>
+          <a:bodyPr>
+            <a:normAutofit/>
+          </a:bodyPr>
+          <a:lstStyle/>
+          <a:p>
+            <a:pPr marL="0" indent="0">
+              <a:buNone/>
+            </a:pPr>
+            <a:r>
+              <a:rPr lang="en-US" sz="1200" dirty="0">
+                <a:solidFill>
+                  <a:srgbClr val="000000"/>
+                </a:solidFill>
+                <a:latin typeface="Cascadia Mono" panose="020B0609020000020004" pitchFamily="49" charset="0"/>
+              </a:rPr>
+              <a:t>[</a:t>
+            </a:r>
+            <a:r>
+              <a:rPr lang="en-US" sz="1200" dirty="0">
+                <a:solidFill>
+                  <a:srgbClr val="2B91AF"/>
+                </a:solidFill>
+                <a:latin typeface="Cascadia Mono" panose="020B0609020000020004" pitchFamily="49" charset="0"/>
+              </a:rPr>
+              <a:t>Serializable</a:t>
+            </a:r>
+            <a:r>
+              <a:rPr lang="en-US" sz="1200" dirty="0">
+                <a:solidFill>
+                  <a:srgbClr val="000000"/>
+                </a:solidFill>
+                <a:latin typeface="Cascadia Mono" panose="020B0609020000020004" pitchFamily="49" charset="0"/>
+              </a:rPr>
+              <a:t>]</a:t>
+            </a:r>
+          </a:p>
+          <a:p>
+            <a:pPr marL="0" indent="0">
+              <a:buNone/>
+            </a:pPr>
+            <a:r>
+              <a:rPr lang="en-US" sz="1200" dirty="0">
+                <a:solidFill>
+                  <a:srgbClr val="0000FF"/>
+                </a:solidFill>
+                <a:latin typeface="Cascadia Mono" panose="020B0609020000020004" pitchFamily="49" charset="0"/>
+              </a:rPr>
+              <a:t>internal</a:t>
+            </a:r>
+            <a:r>
+              <a:rPr lang="en-US" sz="1200" dirty="0">
+                <a:solidFill>
+                  <a:srgbClr val="000000"/>
+                </a:solidFill>
+                <a:latin typeface="Cascadia Mono" panose="020B0609020000020004" pitchFamily="49" charset="0"/>
+              </a:rPr>
+              <a:t> </a:t>
+            </a:r>
+            <a:r>
+              <a:rPr lang="en-US" sz="1200" dirty="0">
+                <a:solidFill>
+                  <a:srgbClr val="0000FF"/>
+                </a:solidFill>
+                <a:latin typeface="Cascadia Mono" panose="020B0609020000020004" pitchFamily="49" charset="0"/>
+              </a:rPr>
+              <a:t>class</a:t>
+            </a:r>
+            <a:r>
+              <a:rPr lang="en-US" sz="1200" dirty="0">
+                <a:solidFill>
+                  <a:srgbClr val="000000"/>
+                </a:solidFill>
+                <a:latin typeface="Cascadia Mono" panose="020B0609020000020004" pitchFamily="49" charset="0"/>
+              </a:rPr>
+              <a:t> </a:t>
+            </a:r>
+            <a:r>
+              <a:rPr lang="en-US" sz="1200" dirty="0" err="1">
+                <a:solidFill>
+                  <a:srgbClr val="2B91AF"/>
+                </a:solidFill>
+                <a:latin typeface="Cascadia Mono" panose="020B0609020000020004" pitchFamily="49" charset="0"/>
+              </a:rPr>
+              <a:t>HagargRyonisGod</a:t>
+            </a:r>
+            <a:r>
+              <a:rPr lang="en-US" sz="1200" dirty="0">
+                <a:solidFill>
+                  <a:srgbClr val="000000"/>
+                </a:solidFill>
+                <a:latin typeface="Cascadia Mono" panose="020B0609020000020004" pitchFamily="49" charset="0"/>
+              </a:rPr>
+              <a:t> : </a:t>
+            </a:r>
+            <a:r>
+              <a:rPr lang="en-US" sz="1200" dirty="0">
+                <a:solidFill>
+                  <a:srgbClr val="2B91AF"/>
+                </a:solidFill>
+                <a:latin typeface="Cascadia Mono" panose="020B0609020000020004" pitchFamily="49" charset="0"/>
+              </a:rPr>
+              <a:t>God</a:t>
+            </a:r>
+            <a:endParaRPr lang="en-US" sz="1200" dirty="0">
+              <a:solidFill>
+                <a:srgbClr val="000000"/>
+              </a:solidFill>
+              <a:latin typeface="Cascadia Mono" panose="020B0609020000020004" pitchFamily="49" charset="0"/>
+            </a:endParaRPr>
+          </a:p>
+          <a:p>
+            <a:pPr marL="0" indent="0">
+              <a:buNone/>
+            </a:pPr>
+            <a:r>
+              <a:rPr lang="en-US" sz="1200" dirty="0">
+                <a:solidFill>
+                  <a:srgbClr val="000000"/>
+                </a:solidFill>
+                <a:latin typeface="Cascadia Mono" panose="020B0609020000020004" pitchFamily="49" charset="0"/>
+              </a:rPr>
+              <a:t>{</a:t>
+            </a:r>
+          </a:p>
+          <a:p>
+            <a:pPr marL="0" indent="0">
+              <a:buNone/>
+            </a:pPr>
+            <a:r>
+              <a:rPr lang="en-US" sz="1200" dirty="0">
+                <a:solidFill>
+                  <a:srgbClr val="000000"/>
+                </a:solidFill>
+                <a:latin typeface="Cascadia Mono" panose="020B0609020000020004" pitchFamily="49" charset="0"/>
+              </a:rPr>
+              <a:t>    </a:t>
+            </a:r>
+            <a:r>
+              <a:rPr lang="en-US" sz="1200" dirty="0">
+                <a:solidFill>
+                  <a:srgbClr val="0000FF"/>
+                </a:solidFill>
+                <a:latin typeface="Cascadia Mono" panose="020B0609020000020004" pitchFamily="49" charset="0"/>
+              </a:rPr>
+              <a:t>private</a:t>
+            </a:r>
+            <a:r>
+              <a:rPr lang="en-US" sz="1200" dirty="0">
+                <a:solidFill>
+                  <a:srgbClr val="000000"/>
+                </a:solidFill>
+                <a:latin typeface="Cascadia Mono" panose="020B0609020000020004" pitchFamily="49" charset="0"/>
+              </a:rPr>
+              <a:t> </a:t>
+            </a:r>
+            <a:r>
+              <a:rPr lang="en-US" sz="1200" dirty="0" err="1">
+                <a:solidFill>
+                  <a:srgbClr val="2B91AF"/>
+                </a:solidFill>
+                <a:latin typeface="Cascadia Mono" panose="020B0609020000020004" pitchFamily="49" charset="0"/>
+              </a:rPr>
+              <a:t>HagargRyonisGod</a:t>
+            </a:r>
+            <a:r>
+              <a:rPr lang="en-US" sz="1200" dirty="0">
+                <a:solidFill>
+                  <a:srgbClr val="000000"/>
+                </a:solidFill>
+                <a:latin typeface="Cascadia Mono" panose="020B0609020000020004" pitchFamily="49" charset="0"/>
+              </a:rPr>
+              <a:t>(</a:t>
+            </a:r>
+            <a:r>
+              <a:rPr lang="en-US" sz="1200" dirty="0">
+                <a:solidFill>
+                  <a:srgbClr val="2B91AF"/>
+                </a:solidFill>
+                <a:latin typeface="Cascadia Mono" panose="020B0609020000020004" pitchFamily="49" charset="0"/>
+              </a:rPr>
+              <a:t>Game</a:t>
+            </a:r>
+            <a:r>
+              <a:rPr lang="en-US" sz="1200" dirty="0">
+                <a:solidFill>
+                  <a:srgbClr val="000000"/>
+                </a:solidFill>
+                <a:latin typeface="Cascadia Mono" panose="020B0609020000020004" pitchFamily="49" charset="0"/>
+              </a:rPr>
+              <a:t> game) : </a:t>
+            </a:r>
+            <a:r>
+              <a:rPr lang="en-US" sz="1200" dirty="0">
+                <a:solidFill>
+                  <a:srgbClr val="0000FF"/>
+                </a:solidFill>
+                <a:latin typeface="Cascadia Mono" panose="020B0609020000020004" pitchFamily="49" charset="0"/>
+              </a:rPr>
+              <a:t>base</a:t>
+            </a:r>
+            <a:r>
+              <a:rPr lang="en-US" sz="1200" dirty="0">
+                <a:solidFill>
+                  <a:srgbClr val="000000"/>
+                </a:solidFill>
+                <a:latin typeface="Cascadia Mono" panose="020B0609020000020004" pitchFamily="49" charset="0"/>
+              </a:rPr>
+              <a:t>(game) { } </a:t>
+            </a:r>
+            <a:r>
+              <a:rPr lang="en-US" sz="1200" dirty="0">
+                <a:solidFill>
+                  <a:srgbClr val="008000"/>
+                </a:solidFill>
+                <a:latin typeface="Cascadia Mono" panose="020B0609020000020004" pitchFamily="49" charset="0"/>
+              </a:rPr>
+              <a:t>// This object is a singleton.</a:t>
+            </a:r>
+            <a:endParaRPr lang="en-US" sz="1200" dirty="0">
+              <a:solidFill>
+                <a:srgbClr val="000000"/>
+              </a:solidFill>
+              <a:latin typeface="Cascadia Mono" panose="020B0609020000020004" pitchFamily="49" charset="0"/>
+            </a:endParaRPr>
+          </a:p>
+          <a:p>
+            <a:pPr marL="0" indent="0">
+              <a:buNone/>
+            </a:pPr>
+            <a:r>
+              <a:rPr lang="en-US" sz="1200" dirty="0">
+                <a:solidFill>
+                  <a:srgbClr val="000000"/>
+                </a:solidFill>
+                <a:latin typeface="Cascadia Mono" panose="020B0609020000020004" pitchFamily="49" charset="0"/>
+              </a:rPr>
+              <a:t>    </a:t>
+            </a:r>
+            <a:r>
+              <a:rPr lang="en-US" sz="1200" dirty="0">
+                <a:solidFill>
+                  <a:srgbClr val="0000FF"/>
+                </a:solidFill>
+                <a:latin typeface="Cascadia Mono" panose="020B0609020000020004" pitchFamily="49" charset="0"/>
+              </a:rPr>
+              <a:t>public</a:t>
+            </a:r>
+            <a:r>
+              <a:rPr lang="en-US" sz="1200" dirty="0">
+                <a:solidFill>
+                  <a:srgbClr val="000000"/>
+                </a:solidFill>
+                <a:latin typeface="Cascadia Mono" panose="020B0609020000020004" pitchFamily="49" charset="0"/>
+              </a:rPr>
+              <a:t> </a:t>
+            </a:r>
+            <a:r>
+              <a:rPr lang="en-US" sz="1200" dirty="0">
+                <a:solidFill>
+                  <a:srgbClr val="0000FF"/>
+                </a:solidFill>
+                <a:latin typeface="Cascadia Mono" panose="020B0609020000020004" pitchFamily="49" charset="0"/>
+              </a:rPr>
+              <a:t>override</a:t>
+            </a:r>
+            <a:r>
+              <a:rPr lang="en-US" sz="1200" dirty="0">
+                <a:solidFill>
+                  <a:srgbClr val="000000"/>
+                </a:solidFill>
+                <a:latin typeface="Cascadia Mono" panose="020B0609020000020004" pitchFamily="49" charset="0"/>
+              </a:rPr>
+              <a:t> </a:t>
+            </a:r>
+            <a:r>
+              <a:rPr lang="en-US" sz="1200" dirty="0">
+                <a:solidFill>
+                  <a:srgbClr val="0000FF"/>
+                </a:solidFill>
+                <a:latin typeface="Cascadia Mono" panose="020B0609020000020004" pitchFamily="49" charset="0"/>
+              </a:rPr>
+              <a:t>string</a:t>
+            </a:r>
+            <a:r>
+              <a:rPr lang="en-US" sz="1200" dirty="0">
+                <a:solidFill>
+                  <a:srgbClr val="000000"/>
+                </a:solidFill>
+                <a:latin typeface="Cascadia Mono" panose="020B0609020000020004" pitchFamily="49" charset="0"/>
+              </a:rPr>
+              <a:t> </a:t>
+            </a:r>
+            <a:r>
+              <a:rPr lang="en-US" sz="1200" dirty="0" err="1">
+                <a:solidFill>
+                  <a:srgbClr val="000000"/>
+                </a:solidFill>
+                <a:latin typeface="Cascadia Mono" panose="020B0609020000020004" pitchFamily="49" charset="0"/>
+              </a:rPr>
+              <a:t>LongName</a:t>
+            </a:r>
+            <a:r>
+              <a:rPr lang="en-US" sz="1200" dirty="0">
+                <a:solidFill>
+                  <a:srgbClr val="000000"/>
+                </a:solidFill>
+                <a:latin typeface="Cascadia Mono" panose="020B0609020000020004" pitchFamily="49" charset="0"/>
+              </a:rPr>
+              <a:t> =&gt; </a:t>
+            </a:r>
+            <a:r>
+              <a:rPr lang="en-US" sz="1200" dirty="0">
+                <a:solidFill>
+                  <a:srgbClr val="A31515"/>
+                </a:solidFill>
+                <a:latin typeface="Cascadia Mono" panose="020B0609020000020004" pitchFamily="49" charset="0"/>
+              </a:rPr>
+              <a:t>"</a:t>
+            </a:r>
+            <a:r>
+              <a:rPr lang="en-US" sz="1200" dirty="0" err="1">
+                <a:solidFill>
+                  <a:srgbClr val="A31515"/>
+                </a:solidFill>
+                <a:latin typeface="Cascadia Mono" panose="020B0609020000020004" pitchFamily="49" charset="0"/>
+              </a:rPr>
+              <a:t>Hagarg</a:t>
+            </a:r>
+            <a:r>
+              <a:rPr lang="en-US" sz="1200" dirty="0">
+                <a:solidFill>
+                  <a:srgbClr val="A31515"/>
+                </a:solidFill>
+                <a:latin typeface="Cascadia Mono" panose="020B0609020000020004" pitchFamily="49" charset="0"/>
+              </a:rPr>
+              <a:t> </a:t>
+            </a:r>
+            <a:r>
+              <a:rPr lang="en-US" sz="1200" dirty="0" err="1">
+                <a:solidFill>
+                  <a:srgbClr val="A31515"/>
+                </a:solidFill>
+                <a:latin typeface="Cascadia Mono" panose="020B0609020000020004" pitchFamily="49" charset="0"/>
+              </a:rPr>
+              <a:t>Ryonis</a:t>
+            </a:r>
+            <a:r>
+              <a:rPr lang="en-US" sz="1200" dirty="0">
+                <a:solidFill>
+                  <a:srgbClr val="A31515"/>
+                </a:solidFill>
+                <a:latin typeface="Cascadia Mono" panose="020B0609020000020004" pitchFamily="49" charset="0"/>
+              </a:rPr>
+              <a:t>, goddess of beasts"</a:t>
+            </a:r>
+            <a:r>
+              <a:rPr lang="en-US" sz="1200" dirty="0">
+                <a:solidFill>
+                  <a:srgbClr val="000000"/>
+                </a:solidFill>
+                <a:latin typeface="Cascadia Mono" panose="020B0609020000020004" pitchFamily="49" charset="0"/>
+              </a:rPr>
+              <a:t>;</a:t>
+            </a:r>
+          </a:p>
+          <a:p>
+            <a:pPr marL="0" indent="0">
+              <a:buNone/>
+            </a:pPr>
+            <a:r>
+              <a:rPr lang="en-US" sz="1200" dirty="0">
+                <a:solidFill>
+                  <a:srgbClr val="000000"/>
+                </a:solidFill>
+                <a:latin typeface="Cascadia Mono" panose="020B0609020000020004" pitchFamily="49" charset="0"/>
+              </a:rPr>
+              <a:t>    </a:t>
+            </a:r>
+            <a:r>
+              <a:rPr lang="en-US" sz="1200" dirty="0">
+                <a:solidFill>
+                  <a:srgbClr val="0000FF"/>
+                </a:solidFill>
+                <a:latin typeface="Cascadia Mono" panose="020B0609020000020004" pitchFamily="49" charset="0"/>
+              </a:rPr>
+              <a:t>public</a:t>
+            </a:r>
+            <a:r>
+              <a:rPr lang="en-US" sz="1200" dirty="0">
+                <a:solidFill>
+                  <a:srgbClr val="000000"/>
+                </a:solidFill>
+                <a:latin typeface="Cascadia Mono" panose="020B0609020000020004" pitchFamily="49" charset="0"/>
+              </a:rPr>
+              <a:t> </a:t>
+            </a:r>
+            <a:r>
+              <a:rPr lang="en-US" sz="1200" dirty="0">
+                <a:solidFill>
+                  <a:srgbClr val="0000FF"/>
+                </a:solidFill>
+                <a:latin typeface="Cascadia Mono" panose="020B0609020000020004" pitchFamily="49" charset="0"/>
+              </a:rPr>
+              <a:t>override</a:t>
+            </a:r>
+            <a:r>
+              <a:rPr lang="en-US" sz="1200" dirty="0">
+                <a:solidFill>
+                  <a:srgbClr val="000000"/>
+                </a:solidFill>
+                <a:latin typeface="Cascadia Mono" panose="020B0609020000020004" pitchFamily="49" charset="0"/>
+              </a:rPr>
+              <a:t> </a:t>
+            </a:r>
+            <a:r>
+              <a:rPr lang="en-US" sz="1200" dirty="0">
+                <a:solidFill>
+                  <a:srgbClr val="0000FF"/>
+                </a:solidFill>
+                <a:latin typeface="Cascadia Mono" panose="020B0609020000020004" pitchFamily="49" charset="0"/>
+              </a:rPr>
+              <a:t>string</a:t>
+            </a:r>
+            <a:r>
+              <a:rPr lang="en-US" sz="1200" dirty="0">
+                <a:solidFill>
+                  <a:srgbClr val="000000"/>
+                </a:solidFill>
+                <a:latin typeface="Cascadia Mono" panose="020B0609020000020004" pitchFamily="49" charset="0"/>
+              </a:rPr>
+              <a:t> </a:t>
+            </a:r>
+            <a:r>
+              <a:rPr lang="en-US" sz="1200" dirty="0" err="1">
+                <a:solidFill>
+                  <a:srgbClr val="000000"/>
+                </a:solidFill>
+                <a:latin typeface="Cascadia Mono" panose="020B0609020000020004" pitchFamily="49" charset="0"/>
+              </a:rPr>
+              <a:t>ShortName</a:t>
+            </a:r>
+            <a:r>
+              <a:rPr lang="en-US" sz="1200" dirty="0">
+                <a:solidFill>
+                  <a:srgbClr val="000000"/>
+                </a:solidFill>
+                <a:latin typeface="Cascadia Mono" panose="020B0609020000020004" pitchFamily="49" charset="0"/>
+              </a:rPr>
+              <a:t> =&gt; </a:t>
+            </a:r>
+            <a:r>
+              <a:rPr lang="en-US" sz="1200" dirty="0">
+                <a:solidFill>
+                  <a:srgbClr val="A31515"/>
+                </a:solidFill>
+                <a:latin typeface="Cascadia Mono" panose="020B0609020000020004" pitchFamily="49" charset="0"/>
+              </a:rPr>
+              <a:t>"</a:t>
+            </a:r>
+            <a:r>
+              <a:rPr lang="en-US" sz="1200" dirty="0" err="1">
+                <a:solidFill>
+                  <a:srgbClr val="A31515"/>
+                </a:solidFill>
+                <a:latin typeface="Cascadia Mono" panose="020B0609020000020004" pitchFamily="49" charset="0"/>
+              </a:rPr>
+              <a:t>Hagarg</a:t>
+            </a:r>
+            <a:r>
+              <a:rPr lang="en-US" sz="1200" dirty="0">
+                <a:solidFill>
+                  <a:srgbClr val="A31515"/>
+                </a:solidFill>
+                <a:latin typeface="Cascadia Mono" panose="020B0609020000020004" pitchFamily="49" charset="0"/>
+              </a:rPr>
+              <a:t> </a:t>
+            </a:r>
+            <a:r>
+              <a:rPr lang="en-US" sz="1200" dirty="0" err="1">
+                <a:solidFill>
+                  <a:srgbClr val="A31515"/>
+                </a:solidFill>
+                <a:latin typeface="Cascadia Mono" panose="020B0609020000020004" pitchFamily="49" charset="0"/>
+              </a:rPr>
+              <a:t>Ryonis</a:t>
+            </a:r>
+            <a:r>
+              <a:rPr lang="en-US" sz="1200" dirty="0">
+                <a:solidFill>
+                  <a:srgbClr val="A31515"/>
+                </a:solidFill>
+                <a:latin typeface="Cascadia Mono" panose="020B0609020000020004" pitchFamily="49" charset="0"/>
+              </a:rPr>
+              <a:t>"</a:t>
+            </a:r>
+            <a:r>
+              <a:rPr lang="en-US" sz="1200" dirty="0">
+                <a:solidFill>
+                  <a:srgbClr val="000000"/>
+                </a:solidFill>
+                <a:latin typeface="Cascadia Mono" panose="020B0609020000020004" pitchFamily="49" charset="0"/>
+              </a:rPr>
+              <a:t>;</a:t>
+            </a:r>
+          </a:p>
+          <a:p>
+            <a:pPr marL="0" indent="0">
+              <a:buNone/>
+            </a:pPr>
+            <a:r>
+              <a:rPr lang="en-US" sz="1200" dirty="0">
+                <a:solidFill>
+                  <a:srgbClr val="000000"/>
+                </a:solidFill>
+                <a:latin typeface="Cascadia Mono" panose="020B0609020000020004" pitchFamily="49" charset="0"/>
+              </a:rPr>
+              <a:t>    </a:t>
+            </a:r>
+            <a:r>
+              <a:rPr lang="en-US" sz="1200" dirty="0">
+                <a:solidFill>
+                  <a:srgbClr val="0000FF"/>
+                </a:solidFill>
+                <a:latin typeface="Cascadia Mono" panose="020B0609020000020004" pitchFamily="49" charset="0"/>
+              </a:rPr>
+              <a:t>public</a:t>
+            </a:r>
+            <a:r>
+              <a:rPr lang="en-US" sz="1200" dirty="0">
+                <a:solidFill>
+                  <a:srgbClr val="000000"/>
+                </a:solidFill>
+                <a:latin typeface="Cascadia Mono" panose="020B0609020000020004" pitchFamily="49" charset="0"/>
+              </a:rPr>
+              <a:t> </a:t>
+            </a:r>
+            <a:r>
+              <a:rPr lang="en-US" sz="1200" dirty="0">
+                <a:solidFill>
+                  <a:srgbClr val="0000FF"/>
+                </a:solidFill>
+                <a:latin typeface="Cascadia Mono" panose="020B0609020000020004" pitchFamily="49" charset="0"/>
+              </a:rPr>
+              <a:t>override</a:t>
+            </a:r>
+            <a:r>
+              <a:rPr lang="en-US" sz="1200" dirty="0">
+                <a:solidFill>
+                  <a:srgbClr val="000000"/>
+                </a:solidFill>
+                <a:latin typeface="Cascadia Mono" panose="020B0609020000020004" pitchFamily="49" charset="0"/>
+              </a:rPr>
+              <a:t> </a:t>
+            </a:r>
+            <a:r>
+              <a:rPr lang="en-US" sz="1200" dirty="0">
+                <a:solidFill>
+                  <a:srgbClr val="0000FF"/>
+                </a:solidFill>
+                <a:latin typeface="Cascadia Mono" panose="020B0609020000020004" pitchFamily="49" charset="0"/>
+              </a:rPr>
+              <a:t>string</a:t>
+            </a:r>
+            <a:r>
+              <a:rPr lang="en-US" sz="1200" dirty="0">
+                <a:solidFill>
+                  <a:srgbClr val="000000"/>
+                </a:solidFill>
+                <a:latin typeface="Cascadia Mono" panose="020B0609020000020004" pitchFamily="49" charset="0"/>
+              </a:rPr>
+              <a:t> </a:t>
+            </a:r>
+            <a:r>
+              <a:rPr lang="en-US" sz="1200" dirty="0" err="1">
+                <a:solidFill>
+                  <a:srgbClr val="000000"/>
+                </a:solidFill>
+                <a:latin typeface="Cascadia Mono" panose="020B0609020000020004" pitchFamily="49" charset="0"/>
+              </a:rPr>
+              <a:t>FavorDescription</a:t>
+            </a:r>
+            <a:r>
+              <a:rPr lang="en-US" sz="1200" dirty="0">
+                <a:solidFill>
+                  <a:srgbClr val="000000"/>
+                </a:solidFill>
+                <a:latin typeface="Cascadia Mono" panose="020B0609020000020004" pitchFamily="49" charset="0"/>
+              </a:rPr>
+              <a:t> =&gt; </a:t>
+            </a:r>
+            <a:r>
+              <a:rPr lang="en-US" sz="1200" dirty="0">
+                <a:solidFill>
+                  <a:srgbClr val="A31515"/>
+                </a:solidFill>
+                <a:latin typeface="Cascadia Mono" panose="020B0609020000020004" pitchFamily="49" charset="0"/>
+              </a:rPr>
+              <a:t>" ({0}% chance to avoid poison/life drain)"</a:t>
+            </a:r>
+            <a:r>
+              <a:rPr lang="en-US" sz="1200" dirty="0">
+                <a:solidFill>
+                  <a:srgbClr val="000000"/>
+                </a:solidFill>
+                <a:latin typeface="Cascadia Mono" panose="020B0609020000020004" pitchFamily="49" charset="0"/>
+              </a:rPr>
+              <a:t>;</a:t>
+            </a:r>
+          </a:p>
+          <a:p>
+            <a:pPr marL="0" indent="0">
+              <a:buNone/>
+            </a:pPr>
+            <a:r>
+              <a:rPr lang="en-US" sz="1200" dirty="0">
+                <a:solidFill>
+                  <a:srgbClr val="000000"/>
+                </a:solidFill>
+                <a:latin typeface="Cascadia Mono" panose="020B0609020000020004" pitchFamily="49" charset="0"/>
+              </a:rPr>
+              <a:t>}</a:t>
+            </a:r>
+            <a:endParaRPr lang="en-US" sz="1200" dirty="0"/>
+          </a:p>
+        </p:txBody>
+      </p:sp>
+    </p:spTree>
+    <p:extLst>
+      <p:ext uri="{BB962C8B-B14F-4D97-AF65-F5344CB8AC3E}">
+        <p14:creationId xmlns:p14="http://schemas.microsoft.com/office/powerpoint/2010/main" val="408214001"/>
+      </p:ext>
+    </p:extLst>
+  </p:cSld>
+  <p:clrMapOvr>
+    <a:masterClrMapping/>
+  </p:clrMapOvr>
+</p:sld>
+</file>
+
+<file path=ppt/slides/slide11.xml><?xml version="1.0" encoding="utf-8"?>
+<p:sld xmlns:a="http://schemas.openxmlformats.org/drawingml/2006/main" xmlns:r="http://schemas.openxmlformats.org/officeDocument/2006/relationships" xmlns:p="http://schemas.openxmlformats.org/presentationml/2006/main">
+  <p:cSld>
+    <p:spTree>
+      <p:nvGrpSpPr>
+        <p:cNvPr id="1" name=""/>
+        <p:cNvGrpSpPr/>
+        <p:nvPr/>
+      </p:nvGrpSpPr>
+      <p:grpSpPr>
+        <a:xfrm>
+          <a:off x="0" y="0"/>
+          <a:ext cx="0" cy="0"/>
+          <a:chOff x="0" y="0"/>
+          <a:chExt cx="0" cy="0"/>
+        </a:xfrm>
+      </p:grpSpPr>
+      <p:sp>
+        <p:nvSpPr>
+          <p:cNvPr id="2" name="Title 1">
+            <a:extLst>
+              <a:ext uri="{FF2B5EF4-FFF2-40B4-BE49-F238E27FC236}">
+                <a16:creationId xmlns:a16="http://schemas.microsoft.com/office/drawing/2014/main" id="{9840CB4B-4C89-2749-1A44-04E00EC35BA2}"/>
+              </a:ext>
+            </a:extLst>
+          </p:cNvPr>
+          <p:cNvSpPr>
+            <a:spLocks noGrp="1"/>
+          </p:cNvSpPr>
+          <p:nvPr>
+            <p:ph type="title"/>
+          </p:nvPr>
+        </p:nvSpPr>
+        <p:spPr/>
+        <p:txBody>
+          <a:bodyPr/>
+          <a:lstStyle/>
+          <a:p>
+            <a:r>
+              <a:rPr lang="en-US" dirty="0"/>
+              <a:t>Binding Implementation</a:t>
+            </a:r>
+          </a:p>
+        </p:txBody>
+      </p:sp>
+      <p:sp>
+        <p:nvSpPr>
+          <p:cNvPr id="3" name="Content Placeholder 2">
+            <a:extLst>
+              <a:ext uri="{FF2B5EF4-FFF2-40B4-BE49-F238E27FC236}">
+                <a16:creationId xmlns:a16="http://schemas.microsoft.com/office/drawing/2014/main" id="{07FD3693-BA4E-FDA4-B2C5-4494D2747D87}"/>
+              </a:ext>
+            </a:extLst>
+          </p:cNvPr>
+          <p:cNvSpPr>
+            <a:spLocks noGrp="1"/>
+          </p:cNvSpPr>
+          <p:nvPr>
+            <p:ph idx="1"/>
+          </p:nvPr>
+        </p:nvSpPr>
+        <p:spPr>
+          <a:xfrm>
+            <a:off x="838200" y="1537252"/>
+            <a:ext cx="10515600" cy="4639711"/>
+          </a:xfrm>
+        </p:spPr>
+        <p:txBody>
+          <a:bodyPr>
+            <a:normAutofit fontScale="62500" lnSpcReduction="20000"/>
+          </a:bodyPr>
+          <a:lstStyle/>
+          <a:p>
+            <a:pPr marL="0" indent="0">
+              <a:buNone/>
+            </a:pPr>
+            <a:r>
+              <a:rPr lang="en-US" dirty="0"/>
+              <a:t>The binding phase is used  by API Objects to attach to other objects.  The </a:t>
+            </a:r>
+            <a:r>
+              <a:rPr lang="en-US" dirty="0" err="1"/>
+              <a:t>AngbandOS</a:t>
+            </a:r>
+            <a:r>
+              <a:rPr lang="en-US" dirty="0"/>
+              <a:t> core uses a two-phase process for loading API Objects.</a:t>
+            </a:r>
+          </a:p>
+          <a:p>
+            <a:pPr marL="514350" indent="-514350">
+              <a:buAutoNum type="arabicPeriod"/>
+            </a:pPr>
+            <a:r>
+              <a:rPr lang="en-US" dirty="0"/>
+              <a:t>Load Phase – this phase loads all of the objects from either a game pack or by deserialization.  These objects are stored in the </a:t>
+            </a:r>
+            <a:r>
+              <a:rPr lang="en-US" dirty="0" err="1"/>
+              <a:t>Game.SingletonRepository</a:t>
+            </a:r>
+            <a:r>
+              <a:rPr lang="en-US" dirty="0"/>
+              <a:t>.</a:t>
+            </a:r>
+          </a:p>
+          <a:p>
+            <a:pPr marL="514350" indent="-514350">
+              <a:buAutoNum type="arabicPeriod"/>
+            </a:pPr>
+            <a:r>
+              <a:rPr lang="en-US" dirty="0"/>
+              <a:t>Bind Phase – this phase occurs after the load phase is complete.  </a:t>
+            </a:r>
+            <a:r>
+              <a:rPr lang="en-US" dirty="0" err="1"/>
+              <a:t>AngbandOS</a:t>
+            </a:r>
+            <a:r>
+              <a:rPr lang="en-US" dirty="0"/>
+              <a:t> calls the Bind method for every API Object that was loaded.  API Objects are guaranteed that all of their dependent API objects that they need references to exist and can use the </a:t>
+            </a:r>
+            <a:r>
+              <a:rPr lang="en-US" dirty="0" err="1"/>
+              <a:t>SingletonRepository.Get</a:t>
+            </a:r>
+            <a:r>
+              <a:rPr lang="en-US" dirty="0"/>
+              <a:t> properties to generate the reference.</a:t>
+            </a:r>
+          </a:p>
+          <a:p>
+            <a:pPr marL="0" indent="0">
+              <a:buNone/>
+            </a:pPr>
+            <a:r>
+              <a:rPr lang="en-US" dirty="0"/>
+              <a:t>To implement this:</a:t>
+            </a:r>
+          </a:p>
+          <a:p>
+            <a:r>
+              <a:rPr lang="en-US" dirty="0"/>
+              <a:t>API Objects:</a:t>
+            </a:r>
+          </a:p>
+          <a:p>
+            <a:pPr lvl="1"/>
+            <a:r>
+              <a:rPr lang="en-US" dirty="0"/>
+              <a:t>Need to define an abstract property that returns a string value.  This property is considered light-weight for Generic API Objects and Game Pack objects.  The property name should have a suffix of "Key".   It should note, in the XML comments, which property receives the bound object during the bind phase.</a:t>
+            </a:r>
+          </a:p>
+          <a:p>
+            <a:pPr lvl="1"/>
+            <a:r>
+              <a:rPr lang="en-US" dirty="0"/>
+              <a:t>Should identify in the XML comment which collection that hosts the object.  See the Singleton Collection Interface Binding slide for more information.</a:t>
+            </a:r>
+          </a:p>
+          <a:p>
+            <a:pPr lvl="1"/>
+            <a:r>
+              <a:rPr lang="en-US" dirty="0"/>
+              <a:t>Need to define a non-abstract, non-virtual property that holds the reference to the bound object.  It should note in the XML comment which property it is using for binding during the bind phase.</a:t>
+            </a:r>
+          </a:p>
+          <a:p>
+            <a:pPr lvl="1"/>
+            <a:r>
+              <a:rPr lang="en-US" dirty="0"/>
+              <a:t>Should call the </a:t>
+            </a:r>
+            <a:r>
+              <a:rPr lang="en-US" dirty="0" err="1"/>
+              <a:t>SingletonRepository.Get</a:t>
+            </a:r>
+            <a:r>
+              <a:rPr lang="en-US" dirty="0"/>
+              <a:t> method in the Bind method to </a:t>
+            </a:r>
+          </a:p>
+          <a:p>
+            <a:r>
+              <a:rPr lang="en-US" dirty="0"/>
+              <a:t>Generic API Objects and Game Pack Objects can provide the key value of the desired object.</a:t>
+            </a:r>
+          </a:p>
+          <a:p>
+            <a:endParaRPr lang="en-US" dirty="0"/>
+          </a:p>
+          <a:p>
+            <a:endParaRPr lang="en-US" dirty="0"/>
+          </a:p>
+          <a:p>
+            <a:endParaRPr lang="en-US" dirty="0"/>
+          </a:p>
+          <a:p>
+            <a:pPr marL="0" indent="0">
+              <a:buNone/>
+            </a:pPr>
+            <a:endParaRPr lang="en-US" dirty="0"/>
+          </a:p>
+        </p:txBody>
+      </p:sp>
+    </p:spTree>
+    <p:extLst>
+      <p:ext uri="{BB962C8B-B14F-4D97-AF65-F5344CB8AC3E}">
+        <p14:creationId xmlns:p14="http://schemas.microsoft.com/office/powerpoint/2010/main" val="1899274951"/>
+      </p:ext>
+    </p:extLst>
+  </p:cSld>
+  <p:clrMapOvr>
+    <a:masterClrMapping/>
+  </p:clrMapOvr>
+</p:sld>
+</file>
+
+<file path=ppt/slides/slide12.xml><?xml version="1.0" encoding="utf-8"?>
+<p:sld xmlns:a="http://schemas.openxmlformats.org/drawingml/2006/main" xmlns:r="http://schemas.openxmlformats.org/officeDocument/2006/relationships" xmlns:p="http://schemas.openxmlformats.org/presentationml/2006/main">
+  <p:cSld>
+    <p:spTree>
+      <p:nvGrpSpPr>
+        <p:cNvPr id="1" name=""/>
+        <p:cNvGrpSpPr/>
+        <p:nvPr/>
+      </p:nvGrpSpPr>
+      <p:grpSpPr>
+        <a:xfrm>
+          <a:off x="0" y="0"/>
+          <a:ext cx="0" cy="0"/>
+          <a:chOff x="0" y="0"/>
+          <a:chExt cx="0" cy="0"/>
+        </a:xfrm>
+      </p:grpSpPr>
+      <p:sp>
+        <p:nvSpPr>
+          <p:cNvPr id="2" name="Title 1">
+            <a:extLst>
+              <a:ext uri="{FF2B5EF4-FFF2-40B4-BE49-F238E27FC236}">
+                <a16:creationId xmlns:a16="http://schemas.microsoft.com/office/drawing/2014/main" id="{07B8008A-A924-EAFC-BE08-C2E5DD466393}"/>
+              </a:ext>
+            </a:extLst>
+          </p:cNvPr>
+          <p:cNvSpPr>
+            <a:spLocks noGrp="1"/>
+          </p:cNvSpPr>
+          <p:nvPr>
+            <p:ph type="title"/>
+          </p:nvPr>
+        </p:nvSpPr>
+        <p:spPr/>
+        <p:txBody>
+          <a:bodyPr/>
+          <a:lstStyle/>
+          <a:p>
+            <a:r>
+              <a:rPr lang="en-US" dirty="0"/>
+              <a:t>Binding Implementation Example</a:t>
+            </a:r>
+          </a:p>
+        </p:txBody>
+      </p:sp>
+      <p:sp>
+        <p:nvSpPr>
+          <p:cNvPr id="3" name="Content Placeholder 2">
+            <a:extLst>
+              <a:ext uri="{FF2B5EF4-FFF2-40B4-BE49-F238E27FC236}">
+                <a16:creationId xmlns:a16="http://schemas.microsoft.com/office/drawing/2014/main" id="{819B183C-CF60-6AB0-8CB3-0E0DF587FA80}"/>
+              </a:ext>
+            </a:extLst>
+          </p:cNvPr>
+          <p:cNvSpPr>
+            <a:spLocks noGrp="1"/>
+          </p:cNvSpPr>
+          <p:nvPr>
+            <p:ph idx="1"/>
+          </p:nvPr>
+        </p:nvSpPr>
+        <p:spPr/>
+        <p:txBody>
+          <a:bodyPr>
+            <a:normAutofit/>
+          </a:bodyPr>
+          <a:lstStyle/>
+          <a:p>
+            <a:pPr marL="0" indent="0">
+              <a:buNone/>
+            </a:pPr>
+            <a:r>
+              <a:rPr lang="en-US" sz="1100" dirty="0">
+                <a:solidFill>
+                  <a:srgbClr val="0000FF"/>
+                </a:solidFill>
+                <a:latin typeface="Cascadia Mono" panose="020B0609020000020004" pitchFamily="49" charset="0"/>
+              </a:rPr>
+              <a:t>public</a:t>
+            </a:r>
+            <a:r>
+              <a:rPr lang="en-US" sz="1100" dirty="0">
+                <a:solidFill>
+                  <a:srgbClr val="000000"/>
+                </a:solidFill>
+                <a:latin typeface="Cascadia Mono" panose="020B0609020000020004" pitchFamily="49" charset="0"/>
+              </a:rPr>
+              <a:t> </a:t>
+            </a:r>
+            <a:r>
+              <a:rPr lang="en-US" sz="1100" dirty="0">
+                <a:solidFill>
+                  <a:srgbClr val="0000FF"/>
+                </a:solidFill>
+                <a:latin typeface="Cascadia Mono" panose="020B0609020000020004" pitchFamily="49" charset="0"/>
+              </a:rPr>
+              <a:t>void</a:t>
+            </a:r>
+            <a:r>
+              <a:rPr lang="en-US" sz="1100" dirty="0">
+                <a:solidFill>
+                  <a:srgbClr val="000000"/>
+                </a:solidFill>
+                <a:latin typeface="Cascadia Mono" panose="020B0609020000020004" pitchFamily="49" charset="0"/>
+              </a:rPr>
+              <a:t> Bind()</a:t>
+            </a:r>
+          </a:p>
+          <a:p>
+            <a:pPr marL="0" indent="0">
+              <a:buNone/>
+            </a:pPr>
+            <a:r>
+              <a:rPr lang="en-US" sz="1100" dirty="0">
+                <a:solidFill>
+                  <a:srgbClr val="000000"/>
+                </a:solidFill>
+                <a:latin typeface="Cascadia Mono" panose="020B0609020000020004" pitchFamily="49" charset="0"/>
+              </a:rPr>
+              <a:t>{</a:t>
+            </a:r>
+          </a:p>
+          <a:p>
+            <a:pPr marL="0" indent="0">
+              <a:buNone/>
+            </a:pPr>
+            <a:r>
+              <a:rPr lang="en-US" sz="1100" dirty="0">
+                <a:solidFill>
+                  <a:srgbClr val="000000"/>
+                </a:solidFill>
+                <a:latin typeface="Cascadia Mono" panose="020B0609020000020004" pitchFamily="49" charset="0"/>
+              </a:rPr>
+              <a:t>    </a:t>
+            </a:r>
+            <a:r>
+              <a:rPr lang="en-US" sz="1100" dirty="0" err="1">
+                <a:solidFill>
+                  <a:srgbClr val="000000"/>
+                </a:solidFill>
+                <a:latin typeface="Cascadia Mono" panose="020B0609020000020004" pitchFamily="49" charset="0"/>
+              </a:rPr>
+              <a:t>ExecuteOnPlayerScript</a:t>
+            </a:r>
+            <a:r>
+              <a:rPr lang="en-US" sz="1100" dirty="0">
+                <a:solidFill>
+                  <a:srgbClr val="000000"/>
+                </a:solidFill>
+                <a:latin typeface="Cascadia Mono" panose="020B0609020000020004" pitchFamily="49" charset="0"/>
+              </a:rPr>
+              <a:t> = </a:t>
+            </a:r>
+            <a:r>
+              <a:rPr lang="en-US" sz="1100" dirty="0" err="1">
+                <a:solidFill>
+                  <a:srgbClr val="000000"/>
+                </a:solidFill>
+                <a:latin typeface="Cascadia Mono" panose="020B0609020000020004" pitchFamily="49" charset="0"/>
+              </a:rPr>
+              <a:t>Game.SingletonRepository.Get</a:t>
+            </a:r>
+            <a:r>
+              <a:rPr lang="en-US" sz="1100" dirty="0">
+                <a:solidFill>
+                  <a:srgbClr val="000000"/>
+                </a:solidFill>
+                <a:latin typeface="Cascadia Mono" panose="020B0609020000020004" pitchFamily="49" charset="0"/>
+              </a:rPr>
+              <a:t>&lt;</a:t>
+            </a:r>
+            <a:r>
+              <a:rPr lang="en-US" sz="1100" dirty="0" err="1">
+                <a:solidFill>
+                  <a:srgbClr val="2B91AF"/>
+                </a:solidFill>
+                <a:latin typeface="Cascadia Mono" panose="020B0609020000020004" pitchFamily="49" charset="0"/>
+              </a:rPr>
+              <a:t>IScriptMonster</a:t>
+            </a:r>
+            <a:r>
+              <a:rPr lang="en-US" sz="1100" dirty="0">
+                <a:solidFill>
+                  <a:srgbClr val="000000"/>
+                </a:solidFill>
+                <a:latin typeface="Cascadia Mono" panose="020B0609020000020004" pitchFamily="49" charset="0"/>
+              </a:rPr>
+              <a:t>&gt;(</a:t>
+            </a:r>
+            <a:r>
+              <a:rPr lang="en-US" sz="1100" dirty="0" err="1">
+                <a:solidFill>
+                  <a:srgbClr val="000000"/>
+                </a:solidFill>
+                <a:latin typeface="Cascadia Mono" panose="020B0609020000020004" pitchFamily="49" charset="0"/>
+              </a:rPr>
+              <a:t>ExecuteOnPlayerScriptKey</a:t>
+            </a:r>
+            <a:r>
+              <a:rPr lang="en-US" sz="1100" dirty="0">
+                <a:solidFill>
+                  <a:srgbClr val="000000"/>
+                </a:solidFill>
+                <a:latin typeface="Cascadia Mono" panose="020B0609020000020004" pitchFamily="49" charset="0"/>
+              </a:rPr>
+              <a:t>);</a:t>
+            </a:r>
+          </a:p>
+          <a:p>
+            <a:pPr marL="0" indent="0">
+              <a:buNone/>
+            </a:pPr>
+            <a:r>
+              <a:rPr lang="en-US" sz="1100" dirty="0">
+                <a:solidFill>
+                  <a:srgbClr val="000000"/>
+                </a:solidFill>
+                <a:latin typeface="Cascadia Mono" panose="020B0609020000020004" pitchFamily="49" charset="0"/>
+              </a:rPr>
+              <a:t>}</a:t>
+            </a:r>
+          </a:p>
+          <a:p>
+            <a:pPr marL="0" indent="0">
+              <a:buNone/>
+            </a:pPr>
+            <a:r>
+              <a:rPr lang="en-US" sz="1100" dirty="0">
+                <a:solidFill>
+                  <a:srgbClr val="808080"/>
+                </a:solidFill>
+                <a:latin typeface="Cascadia Mono" panose="020B0609020000020004" pitchFamily="49" charset="0"/>
+              </a:rPr>
+              <a:t>///</a:t>
+            </a:r>
+            <a:r>
+              <a:rPr lang="en-US" sz="1100" dirty="0">
+                <a:solidFill>
+                  <a:srgbClr val="008000"/>
+                </a:solidFill>
+                <a:latin typeface="Cascadia Mono" panose="020B0609020000020004" pitchFamily="49" charset="0"/>
+              </a:rPr>
+              <a:t> </a:t>
+            </a:r>
+            <a:r>
+              <a:rPr lang="en-US" sz="1100" dirty="0">
+                <a:solidFill>
+                  <a:srgbClr val="808080"/>
+                </a:solidFill>
+                <a:latin typeface="Cascadia Mono" panose="020B0609020000020004" pitchFamily="49" charset="0"/>
+              </a:rPr>
+              <a:t>&lt;summary&gt;</a:t>
+            </a:r>
+            <a:endParaRPr lang="en-US" sz="1100" dirty="0">
+              <a:solidFill>
+                <a:srgbClr val="000000"/>
+              </a:solidFill>
+              <a:latin typeface="Cascadia Mono" panose="020B0609020000020004" pitchFamily="49" charset="0"/>
+            </a:endParaRPr>
+          </a:p>
+          <a:p>
+            <a:pPr marL="0" indent="0">
+              <a:buNone/>
+            </a:pPr>
+            <a:r>
+              <a:rPr lang="en-US" sz="1100" dirty="0">
+                <a:solidFill>
+                  <a:srgbClr val="808080"/>
+                </a:solidFill>
+                <a:latin typeface="Cascadia Mono" panose="020B0609020000020004" pitchFamily="49" charset="0"/>
+              </a:rPr>
+              <a:t>///</a:t>
+            </a:r>
+            <a:r>
+              <a:rPr lang="en-US" sz="1100" dirty="0">
+                <a:solidFill>
+                  <a:srgbClr val="008000"/>
+                </a:solidFill>
+                <a:latin typeface="Cascadia Mono" panose="020B0609020000020004" pitchFamily="49" charset="0"/>
+              </a:rPr>
+              <a:t> Returns the key for the script to run when this spell is cast on the player.  This property is used to bind the </a:t>
+            </a:r>
+            <a:r>
+              <a:rPr lang="en-US" sz="1100" dirty="0" err="1">
+                <a:solidFill>
+                  <a:srgbClr val="008000"/>
+                </a:solidFill>
+                <a:latin typeface="Cascadia Mono" panose="020B0609020000020004" pitchFamily="49" charset="0"/>
+              </a:rPr>
+              <a:t>ExecuteOnPlayerScript</a:t>
+            </a:r>
+            <a:r>
+              <a:rPr lang="en-US" sz="1100" dirty="0">
+                <a:solidFill>
+                  <a:srgbClr val="008000"/>
+                </a:solidFill>
+                <a:latin typeface="Cascadia Mono" panose="020B0609020000020004" pitchFamily="49" charset="0"/>
+              </a:rPr>
+              <a:t> property during the bind phase.</a:t>
+            </a:r>
+            <a:endParaRPr lang="en-US" sz="1100" dirty="0">
+              <a:solidFill>
+                <a:srgbClr val="000000"/>
+              </a:solidFill>
+              <a:latin typeface="Cascadia Mono" panose="020B0609020000020004" pitchFamily="49" charset="0"/>
+            </a:endParaRPr>
+          </a:p>
+          <a:p>
+            <a:pPr marL="0" indent="0">
+              <a:buNone/>
+            </a:pPr>
+            <a:r>
+              <a:rPr lang="en-US" sz="1100" dirty="0">
+                <a:solidFill>
+                  <a:srgbClr val="808080"/>
+                </a:solidFill>
+                <a:latin typeface="Cascadia Mono" panose="020B0609020000020004" pitchFamily="49" charset="0"/>
+              </a:rPr>
+              <a:t>///</a:t>
+            </a:r>
+            <a:r>
+              <a:rPr lang="en-US" sz="1100" dirty="0">
+                <a:solidFill>
+                  <a:srgbClr val="008000"/>
+                </a:solidFill>
+                <a:latin typeface="Cascadia Mono" panose="020B0609020000020004" pitchFamily="49" charset="0"/>
+              </a:rPr>
+              <a:t> </a:t>
+            </a:r>
+            <a:r>
+              <a:rPr lang="en-US" sz="1100" dirty="0">
+                <a:solidFill>
+                  <a:srgbClr val="808080"/>
+                </a:solidFill>
+                <a:latin typeface="Cascadia Mono" panose="020B0609020000020004" pitchFamily="49" charset="0"/>
+              </a:rPr>
+              <a:t>&lt;/summary&gt;</a:t>
+            </a:r>
+            <a:endParaRPr lang="en-US" sz="1100" dirty="0">
+              <a:solidFill>
+                <a:srgbClr val="000000"/>
+              </a:solidFill>
+              <a:latin typeface="Cascadia Mono" panose="020B0609020000020004" pitchFamily="49" charset="0"/>
+            </a:endParaRPr>
+          </a:p>
+          <a:p>
+            <a:pPr marL="0" indent="0">
+              <a:buNone/>
+            </a:pPr>
+            <a:r>
+              <a:rPr lang="en-US" sz="1100" dirty="0">
+                <a:solidFill>
+                  <a:srgbClr val="0000FF"/>
+                </a:solidFill>
+                <a:latin typeface="Cascadia Mono" panose="020B0609020000020004" pitchFamily="49" charset="0"/>
+              </a:rPr>
+              <a:t>public</a:t>
+            </a:r>
+            <a:r>
+              <a:rPr lang="en-US" sz="1100" dirty="0">
+                <a:solidFill>
+                  <a:srgbClr val="000000"/>
+                </a:solidFill>
+                <a:latin typeface="Cascadia Mono" panose="020B0609020000020004" pitchFamily="49" charset="0"/>
+              </a:rPr>
+              <a:t> </a:t>
+            </a:r>
+            <a:r>
+              <a:rPr lang="en-US" sz="1100" dirty="0">
+                <a:solidFill>
+                  <a:srgbClr val="0000FF"/>
+                </a:solidFill>
+                <a:latin typeface="Cascadia Mono" panose="020B0609020000020004" pitchFamily="49" charset="0"/>
+              </a:rPr>
+              <a:t>abstract</a:t>
+            </a:r>
+            <a:r>
+              <a:rPr lang="en-US" sz="1100" dirty="0">
+                <a:solidFill>
+                  <a:srgbClr val="000000"/>
+                </a:solidFill>
+                <a:latin typeface="Cascadia Mono" panose="020B0609020000020004" pitchFamily="49" charset="0"/>
+              </a:rPr>
+              <a:t> </a:t>
+            </a:r>
+            <a:r>
+              <a:rPr lang="en-US" sz="1100" dirty="0">
+                <a:solidFill>
+                  <a:srgbClr val="0000FF"/>
+                </a:solidFill>
+                <a:latin typeface="Cascadia Mono" panose="020B0609020000020004" pitchFamily="49" charset="0"/>
+              </a:rPr>
+              <a:t>string</a:t>
+            </a:r>
+            <a:r>
+              <a:rPr lang="en-US" sz="1100" dirty="0">
+                <a:solidFill>
+                  <a:srgbClr val="000000"/>
+                </a:solidFill>
+                <a:latin typeface="Cascadia Mono" panose="020B0609020000020004" pitchFamily="49" charset="0"/>
+              </a:rPr>
+              <a:t> </a:t>
+            </a:r>
+            <a:r>
+              <a:rPr lang="en-US" sz="1100" dirty="0" err="1">
+                <a:solidFill>
+                  <a:srgbClr val="000000"/>
+                </a:solidFill>
+                <a:latin typeface="Cascadia Mono" panose="020B0609020000020004" pitchFamily="49" charset="0"/>
+              </a:rPr>
+              <a:t>ExecuteOnPlayerScriptKey</a:t>
+            </a:r>
+            <a:r>
+              <a:rPr lang="en-US" sz="1100" dirty="0">
+                <a:solidFill>
+                  <a:srgbClr val="000000"/>
+                </a:solidFill>
+                <a:latin typeface="Cascadia Mono" panose="020B0609020000020004" pitchFamily="49" charset="0"/>
+              </a:rPr>
+              <a:t> { </a:t>
+            </a:r>
+            <a:r>
+              <a:rPr lang="en-US" sz="1100" dirty="0">
+                <a:solidFill>
+                  <a:srgbClr val="0000FF"/>
+                </a:solidFill>
+                <a:latin typeface="Cascadia Mono" panose="020B0609020000020004" pitchFamily="49" charset="0"/>
+              </a:rPr>
+              <a:t>get</a:t>
+            </a:r>
+            <a:r>
+              <a:rPr lang="en-US" sz="1100" dirty="0">
+                <a:solidFill>
+                  <a:srgbClr val="000000"/>
+                </a:solidFill>
+                <a:latin typeface="Cascadia Mono" panose="020B0609020000020004" pitchFamily="49" charset="0"/>
+              </a:rPr>
+              <a:t>; }</a:t>
+            </a:r>
+          </a:p>
+          <a:p>
+            <a:pPr marL="0" indent="0">
+              <a:buNone/>
+            </a:pPr>
+            <a:endParaRPr lang="en-US" sz="1100" dirty="0">
+              <a:solidFill>
+                <a:srgbClr val="000000"/>
+              </a:solidFill>
+              <a:latin typeface="Cascadia Mono" panose="020B0609020000020004" pitchFamily="49" charset="0"/>
+            </a:endParaRPr>
+          </a:p>
+          <a:p>
+            <a:pPr marL="0" indent="0">
+              <a:buNone/>
+            </a:pPr>
+            <a:r>
+              <a:rPr lang="en-US" sz="1100" dirty="0">
+                <a:solidFill>
+                  <a:srgbClr val="808080"/>
+                </a:solidFill>
+                <a:latin typeface="Cascadia Mono" panose="020B0609020000020004" pitchFamily="49" charset="0"/>
+              </a:rPr>
+              <a:t>///</a:t>
+            </a:r>
+            <a:r>
+              <a:rPr lang="en-US" sz="1100" dirty="0">
+                <a:solidFill>
+                  <a:srgbClr val="008000"/>
+                </a:solidFill>
+                <a:latin typeface="Cascadia Mono" panose="020B0609020000020004" pitchFamily="49" charset="0"/>
+              </a:rPr>
+              <a:t> </a:t>
+            </a:r>
+            <a:r>
+              <a:rPr lang="en-US" sz="1100" dirty="0">
+                <a:solidFill>
+                  <a:srgbClr val="808080"/>
+                </a:solidFill>
+                <a:latin typeface="Cascadia Mono" panose="020B0609020000020004" pitchFamily="49" charset="0"/>
+              </a:rPr>
+              <a:t>&lt;summary&gt;</a:t>
+            </a:r>
+            <a:endParaRPr lang="en-US" sz="1100" dirty="0">
+              <a:solidFill>
+                <a:srgbClr val="000000"/>
+              </a:solidFill>
+              <a:latin typeface="Cascadia Mono" panose="020B0609020000020004" pitchFamily="49" charset="0"/>
+            </a:endParaRPr>
+          </a:p>
+          <a:p>
+            <a:pPr marL="0" indent="0">
+              <a:buNone/>
+            </a:pPr>
+            <a:r>
+              <a:rPr lang="en-US" sz="1100" dirty="0">
+                <a:solidFill>
+                  <a:srgbClr val="808080"/>
+                </a:solidFill>
+                <a:latin typeface="Cascadia Mono" panose="020B0609020000020004" pitchFamily="49" charset="0"/>
+              </a:rPr>
+              <a:t>///</a:t>
+            </a:r>
+            <a:r>
+              <a:rPr lang="en-US" sz="1100" dirty="0">
+                <a:solidFill>
+                  <a:srgbClr val="008000"/>
+                </a:solidFill>
+                <a:latin typeface="Cascadia Mono" panose="020B0609020000020004" pitchFamily="49" charset="0"/>
+              </a:rPr>
+              <a:t> Returns the script to run when this spell is cast on the player.  This property is bound using the </a:t>
+            </a:r>
+            <a:r>
+              <a:rPr lang="en-US" sz="1100" dirty="0" err="1">
+                <a:solidFill>
+                  <a:srgbClr val="008000"/>
+                </a:solidFill>
+                <a:latin typeface="Cascadia Mono" panose="020B0609020000020004" pitchFamily="49" charset="0"/>
+              </a:rPr>
+              <a:t>ExecuteOnPlayerScriptKey</a:t>
+            </a:r>
+            <a:r>
+              <a:rPr lang="en-US" sz="1100" dirty="0">
+                <a:solidFill>
+                  <a:srgbClr val="008000"/>
+                </a:solidFill>
+                <a:latin typeface="Cascadia Mono" panose="020B0609020000020004" pitchFamily="49" charset="0"/>
+              </a:rPr>
+              <a:t> property during the bind phase.</a:t>
+            </a:r>
+            <a:endParaRPr lang="en-US" sz="1100" dirty="0">
+              <a:solidFill>
+                <a:srgbClr val="000000"/>
+              </a:solidFill>
+              <a:latin typeface="Cascadia Mono" panose="020B0609020000020004" pitchFamily="49" charset="0"/>
+            </a:endParaRPr>
+          </a:p>
+          <a:p>
+            <a:pPr marL="0" indent="0">
+              <a:buNone/>
+            </a:pPr>
+            <a:r>
+              <a:rPr lang="en-US" sz="1100" dirty="0">
+                <a:solidFill>
+                  <a:srgbClr val="808080"/>
+                </a:solidFill>
+                <a:latin typeface="Cascadia Mono" panose="020B0609020000020004" pitchFamily="49" charset="0"/>
+              </a:rPr>
+              <a:t>///</a:t>
+            </a:r>
+            <a:r>
+              <a:rPr lang="en-US" sz="1100" dirty="0">
+                <a:solidFill>
+                  <a:srgbClr val="008000"/>
+                </a:solidFill>
+                <a:latin typeface="Cascadia Mono" panose="020B0609020000020004" pitchFamily="49" charset="0"/>
+              </a:rPr>
+              <a:t> </a:t>
+            </a:r>
+            <a:r>
+              <a:rPr lang="en-US" sz="1100" dirty="0">
+                <a:solidFill>
+                  <a:srgbClr val="808080"/>
+                </a:solidFill>
+                <a:latin typeface="Cascadia Mono" panose="020B0609020000020004" pitchFamily="49" charset="0"/>
+              </a:rPr>
+              <a:t>&lt;/summary&gt;</a:t>
+            </a:r>
+            <a:endParaRPr lang="en-US" sz="1100" dirty="0">
+              <a:solidFill>
+                <a:srgbClr val="000000"/>
+              </a:solidFill>
+              <a:latin typeface="Cascadia Mono" panose="020B0609020000020004" pitchFamily="49" charset="0"/>
+            </a:endParaRPr>
+          </a:p>
+          <a:p>
+            <a:pPr marL="0" indent="0">
+              <a:buNone/>
+            </a:pPr>
+            <a:r>
+              <a:rPr lang="en-US" sz="1100" dirty="0">
+                <a:solidFill>
+                  <a:srgbClr val="0000FF"/>
+                </a:solidFill>
+                <a:latin typeface="Cascadia Mono" panose="020B0609020000020004" pitchFamily="49" charset="0"/>
+              </a:rPr>
+              <a:t>public</a:t>
+            </a:r>
+            <a:r>
+              <a:rPr lang="en-US" sz="1100" dirty="0">
+                <a:solidFill>
+                  <a:srgbClr val="000000"/>
+                </a:solidFill>
+                <a:latin typeface="Cascadia Mono" panose="020B0609020000020004" pitchFamily="49" charset="0"/>
+              </a:rPr>
+              <a:t> </a:t>
+            </a:r>
+            <a:r>
+              <a:rPr lang="en-US" sz="800" dirty="0" err="1">
+                <a:solidFill>
+                  <a:srgbClr val="2B91AF"/>
+                </a:solidFill>
+                <a:latin typeface="Cascadia Mono" panose="020B0609020000020004" pitchFamily="49" charset="0"/>
+              </a:rPr>
+              <a:t>IScriptMonster</a:t>
+            </a:r>
+            <a:r>
+              <a:rPr lang="en-US" sz="800" dirty="0">
+                <a:solidFill>
+                  <a:srgbClr val="000000"/>
+                </a:solidFill>
+                <a:latin typeface="Cascadia Mono" panose="020B0609020000020004" pitchFamily="49" charset="0"/>
+              </a:rPr>
+              <a:t> </a:t>
+            </a:r>
+            <a:r>
+              <a:rPr lang="en-US" sz="800" dirty="0" err="1">
+                <a:solidFill>
+                  <a:srgbClr val="000000"/>
+                </a:solidFill>
+                <a:latin typeface="Cascadia Mono" panose="020B0609020000020004" pitchFamily="49" charset="0"/>
+              </a:rPr>
+              <a:t>ExecuteOnPlayerScript</a:t>
+            </a:r>
+            <a:r>
+              <a:rPr lang="en-US" sz="800" dirty="0">
+                <a:solidFill>
+                  <a:srgbClr val="000000"/>
+                </a:solidFill>
+                <a:latin typeface="Cascadia Mono" panose="020B0609020000020004" pitchFamily="49" charset="0"/>
+              </a:rPr>
+              <a:t> { </a:t>
+            </a:r>
+            <a:r>
+              <a:rPr lang="en-US" sz="800" dirty="0">
+                <a:solidFill>
+                  <a:srgbClr val="0000FF"/>
+                </a:solidFill>
+                <a:latin typeface="Cascadia Mono" panose="020B0609020000020004" pitchFamily="49" charset="0"/>
+              </a:rPr>
+              <a:t>get</a:t>
+            </a:r>
+            <a:r>
+              <a:rPr lang="en-US" sz="800" dirty="0">
+                <a:solidFill>
+                  <a:srgbClr val="000000"/>
+                </a:solidFill>
+                <a:latin typeface="Cascadia Mono" panose="020B0609020000020004" pitchFamily="49" charset="0"/>
+              </a:rPr>
+              <a:t>; </a:t>
+            </a:r>
+            <a:r>
+              <a:rPr lang="en-US" sz="800" dirty="0">
+                <a:solidFill>
+                  <a:srgbClr val="0000FF"/>
+                </a:solidFill>
+                <a:latin typeface="Cascadia Mono" panose="020B0609020000020004" pitchFamily="49" charset="0"/>
+              </a:rPr>
+              <a:t>private</a:t>
+            </a:r>
+            <a:r>
+              <a:rPr lang="en-US" sz="800" dirty="0">
+                <a:solidFill>
+                  <a:srgbClr val="000000"/>
+                </a:solidFill>
+                <a:latin typeface="Cascadia Mono" panose="020B0609020000020004" pitchFamily="49" charset="0"/>
+              </a:rPr>
+              <a:t> </a:t>
+            </a:r>
+            <a:r>
+              <a:rPr lang="en-US" sz="800" dirty="0">
+                <a:solidFill>
+                  <a:srgbClr val="0000FF"/>
+                </a:solidFill>
+                <a:latin typeface="Cascadia Mono" panose="020B0609020000020004" pitchFamily="49" charset="0"/>
+              </a:rPr>
+              <a:t>set</a:t>
+            </a:r>
+            <a:r>
+              <a:rPr lang="en-US" sz="800" dirty="0">
+                <a:solidFill>
+                  <a:srgbClr val="000000"/>
+                </a:solidFill>
+                <a:latin typeface="Cascadia Mono" panose="020B0609020000020004" pitchFamily="49" charset="0"/>
+              </a:rPr>
+              <a:t>; }</a:t>
+            </a:r>
+            <a:endParaRPr lang="en-US" sz="800" dirty="0"/>
+          </a:p>
+        </p:txBody>
+      </p:sp>
+    </p:spTree>
+    <p:extLst>
+      <p:ext uri="{BB962C8B-B14F-4D97-AF65-F5344CB8AC3E}">
+        <p14:creationId xmlns:p14="http://schemas.microsoft.com/office/powerpoint/2010/main" val="1074209003"/>
+      </p:ext>
+    </p:extLst>
+  </p:cSld>
+  <p:clrMapOvr>
+    <a:masterClrMapping/>
+  </p:clrMapOvr>
+</p:sld>
+</file>
+
+<file path=ppt/slides/slide13.xml><?xml version="1.0" encoding="utf-8"?>
+<p:sld xmlns:a="http://schemas.openxmlformats.org/drawingml/2006/main" xmlns:r="http://schemas.openxmlformats.org/officeDocument/2006/relationships" xmlns:p="http://schemas.openxmlformats.org/presentationml/2006/main">
+  <p:cSld>
+    <p:spTree>
+      <p:nvGrpSpPr>
+        <p:cNvPr id="1" name=""/>
+        <p:cNvGrpSpPr/>
+        <p:nvPr/>
+      </p:nvGrpSpPr>
+      <p:grpSpPr>
+        <a:xfrm>
+          <a:off x="0" y="0"/>
+          <a:ext cx="0" cy="0"/>
+          <a:chOff x="0" y="0"/>
+          <a:chExt cx="0" cy="0"/>
+        </a:xfrm>
+      </p:grpSpPr>
+      <p:sp>
+        <p:nvSpPr>
+          <p:cNvPr id="2" name="Title 1">
+            <a:extLst>
+              <a:ext uri="{FF2B5EF4-FFF2-40B4-BE49-F238E27FC236}">
+                <a16:creationId xmlns:a16="http://schemas.microsoft.com/office/drawing/2014/main" id="{D470675A-A7F2-6A4B-DE18-2B7A2079C63E}"/>
+              </a:ext>
+            </a:extLst>
+          </p:cNvPr>
+          <p:cNvSpPr>
+            <a:spLocks noGrp="1"/>
+          </p:cNvSpPr>
+          <p:nvPr>
+            <p:ph type="title"/>
+          </p:nvPr>
+        </p:nvSpPr>
+        <p:spPr/>
+        <p:txBody>
+          <a:bodyPr/>
+          <a:lstStyle/>
+          <a:p>
+            <a:r>
+              <a:rPr lang="en-US" dirty="0"/>
+              <a:t>Singleton Collection Interface Binding</a:t>
+            </a:r>
+          </a:p>
+        </p:txBody>
+      </p:sp>
+      <p:sp>
+        <p:nvSpPr>
+          <p:cNvPr id="3" name="Content Placeholder 2">
+            <a:extLst>
+              <a:ext uri="{FF2B5EF4-FFF2-40B4-BE49-F238E27FC236}">
+                <a16:creationId xmlns:a16="http://schemas.microsoft.com/office/drawing/2014/main" id="{0D7B1D8D-3622-8F1C-6E5C-FAB96016C7E8}"/>
+              </a:ext>
+            </a:extLst>
+          </p:cNvPr>
+          <p:cNvSpPr>
+            <a:spLocks noGrp="1"/>
+          </p:cNvSpPr>
+          <p:nvPr>
+            <p:ph idx="1"/>
+          </p:nvPr>
+        </p:nvSpPr>
+        <p:spPr/>
+        <p:txBody>
+          <a:bodyPr>
+            <a:normAutofit fontScale="92500"/>
+          </a:bodyPr>
+          <a:lstStyle/>
+          <a:p>
+            <a:pPr marL="0" indent="0">
+              <a:buNone/>
+            </a:pPr>
+            <a:r>
+              <a:rPr lang="en-US" dirty="0"/>
+              <a:t>The two-phase load and bind phases for </a:t>
+            </a:r>
+            <a:r>
+              <a:rPr lang="en-US" dirty="0" err="1"/>
+              <a:t>AngbandOS</a:t>
+            </a:r>
+            <a:r>
+              <a:rPr lang="en-US" dirty="0"/>
+              <a:t> often need to allow binding to objects using an interface; rather than a solid class.</a:t>
+            </a:r>
+          </a:p>
+          <a:p>
+            <a:pPr marL="0" indent="0">
+              <a:buNone/>
+            </a:pPr>
+            <a:r>
+              <a:rPr lang="en-US" dirty="0"/>
+              <a:t>To support this, </a:t>
+            </a:r>
+            <a:r>
+              <a:rPr lang="en-US" dirty="0" err="1"/>
+              <a:t>AngbandOS</a:t>
+            </a:r>
+            <a:r>
+              <a:rPr lang="en-US" dirty="0"/>
+              <a:t> implements a solid-class and interface registration that the </a:t>
+            </a:r>
+            <a:r>
+              <a:rPr lang="en-US" dirty="0" err="1"/>
+              <a:t>SingletonRepository.Get</a:t>
+            </a:r>
+            <a:r>
+              <a:rPr lang="en-US" dirty="0"/>
+              <a:t> method uses for finding objects during the bind phase.</a:t>
+            </a:r>
+          </a:p>
+          <a:p>
+            <a:pPr marL="0" indent="0">
+              <a:buNone/>
+            </a:pPr>
+            <a:r>
+              <a:rPr lang="en-US" dirty="0"/>
+              <a:t>To add additional interfaces and support to this system, the </a:t>
+            </a:r>
+            <a:r>
+              <a:rPr lang="en-US" dirty="0" err="1"/>
+              <a:t>SingletonRepository.Load</a:t>
+            </a:r>
+            <a:r>
+              <a:rPr lang="en-US" dirty="0"/>
+              <a:t> method registers the classes and interfaces.</a:t>
+            </a:r>
+          </a:p>
+          <a:p>
+            <a:pPr marL="0" indent="0">
+              <a:buNone/>
+            </a:pPr>
+            <a:r>
+              <a:rPr lang="en-US" sz="1800" dirty="0" err="1">
+                <a:solidFill>
+                  <a:srgbClr val="000000"/>
+                </a:solidFill>
+                <a:latin typeface="Cascadia Mono" panose="020B0609020000020004" pitchFamily="49" charset="0"/>
+              </a:rPr>
+              <a:t>RegisterRepository</a:t>
+            </a:r>
+            <a:r>
+              <a:rPr lang="en-US" sz="1800" dirty="0">
+                <a:solidFill>
+                  <a:srgbClr val="000000"/>
+                </a:solidFill>
+                <a:latin typeface="Cascadia Mono" panose="020B0609020000020004" pitchFamily="49" charset="0"/>
+              </a:rPr>
+              <a:t>&lt;</a:t>
+            </a:r>
+            <a:r>
+              <a:rPr lang="en-US" sz="1800" dirty="0" err="1">
+                <a:solidFill>
+                  <a:srgbClr val="2B91AF"/>
+                </a:solidFill>
+                <a:latin typeface="Cascadia Mono" panose="020B0609020000020004" pitchFamily="49" charset="0"/>
+              </a:rPr>
+              <a:t>IBoolValue</a:t>
+            </a:r>
+            <a:r>
+              <a:rPr lang="en-US" sz="1800" dirty="0">
+                <a:solidFill>
+                  <a:srgbClr val="000000"/>
+                </a:solidFill>
+                <a:latin typeface="Cascadia Mono" panose="020B0609020000020004" pitchFamily="49" charset="0"/>
+              </a:rPr>
+              <a:t>&gt;();</a:t>
+            </a:r>
+          </a:p>
+          <a:p>
+            <a:pPr marL="0" indent="0">
+              <a:buNone/>
+            </a:pPr>
+            <a:r>
+              <a:rPr lang="en-US" sz="1800" dirty="0" err="1">
+                <a:solidFill>
+                  <a:srgbClr val="000000"/>
+                </a:solidFill>
+                <a:latin typeface="Cascadia Mono" panose="020B0609020000020004" pitchFamily="49" charset="0"/>
+              </a:rPr>
+              <a:t>RegisterRepository</a:t>
+            </a:r>
+            <a:r>
+              <a:rPr lang="en-US" sz="1800" dirty="0">
+                <a:solidFill>
+                  <a:srgbClr val="000000"/>
+                </a:solidFill>
+                <a:latin typeface="Cascadia Mono" panose="020B0609020000020004" pitchFamily="49" charset="0"/>
+              </a:rPr>
+              <a:t>&lt;</a:t>
+            </a:r>
+            <a:r>
+              <a:rPr lang="en-US" sz="1800" dirty="0" err="1">
+                <a:solidFill>
+                  <a:srgbClr val="2B91AF"/>
+                </a:solidFill>
+                <a:latin typeface="Cascadia Mono" panose="020B0609020000020004" pitchFamily="49" charset="0"/>
+              </a:rPr>
+              <a:t>IIntValue</a:t>
+            </a:r>
+            <a:r>
+              <a:rPr lang="en-US" sz="1800" dirty="0">
+                <a:solidFill>
+                  <a:srgbClr val="000000"/>
+                </a:solidFill>
+                <a:latin typeface="Cascadia Mono" panose="020B0609020000020004" pitchFamily="49" charset="0"/>
+              </a:rPr>
+              <a:t>&gt;();</a:t>
+            </a:r>
+          </a:p>
+          <a:p>
+            <a:pPr marL="0" indent="0">
+              <a:buNone/>
+            </a:pPr>
+            <a:r>
+              <a:rPr lang="en-US" sz="1800" dirty="0" err="1">
+                <a:solidFill>
+                  <a:srgbClr val="000000"/>
+                </a:solidFill>
+                <a:latin typeface="Cascadia Mono" panose="020B0609020000020004" pitchFamily="49" charset="0"/>
+              </a:rPr>
+              <a:t>RegisterRepository</a:t>
+            </a:r>
+            <a:r>
+              <a:rPr lang="en-US" sz="1800" dirty="0">
+                <a:solidFill>
+                  <a:srgbClr val="000000"/>
+                </a:solidFill>
+                <a:latin typeface="Cascadia Mono" panose="020B0609020000020004" pitchFamily="49" charset="0"/>
+              </a:rPr>
+              <a:t>&lt;</a:t>
+            </a:r>
+            <a:r>
+              <a:rPr lang="en-US" sz="1800" dirty="0">
+                <a:solidFill>
+                  <a:srgbClr val="2B91AF"/>
+                </a:solidFill>
+                <a:latin typeface="Cascadia Mono" panose="020B0609020000020004" pitchFamily="49" charset="0"/>
+              </a:rPr>
+              <a:t>Activation</a:t>
+            </a:r>
+            <a:r>
+              <a:rPr lang="en-US" sz="1800" dirty="0">
+                <a:solidFill>
+                  <a:srgbClr val="000000"/>
+                </a:solidFill>
+                <a:latin typeface="Cascadia Mono" panose="020B0609020000020004" pitchFamily="49" charset="0"/>
+              </a:rPr>
+              <a:t>&gt;();</a:t>
+            </a:r>
+          </a:p>
+          <a:p>
+            <a:pPr marL="0" indent="0">
+              <a:buNone/>
+            </a:pPr>
+            <a:r>
+              <a:rPr lang="en-US" sz="1800" dirty="0" err="1">
+                <a:solidFill>
+                  <a:srgbClr val="000000"/>
+                </a:solidFill>
+                <a:latin typeface="Cascadia Mono" panose="020B0609020000020004" pitchFamily="49" charset="0"/>
+              </a:rPr>
+              <a:t>RegisterRepository</a:t>
+            </a:r>
+            <a:r>
+              <a:rPr lang="en-US" sz="1800" dirty="0">
+                <a:solidFill>
+                  <a:srgbClr val="000000"/>
+                </a:solidFill>
+                <a:latin typeface="Cascadia Mono" panose="020B0609020000020004" pitchFamily="49" charset="0"/>
+              </a:rPr>
+              <a:t>&lt;</a:t>
+            </a:r>
+            <a:r>
+              <a:rPr lang="en-US" sz="1800" dirty="0" err="1">
+                <a:solidFill>
+                  <a:srgbClr val="2B91AF"/>
+                </a:solidFill>
+                <a:latin typeface="Cascadia Mono" panose="020B0609020000020004" pitchFamily="49" charset="0"/>
+              </a:rPr>
+              <a:t>ActivationWeightedRandom</a:t>
+            </a:r>
+            <a:r>
+              <a:rPr lang="en-US" sz="1800" dirty="0">
+                <a:solidFill>
+                  <a:srgbClr val="000000"/>
+                </a:solidFill>
+                <a:latin typeface="Cascadia Mono" panose="020B0609020000020004" pitchFamily="49" charset="0"/>
+              </a:rPr>
+              <a:t>&gt;();</a:t>
+            </a:r>
+          </a:p>
+          <a:p>
+            <a:pPr marL="0" indent="0">
+              <a:buNone/>
+            </a:pPr>
+            <a:endParaRPr lang="en-US" dirty="0"/>
+          </a:p>
+        </p:txBody>
+      </p:sp>
+    </p:spTree>
+    <p:extLst>
+      <p:ext uri="{BB962C8B-B14F-4D97-AF65-F5344CB8AC3E}">
+        <p14:creationId xmlns:p14="http://schemas.microsoft.com/office/powerpoint/2010/main" val="3999199384"/>
+      </p:ext>
+    </p:extLst>
+  </p:cSld>
+  <p:clrMapOvr>
+    <a:masterClrMapping/>
+  </p:clrMapOvr>
+</p:sld>
+</file>
+
 <file path=ppt/slides/slide2.xml><?xml version="1.0" encoding="utf-8"?>
 <p:sld xmlns:a="http://schemas.openxmlformats.org/drawingml/2006/main" xmlns:r="http://schemas.openxmlformats.org/officeDocument/2006/relationships" xmlns:p="http://schemas.openxmlformats.org/presentationml/2006/main">
   <p:cSld>
@@ -3576,8 +5520,8 @@
         </p:nvSpPr>
         <p:spPr>
           <a:xfrm>
-            <a:off x="3690612" y="3244334"/>
-            <a:ext cx="2317474" cy="369332"/>
+            <a:off x="3690612" y="3770833"/>
+            <a:ext cx="2665581" cy="369332"/>
           </a:xfrm>
           <a:prstGeom prst="rect">
             <a:avLst/>
@@ -3597,7 +5541,7 @@
           <a:p>
             <a:r>
               <a:rPr lang="en-US" dirty="0"/>
-              <a:t>Generic API Object 2</a:t>
+              <a:t>Game Pack API Object 1</a:t>
             </a:r>
           </a:p>
         </p:txBody>
@@ -3770,47 +5714,6 @@
           </a:p>
         </p:txBody>
       </p:sp>
-      <p:sp>
-        <p:nvSpPr>
-          <p:cNvPr id="15" name="TextBox 14">
-            <a:extLst>
-              <a:ext uri="{FF2B5EF4-FFF2-40B4-BE49-F238E27FC236}">
-                <a16:creationId xmlns:a16="http://schemas.microsoft.com/office/drawing/2014/main" id="{DA17A2BB-30EF-85B1-81D0-F419D75DA1CF}"/>
-              </a:ext>
-            </a:extLst>
-          </p:cNvPr>
-          <p:cNvSpPr txBox="1"/>
-          <p:nvPr/>
-        </p:nvSpPr>
-        <p:spPr>
-          <a:xfrm>
-            <a:off x="7232137" y="3244334"/>
-            <a:ext cx="2199861" cy="369332"/>
-          </a:xfrm>
-          <a:prstGeom prst="rect">
-            <a:avLst/>
-          </a:prstGeom>
-          <a:noFill/>
-          <a:ln>
-            <a:solidFill>
-              <a:schemeClr val="accent1"/>
-            </a:solidFill>
-          </a:ln>
-        </p:spPr>
-        <p:txBody>
-          <a:bodyPr wrap="square" rtlCol="0">
-            <a:spAutoFit/>
-          </a:bodyPr>
-          <a:lstStyle/>
-          <a:p>
-            <a:r>
-              <a:rPr lang="en-US" dirty="0" err="1"/>
-              <a:t>GameConfiguration</a:t>
-            </a:r>
-            <a:endParaRPr lang="en-US" dirty="0"/>
-          </a:p>
-        </p:txBody>
-      </p:sp>
       <p:cxnSp>
         <p:nvCxnSpPr>
           <p:cNvPr id="17" name="Straight Arrow Connector 16">
@@ -3830,49 +5733,6 @@
         <p:spPr>
           <a:xfrm flipH="1">
             <a:off x="6008086" y="2855516"/>
-            <a:ext cx="1224051" cy="0"/>
-          </a:xfrm>
-          <a:prstGeom prst="straightConnector1">
-            <a:avLst/>
-          </a:prstGeom>
-          <a:ln>
-            <a:tailEnd type="triangle"/>
-          </a:ln>
-        </p:spPr>
-        <p:style>
-          <a:lnRef idx="2">
-            <a:schemeClr val="accent1"/>
-          </a:lnRef>
-          <a:fillRef idx="0">
-            <a:schemeClr val="accent1"/>
-          </a:fillRef>
-          <a:effectRef idx="1">
-            <a:schemeClr val="accent1"/>
-          </a:effectRef>
-          <a:fontRef idx="minor">
-            <a:schemeClr val="tx1"/>
-          </a:fontRef>
-        </p:style>
-      </p:cxnSp>
-      <p:cxnSp>
-        <p:nvCxnSpPr>
-          <p:cNvPr id="19" name="Straight Arrow Connector 18">
-            <a:extLst>
-              <a:ext uri="{FF2B5EF4-FFF2-40B4-BE49-F238E27FC236}">
-                <a16:creationId xmlns:a16="http://schemas.microsoft.com/office/drawing/2014/main" id="{7FF75695-F7F4-5862-718E-9A5B30EE21FB}"/>
-              </a:ext>
-            </a:extLst>
-          </p:cNvPr>
-          <p:cNvCxnSpPr>
-            <a:cxnSpLocks/>
-            <a:stCxn id="15" idx="1"/>
-            <a:endCxn id="7" idx="3"/>
-          </p:cNvCxnSpPr>
-          <p:nvPr/>
-        </p:nvCxnSpPr>
-        <p:spPr>
-          <a:xfrm flipH="1">
-            <a:off x="6008086" y="3429000"/>
             <a:ext cx="1224051" cy="0"/>
           </a:xfrm>
           <a:prstGeom prst="straightConnector1">
@@ -3959,7 +5819,7 @@
         <p:spPr>
           <a:xfrm flipH="1" flipV="1">
             <a:off x="2436743" y="2855516"/>
-            <a:ext cx="1253869" cy="573484"/>
+            <a:ext cx="1253869" cy="1099983"/>
           </a:xfrm>
           <a:prstGeom prst="straightConnector1">
             <a:avLst/>
@@ -4073,6 +5933,120 @@
           </a:fontRef>
         </p:style>
       </p:cxnSp>
+      <p:sp>
+        <p:nvSpPr>
+          <p:cNvPr id="10" name="Rectangle 9">
+            <a:extLst>
+              <a:ext uri="{FF2B5EF4-FFF2-40B4-BE49-F238E27FC236}">
+                <a16:creationId xmlns:a16="http://schemas.microsoft.com/office/drawing/2014/main" id="{A3082C74-DDFE-BB79-27CB-99F35F673585}"/>
+              </a:ext>
+            </a:extLst>
+          </p:cNvPr>
+          <p:cNvSpPr/>
+          <p:nvPr/>
+        </p:nvSpPr>
+        <p:spPr>
+          <a:xfrm>
+            <a:off x="3378820" y="1690687"/>
+            <a:ext cx="6376437" cy="1553641"/>
+          </a:xfrm>
+          <a:prstGeom prst="rect">
+            <a:avLst/>
+          </a:prstGeom>
+          <a:noFill/>
+          <a:ln>
+            <a:prstDash val="sysDot"/>
+          </a:ln>
+        </p:spPr>
+        <p:style>
+          <a:lnRef idx="2">
+            <a:schemeClr val="accent1">
+              <a:shade val="15000"/>
+            </a:schemeClr>
+          </a:lnRef>
+          <a:fillRef idx="1">
+            <a:schemeClr val="accent1"/>
+          </a:fillRef>
+          <a:effectRef idx="0">
+            <a:schemeClr val="accent1"/>
+          </a:effectRef>
+          <a:fontRef idx="minor">
+            <a:schemeClr val="lt1"/>
+          </a:fontRef>
+        </p:style>
+        <p:txBody>
+          <a:bodyPr rtlCol="0" anchor="t" anchorCtr="0"/>
+          <a:lstStyle/>
+          <a:p>
+            <a:pPr algn="ctr"/>
+            <a:r>
+              <a:rPr lang="en-US" dirty="0">
+                <a:solidFill>
+                  <a:schemeClr val="tx1"/>
+                </a:solidFill>
+              </a:rPr>
+              <a:t>Serialization/Deserialization</a:t>
+            </a:r>
+          </a:p>
+        </p:txBody>
+      </p:sp>
+      <p:sp>
+        <p:nvSpPr>
+          <p:cNvPr id="16" name="Rectangle 15">
+            <a:extLst>
+              <a:ext uri="{FF2B5EF4-FFF2-40B4-BE49-F238E27FC236}">
+                <a16:creationId xmlns:a16="http://schemas.microsoft.com/office/drawing/2014/main" id="{A6BF0B90-8C55-7126-B20E-657EEAA28539}"/>
+              </a:ext>
+            </a:extLst>
+          </p:cNvPr>
+          <p:cNvSpPr/>
+          <p:nvPr/>
+        </p:nvSpPr>
+        <p:spPr>
+          <a:xfrm>
+            <a:off x="3356941" y="3382023"/>
+            <a:ext cx="6376437" cy="1004448"/>
+          </a:xfrm>
+          <a:prstGeom prst="rect">
+            <a:avLst/>
+          </a:prstGeom>
+          <a:noFill/>
+          <a:ln>
+            <a:prstDash val="sysDot"/>
+          </a:ln>
+        </p:spPr>
+        <p:style>
+          <a:lnRef idx="2">
+            <a:schemeClr val="accent1">
+              <a:shade val="15000"/>
+            </a:schemeClr>
+          </a:lnRef>
+          <a:fillRef idx="1">
+            <a:schemeClr val="accent1"/>
+          </a:fillRef>
+          <a:effectRef idx="0">
+            <a:schemeClr val="accent1"/>
+          </a:effectRef>
+          <a:fontRef idx="minor">
+            <a:schemeClr val="lt1"/>
+          </a:fontRef>
+        </p:style>
+        <p:txBody>
+          <a:bodyPr rtlCol="0" anchor="t" anchorCtr="0"/>
+          <a:lstStyle/>
+          <a:p>
+            <a:pPr algn="ctr"/>
+            <a:r>
+              <a:rPr lang="en-US" dirty="0">
+                <a:solidFill>
+                  <a:schemeClr val="tx1"/>
+                </a:solidFill>
+              </a:rPr>
+              <a:t>Game Pack</a:t>
+            </a:r>
+          </a:p>
+        </p:txBody>
+      </p:sp>
     </p:spTree>
     <p:extLst>
       <p:ext uri="{BB962C8B-B14F-4D97-AF65-F5344CB8AC3E}">
@@ -4117,8 +6091,8 @@
         </p:nvSpPr>
         <p:spPr>
           <a:xfrm>
-            <a:off x="730526" y="1690689"/>
-            <a:ext cx="10730948" cy="4536968"/>
+            <a:off x="730526" y="1548714"/>
+            <a:ext cx="10730948" cy="4678943"/>
           </a:xfrm>
           <a:prstGeom prst="rect">
             <a:avLst/>
@@ -4132,7 +6106,7 @@
         </p:spPr>
         <p:txBody>
           <a:bodyPr wrap="square" rtlCol="0">
-            <a:normAutofit/>
+            <a:normAutofit fontScale="92500" lnSpcReduction="20000"/>
           </a:bodyPr>
           <a:lstStyle/>
           <a:p>
@@ -4142,7 +6116,61 @@
             </a:pPr>
             <a:r>
               <a:rPr lang="en-US" dirty="0"/>
-              <a:t>Are heavy weight objects that often implement methods for functionality.  These methods:</a:t>
+              <a:t>Are internal classes.</a:t>
+            </a:r>
+          </a:p>
+          <a:p>
+            <a:pPr marL="342900" indent="-342900">
+              <a:buFont typeface="+mj-lt"/>
+              <a:buAutoNum type="arabicPeriod"/>
+            </a:pPr>
+            <a:r>
+              <a:rPr lang="en-US" dirty="0"/>
+              <a:t>Can, optionally, be derived from API Base Objects.</a:t>
+            </a:r>
+          </a:p>
+          <a:p>
+            <a:pPr marL="342900" indent="-342900">
+              <a:buFont typeface="+mj-lt"/>
+              <a:buAutoNum type="arabicPeriod"/>
+            </a:pPr>
+            <a:r>
+              <a:rPr lang="en-US"/>
+              <a:t>Can </a:t>
+            </a:r>
+            <a:r>
+              <a:rPr lang="en-US" dirty="0"/>
+              <a:t>maintain state.</a:t>
+            </a:r>
+          </a:p>
+          <a:p>
+            <a:pPr marL="342900" indent="-342900">
+              <a:buFont typeface="+mj-lt"/>
+              <a:buAutoNum type="arabicPeriod"/>
+            </a:pPr>
+            <a:r>
+              <a:rPr lang="en-US" dirty="0"/>
+              <a:t>Are always abstract because they require either a Game Pack Objects or a Generic API Objects for implementation.</a:t>
+            </a:r>
+          </a:p>
+          <a:p>
+            <a:pPr marL="342900" indent="-342900">
+              <a:buFont typeface="+mj-lt"/>
+              <a:buAutoNum type="arabicPeriod"/>
+            </a:pPr>
+            <a:r>
+              <a:rPr lang="en-US" dirty="0"/>
+              <a:t>Methods and properties may have any access modifier (Typically, private, protected, internal or public),</a:t>
+            </a:r>
+          </a:p>
+          <a:p>
+            <a:pPr marL="342900" indent="-342900">
+              <a:buFont typeface="+mj-lt"/>
+              <a:buAutoNum type="arabicPeriod"/>
+            </a:pPr>
+            <a:r>
+              <a:rPr lang="en-US" dirty="0"/>
+              <a:t>Are heavy weight objects that often implement methods for functionality and</a:t>
             </a:r>
           </a:p>
           <a:p>
@@ -4152,7 +6180,7 @@
             </a:pPr>
             <a:r>
               <a:rPr lang="en-US" dirty="0"/>
-              <a:t>Can have any access modifier (Typically, private, protected, internal or public),</a:t>
+              <a:t>Never declare new abstract or virtual methods to ensure derived objects are light-weight,</a:t>
             </a:r>
           </a:p>
           <a:p>
@@ -4162,7 +6190,25 @@
             </a:pPr>
             <a:r>
               <a:rPr lang="en-US" dirty="0"/>
-              <a:t>Are not abstract or virtual.  This ensures derived objects are light-weight.</a:t>
+              <a:t>Optionally, Seal overridden base methods to further ensure derived generic objects conform to the light-weight standards.</a:t>
+            </a:r>
+          </a:p>
+          <a:p>
+            <a:pPr marL="342900" indent="-342900">
+              <a:buFont typeface="+mj-lt"/>
+              <a:buAutoNum type="arabicPeriod"/>
+            </a:pPr>
+            <a:r>
+              <a:rPr lang="en-US" dirty="0"/>
+              <a:t>Must implement the </a:t>
+            </a:r>
+            <a:r>
+              <a:rPr lang="en-US" dirty="0" err="1"/>
+              <a:t>IGetKey</a:t>
+            </a:r>
+            <a:r>
+              <a:rPr lang="en-US" dirty="0"/>
+              <a:t> interface which declare:</a:t>
             </a:r>
           </a:p>
           <a:p>
@@ -4172,15 +6218,83 @@
             </a:pPr>
             <a:r>
               <a:rPr lang="en-US" dirty="0"/>
-              <a:t>Optionally, should Seal base methods to further ensure derived generic objects conform the </a:t>
+              <a:t>A unique key for each instance (e.g. </a:t>
             </a:r>
             <a:r>
               <a:rPr lang="en-US" dirty="0" err="1"/>
-              <a:t>the</a:t>
+              <a:t>GetKey</a:t>
             </a:r>
             <a:r>
               <a:rPr lang="en-US" dirty="0"/>
-              <a:t> light-weight standards.</a:t>
+              <a:t>), with a similar implementation to:</a:t>
+            </a:r>
+          </a:p>
+          <a:p>
+            <a:pPr marL="798513" lvl="1"/>
+            <a:r>
+              <a:rPr lang="en-US" sz="1800" dirty="0">
+                <a:solidFill>
+                  <a:srgbClr val="0000FF"/>
+                </a:solidFill>
+                <a:latin typeface="Cascadia Mono" panose="020B0609020000020004" pitchFamily="49" charset="0"/>
+              </a:rPr>
+              <a:t>public</a:t>
+            </a:r>
+            <a:r>
+              <a:rPr lang="en-US" sz="1800" dirty="0">
+                <a:solidFill>
+                  <a:srgbClr val="000000"/>
+                </a:solidFill>
+                <a:latin typeface="Cascadia Mono" panose="020B0609020000020004" pitchFamily="49" charset="0"/>
+              </a:rPr>
+              <a:t> </a:t>
+            </a:r>
+            <a:r>
+              <a:rPr lang="en-US" sz="1800" dirty="0">
+                <a:solidFill>
+                  <a:srgbClr val="0000FF"/>
+                </a:solidFill>
+                <a:latin typeface="Cascadia Mono" panose="020B0609020000020004" pitchFamily="49" charset="0"/>
+              </a:rPr>
+              <a:t>string</a:t>
+            </a:r>
+            <a:r>
+              <a:rPr lang="en-US" sz="1800" dirty="0">
+                <a:solidFill>
+                  <a:srgbClr val="000000"/>
+                </a:solidFill>
+                <a:latin typeface="Cascadia Mono" panose="020B0609020000020004" pitchFamily="49" charset="0"/>
+              </a:rPr>
+              <a:t> </a:t>
+            </a:r>
+            <a:r>
+              <a:rPr lang="en-US" sz="1800" dirty="0" err="1">
+                <a:solidFill>
+                  <a:srgbClr val="000000"/>
+                </a:solidFill>
+                <a:latin typeface="Cascadia Mono" panose="020B0609020000020004" pitchFamily="49" charset="0"/>
+              </a:rPr>
+              <a:t>GetKey</a:t>
+            </a:r>
+            <a:r>
+              <a:rPr lang="en-US" sz="1800" dirty="0">
+                <a:solidFill>
+                  <a:srgbClr val="000000"/>
+                </a:solidFill>
+                <a:latin typeface="Cascadia Mono" panose="020B0609020000020004" pitchFamily="49" charset="0"/>
+              </a:rPr>
+              <a:t> =&gt; Key;</a:t>
+            </a:r>
+            <a:endParaRPr lang="en-US" dirty="0"/>
+          </a:p>
+          <a:p>
+            <a:pPr marL="800100" lvl="1" indent="-342900">
+              <a:buFont typeface="Arial" panose="020B0604020202020204" pitchFamily="34" charset="0"/>
+              <a:buChar char="•"/>
+            </a:pPr>
+            <a:r>
+              <a:rPr lang="en-US" dirty="0"/>
+              <a:t>A bind property (e.g. Bind) that allows the object to bind to other objects.</a:t>
             </a:r>
           </a:p>
           <a:p>
@@ -4190,63 +6304,7 @@
             </a:pPr>
             <a:r>
               <a:rPr lang="en-US" dirty="0"/>
-              <a:t>Must implement the </a:t>
-            </a:r>
-            <a:r>
-              <a:rPr lang="en-US" dirty="0" err="1"/>
-              <a:t>IGetKey</a:t>
-            </a:r>
-            <a:r>
-              <a:rPr lang="en-US" dirty="0"/>
-              <a:t> interface which declare:</a:t>
-            </a:r>
-          </a:p>
-          <a:p>
-            <a:pPr marL="800100" lvl="1" indent="-342900">
-              <a:buFont typeface="Arial" panose="020B0604020202020204" pitchFamily="34" charset="0"/>
-              <a:buChar char="•"/>
-            </a:pPr>
-            <a:r>
-              <a:rPr lang="en-US" dirty="0"/>
-              <a:t>A unique key for each instance (e.g. </a:t>
-            </a:r>
-            <a:r>
-              <a:rPr lang="en-US" dirty="0" err="1"/>
-              <a:t>GetKey</a:t>
-            </a:r>
-            <a:r>
-              <a:rPr lang="en-US" dirty="0"/>
-              <a:t>)</a:t>
-            </a:r>
-          </a:p>
-          <a:p>
-            <a:pPr marL="800100" lvl="1" indent="-342900">
-              <a:buFont typeface="Arial" panose="020B0604020202020204" pitchFamily="34" charset="0"/>
-              <a:buChar char="•"/>
-            </a:pPr>
-            <a:r>
-              <a:rPr lang="en-US" dirty="0"/>
-              <a:t>A bind property (e.g. Bind) that allows the object to bind to other objects.</a:t>
-            </a:r>
-          </a:p>
-          <a:p>
-            <a:pPr marL="342900" indent="-342900">
-              <a:buFont typeface="+mj-lt"/>
-              <a:buAutoNum type="arabicPeriod"/>
-            </a:pPr>
-            <a:r>
-              <a:rPr lang="en-US" dirty="0"/>
-              <a:t>Use abstract and virtual properties for derived objects to supply required values or override default behavior.  See the next slide for supported light-weight data-types.</a:t>
-            </a:r>
-          </a:p>
-          <a:p>
-            <a:pPr marL="342900" indent="-342900">
-              <a:buFont typeface="+mj-lt"/>
-              <a:buAutoNum type="arabicPeriod"/>
-            </a:pPr>
-            <a:r>
-              <a:rPr lang="en-US" dirty="0"/>
-              <a:t>Typically, do not maintain state.  Properties are implemented as read-only properties using the </a:t>
+              <a:t>Implement abstract and virtual read-only properties using the </a:t>
             </a:r>
             <a:r>
               <a:rPr lang="en-US" dirty="0">
@@ -4257,7 +6315,18 @@
             </a:r>
             <a:r>
               <a:rPr lang="en-US" dirty="0"/>
-              <a:t> syntax.  In other words, lambda =&gt; operator cannot be used.</a:t>
+              <a:t> syntax so that derived objects can supply required or override default values.  Virtual properties can use the go to (</a:t>
+            </a:r>
+            <a:r>
+              <a:rPr lang="en-US" dirty="0">
+                <a:latin typeface="Courier New" panose="02070309020205020404" pitchFamily="49" charset="0"/>
+                <a:cs typeface="Courier New" panose="02070309020205020404" pitchFamily="49" charset="0"/>
+              </a:rPr>
+              <a:t>=&gt;</a:t>
+            </a:r>
+            <a:r>
+              <a:rPr lang="en-US" dirty="0"/>
+              <a:t>) operator to provide a default value.  </a:t>
             </a:r>
           </a:p>
           <a:p>
@@ -6544,8 +8613,8 @@
               <a:buChar char="•"/>
             </a:pPr>
             <a:r>
-              <a:rPr lang="en-US" dirty="0"/>
-              <a:t>Are derived from API Objects.</a:t>
+              <a:rPr lang="en-US" sz="2400" dirty="0"/>
+              <a:t>Are light-weight, by definition.</a:t>
             </a:r>
           </a:p>
           <a:p>
@@ -6554,8 +8623,8 @@
               <a:buChar char="•"/>
             </a:pPr>
             <a:r>
-              <a:rPr lang="en-US" dirty="0"/>
-              <a:t>Override all abstract and virtual properties of the base class.</a:t>
+              <a:rPr lang="en-US" sz="2400" dirty="0"/>
+              <a:t>Implement an API Object as a base class.</a:t>
             </a:r>
           </a:p>
           <a:p>
@@ -6564,8 +8633,56 @@
               <a:buChar char="•"/>
             </a:pPr>
             <a:r>
-              <a:rPr lang="en-US" dirty="0"/>
+              <a:rPr lang="en-US" sz="2400" dirty="0"/>
+              <a:t>Override all abstract and virtual properties of the base class.</a:t>
+            </a:r>
+          </a:p>
+          <a:p>
+            <a:pPr marL="285750" indent="-285750">
+              <a:buFont typeface="Arial" panose="020B0604020202020204" pitchFamily="34" charset="0"/>
+              <a:buChar char="•"/>
+            </a:pPr>
+            <a:r>
+              <a:rPr lang="en-US" sz="2400" dirty="0"/>
+              <a:t>Implement the </a:t>
+            </a:r>
+            <a:r>
+              <a:rPr lang="en-US" sz="2400" dirty="0" err="1"/>
+              <a:t>IToJson</a:t>
+            </a:r>
+            <a:r>
+              <a:rPr lang="en-US" sz="2400" dirty="0"/>
+              <a:t> interface for serialization.</a:t>
+            </a:r>
+          </a:p>
+          <a:p>
+            <a:pPr marL="285750" indent="-285750">
+              <a:buFont typeface="Arial" panose="020B0604020202020204" pitchFamily="34" charset="0"/>
+              <a:buChar char="•"/>
+            </a:pPr>
+            <a:r>
+              <a:rPr lang="en-US" sz="2400" dirty="0"/>
               <a:t>Never maintain state.</a:t>
+            </a:r>
+          </a:p>
+          <a:p>
+            <a:pPr marL="285750" indent="-285750">
+              <a:buFont typeface="Arial" panose="020B0604020202020204" pitchFamily="34" charset="0"/>
+              <a:buChar char="•"/>
+            </a:pPr>
+            <a:r>
+              <a:rPr lang="en-US" sz="2400" dirty="0"/>
+              <a:t>Never have default property value assignments.</a:t>
+            </a:r>
+          </a:p>
+          <a:p>
+            <a:pPr marL="285750" indent="-285750">
+              <a:buFont typeface="Arial" panose="020B0604020202020204" pitchFamily="34" charset="0"/>
+              <a:buChar char="•"/>
+            </a:pPr>
+            <a:r>
+              <a:rPr lang="en-US" sz="2400" dirty="0"/>
+              <a:t>Shouldn’t need to include XML comments because they are all derived from the base API Object.</a:t>
             </a:r>
           </a:p>
           <a:p>
@@ -7475,7 +9592,23 @@
             </a:r>
             <a:r>
               <a:rPr lang="en-US" dirty="0"/>
-              <a:t> interface for serialization.</a:t>
+              <a:t> interface for serialization.  Eventually, the </a:t>
+            </a:r>
+            <a:r>
+              <a:rPr lang="en-US" dirty="0" err="1"/>
+              <a:t>IToJson</a:t>
+            </a:r>
+            <a:r>
+              <a:rPr lang="en-US" dirty="0"/>
+              <a:t> interface will be merged with the </a:t>
+            </a:r>
+            <a:r>
+              <a:rPr lang="en-US" dirty="0" err="1"/>
+              <a:t>IGetKey</a:t>
+            </a:r>
+            <a:r>
+              <a:rPr lang="en-US" dirty="0"/>
+              <a:t> interface.</a:t>
             </a:r>
           </a:p>
           <a:p>
@@ -7512,6 +9645,145 @@
     <p:extLst>
       <p:ext uri="{BB962C8B-B14F-4D97-AF65-F5344CB8AC3E}">
         <p14:creationId xmlns:p14="http://schemas.microsoft.com/office/powerpoint/2010/main" val="2117860929"/>
+      </p:ext>
+    </p:extLst>
+  </p:cSld>
+  <p:clrMapOvr>
+    <a:masterClrMapping/>
+  </p:clrMapOvr>
+</p:sld>
+</file>
+
+<file path=ppt/slides/slide9.xml><?xml version="1.0" encoding="utf-8"?>
+<p:sld xmlns:a="http://schemas.openxmlformats.org/drawingml/2006/main" xmlns:r="http://schemas.openxmlformats.org/officeDocument/2006/relationships" xmlns:p="http://schemas.openxmlformats.org/presentationml/2006/main">
+  <p:cSld>
+    <p:spTree>
+      <p:nvGrpSpPr>
+        <p:cNvPr id="1" name=""/>
+        <p:cNvGrpSpPr/>
+        <p:nvPr/>
+      </p:nvGrpSpPr>
+      <p:grpSpPr>
+        <a:xfrm>
+          <a:off x="0" y="0"/>
+          <a:ext cx="0" cy="0"/>
+          <a:chOff x="0" y="0"/>
+          <a:chExt cx="0" cy="0"/>
+        </a:xfrm>
+      </p:grpSpPr>
+      <p:sp>
+        <p:nvSpPr>
+          <p:cNvPr id="2" name="Title 1">
+            <a:extLst>
+              <a:ext uri="{FF2B5EF4-FFF2-40B4-BE49-F238E27FC236}">
+                <a16:creationId xmlns:a16="http://schemas.microsoft.com/office/drawing/2014/main" id="{73406A12-9689-1867-84F8-B9F88296B75E}"/>
+              </a:ext>
+            </a:extLst>
+          </p:cNvPr>
+          <p:cNvSpPr>
+            <a:spLocks noGrp="1"/>
+          </p:cNvSpPr>
+          <p:nvPr>
+            <p:ph type="title"/>
+          </p:nvPr>
+        </p:nvSpPr>
+        <p:spPr/>
+        <p:txBody>
+          <a:bodyPr/>
+          <a:lstStyle/>
+          <a:p>
+            <a:r>
+              <a:rPr lang="en-US" dirty="0"/>
+              <a:t>Game Pack Objects</a:t>
+            </a:r>
+          </a:p>
+        </p:txBody>
+      </p:sp>
+      <p:sp>
+        <p:nvSpPr>
+          <p:cNvPr id="3" name="Content Placeholder 2">
+            <a:extLst>
+              <a:ext uri="{FF2B5EF4-FFF2-40B4-BE49-F238E27FC236}">
+                <a16:creationId xmlns:a16="http://schemas.microsoft.com/office/drawing/2014/main" id="{FF9FAB0B-07FF-0D76-0D3F-A95780817835}"/>
+              </a:ext>
+            </a:extLst>
+          </p:cNvPr>
+          <p:cNvSpPr>
+            <a:spLocks noGrp="1"/>
+          </p:cNvSpPr>
+          <p:nvPr>
+            <p:ph idx="1"/>
+          </p:nvPr>
+        </p:nvSpPr>
+        <p:spPr/>
+        <p:txBody>
+          <a:bodyPr>
+            <a:normAutofit fontScale="85000" lnSpcReduction="10000"/>
+          </a:bodyPr>
+          <a:lstStyle/>
+          <a:p>
+            <a:r>
+              <a:rPr lang="en-US" dirty="0"/>
+              <a:t>Are light-weight, by definition.</a:t>
+            </a:r>
+          </a:p>
+          <a:p>
+            <a:r>
+              <a:rPr lang="en-US" dirty="0"/>
+              <a:t>Implement an API Object as a base class.</a:t>
+            </a:r>
+          </a:p>
+          <a:p>
+            <a:r>
+              <a:rPr lang="en-US" dirty="0"/>
+              <a:t>Cannot override API Object or API Base Object methods</a:t>
+            </a:r>
+          </a:p>
+          <a:p>
+            <a:r>
+              <a:rPr lang="en-US" dirty="0"/>
+              <a:t>Override all abstract properties to provide required values for functionality.</a:t>
+            </a:r>
+          </a:p>
+          <a:p>
+            <a:r>
+              <a:rPr lang="en-US" dirty="0"/>
+              <a:t>Optionally, override virtual properties to provide alternate values, as desired.</a:t>
+            </a:r>
+          </a:p>
+          <a:p>
+            <a:r>
+              <a:rPr lang="en-US" dirty="0"/>
+              <a:t>Must specify a private access modifier for the constructor.</a:t>
+            </a:r>
+          </a:p>
+          <a:p>
+            <a:r>
+              <a:rPr lang="en-US" dirty="0"/>
+              <a:t>Cannot have any other constructors.</a:t>
+            </a:r>
+          </a:p>
+          <a:p>
+            <a:r>
+              <a:rPr lang="en-US" dirty="0"/>
+              <a:t>Constructor must accept a single parameter for the Game and pass it to the base API object.</a:t>
+            </a:r>
+          </a:p>
+          <a:p>
+            <a:r>
+              <a:rPr lang="en-US" dirty="0"/>
+              <a:t>Never maintain state.</a:t>
+            </a:r>
+          </a:p>
+          <a:p>
+            <a:endParaRPr lang="en-US" dirty="0"/>
+          </a:p>
+        </p:txBody>
+      </p:sp>
+    </p:spTree>
+    <p:extLst>
+      <p:ext uri="{BB962C8B-B14F-4D97-AF65-F5344CB8AC3E}">
+        <p14:creationId xmlns:p14="http://schemas.microsoft.com/office/powerpoint/2010/main" val="2843370721"/>
       </p:ext>
     </p:extLst>
   </p:cSld>

</xml_diff>

<commit_message>
Revert "Updated and added a lot more content."
This reverts commit 428371ea38d8438a5beec6fa1e77e16c01e87d45.
</commit_message>
<xml_diff>
--- a/Documents/Object Property Design and Binding.pptx
+++ b/Documents/Object Property Design and Binding.pptx
@@ -13,11 +13,6 @@
     <p:sldId id="260" r:id="rId7"/>
     <p:sldId id="261" r:id="rId8"/>
     <p:sldId id="263" r:id="rId9"/>
-    <p:sldId id="264" r:id="rId10"/>
-    <p:sldId id="265" r:id="rId11"/>
-    <p:sldId id="266" r:id="rId12"/>
-    <p:sldId id="267" r:id="rId13"/>
-    <p:sldId id="268" r:id="rId14"/>
   </p:sldIdLst>
   <p:sldSz cx="12192000" cy="6858000"/>
   <p:notesSz cx="6858000" cy="9144000"/>
@@ -116,11 +111,6 @@
       </a:defRPr>
     </a:lvl9pPr>
   </p:defaultTextStyle>
-  <p:extLst>
-    <p:ext uri="{EFAFB233-063F-42B5-8137-9DF3F51BA10A}">
-      <p15:sldGuideLst xmlns:p15="http://schemas.microsoft.com/office/powerpoint/2012/main"/>
-    </p:ext>
-  </p:extLst>
 </p:presentation>
 </file>
 
@@ -3407,1940 +3397,6 @@
 </p:sld>
 </file>
 
-<file path=ppt/slides/slide10.xml><?xml version="1.0" encoding="utf-8"?>
-<p:sld xmlns:a="http://schemas.openxmlformats.org/drawingml/2006/main" xmlns:r="http://schemas.openxmlformats.org/officeDocument/2006/relationships" xmlns:p="http://schemas.openxmlformats.org/presentationml/2006/main">
-  <p:cSld>
-    <p:spTree>
-      <p:nvGrpSpPr>
-        <p:cNvPr id="1" name=""/>
-        <p:cNvGrpSpPr/>
-        <p:nvPr/>
-      </p:nvGrpSpPr>
-      <p:grpSpPr>
-        <a:xfrm>
-          <a:off x="0" y="0"/>
-          <a:ext cx="0" cy="0"/>
-          <a:chOff x="0" y="0"/>
-          <a:chExt cx="0" cy="0"/>
-        </a:xfrm>
-      </p:grpSpPr>
-      <p:sp>
-        <p:nvSpPr>
-          <p:cNvPr id="2" name="Title 1">
-            <a:extLst>
-              <a:ext uri="{FF2B5EF4-FFF2-40B4-BE49-F238E27FC236}">
-                <a16:creationId xmlns:a16="http://schemas.microsoft.com/office/drawing/2014/main" id="{FF4D2314-9444-78BC-7431-72B0112244EC}"/>
-              </a:ext>
-            </a:extLst>
-          </p:cNvPr>
-          <p:cNvSpPr>
-            <a:spLocks noGrp="1"/>
-          </p:cNvSpPr>
-          <p:nvPr>
-            <p:ph type="title"/>
-          </p:nvPr>
-        </p:nvSpPr>
-        <p:spPr/>
-        <p:txBody>
-          <a:bodyPr/>
-          <a:lstStyle/>
-          <a:p>
-            <a:r>
-              <a:rPr lang="en-US" dirty="0"/>
-              <a:t>Game Pack Object Example</a:t>
-            </a:r>
-          </a:p>
-        </p:txBody>
-      </p:sp>
-      <p:sp>
-        <p:nvSpPr>
-          <p:cNvPr id="3" name="Content Placeholder 2">
-            <a:extLst>
-              <a:ext uri="{FF2B5EF4-FFF2-40B4-BE49-F238E27FC236}">
-                <a16:creationId xmlns:a16="http://schemas.microsoft.com/office/drawing/2014/main" id="{E31363C7-035C-692A-68AA-69274F4FDB09}"/>
-              </a:ext>
-            </a:extLst>
-          </p:cNvPr>
-          <p:cNvSpPr>
-            <a:spLocks noGrp="1"/>
-          </p:cNvSpPr>
-          <p:nvPr>
-            <p:ph idx="1"/>
-          </p:nvPr>
-        </p:nvSpPr>
-        <p:spPr/>
-        <p:txBody>
-          <a:bodyPr>
-            <a:normAutofit/>
-          </a:bodyPr>
-          <a:lstStyle/>
-          <a:p>
-            <a:pPr marL="0" indent="0">
-              <a:buNone/>
-            </a:pPr>
-            <a:r>
-              <a:rPr lang="en-US" sz="1200" dirty="0">
-                <a:solidFill>
-                  <a:srgbClr val="000000"/>
-                </a:solidFill>
-                <a:latin typeface="Cascadia Mono" panose="020B0609020000020004" pitchFamily="49" charset="0"/>
-              </a:rPr>
-              <a:t>[</a:t>
-            </a:r>
-            <a:r>
-              <a:rPr lang="en-US" sz="1200" dirty="0">
-                <a:solidFill>
-                  <a:srgbClr val="2B91AF"/>
-                </a:solidFill>
-                <a:latin typeface="Cascadia Mono" panose="020B0609020000020004" pitchFamily="49" charset="0"/>
-              </a:rPr>
-              <a:t>Serializable</a:t>
-            </a:r>
-            <a:r>
-              <a:rPr lang="en-US" sz="1200" dirty="0">
-                <a:solidFill>
-                  <a:srgbClr val="000000"/>
-                </a:solidFill>
-                <a:latin typeface="Cascadia Mono" panose="020B0609020000020004" pitchFamily="49" charset="0"/>
-              </a:rPr>
-              <a:t>]</a:t>
-            </a:r>
-          </a:p>
-          <a:p>
-            <a:pPr marL="0" indent="0">
-              <a:buNone/>
-            </a:pPr>
-            <a:r>
-              <a:rPr lang="en-US" sz="1200" dirty="0">
-                <a:solidFill>
-                  <a:srgbClr val="0000FF"/>
-                </a:solidFill>
-                <a:latin typeface="Cascadia Mono" panose="020B0609020000020004" pitchFamily="49" charset="0"/>
-              </a:rPr>
-              <a:t>internal</a:t>
-            </a:r>
-            <a:r>
-              <a:rPr lang="en-US" sz="1200" dirty="0">
-                <a:solidFill>
-                  <a:srgbClr val="000000"/>
-                </a:solidFill>
-                <a:latin typeface="Cascadia Mono" panose="020B0609020000020004" pitchFamily="49" charset="0"/>
-              </a:rPr>
-              <a:t> </a:t>
-            </a:r>
-            <a:r>
-              <a:rPr lang="en-US" sz="1200" dirty="0">
-                <a:solidFill>
-                  <a:srgbClr val="0000FF"/>
-                </a:solidFill>
-                <a:latin typeface="Cascadia Mono" panose="020B0609020000020004" pitchFamily="49" charset="0"/>
-              </a:rPr>
-              <a:t>class</a:t>
-            </a:r>
-            <a:r>
-              <a:rPr lang="en-US" sz="1200" dirty="0">
-                <a:solidFill>
-                  <a:srgbClr val="000000"/>
-                </a:solidFill>
-                <a:latin typeface="Cascadia Mono" panose="020B0609020000020004" pitchFamily="49" charset="0"/>
-              </a:rPr>
-              <a:t> </a:t>
-            </a:r>
-            <a:r>
-              <a:rPr lang="en-US" sz="1200" dirty="0" err="1">
-                <a:solidFill>
-                  <a:srgbClr val="2B91AF"/>
-                </a:solidFill>
-                <a:latin typeface="Cascadia Mono" panose="020B0609020000020004" pitchFamily="49" charset="0"/>
-              </a:rPr>
-              <a:t>HagargRyonisGod</a:t>
-            </a:r>
-            <a:r>
-              <a:rPr lang="en-US" sz="1200" dirty="0">
-                <a:solidFill>
-                  <a:srgbClr val="000000"/>
-                </a:solidFill>
-                <a:latin typeface="Cascadia Mono" panose="020B0609020000020004" pitchFamily="49" charset="0"/>
-              </a:rPr>
-              <a:t> : </a:t>
-            </a:r>
-            <a:r>
-              <a:rPr lang="en-US" sz="1200" dirty="0">
-                <a:solidFill>
-                  <a:srgbClr val="2B91AF"/>
-                </a:solidFill>
-                <a:latin typeface="Cascadia Mono" panose="020B0609020000020004" pitchFamily="49" charset="0"/>
-              </a:rPr>
-              <a:t>God</a:t>
-            </a:r>
-            <a:endParaRPr lang="en-US" sz="1200" dirty="0">
-              <a:solidFill>
-                <a:srgbClr val="000000"/>
-              </a:solidFill>
-              <a:latin typeface="Cascadia Mono" panose="020B0609020000020004" pitchFamily="49" charset="0"/>
-            </a:endParaRPr>
-          </a:p>
-          <a:p>
-            <a:pPr marL="0" indent="0">
-              <a:buNone/>
-            </a:pPr>
-            <a:r>
-              <a:rPr lang="en-US" sz="1200" dirty="0">
-                <a:solidFill>
-                  <a:srgbClr val="000000"/>
-                </a:solidFill>
-                <a:latin typeface="Cascadia Mono" panose="020B0609020000020004" pitchFamily="49" charset="0"/>
-              </a:rPr>
-              <a:t>{</a:t>
-            </a:r>
-          </a:p>
-          <a:p>
-            <a:pPr marL="0" indent="0">
-              <a:buNone/>
-            </a:pPr>
-            <a:r>
-              <a:rPr lang="en-US" sz="1200" dirty="0">
-                <a:solidFill>
-                  <a:srgbClr val="000000"/>
-                </a:solidFill>
-                <a:latin typeface="Cascadia Mono" panose="020B0609020000020004" pitchFamily="49" charset="0"/>
-              </a:rPr>
-              <a:t>    </a:t>
-            </a:r>
-            <a:r>
-              <a:rPr lang="en-US" sz="1200" dirty="0">
-                <a:solidFill>
-                  <a:srgbClr val="0000FF"/>
-                </a:solidFill>
-                <a:latin typeface="Cascadia Mono" panose="020B0609020000020004" pitchFamily="49" charset="0"/>
-              </a:rPr>
-              <a:t>private</a:t>
-            </a:r>
-            <a:r>
-              <a:rPr lang="en-US" sz="1200" dirty="0">
-                <a:solidFill>
-                  <a:srgbClr val="000000"/>
-                </a:solidFill>
-                <a:latin typeface="Cascadia Mono" panose="020B0609020000020004" pitchFamily="49" charset="0"/>
-              </a:rPr>
-              <a:t> </a:t>
-            </a:r>
-            <a:r>
-              <a:rPr lang="en-US" sz="1200" dirty="0" err="1">
-                <a:solidFill>
-                  <a:srgbClr val="2B91AF"/>
-                </a:solidFill>
-                <a:latin typeface="Cascadia Mono" panose="020B0609020000020004" pitchFamily="49" charset="0"/>
-              </a:rPr>
-              <a:t>HagargRyonisGod</a:t>
-            </a:r>
-            <a:r>
-              <a:rPr lang="en-US" sz="1200" dirty="0">
-                <a:solidFill>
-                  <a:srgbClr val="000000"/>
-                </a:solidFill>
-                <a:latin typeface="Cascadia Mono" panose="020B0609020000020004" pitchFamily="49" charset="0"/>
-              </a:rPr>
-              <a:t>(</a:t>
-            </a:r>
-            <a:r>
-              <a:rPr lang="en-US" sz="1200" dirty="0">
-                <a:solidFill>
-                  <a:srgbClr val="2B91AF"/>
-                </a:solidFill>
-                <a:latin typeface="Cascadia Mono" panose="020B0609020000020004" pitchFamily="49" charset="0"/>
-              </a:rPr>
-              <a:t>Game</a:t>
-            </a:r>
-            <a:r>
-              <a:rPr lang="en-US" sz="1200" dirty="0">
-                <a:solidFill>
-                  <a:srgbClr val="000000"/>
-                </a:solidFill>
-                <a:latin typeface="Cascadia Mono" panose="020B0609020000020004" pitchFamily="49" charset="0"/>
-              </a:rPr>
-              <a:t> game) : </a:t>
-            </a:r>
-            <a:r>
-              <a:rPr lang="en-US" sz="1200" dirty="0">
-                <a:solidFill>
-                  <a:srgbClr val="0000FF"/>
-                </a:solidFill>
-                <a:latin typeface="Cascadia Mono" panose="020B0609020000020004" pitchFamily="49" charset="0"/>
-              </a:rPr>
-              <a:t>base</a:t>
-            </a:r>
-            <a:r>
-              <a:rPr lang="en-US" sz="1200" dirty="0">
-                <a:solidFill>
-                  <a:srgbClr val="000000"/>
-                </a:solidFill>
-                <a:latin typeface="Cascadia Mono" panose="020B0609020000020004" pitchFamily="49" charset="0"/>
-              </a:rPr>
-              <a:t>(game) { } </a:t>
-            </a:r>
-            <a:r>
-              <a:rPr lang="en-US" sz="1200" dirty="0">
-                <a:solidFill>
-                  <a:srgbClr val="008000"/>
-                </a:solidFill>
-                <a:latin typeface="Cascadia Mono" panose="020B0609020000020004" pitchFamily="49" charset="0"/>
-              </a:rPr>
-              <a:t>// This object is a singleton.</a:t>
-            </a:r>
-            <a:endParaRPr lang="en-US" sz="1200" dirty="0">
-              <a:solidFill>
-                <a:srgbClr val="000000"/>
-              </a:solidFill>
-              <a:latin typeface="Cascadia Mono" panose="020B0609020000020004" pitchFamily="49" charset="0"/>
-            </a:endParaRPr>
-          </a:p>
-          <a:p>
-            <a:pPr marL="0" indent="0">
-              <a:buNone/>
-            </a:pPr>
-            <a:r>
-              <a:rPr lang="en-US" sz="1200" dirty="0">
-                <a:solidFill>
-                  <a:srgbClr val="000000"/>
-                </a:solidFill>
-                <a:latin typeface="Cascadia Mono" panose="020B0609020000020004" pitchFamily="49" charset="0"/>
-              </a:rPr>
-              <a:t>    </a:t>
-            </a:r>
-            <a:r>
-              <a:rPr lang="en-US" sz="1200" dirty="0">
-                <a:solidFill>
-                  <a:srgbClr val="0000FF"/>
-                </a:solidFill>
-                <a:latin typeface="Cascadia Mono" panose="020B0609020000020004" pitchFamily="49" charset="0"/>
-              </a:rPr>
-              <a:t>public</a:t>
-            </a:r>
-            <a:r>
-              <a:rPr lang="en-US" sz="1200" dirty="0">
-                <a:solidFill>
-                  <a:srgbClr val="000000"/>
-                </a:solidFill>
-                <a:latin typeface="Cascadia Mono" panose="020B0609020000020004" pitchFamily="49" charset="0"/>
-              </a:rPr>
-              <a:t> </a:t>
-            </a:r>
-            <a:r>
-              <a:rPr lang="en-US" sz="1200" dirty="0">
-                <a:solidFill>
-                  <a:srgbClr val="0000FF"/>
-                </a:solidFill>
-                <a:latin typeface="Cascadia Mono" panose="020B0609020000020004" pitchFamily="49" charset="0"/>
-              </a:rPr>
-              <a:t>override</a:t>
-            </a:r>
-            <a:r>
-              <a:rPr lang="en-US" sz="1200" dirty="0">
-                <a:solidFill>
-                  <a:srgbClr val="000000"/>
-                </a:solidFill>
-                <a:latin typeface="Cascadia Mono" panose="020B0609020000020004" pitchFamily="49" charset="0"/>
-              </a:rPr>
-              <a:t> </a:t>
-            </a:r>
-            <a:r>
-              <a:rPr lang="en-US" sz="1200" dirty="0">
-                <a:solidFill>
-                  <a:srgbClr val="0000FF"/>
-                </a:solidFill>
-                <a:latin typeface="Cascadia Mono" panose="020B0609020000020004" pitchFamily="49" charset="0"/>
-              </a:rPr>
-              <a:t>string</a:t>
-            </a:r>
-            <a:r>
-              <a:rPr lang="en-US" sz="1200" dirty="0">
-                <a:solidFill>
-                  <a:srgbClr val="000000"/>
-                </a:solidFill>
-                <a:latin typeface="Cascadia Mono" panose="020B0609020000020004" pitchFamily="49" charset="0"/>
-              </a:rPr>
-              <a:t> </a:t>
-            </a:r>
-            <a:r>
-              <a:rPr lang="en-US" sz="1200" dirty="0" err="1">
-                <a:solidFill>
-                  <a:srgbClr val="000000"/>
-                </a:solidFill>
-                <a:latin typeface="Cascadia Mono" panose="020B0609020000020004" pitchFamily="49" charset="0"/>
-              </a:rPr>
-              <a:t>LongName</a:t>
-            </a:r>
-            <a:r>
-              <a:rPr lang="en-US" sz="1200" dirty="0">
-                <a:solidFill>
-                  <a:srgbClr val="000000"/>
-                </a:solidFill>
-                <a:latin typeface="Cascadia Mono" panose="020B0609020000020004" pitchFamily="49" charset="0"/>
-              </a:rPr>
-              <a:t> =&gt; </a:t>
-            </a:r>
-            <a:r>
-              <a:rPr lang="en-US" sz="1200" dirty="0">
-                <a:solidFill>
-                  <a:srgbClr val="A31515"/>
-                </a:solidFill>
-                <a:latin typeface="Cascadia Mono" panose="020B0609020000020004" pitchFamily="49" charset="0"/>
-              </a:rPr>
-              <a:t>"</a:t>
-            </a:r>
-            <a:r>
-              <a:rPr lang="en-US" sz="1200" dirty="0" err="1">
-                <a:solidFill>
-                  <a:srgbClr val="A31515"/>
-                </a:solidFill>
-                <a:latin typeface="Cascadia Mono" panose="020B0609020000020004" pitchFamily="49" charset="0"/>
-              </a:rPr>
-              <a:t>Hagarg</a:t>
-            </a:r>
-            <a:r>
-              <a:rPr lang="en-US" sz="1200" dirty="0">
-                <a:solidFill>
-                  <a:srgbClr val="A31515"/>
-                </a:solidFill>
-                <a:latin typeface="Cascadia Mono" panose="020B0609020000020004" pitchFamily="49" charset="0"/>
-              </a:rPr>
-              <a:t> </a:t>
-            </a:r>
-            <a:r>
-              <a:rPr lang="en-US" sz="1200" dirty="0" err="1">
-                <a:solidFill>
-                  <a:srgbClr val="A31515"/>
-                </a:solidFill>
-                <a:latin typeface="Cascadia Mono" panose="020B0609020000020004" pitchFamily="49" charset="0"/>
-              </a:rPr>
-              <a:t>Ryonis</a:t>
-            </a:r>
-            <a:r>
-              <a:rPr lang="en-US" sz="1200" dirty="0">
-                <a:solidFill>
-                  <a:srgbClr val="A31515"/>
-                </a:solidFill>
-                <a:latin typeface="Cascadia Mono" panose="020B0609020000020004" pitchFamily="49" charset="0"/>
-              </a:rPr>
-              <a:t>, goddess of beasts"</a:t>
-            </a:r>
-            <a:r>
-              <a:rPr lang="en-US" sz="1200" dirty="0">
-                <a:solidFill>
-                  <a:srgbClr val="000000"/>
-                </a:solidFill>
-                <a:latin typeface="Cascadia Mono" panose="020B0609020000020004" pitchFamily="49" charset="0"/>
-              </a:rPr>
-              <a:t>;</a:t>
-            </a:r>
-          </a:p>
-          <a:p>
-            <a:pPr marL="0" indent="0">
-              <a:buNone/>
-            </a:pPr>
-            <a:r>
-              <a:rPr lang="en-US" sz="1200" dirty="0">
-                <a:solidFill>
-                  <a:srgbClr val="000000"/>
-                </a:solidFill>
-                <a:latin typeface="Cascadia Mono" panose="020B0609020000020004" pitchFamily="49" charset="0"/>
-              </a:rPr>
-              <a:t>    </a:t>
-            </a:r>
-            <a:r>
-              <a:rPr lang="en-US" sz="1200" dirty="0">
-                <a:solidFill>
-                  <a:srgbClr val="0000FF"/>
-                </a:solidFill>
-                <a:latin typeface="Cascadia Mono" panose="020B0609020000020004" pitchFamily="49" charset="0"/>
-              </a:rPr>
-              <a:t>public</a:t>
-            </a:r>
-            <a:r>
-              <a:rPr lang="en-US" sz="1200" dirty="0">
-                <a:solidFill>
-                  <a:srgbClr val="000000"/>
-                </a:solidFill>
-                <a:latin typeface="Cascadia Mono" panose="020B0609020000020004" pitchFamily="49" charset="0"/>
-              </a:rPr>
-              <a:t> </a:t>
-            </a:r>
-            <a:r>
-              <a:rPr lang="en-US" sz="1200" dirty="0">
-                <a:solidFill>
-                  <a:srgbClr val="0000FF"/>
-                </a:solidFill>
-                <a:latin typeface="Cascadia Mono" panose="020B0609020000020004" pitchFamily="49" charset="0"/>
-              </a:rPr>
-              <a:t>override</a:t>
-            </a:r>
-            <a:r>
-              <a:rPr lang="en-US" sz="1200" dirty="0">
-                <a:solidFill>
-                  <a:srgbClr val="000000"/>
-                </a:solidFill>
-                <a:latin typeface="Cascadia Mono" panose="020B0609020000020004" pitchFamily="49" charset="0"/>
-              </a:rPr>
-              <a:t> </a:t>
-            </a:r>
-            <a:r>
-              <a:rPr lang="en-US" sz="1200" dirty="0">
-                <a:solidFill>
-                  <a:srgbClr val="0000FF"/>
-                </a:solidFill>
-                <a:latin typeface="Cascadia Mono" panose="020B0609020000020004" pitchFamily="49" charset="0"/>
-              </a:rPr>
-              <a:t>string</a:t>
-            </a:r>
-            <a:r>
-              <a:rPr lang="en-US" sz="1200" dirty="0">
-                <a:solidFill>
-                  <a:srgbClr val="000000"/>
-                </a:solidFill>
-                <a:latin typeface="Cascadia Mono" panose="020B0609020000020004" pitchFamily="49" charset="0"/>
-              </a:rPr>
-              <a:t> </a:t>
-            </a:r>
-            <a:r>
-              <a:rPr lang="en-US" sz="1200" dirty="0" err="1">
-                <a:solidFill>
-                  <a:srgbClr val="000000"/>
-                </a:solidFill>
-                <a:latin typeface="Cascadia Mono" panose="020B0609020000020004" pitchFamily="49" charset="0"/>
-              </a:rPr>
-              <a:t>ShortName</a:t>
-            </a:r>
-            <a:r>
-              <a:rPr lang="en-US" sz="1200" dirty="0">
-                <a:solidFill>
-                  <a:srgbClr val="000000"/>
-                </a:solidFill>
-                <a:latin typeface="Cascadia Mono" panose="020B0609020000020004" pitchFamily="49" charset="0"/>
-              </a:rPr>
-              <a:t> =&gt; </a:t>
-            </a:r>
-            <a:r>
-              <a:rPr lang="en-US" sz="1200" dirty="0">
-                <a:solidFill>
-                  <a:srgbClr val="A31515"/>
-                </a:solidFill>
-                <a:latin typeface="Cascadia Mono" panose="020B0609020000020004" pitchFamily="49" charset="0"/>
-              </a:rPr>
-              <a:t>"</a:t>
-            </a:r>
-            <a:r>
-              <a:rPr lang="en-US" sz="1200" dirty="0" err="1">
-                <a:solidFill>
-                  <a:srgbClr val="A31515"/>
-                </a:solidFill>
-                <a:latin typeface="Cascadia Mono" panose="020B0609020000020004" pitchFamily="49" charset="0"/>
-              </a:rPr>
-              <a:t>Hagarg</a:t>
-            </a:r>
-            <a:r>
-              <a:rPr lang="en-US" sz="1200" dirty="0">
-                <a:solidFill>
-                  <a:srgbClr val="A31515"/>
-                </a:solidFill>
-                <a:latin typeface="Cascadia Mono" panose="020B0609020000020004" pitchFamily="49" charset="0"/>
-              </a:rPr>
-              <a:t> </a:t>
-            </a:r>
-            <a:r>
-              <a:rPr lang="en-US" sz="1200" dirty="0" err="1">
-                <a:solidFill>
-                  <a:srgbClr val="A31515"/>
-                </a:solidFill>
-                <a:latin typeface="Cascadia Mono" panose="020B0609020000020004" pitchFamily="49" charset="0"/>
-              </a:rPr>
-              <a:t>Ryonis</a:t>
-            </a:r>
-            <a:r>
-              <a:rPr lang="en-US" sz="1200" dirty="0">
-                <a:solidFill>
-                  <a:srgbClr val="A31515"/>
-                </a:solidFill>
-                <a:latin typeface="Cascadia Mono" panose="020B0609020000020004" pitchFamily="49" charset="0"/>
-              </a:rPr>
-              <a:t>"</a:t>
-            </a:r>
-            <a:r>
-              <a:rPr lang="en-US" sz="1200" dirty="0">
-                <a:solidFill>
-                  <a:srgbClr val="000000"/>
-                </a:solidFill>
-                <a:latin typeface="Cascadia Mono" panose="020B0609020000020004" pitchFamily="49" charset="0"/>
-              </a:rPr>
-              <a:t>;</a:t>
-            </a:r>
-          </a:p>
-          <a:p>
-            <a:pPr marL="0" indent="0">
-              <a:buNone/>
-            </a:pPr>
-            <a:r>
-              <a:rPr lang="en-US" sz="1200" dirty="0">
-                <a:solidFill>
-                  <a:srgbClr val="000000"/>
-                </a:solidFill>
-                <a:latin typeface="Cascadia Mono" panose="020B0609020000020004" pitchFamily="49" charset="0"/>
-              </a:rPr>
-              <a:t>    </a:t>
-            </a:r>
-            <a:r>
-              <a:rPr lang="en-US" sz="1200" dirty="0">
-                <a:solidFill>
-                  <a:srgbClr val="0000FF"/>
-                </a:solidFill>
-                <a:latin typeface="Cascadia Mono" panose="020B0609020000020004" pitchFamily="49" charset="0"/>
-              </a:rPr>
-              <a:t>public</a:t>
-            </a:r>
-            <a:r>
-              <a:rPr lang="en-US" sz="1200" dirty="0">
-                <a:solidFill>
-                  <a:srgbClr val="000000"/>
-                </a:solidFill>
-                <a:latin typeface="Cascadia Mono" panose="020B0609020000020004" pitchFamily="49" charset="0"/>
-              </a:rPr>
-              <a:t> </a:t>
-            </a:r>
-            <a:r>
-              <a:rPr lang="en-US" sz="1200" dirty="0">
-                <a:solidFill>
-                  <a:srgbClr val="0000FF"/>
-                </a:solidFill>
-                <a:latin typeface="Cascadia Mono" panose="020B0609020000020004" pitchFamily="49" charset="0"/>
-              </a:rPr>
-              <a:t>override</a:t>
-            </a:r>
-            <a:r>
-              <a:rPr lang="en-US" sz="1200" dirty="0">
-                <a:solidFill>
-                  <a:srgbClr val="000000"/>
-                </a:solidFill>
-                <a:latin typeface="Cascadia Mono" panose="020B0609020000020004" pitchFamily="49" charset="0"/>
-              </a:rPr>
-              <a:t> </a:t>
-            </a:r>
-            <a:r>
-              <a:rPr lang="en-US" sz="1200" dirty="0">
-                <a:solidFill>
-                  <a:srgbClr val="0000FF"/>
-                </a:solidFill>
-                <a:latin typeface="Cascadia Mono" panose="020B0609020000020004" pitchFamily="49" charset="0"/>
-              </a:rPr>
-              <a:t>string</a:t>
-            </a:r>
-            <a:r>
-              <a:rPr lang="en-US" sz="1200" dirty="0">
-                <a:solidFill>
-                  <a:srgbClr val="000000"/>
-                </a:solidFill>
-                <a:latin typeface="Cascadia Mono" panose="020B0609020000020004" pitchFamily="49" charset="0"/>
-              </a:rPr>
-              <a:t> </a:t>
-            </a:r>
-            <a:r>
-              <a:rPr lang="en-US" sz="1200" dirty="0" err="1">
-                <a:solidFill>
-                  <a:srgbClr val="000000"/>
-                </a:solidFill>
-                <a:latin typeface="Cascadia Mono" panose="020B0609020000020004" pitchFamily="49" charset="0"/>
-              </a:rPr>
-              <a:t>FavorDescription</a:t>
-            </a:r>
-            <a:r>
-              <a:rPr lang="en-US" sz="1200" dirty="0">
-                <a:solidFill>
-                  <a:srgbClr val="000000"/>
-                </a:solidFill>
-                <a:latin typeface="Cascadia Mono" panose="020B0609020000020004" pitchFamily="49" charset="0"/>
-              </a:rPr>
-              <a:t> =&gt; </a:t>
-            </a:r>
-            <a:r>
-              <a:rPr lang="en-US" sz="1200" dirty="0">
-                <a:solidFill>
-                  <a:srgbClr val="A31515"/>
-                </a:solidFill>
-                <a:latin typeface="Cascadia Mono" panose="020B0609020000020004" pitchFamily="49" charset="0"/>
-              </a:rPr>
-              <a:t>" ({0}% chance to avoid poison/life drain)"</a:t>
-            </a:r>
-            <a:r>
-              <a:rPr lang="en-US" sz="1200" dirty="0">
-                <a:solidFill>
-                  <a:srgbClr val="000000"/>
-                </a:solidFill>
-                <a:latin typeface="Cascadia Mono" panose="020B0609020000020004" pitchFamily="49" charset="0"/>
-              </a:rPr>
-              <a:t>;</a:t>
-            </a:r>
-          </a:p>
-          <a:p>
-            <a:pPr marL="0" indent="0">
-              <a:buNone/>
-            </a:pPr>
-            <a:r>
-              <a:rPr lang="en-US" sz="1200" dirty="0">
-                <a:solidFill>
-                  <a:srgbClr val="000000"/>
-                </a:solidFill>
-                <a:latin typeface="Cascadia Mono" panose="020B0609020000020004" pitchFamily="49" charset="0"/>
-              </a:rPr>
-              <a:t>}</a:t>
-            </a:r>
-            <a:endParaRPr lang="en-US" sz="1200" dirty="0"/>
-          </a:p>
-        </p:txBody>
-      </p:sp>
-    </p:spTree>
-    <p:extLst>
-      <p:ext uri="{BB962C8B-B14F-4D97-AF65-F5344CB8AC3E}">
-        <p14:creationId xmlns:p14="http://schemas.microsoft.com/office/powerpoint/2010/main" val="408214001"/>
-      </p:ext>
-    </p:extLst>
-  </p:cSld>
-  <p:clrMapOvr>
-    <a:masterClrMapping/>
-  </p:clrMapOvr>
-</p:sld>
-</file>
-
-<file path=ppt/slides/slide11.xml><?xml version="1.0" encoding="utf-8"?>
-<p:sld xmlns:a="http://schemas.openxmlformats.org/drawingml/2006/main" xmlns:r="http://schemas.openxmlformats.org/officeDocument/2006/relationships" xmlns:p="http://schemas.openxmlformats.org/presentationml/2006/main">
-  <p:cSld>
-    <p:spTree>
-      <p:nvGrpSpPr>
-        <p:cNvPr id="1" name=""/>
-        <p:cNvGrpSpPr/>
-        <p:nvPr/>
-      </p:nvGrpSpPr>
-      <p:grpSpPr>
-        <a:xfrm>
-          <a:off x="0" y="0"/>
-          <a:ext cx="0" cy="0"/>
-          <a:chOff x="0" y="0"/>
-          <a:chExt cx="0" cy="0"/>
-        </a:xfrm>
-      </p:grpSpPr>
-      <p:sp>
-        <p:nvSpPr>
-          <p:cNvPr id="2" name="Title 1">
-            <a:extLst>
-              <a:ext uri="{FF2B5EF4-FFF2-40B4-BE49-F238E27FC236}">
-                <a16:creationId xmlns:a16="http://schemas.microsoft.com/office/drawing/2014/main" id="{9840CB4B-4C89-2749-1A44-04E00EC35BA2}"/>
-              </a:ext>
-            </a:extLst>
-          </p:cNvPr>
-          <p:cNvSpPr>
-            <a:spLocks noGrp="1"/>
-          </p:cNvSpPr>
-          <p:nvPr>
-            <p:ph type="title"/>
-          </p:nvPr>
-        </p:nvSpPr>
-        <p:spPr/>
-        <p:txBody>
-          <a:bodyPr/>
-          <a:lstStyle/>
-          <a:p>
-            <a:r>
-              <a:rPr lang="en-US" dirty="0"/>
-              <a:t>Binding Implementation</a:t>
-            </a:r>
-          </a:p>
-        </p:txBody>
-      </p:sp>
-      <p:sp>
-        <p:nvSpPr>
-          <p:cNvPr id="3" name="Content Placeholder 2">
-            <a:extLst>
-              <a:ext uri="{FF2B5EF4-FFF2-40B4-BE49-F238E27FC236}">
-                <a16:creationId xmlns:a16="http://schemas.microsoft.com/office/drawing/2014/main" id="{07FD3693-BA4E-FDA4-B2C5-4494D2747D87}"/>
-              </a:ext>
-            </a:extLst>
-          </p:cNvPr>
-          <p:cNvSpPr>
-            <a:spLocks noGrp="1"/>
-          </p:cNvSpPr>
-          <p:nvPr>
-            <p:ph idx="1"/>
-          </p:nvPr>
-        </p:nvSpPr>
-        <p:spPr>
-          <a:xfrm>
-            <a:off x="838200" y="1537252"/>
-            <a:ext cx="10515600" cy="4639711"/>
-          </a:xfrm>
-        </p:spPr>
-        <p:txBody>
-          <a:bodyPr>
-            <a:normAutofit fontScale="62500" lnSpcReduction="20000"/>
-          </a:bodyPr>
-          <a:lstStyle/>
-          <a:p>
-            <a:pPr marL="0" indent="0">
-              <a:buNone/>
-            </a:pPr>
-            <a:r>
-              <a:rPr lang="en-US" dirty="0"/>
-              <a:t>The binding phase is used  by API Objects to attach to other objects.  The </a:t>
-            </a:r>
-            <a:r>
-              <a:rPr lang="en-US" dirty="0" err="1"/>
-              <a:t>AngbandOS</a:t>
-            </a:r>
-            <a:r>
-              <a:rPr lang="en-US" dirty="0"/>
-              <a:t> core uses a two-phase process for loading API Objects.</a:t>
-            </a:r>
-          </a:p>
-          <a:p>
-            <a:pPr marL="514350" indent="-514350">
-              <a:buAutoNum type="arabicPeriod"/>
-            </a:pPr>
-            <a:r>
-              <a:rPr lang="en-US" dirty="0"/>
-              <a:t>Load Phase – this phase loads all of the objects from either a game pack or by deserialization.  These objects are stored in the </a:t>
-            </a:r>
-            <a:r>
-              <a:rPr lang="en-US" dirty="0" err="1"/>
-              <a:t>Game.SingletonRepository</a:t>
-            </a:r>
-            <a:r>
-              <a:rPr lang="en-US" dirty="0"/>
-              <a:t>.</a:t>
-            </a:r>
-          </a:p>
-          <a:p>
-            <a:pPr marL="514350" indent="-514350">
-              <a:buAutoNum type="arabicPeriod"/>
-            </a:pPr>
-            <a:r>
-              <a:rPr lang="en-US" dirty="0"/>
-              <a:t>Bind Phase – this phase occurs after the load phase is complete.  </a:t>
-            </a:r>
-            <a:r>
-              <a:rPr lang="en-US" dirty="0" err="1"/>
-              <a:t>AngbandOS</a:t>
-            </a:r>
-            <a:r>
-              <a:rPr lang="en-US" dirty="0"/>
-              <a:t> calls the Bind method for every API Object that was loaded.  API Objects are guaranteed that all of their dependent API objects that they need references to exist and can use the </a:t>
-            </a:r>
-            <a:r>
-              <a:rPr lang="en-US" dirty="0" err="1"/>
-              <a:t>SingletonRepository.Get</a:t>
-            </a:r>
-            <a:r>
-              <a:rPr lang="en-US" dirty="0"/>
-              <a:t> properties to generate the reference.</a:t>
-            </a:r>
-          </a:p>
-          <a:p>
-            <a:pPr marL="0" indent="0">
-              <a:buNone/>
-            </a:pPr>
-            <a:r>
-              <a:rPr lang="en-US" dirty="0"/>
-              <a:t>To implement this:</a:t>
-            </a:r>
-          </a:p>
-          <a:p>
-            <a:r>
-              <a:rPr lang="en-US" dirty="0"/>
-              <a:t>API Objects:</a:t>
-            </a:r>
-          </a:p>
-          <a:p>
-            <a:pPr lvl="1"/>
-            <a:r>
-              <a:rPr lang="en-US" dirty="0"/>
-              <a:t>Need to define an abstract property that returns a string value.  This property is considered light-weight for Generic API Objects and Game Pack objects.  The property name should have a suffix of "Key".   It should note, in the XML comments, which property receives the bound object during the bind phase.</a:t>
-            </a:r>
-          </a:p>
-          <a:p>
-            <a:pPr lvl="1"/>
-            <a:r>
-              <a:rPr lang="en-US" dirty="0"/>
-              <a:t>Should identify in the XML comment which collection that hosts the object.  See the Singleton Collection Interface Binding slide for more information.</a:t>
-            </a:r>
-          </a:p>
-          <a:p>
-            <a:pPr lvl="1"/>
-            <a:r>
-              <a:rPr lang="en-US" dirty="0"/>
-              <a:t>Need to define a non-abstract, non-virtual property that holds the reference to the bound object.  It should note in the XML comment which property it is using for binding during the bind phase.</a:t>
-            </a:r>
-          </a:p>
-          <a:p>
-            <a:pPr lvl="1"/>
-            <a:r>
-              <a:rPr lang="en-US" dirty="0"/>
-              <a:t>Should call the </a:t>
-            </a:r>
-            <a:r>
-              <a:rPr lang="en-US" dirty="0" err="1"/>
-              <a:t>SingletonRepository.Get</a:t>
-            </a:r>
-            <a:r>
-              <a:rPr lang="en-US" dirty="0"/>
-              <a:t> method in the Bind method to </a:t>
-            </a:r>
-          </a:p>
-          <a:p>
-            <a:r>
-              <a:rPr lang="en-US" dirty="0"/>
-              <a:t>Generic API Objects and Game Pack Objects can provide the key value of the desired object.</a:t>
-            </a:r>
-          </a:p>
-          <a:p>
-            <a:endParaRPr lang="en-US" dirty="0"/>
-          </a:p>
-          <a:p>
-            <a:endParaRPr lang="en-US" dirty="0"/>
-          </a:p>
-          <a:p>
-            <a:endParaRPr lang="en-US" dirty="0"/>
-          </a:p>
-          <a:p>
-            <a:pPr marL="0" indent="0">
-              <a:buNone/>
-            </a:pPr>
-            <a:endParaRPr lang="en-US" dirty="0"/>
-          </a:p>
-        </p:txBody>
-      </p:sp>
-    </p:spTree>
-    <p:extLst>
-      <p:ext uri="{BB962C8B-B14F-4D97-AF65-F5344CB8AC3E}">
-        <p14:creationId xmlns:p14="http://schemas.microsoft.com/office/powerpoint/2010/main" val="1899274951"/>
-      </p:ext>
-    </p:extLst>
-  </p:cSld>
-  <p:clrMapOvr>
-    <a:masterClrMapping/>
-  </p:clrMapOvr>
-</p:sld>
-</file>
-
-<file path=ppt/slides/slide12.xml><?xml version="1.0" encoding="utf-8"?>
-<p:sld xmlns:a="http://schemas.openxmlformats.org/drawingml/2006/main" xmlns:r="http://schemas.openxmlformats.org/officeDocument/2006/relationships" xmlns:p="http://schemas.openxmlformats.org/presentationml/2006/main">
-  <p:cSld>
-    <p:spTree>
-      <p:nvGrpSpPr>
-        <p:cNvPr id="1" name=""/>
-        <p:cNvGrpSpPr/>
-        <p:nvPr/>
-      </p:nvGrpSpPr>
-      <p:grpSpPr>
-        <a:xfrm>
-          <a:off x="0" y="0"/>
-          <a:ext cx="0" cy="0"/>
-          <a:chOff x="0" y="0"/>
-          <a:chExt cx="0" cy="0"/>
-        </a:xfrm>
-      </p:grpSpPr>
-      <p:sp>
-        <p:nvSpPr>
-          <p:cNvPr id="2" name="Title 1">
-            <a:extLst>
-              <a:ext uri="{FF2B5EF4-FFF2-40B4-BE49-F238E27FC236}">
-                <a16:creationId xmlns:a16="http://schemas.microsoft.com/office/drawing/2014/main" id="{07B8008A-A924-EAFC-BE08-C2E5DD466393}"/>
-              </a:ext>
-            </a:extLst>
-          </p:cNvPr>
-          <p:cNvSpPr>
-            <a:spLocks noGrp="1"/>
-          </p:cNvSpPr>
-          <p:nvPr>
-            <p:ph type="title"/>
-          </p:nvPr>
-        </p:nvSpPr>
-        <p:spPr/>
-        <p:txBody>
-          <a:bodyPr/>
-          <a:lstStyle/>
-          <a:p>
-            <a:r>
-              <a:rPr lang="en-US" dirty="0"/>
-              <a:t>Binding Implementation Example</a:t>
-            </a:r>
-          </a:p>
-        </p:txBody>
-      </p:sp>
-      <p:sp>
-        <p:nvSpPr>
-          <p:cNvPr id="3" name="Content Placeholder 2">
-            <a:extLst>
-              <a:ext uri="{FF2B5EF4-FFF2-40B4-BE49-F238E27FC236}">
-                <a16:creationId xmlns:a16="http://schemas.microsoft.com/office/drawing/2014/main" id="{819B183C-CF60-6AB0-8CB3-0E0DF587FA80}"/>
-              </a:ext>
-            </a:extLst>
-          </p:cNvPr>
-          <p:cNvSpPr>
-            <a:spLocks noGrp="1"/>
-          </p:cNvSpPr>
-          <p:nvPr>
-            <p:ph idx="1"/>
-          </p:nvPr>
-        </p:nvSpPr>
-        <p:spPr/>
-        <p:txBody>
-          <a:bodyPr>
-            <a:normAutofit/>
-          </a:bodyPr>
-          <a:lstStyle/>
-          <a:p>
-            <a:pPr marL="0" indent="0">
-              <a:buNone/>
-            </a:pPr>
-            <a:r>
-              <a:rPr lang="en-US" sz="1100" dirty="0">
-                <a:solidFill>
-                  <a:srgbClr val="0000FF"/>
-                </a:solidFill>
-                <a:latin typeface="Cascadia Mono" panose="020B0609020000020004" pitchFamily="49" charset="0"/>
-              </a:rPr>
-              <a:t>public</a:t>
-            </a:r>
-            <a:r>
-              <a:rPr lang="en-US" sz="1100" dirty="0">
-                <a:solidFill>
-                  <a:srgbClr val="000000"/>
-                </a:solidFill>
-                <a:latin typeface="Cascadia Mono" panose="020B0609020000020004" pitchFamily="49" charset="0"/>
-              </a:rPr>
-              <a:t> </a:t>
-            </a:r>
-            <a:r>
-              <a:rPr lang="en-US" sz="1100" dirty="0">
-                <a:solidFill>
-                  <a:srgbClr val="0000FF"/>
-                </a:solidFill>
-                <a:latin typeface="Cascadia Mono" panose="020B0609020000020004" pitchFamily="49" charset="0"/>
-              </a:rPr>
-              <a:t>void</a:t>
-            </a:r>
-            <a:r>
-              <a:rPr lang="en-US" sz="1100" dirty="0">
-                <a:solidFill>
-                  <a:srgbClr val="000000"/>
-                </a:solidFill>
-                <a:latin typeface="Cascadia Mono" panose="020B0609020000020004" pitchFamily="49" charset="0"/>
-              </a:rPr>
-              <a:t> Bind()</a:t>
-            </a:r>
-          </a:p>
-          <a:p>
-            <a:pPr marL="0" indent="0">
-              <a:buNone/>
-            </a:pPr>
-            <a:r>
-              <a:rPr lang="en-US" sz="1100" dirty="0">
-                <a:solidFill>
-                  <a:srgbClr val="000000"/>
-                </a:solidFill>
-                <a:latin typeface="Cascadia Mono" panose="020B0609020000020004" pitchFamily="49" charset="0"/>
-              </a:rPr>
-              <a:t>{</a:t>
-            </a:r>
-          </a:p>
-          <a:p>
-            <a:pPr marL="0" indent="0">
-              <a:buNone/>
-            </a:pPr>
-            <a:r>
-              <a:rPr lang="en-US" sz="1100" dirty="0">
-                <a:solidFill>
-                  <a:srgbClr val="000000"/>
-                </a:solidFill>
-                <a:latin typeface="Cascadia Mono" panose="020B0609020000020004" pitchFamily="49" charset="0"/>
-              </a:rPr>
-              <a:t>    </a:t>
-            </a:r>
-            <a:r>
-              <a:rPr lang="en-US" sz="1100" dirty="0" err="1">
-                <a:solidFill>
-                  <a:srgbClr val="000000"/>
-                </a:solidFill>
-                <a:latin typeface="Cascadia Mono" panose="020B0609020000020004" pitchFamily="49" charset="0"/>
-              </a:rPr>
-              <a:t>ExecuteOnPlayerScript</a:t>
-            </a:r>
-            <a:r>
-              <a:rPr lang="en-US" sz="1100" dirty="0">
-                <a:solidFill>
-                  <a:srgbClr val="000000"/>
-                </a:solidFill>
-                <a:latin typeface="Cascadia Mono" panose="020B0609020000020004" pitchFamily="49" charset="0"/>
-              </a:rPr>
-              <a:t> = </a:t>
-            </a:r>
-            <a:r>
-              <a:rPr lang="en-US" sz="1100" dirty="0" err="1">
-                <a:solidFill>
-                  <a:srgbClr val="000000"/>
-                </a:solidFill>
-                <a:latin typeface="Cascadia Mono" panose="020B0609020000020004" pitchFamily="49" charset="0"/>
-              </a:rPr>
-              <a:t>Game.SingletonRepository.Get</a:t>
-            </a:r>
-            <a:r>
-              <a:rPr lang="en-US" sz="1100" dirty="0">
-                <a:solidFill>
-                  <a:srgbClr val="000000"/>
-                </a:solidFill>
-                <a:latin typeface="Cascadia Mono" panose="020B0609020000020004" pitchFamily="49" charset="0"/>
-              </a:rPr>
-              <a:t>&lt;</a:t>
-            </a:r>
-            <a:r>
-              <a:rPr lang="en-US" sz="1100" dirty="0" err="1">
-                <a:solidFill>
-                  <a:srgbClr val="2B91AF"/>
-                </a:solidFill>
-                <a:latin typeface="Cascadia Mono" panose="020B0609020000020004" pitchFamily="49" charset="0"/>
-              </a:rPr>
-              <a:t>IScriptMonster</a:t>
-            </a:r>
-            <a:r>
-              <a:rPr lang="en-US" sz="1100" dirty="0">
-                <a:solidFill>
-                  <a:srgbClr val="000000"/>
-                </a:solidFill>
-                <a:latin typeface="Cascadia Mono" panose="020B0609020000020004" pitchFamily="49" charset="0"/>
-              </a:rPr>
-              <a:t>&gt;(</a:t>
-            </a:r>
-            <a:r>
-              <a:rPr lang="en-US" sz="1100" dirty="0" err="1">
-                <a:solidFill>
-                  <a:srgbClr val="000000"/>
-                </a:solidFill>
-                <a:latin typeface="Cascadia Mono" panose="020B0609020000020004" pitchFamily="49" charset="0"/>
-              </a:rPr>
-              <a:t>ExecuteOnPlayerScriptKey</a:t>
-            </a:r>
-            <a:r>
-              <a:rPr lang="en-US" sz="1100" dirty="0">
-                <a:solidFill>
-                  <a:srgbClr val="000000"/>
-                </a:solidFill>
-                <a:latin typeface="Cascadia Mono" panose="020B0609020000020004" pitchFamily="49" charset="0"/>
-              </a:rPr>
-              <a:t>);</a:t>
-            </a:r>
-          </a:p>
-          <a:p>
-            <a:pPr marL="0" indent="0">
-              <a:buNone/>
-            </a:pPr>
-            <a:r>
-              <a:rPr lang="en-US" sz="1100" dirty="0">
-                <a:solidFill>
-                  <a:srgbClr val="000000"/>
-                </a:solidFill>
-                <a:latin typeface="Cascadia Mono" panose="020B0609020000020004" pitchFamily="49" charset="0"/>
-              </a:rPr>
-              <a:t>}</a:t>
-            </a:r>
-          </a:p>
-          <a:p>
-            <a:pPr marL="0" indent="0">
-              <a:buNone/>
-            </a:pPr>
-            <a:r>
-              <a:rPr lang="en-US" sz="1100" dirty="0">
-                <a:solidFill>
-                  <a:srgbClr val="808080"/>
-                </a:solidFill>
-                <a:latin typeface="Cascadia Mono" panose="020B0609020000020004" pitchFamily="49" charset="0"/>
-              </a:rPr>
-              <a:t>///</a:t>
-            </a:r>
-            <a:r>
-              <a:rPr lang="en-US" sz="1100" dirty="0">
-                <a:solidFill>
-                  <a:srgbClr val="008000"/>
-                </a:solidFill>
-                <a:latin typeface="Cascadia Mono" panose="020B0609020000020004" pitchFamily="49" charset="0"/>
-              </a:rPr>
-              <a:t> </a:t>
-            </a:r>
-            <a:r>
-              <a:rPr lang="en-US" sz="1100" dirty="0">
-                <a:solidFill>
-                  <a:srgbClr val="808080"/>
-                </a:solidFill>
-                <a:latin typeface="Cascadia Mono" panose="020B0609020000020004" pitchFamily="49" charset="0"/>
-              </a:rPr>
-              <a:t>&lt;summary&gt;</a:t>
-            </a:r>
-            <a:endParaRPr lang="en-US" sz="1100" dirty="0">
-              <a:solidFill>
-                <a:srgbClr val="000000"/>
-              </a:solidFill>
-              <a:latin typeface="Cascadia Mono" panose="020B0609020000020004" pitchFamily="49" charset="0"/>
-            </a:endParaRPr>
-          </a:p>
-          <a:p>
-            <a:pPr marL="0" indent="0">
-              <a:buNone/>
-            </a:pPr>
-            <a:r>
-              <a:rPr lang="en-US" sz="1100" dirty="0">
-                <a:solidFill>
-                  <a:srgbClr val="808080"/>
-                </a:solidFill>
-                <a:latin typeface="Cascadia Mono" panose="020B0609020000020004" pitchFamily="49" charset="0"/>
-              </a:rPr>
-              <a:t>///</a:t>
-            </a:r>
-            <a:r>
-              <a:rPr lang="en-US" sz="1100" dirty="0">
-                <a:solidFill>
-                  <a:srgbClr val="008000"/>
-                </a:solidFill>
-                <a:latin typeface="Cascadia Mono" panose="020B0609020000020004" pitchFamily="49" charset="0"/>
-              </a:rPr>
-              <a:t> Returns the key for the script to run when this spell is cast on the player.  This property is used to bind the </a:t>
-            </a:r>
-            <a:r>
-              <a:rPr lang="en-US" sz="1100" dirty="0" err="1">
-                <a:solidFill>
-                  <a:srgbClr val="008000"/>
-                </a:solidFill>
-                <a:latin typeface="Cascadia Mono" panose="020B0609020000020004" pitchFamily="49" charset="0"/>
-              </a:rPr>
-              <a:t>ExecuteOnPlayerScript</a:t>
-            </a:r>
-            <a:r>
-              <a:rPr lang="en-US" sz="1100" dirty="0">
-                <a:solidFill>
-                  <a:srgbClr val="008000"/>
-                </a:solidFill>
-                <a:latin typeface="Cascadia Mono" panose="020B0609020000020004" pitchFamily="49" charset="0"/>
-              </a:rPr>
-              <a:t> property during the bind phase.</a:t>
-            </a:r>
-            <a:endParaRPr lang="en-US" sz="1100" dirty="0">
-              <a:solidFill>
-                <a:srgbClr val="000000"/>
-              </a:solidFill>
-              <a:latin typeface="Cascadia Mono" panose="020B0609020000020004" pitchFamily="49" charset="0"/>
-            </a:endParaRPr>
-          </a:p>
-          <a:p>
-            <a:pPr marL="0" indent="0">
-              <a:buNone/>
-            </a:pPr>
-            <a:r>
-              <a:rPr lang="en-US" sz="1100" dirty="0">
-                <a:solidFill>
-                  <a:srgbClr val="808080"/>
-                </a:solidFill>
-                <a:latin typeface="Cascadia Mono" panose="020B0609020000020004" pitchFamily="49" charset="0"/>
-              </a:rPr>
-              <a:t>///</a:t>
-            </a:r>
-            <a:r>
-              <a:rPr lang="en-US" sz="1100" dirty="0">
-                <a:solidFill>
-                  <a:srgbClr val="008000"/>
-                </a:solidFill>
-                <a:latin typeface="Cascadia Mono" panose="020B0609020000020004" pitchFamily="49" charset="0"/>
-              </a:rPr>
-              <a:t> </a:t>
-            </a:r>
-            <a:r>
-              <a:rPr lang="en-US" sz="1100" dirty="0">
-                <a:solidFill>
-                  <a:srgbClr val="808080"/>
-                </a:solidFill>
-                <a:latin typeface="Cascadia Mono" panose="020B0609020000020004" pitchFamily="49" charset="0"/>
-              </a:rPr>
-              <a:t>&lt;/summary&gt;</a:t>
-            </a:r>
-            <a:endParaRPr lang="en-US" sz="1100" dirty="0">
-              <a:solidFill>
-                <a:srgbClr val="000000"/>
-              </a:solidFill>
-              <a:latin typeface="Cascadia Mono" panose="020B0609020000020004" pitchFamily="49" charset="0"/>
-            </a:endParaRPr>
-          </a:p>
-          <a:p>
-            <a:pPr marL="0" indent="0">
-              <a:buNone/>
-            </a:pPr>
-            <a:r>
-              <a:rPr lang="en-US" sz="1100" dirty="0">
-                <a:solidFill>
-                  <a:srgbClr val="0000FF"/>
-                </a:solidFill>
-                <a:latin typeface="Cascadia Mono" panose="020B0609020000020004" pitchFamily="49" charset="0"/>
-              </a:rPr>
-              <a:t>public</a:t>
-            </a:r>
-            <a:r>
-              <a:rPr lang="en-US" sz="1100" dirty="0">
-                <a:solidFill>
-                  <a:srgbClr val="000000"/>
-                </a:solidFill>
-                <a:latin typeface="Cascadia Mono" panose="020B0609020000020004" pitchFamily="49" charset="0"/>
-              </a:rPr>
-              <a:t> </a:t>
-            </a:r>
-            <a:r>
-              <a:rPr lang="en-US" sz="1100" dirty="0">
-                <a:solidFill>
-                  <a:srgbClr val="0000FF"/>
-                </a:solidFill>
-                <a:latin typeface="Cascadia Mono" panose="020B0609020000020004" pitchFamily="49" charset="0"/>
-              </a:rPr>
-              <a:t>abstract</a:t>
-            </a:r>
-            <a:r>
-              <a:rPr lang="en-US" sz="1100" dirty="0">
-                <a:solidFill>
-                  <a:srgbClr val="000000"/>
-                </a:solidFill>
-                <a:latin typeface="Cascadia Mono" panose="020B0609020000020004" pitchFamily="49" charset="0"/>
-              </a:rPr>
-              <a:t> </a:t>
-            </a:r>
-            <a:r>
-              <a:rPr lang="en-US" sz="1100" dirty="0">
-                <a:solidFill>
-                  <a:srgbClr val="0000FF"/>
-                </a:solidFill>
-                <a:latin typeface="Cascadia Mono" panose="020B0609020000020004" pitchFamily="49" charset="0"/>
-              </a:rPr>
-              <a:t>string</a:t>
-            </a:r>
-            <a:r>
-              <a:rPr lang="en-US" sz="1100" dirty="0">
-                <a:solidFill>
-                  <a:srgbClr val="000000"/>
-                </a:solidFill>
-                <a:latin typeface="Cascadia Mono" panose="020B0609020000020004" pitchFamily="49" charset="0"/>
-              </a:rPr>
-              <a:t> </a:t>
-            </a:r>
-            <a:r>
-              <a:rPr lang="en-US" sz="1100" dirty="0" err="1">
-                <a:solidFill>
-                  <a:srgbClr val="000000"/>
-                </a:solidFill>
-                <a:latin typeface="Cascadia Mono" panose="020B0609020000020004" pitchFamily="49" charset="0"/>
-              </a:rPr>
-              <a:t>ExecuteOnPlayerScriptKey</a:t>
-            </a:r>
-            <a:r>
-              <a:rPr lang="en-US" sz="1100" dirty="0">
-                <a:solidFill>
-                  <a:srgbClr val="000000"/>
-                </a:solidFill>
-                <a:latin typeface="Cascadia Mono" panose="020B0609020000020004" pitchFamily="49" charset="0"/>
-              </a:rPr>
-              <a:t> { </a:t>
-            </a:r>
-            <a:r>
-              <a:rPr lang="en-US" sz="1100" dirty="0">
-                <a:solidFill>
-                  <a:srgbClr val="0000FF"/>
-                </a:solidFill>
-                <a:latin typeface="Cascadia Mono" panose="020B0609020000020004" pitchFamily="49" charset="0"/>
-              </a:rPr>
-              <a:t>get</a:t>
-            </a:r>
-            <a:r>
-              <a:rPr lang="en-US" sz="1100" dirty="0">
-                <a:solidFill>
-                  <a:srgbClr val="000000"/>
-                </a:solidFill>
-                <a:latin typeface="Cascadia Mono" panose="020B0609020000020004" pitchFamily="49" charset="0"/>
-              </a:rPr>
-              <a:t>; }</a:t>
-            </a:r>
-          </a:p>
-          <a:p>
-            <a:pPr marL="0" indent="0">
-              <a:buNone/>
-            </a:pPr>
-            <a:endParaRPr lang="en-US" sz="1100" dirty="0">
-              <a:solidFill>
-                <a:srgbClr val="000000"/>
-              </a:solidFill>
-              <a:latin typeface="Cascadia Mono" panose="020B0609020000020004" pitchFamily="49" charset="0"/>
-            </a:endParaRPr>
-          </a:p>
-          <a:p>
-            <a:pPr marL="0" indent="0">
-              <a:buNone/>
-            </a:pPr>
-            <a:r>
-              <a:rPr lang="en-US" sz="1100" dirty="0">
-                <a:solidFill>
-                  <a:srgbClr val="808080"/>
-                </a:solidFill>
-                <a:latin typeface="Cascadia Mono" panose="020B0609020000020004" pitchFamily="49" charset="0"/>
-              </a:rPr>
-              <a:t>///</a:t>
-            </a:r>
-            <a:r>
-              <a:rPr lang="en-US" sz="1100" dirty="0">
-                <a:solidFill>
-                  <a:srgbClr val="008000"/>
-                </a:solidFill>
-                <a:latin typeface="Cascadia Mono" panose="020B0609020000020004" pitchFamily="49" charset="0"/>
-              </a:rPr>
-              <a:t> </a:t>
-            </a:r>
-            <a:r>
-              <a:rPr lang="en-US" sz="1100" dirty="0">
-                <a:solidFill>
-                  <a:srgbClr val="808080"/>
-                </a:solidFill>
-                <a:latin typeface="Cascadia Mono" panose="020B0609020000020004" pitchFamily="49" charset="0"/>
-              </a:rPr>
-              <a:t>&lt;summary&gt;</a:t>
-            </a:r>
-            <a:endParaRPr lang="en-US" sz="1100" dirty="0">
-              <a:solidFill>
-                <a:srgbClr val="000000"/>
-              </a:solidFill>
-              <a:latin typeface="Cascadia Mono" panose="020B0609020000020004" pitchFamily="49" charset="0"/>
-            </a:endParaRPr>
-          </a:p>
-          <a:p>
-            <a:pPr marL="0" indent="0">
-              <a:buNone/>
-            </a:pPr>
-            <a:r>
-              <a:rPr lang="en-US" sz="1100" dirty="0">
-                <a:solidFill>
-                  <a:srgbClr val="808080"/>
-                </a:solidFill>
-                <a:latin typeface="Cascadia Mono" panose="020B0609020000020004" pitchFamily="49" charset="0"/>
-              </a:rPr>
-              <a:t>///</a:t>
-            </a:r>
-            <a:r>
-              <a:rPr lang="en-US" sz="1100" dirty="0">
-                <a:solidFill>
-                  <a:srgbClr val="008000"/>
-                </a:solidFill>
-                <a:latin typeface="Cascadia Mono" panose="020B0609020000020004" pitchFamily="49" charset="0"/>
-              </a:rPr>
-              <a:t> Returns the script to run when this spell is cast on the player.  This property is bound using the </a:t>
-            </a:r>
-            <a:r>
-              <a:rPr lang="en-US" sz="1100" dirty="0" err="1">
-                <a:solidFill>
-                  <a:srgbClr val="008000"/>
-                </a:solidFill>
-                <a:latin typeface="Cascadia Mono" panose="020B0609020000020004" pitchFamily="49" charset="0"/>
-              </a:rPr>
-              <a:t>ExecuteOnPlayerScriptKey</a:t>
-            </a:r>
-            <a:r>
-              <a:rPr lang="en-US" sz="1100" dirty="0">
-                <a:solidFill>
-                  <a:srgbClr val="008000"/>
-                </a:solidFill>
-                <a:latin typeface="Cascadia Mono" panose="020B0609020000020004" pitchFamily="49" charset="0"/>
-              </a:rPr>
-              <a:t> property during the bind phase.</a:t>
-            </a:r>
-            <a:endParaRPr lang="en-US" sz="1100" dirty="0">
-              <a:solidFill>
-                <a:srgbClr val="000000"/>
-              </a:solidFill>
-              <a:latin typeface="Cascadia Mono" panose="020B0609020000020004" pitchFamily="49" charset="0"/>
-            </a:endParaRPr>
-          </a:p>
-          <a:p>
-            <a:pPr marL="0" indent="0">
-              <a:buNone/>
-            </a:pPr>
-            <a:r>
-              <a:rPr lang="en-US" sz="1100" dirty="0">
-                <a:solidFill>
-                  <a:srgbClr val="808080"/>
-                </a:solidFill>
-                <a:latin typeface="Cascadia Mono" panose="020B0609020000020004" pitchFamily="49" charset="0"/>
-              </a:rPr>
-              <a:t>///</a:t>
-            </a:r>
-            <a:r>
-              <a:rPr lang="en-US" sz="1100" dirty="0">
-                <a:solidFill>
-                  <a:srgbClr val="008000"/>
-                </a:solidFill>
-                <a:latin typeface="Cascadia Mono" panose="020B0609020000020004" pitchFamily="49" charset="0"/>
-              </a:rPr>
-              <a:t> </a:t>
-            </a:r>
-            <a:r>
-              <a:rPr lang="en-US" sz="1100" dirty="0">
-                <a:solidFill>
-                  <a:srgbClr val="808080"/>
-                </a:solidFill>
-                <a:latin typeface="Cascadia Mono" panose="020B0609020000020004" pitchFamily="49" charset="0"/>
-              </a:rPr>
-              <a:t>&lt;/summary&gt;</a:t>
-            </a:r>
-            <a:endParaRPr lang="en-US" sz="1100" dirty="0">
-              <a:solidFill>
-                <a:srgbClr val="000000"/>
-              </a:solidFill>
-              <a:latin typeface="Cascadia Mono" panose="020B0609020000020004" pitchFamily="49" charset="0"/>
-            </a:endParaRPr>
-          </a:p>
-          <a:p>
-            <a:pPr marL="0" indent="0">
-              <a:buNone/>
-            </a:pPr>
-            <a:r>
-              <a:rPr lang="en-US" sz="1100" dirty="0">
-                <a:solidFill>
-                  <a:srgbClr val="0000FF"/>
-                </a:solidFill>
-                <a:latin typeface="Cascadia Mono" panose="020B0609020000020004" pitchFamily="49" charset="0"/>
-              </a:rPr>
-              <a:t>public</a:t>
-            </a:r>
-            <a:r>
-              <a:rPr lang="en-US" sz="1100" dirty="0">
-                <a:solidFill>
-                  <a:srgbClr val="000000"/>
-                </a:solidFill>
-                <a:latin typeface="Cascadia Mono" panose="020B0609020000020004" pitchFamily="49" charset="0"/>
-              </a:rPr>
-              <a:t> </a:t>
-            </a:r>
-            <a:r>
-              <a:rPr lang="en-US" sz="800" dirty="0" err="1">
-                <a:solidFill>
-                  <a:srgbClr val="2B91AF"/>
-                </a:solidFill>
-                <a:latin typeface="Cascadia Mono" panose="020B0609020000020004" pitchFamily="49" charset="0"/>
-              </a:rPr>
-              <a:t>IScriptMonster</a:t>
-            </a:r>
-            <a:r>
-              <a:rPr lang="en-US" sz="800" dirty="0">
-                <a:solidFill>
-                  <a:srgbClr val="000000"/>
-                </a:solidFill>
-                <a:latin typeface="Cascadia Mono" panose="020B0609020000020004" pitchFamily="49" charset="0"/>
-              </a:rPr>
-              <a:t> </a:t>
-            </a:r>
-            <a:r>
-              <a:rPr lang="en-US" sz="800" dirty="0" err="1">
-                <a:solidFill>
-                  <a:srgbClr val="000000"/>
-                </a:solidFill>
-                <a:latin typeface="Cascadia Mono" panose="020B0609020000020004" pitchFamily="49" charset="0"/>
-              </a:rPr>
-              <a:t>ExecuteOnPlayerScript</a:t>
-            </a:r>
-            <a:r>
-              <a:rPr lang="en-US" sz="800" dirty="0">
-                <a:solidFill>
-                  <a:srgbClr val="000000"/>
-                </a:solidFill>
-                <a:latin typeface="Cascadia Mono" panose="020B0609020000020004" pitchFamily="49" charset="0"/>
-              </a:rPr>
-              <a:t> { </a:t>
-            </a:r>
-            <a:r>
-              <a:rPr lang="en-US" sz="800" dirty="0">
-                <a:solidFill>
-                  <a:srgbClr val="0000FF"/>
-                </a:solidFill>
-                <a:latin typeface="Cascadia Mono" panose="020B0609020000020004" pitchFamily="49" charset="0"/>
-              </a:rPr>
-              <a:t>get</a:t>
-            </a:r>
-            <a:r>
-              <a:rPr lang="en-US" sz="800" dirty="0">
-                <a:solidFill>
-                  <a:srgbClr val="000000"/>
-                </a:solidFill>
-                <a:latin typeface="Cascadia Mono" panose="020B0609020000020004" pitchFamily="49" charset="0"/>
-              </a:rPr>
-              <a:t>; </a:t>
-            </a:r>
-            <a:r>
-              <a:rPr lang="en-US" sz="800" dirty="0">
-                <a:solidFill>
-                  <a:srgbClr val="0000FF"/>
-                </a:solidFill>
-                <a:latin typeface="Cascadia Mono" panose="020B0609020000020004" pitchFamily="49" charset="0"/>
-              </a:rPr>
-              <a:t>private</a:t>
-            </a:r>
-            <a:r>
-              <a:rPr lang="en-US" sz="800" dirty="0">
-                <a:solidFill>
-                  <a:srgbClr val="000000"/>
-                </a:solidFill>
-                <a:latin typeface="Cascadia Mono" panose="020B0609020000020004" pitchFamily="49" charset="0"/>
-              </a:rPr>
-              <a:t> </a:t>
-            </a:r>
-            <a:r>
-              <a:rPr lang="en-US" sz="800" dirty="0">
-                <a:solidFill>
-                  <a:srgbClr val="0000FF"/>
-                </a:solidFill>
-                <a:latin typeface="Cascadia Mono" panose="020B0609020000020004" pitchFamily="49" charset="0"/>
-              </a:rPr>
-              <a:t>set</a:t>
-            </a:r>
-            <a:r>
-              <a:rPr lang="en-US" sz="800" dirty="0">
-                <a:solidFill>
-                  <a:srgbClr val="000000"/>
-                </a:solidFill>
-                <a:latin typeface="Cascadia Mono" panose="020B0609020000020004" pitchFamily="49" charset="0"/>
-              </a:rPr>
-              <a:t>; }</a:t>
-            </a:r>
-            <a:endParaRPr lang="en-US" sz="800" dirty="0"/>
-          </a:p>
-        </p:txBody>
-      </p:sp>
-    </p:spTree>
-    <p:extLst>
-      <p:ext uri="{BB962C8B-B14F-4D97-AF65-F5344CB8AC3E}">
-        <p14:creationId xmlns:p14="http://schemas.microsoft.com/office/powerpoint/2010/main" val="1074209003"/>
-      </p:ext>
-    </p:extLst>
-  </p:cSld>
-  <p:clrMapOvr>
-    <a:masterClrMapping/>
-  </p:clrMapOvr>
-</p:sld>
-</file>
-
-<file path=ppt/slides/slide13.xml><?xml version="1.0" encoding="utf-8"?>
-<p:sld xmlns:a="http://schemas.openxmlformats.org/drawingml/2006/main" xmlns:r="http://schemas.openxmlformats.org/officeDocument/2006/relationships" xmlns:p="http://schemas.openxmlformats.org/presentationml/2006/main">
-  <p:cSld>
-    <p:spTree>
-      <p:nvGrpSpPr>
-        <p:cNvPr id="1" name=""/>
-        <p:cNvGrpSpPr/>
-        <p:nvPr/>
-      </p:nvGrpSpPr>
-      <p:grpSpPr>
-        <a:xfrm>
-          <a:off x="0" y="0"/>
-          <a:ext cx="0" cy="0"/>
-          <a:chOff x="0" y="0"/>
-          <a:chExt cx="0" cy="0"/>
-        </a:xfrm>
-      </p:grpSpPr>
-      <p:sp>
-        <p:nvSpPr>
-          <p:cNvPr id="2" name="Title 1">
-            <a:extLst>
-              <a:ext uri="{FF2B5EF4-FFF2-40B4-BE49-F238E27FC236}">
-                <a16:creationId xmlns:a16="http://schemas.microsoft.com/office/drawing/2014/main" id="{D470675A-A7F2-6A4B-DE18-2B7A2079C63E}"/>
-              </a:ext>
-            </a:extLst>
-          </p:cNvPr>
-          <p:cNvSpPr>
-            <a:spLocks noGrp="1"/>
-          </p:cNvSpPr>
-          <p:nvPr>
-            <p:ph type="title"/>
-          </p:nvPr>
-        </p:nvSpPr>
-        <p:spPr/>
-        <p:txBody>
-          <a:bodyPr/>
-          <a:lstStyle/>
-          <a:p>
-            <a:r>
-              <a:rPr lang="en-US" dirty="0"/>
-              <a:t>Singleton Collection Interface Binding</a:t>
-            </a:r>
-          </a:p>
-        </p:txBody>
-      </p:sp>
-      <p:sp>
-        <p:nvSpPr>
-          <p:cNvPr id="3" name="Content Placeholder 2">
-            <a:extLst>
-              <a:ext uri="{FF2B5EF4-FFF2-40B4-BE49-F238E27FC236}">
-                <a16:creationId xmlns:a16="http://schemas.microsoft.com/office/drawing/2014/main" id="{0D7B1D8D-3622-8F1C-6E5C-FAB96016C7E8}"/>
-              </a:ext>
-            </a:extLst>
-          </p:cNvPr>
-          <p:cNvSpPr>
-            <a:spLocks noGrp="1"/>
-          </p:cNvSpPr>
-          <p:nvPr>
-            <p:ph idx="1"/>
-          </p:nvPr>
-        </p:nvSpPr>
-        <p:spPr/>
-        <p:txBody>
-          <a:bodyPr>
-            <a:normAutofit fontScale="92500"/>
-          </a:bodyPr>
-          <a:lstStyle/>
-          <a:p>
-            <a:pPr marL="0" indent="0">
-              <a:buNone/>
-            </a:pPr>
-            <a:r>
-              <a:rPr lang="en-US" dirty="0"/>
-              <a:t>The two-phase load and bind phases for </a:t>
-            </a:r>
-            <a:r>
-              <a:rPr lang="en-US" dirty="0" err="1"/>
-              <a:t>AngbandOS</a:t>
-            </a:r>
-            <a:r>
-              <a:rPr lang="en-US" dirty="0"/>
-              <a:t> often need to allow binding to objects using an interface; rather than a solid class.</a:t>
-            </a:r>
-          </a:p>
-          <a:p>
-            <a:pPr marL="0" indent="0">
-              <a:buNone/>
-            </a:pPr>
-            <a:r>
-              <a:rPr lang="en-US" dirty="0"/>
-              <a:t>To support this, </a:t>
-            </a:r>
-            <a:r>
-              <a:rPr lang="en-US" dirty="0" err="1"/>
-              <a:t>AngbandOS</a:t>
-            </a:r>
-            <a:r>
-              <a:rPr lang="en-US" dirty="0"/>
-              <a:t> implements a solid-class and interface registration that the </a:t>
-            </a:r>
-            <a:r>
-              <a:rPr lang="en-US" dirty="0" err="1"/>
-              <a:t>SingletonRepository.Get</a:t>
-            </a:r>
-            <a:r>
-              <a:rPr lang="en-US" dirty="0"/>
-              <a:t> method uses for finding objects during the bind phase.</a:t>
-            </a:r>
-          </a:p>
-          <a:p>
-            <a:pPr marL="0" indent="0">
-              <a:buNone/>
-            </a:pPr>
-            <a:r>
-              <a:rPr lang="en-US" dirty="0"/>
-              <a:t>To add additional interfaces and support to this system, the </a:t>
-            </a:r>
-            <a:r>
-              <a:rPr lang="en-US" dirty="0" err="1"/>
-              <a:t>SingletonRepository.Load</a:t>
-            </a:r>
-            <a:r>
-              <a:rPr lang="en-US" dirty="0"/>
-              <a:t> method registers the classes and interfaces.</a:t>
-            </a:r>
-          </a:p>
-          <a:p>
-            <a:pPr marL="0" indent="0">
-              <a:buNone/>
-            </a:pPr>
-            <a:r>
-              <a:rPr lang="en-US" sz="1800" dirty="0" err="1">
-                <a:solidFill>
-                  <a:srgbClr val="000000"/>
-                </a:solidFill>
-                <a:latin typeface="Cascadia Mono" panose="020B0609020000020004" pitchFamily="49" charset="0"/>
-              </a:rPr>
-              <a:t>RegisterRepository</a:t>
-            </a:r>
-            <a:r>
-              <a:rPr lang="en-US" sz="1800" dirty="0">
-                <a:solidFill>
-                  <a:srgbClr val="000000"/>
-                </a:solidFill>
-                <a:latin typeface="Cascadia Mono" panose="020B0609020000020004" pitchFamily="49" charset="0"/>
-              </a:rPr>
-              <a:t>&lt;</a:t>
-            </a:r>
-            <a:r>
-              <a:rPr lang="en-US" sz="1800" dirty="0" err="1">
-                <a:solidFill>
-                  <a:srgbClr val="2B91AF"/>
-                </a:solidFill>
-                <a:latin typeface="Cascadia Mono" panose="020B0609020000020004" pitchFamily="49" charset="0"/>
-              </a:rPr>
-              <a:t>IBoolValue</a:t>
-            </a:r>
-            <a:r>
-              <a:rPr lang="en-US" sz="1800" dirty="0">
-                <a:solidFill>
-                  <a:srgbClr val="000000"/>
-                </a:solidFill>
-                <a:latin typeface="Cascadia Mono" panose="020B0609020000020004" pitchFamily="49" charset="0"/>
-              </a:rPr>
-              <a:t>&gt;();</a:t>
-            </a:r>
-          </a:p>
-          <a:p>
-            <a:pPr marL="0" indent="0">
-              <a:buNone/>
-            </a:pPr>
-            <a:r>
-              <a:rPr lang="en-US" sz="1800" dirty="0" err="1">
-                <a:solidFill>
-                  <a:srgbClr val="000000"/>
-                </a:solidFill>
-                <a:latin typeface="Cascadia Mono" panose="020B0609020000020004" pitchFamily="49" charset="0"/>
-              </a:rPr>
-              <a:t>RegisterRepository</a:t>
-            </a:r>
-            <a:r>
-              <a:rPr lang="en-US" sz="1800" dirty="0">
-                <a:solidFill>
-                  <a:srgbClr val="000000"/>
-                </a:solidFill>
-                <a:latin typeface="Cascadia Mono" panose="020B0609020000020004" pitchFamily="49" charset="0"/>
-              </a:rPr>
-              <a:t>&lt;</a:t>
-            </a:r>
-            <a:r>
-              <a:rPr lang="en-US" sz="1800" dirty="0" err="1">
-                <a:solidFill>
-                  <a:srgbClr val="2B91AF"/>
-                </a:solidFill>
-                <a:latin typeface="Cascadia Mono" panose="020B0609020000020004" pitchFamily="49" charset="0"/>
-              </a:rPr>
-              <a:t>IIntValue</a:t>
-            </a:r>
-            <a:r>
-              <a:rPr lang="en-US" sz="1800" dirty="0">
-                <a:solidFill>
-                  <a:srgbClr val="000000"/>
-                </a:solidFill>
-                <a:latin typeface="Cascadia Mono" panose="020B0609020000020004" pitchFamily="49" charset="0"/>
-              </a:rPr>
-              <a:t>&gt;();</a:t>
-            </a:r>
-          </a:p>
-          <a:p>
-            <a:pPr marL="0" indent="0">
-              <a:buNone/>
-            </a:pPr>
-            <a:r>
-              <a:rPr lang="en-US" sz="1800" dirty="0" err="1">
-                <a:solidFill>
-                  <a:srgbClr val="000000"/>
-                </a:solidFill>
-                <a:latin typeface="Cascadia Mono" panose="020B0609020000020004" pitchFamily="49" charset="0"/>
-              </a:rPr>
-              <a:t>RegisterRepository</a:t>
-            </a:r>
-            <a:r>
-              <a:rPr lang="en-US" sz="1800" dirty="0">
-                <a:solidFill>
-                  <a:srgbClr val="000000"/>
-                </a:solidFill>
-                <a:latin typeface="Cascadia Mono" panose="020B0609020000020004" pitchFamily="49" charset="0"/>
-              </a:rPr>
-              <a:t>&lt;</a:t>
-            </a:r>
-            <a:r>
-              <a:rPr lang="en-US" sz="1800" dirty="0">
-                <a:solidFill>
-                  <a:srgbClr val="2B91AF"/>
-                </a:solidFill>
-                <a:latin typeface="Cascadia Mono" panose="020B0609020000020004" pitchFamily="49" charset="0"/>
-              </a:rPr>
-              <a:t>Activation</a:t>
-            </a:r>
-            <a:r>
-              <a:rPr lang="en-US" sz="1800" dirty="0">
-                <a:solidFill>
-                  <a:srgbClr val="000000"/>
-                </a:solidFill>
-                <a:latin typeface="Cascadia Mono" panose="020B0609020000020004" pitchFamily="49" charset="0"/>
-              </a:rPr>
-              <a:t>&gt;();</a:t>
-            </a:r>
-          </a:p>
-          <a:p>
-            <a:pPr marL="0" indent="0">
-              <a:buNone/>
-            </a:pPr>
-            <a:r>
-              <a:rPr lang="en-US" sz="1800" dirty="0" err="1">
-                <a:solidFill>
-                  <a:srgbClr val="000000"/>
-                </a:solidFill>
-                <a:latin typeface="Cascadia Mono" panose="020B0609020000020004" pitchFamily="49" charset="0"/>
-              </a:rPr>
-              <a:t>RegisterRepository</a:t>
-            </a:r>
-            <a:r>
-              <a:rPr lang="en-US" sz="1800" dirty="0">
-                <a:solidFill>
-                  <a:srgbClr val="000000"/>
-                </a:solidFill>
-                <a:latin typeface="Cascadia Mono" panose="020B0609020000020004" pitchFamily="49" charset="0"/>
-              </a:rPr>
-              <a:t>&lt;</a:t>
-            </a:r>
-            <a:r>
-              <a:rPr lang="en-US" sz="1800" dirty="0" err="1">
-                <a:solidFill>
-                  <a:srgbClr val="2B91AF"/>
-                </a:solidFill>
-                <a:latin typeface="Cascadia Mono" panose="020B0609020000020004" pitchFamily="49" charset="0"/>
-              </a:rPr>
-              <a:t>ActivationWeightedRandom</a:t>
-            </a:r>
-            <a:r>
-              <a:rPr lang="en-US" sz="1800" dirty="0">
-                <a:solidFill>
-                  <a:srgbClr val="000000"/>
-                </a:solidFill>
-                <a:latin typeface="Cascadia Mono" panose="020B0609020000020004" pitchFamily="49" charset="0"/>
-              </a:rPr>
-              <a:t>&gt;();</a:t>
-            </a:r>
-          </a:p>
-          <a:p>
-            <a:pPr marL="0" indent="0">
-              <a:buNone/>
-            </a:pPr>
-            <a:endParaRPr lang="en-US" dirty="0"/>
-          </a:p>
-        </p:txBody>
-      </p:sp>
-    </p:spTree>
-    <p:extLst>
-      <p:ext uri="{BB962C8B-B14F-4D97-AF65-F5344CB8AC3E}">
-        <p14:creationId xmlns:p14="http://schemas.microsoft.com/office/powerpoint/2010/main" val="3999199384"/>
-      </p:ext>
-    </p:extLst>
-  </p:cSld>
-  <p:clrMapOvr>
-    <a:masterClrMapping/>
-  </p:clrMapOvr>
-</p:sld>
-</file>
-
 <file path=ppt/slides/slide2.xml><?xml version="1.0" encoding="utf-8"?>
 <p:sld xmlns:a="http://schemas.openxmlformats.org/drawingml/2006/main" xmlns:r="http://schemas.openxmlformats.org/officeDocument/2006/relationships" xmlns:p="http://schemas.openxmlformats.org/presentationml/2006/main">
   <p:cSld>
@@ -5520,8 +3576,8 @@
         </p:nvSpPr>
         <p:spPr>
           <a:xfrm>
-            <a:off x="3690612" y="3770833"/>
-            <a:ext cx="2665581" cy="369332"/>
+            <a:off x="3690612" y="3244334"/>
+            <a:ext cx="2317474" cy="369332"/>
           </a:xfrm>
           <a:prstGeom prst="rect">
             <a:avLst/>
@@ -5541,7 +3597,7 @@
           <a:p>
             <a:r>
               <a:rPr lang="en-US" dirty="0"/>
-              <a:t>Game Pack API Object 1</a:t>
+              <a:t>Generic API Object 2</a:t>
             </a:r>
           </a:p>
         </p:txBody>
@@ -5714,6 +3770,47 @@
           </a:p>
         </p:txBody>
       </p:sp>
+      <p:sp>
+        <p:nvSpPr>
+          <p:cNvPr id="15" name="TextBox 14">
+            <a:extLst>
+              <a:ext uri="{FF2B5EF4-FFF2-40B4-BE49-F238E27FC236}">
+                <a16:creationId xmlns:a16="http://schemas.microsoft.com/office/drawing/2014/main" id="{DA17A2BB-30EF-85B1-81D0-F419D75DA1CF}"/>
+              </a:ext>
+            </a:extLst>
+          </p:cNvPr>
+          <p:cNvSpPr txBox="1"/>
+          <p:nvPr/>
+        </p:nvSpPr>
+        <p:spPr>
+          <a:xfrm>
+            <a:off x="7232137" y="3244334"/>
+            <a:ext cx="2199861" cy="369332"/>
+          </a:xfrm>
+          <a:prstGeom prst="rect">
+            <a:avLst/>
+          </a:prstGeom>
+          <a:noFill/>
+          <a:ln>
+            <a:solidFill>
+              <a:schemeClr val="accent1"/>
+            </a:solidFill>
+          </a:ln>
+        </p:spPr>
+        <p:txBody>
+          <a:bodyPr wrap="square" rtlCol="0">
+            <a:spAutoFit/>
+          </a:bodyPr>
+          <a:lstStyle/>
+          <a:p>
+            <a:r>
+              <a:rPr lang="en-US" dirty="0" err="1"/>
+              <a:t>GameConfiguration</a:t>
+            </a:r>
+            <a:endParaRPr lang="en-US" dirty="0"/>
+          </a:p>
+        </p:txBody>
+      </p:sp>
       <p:cxnSp>
         <p:nvCxnSpPr>
           <p:cNvPr id="17" name="Straight Arrow Connector 16">
@@ -5733,6 +3830,49 @@
         <p:spPr>
           <a:xfrm flipH="1">
             <a:off x="6008086" y="2855516"/>
+            <a:ext cx="1224051" cy="0"/>
+          </a:xfrm>
+          <a:prstGeom prst="straightConnector1">
+            <a:avLst/>
+          </a:prstGeom>
+          <a:ln>
+            <a:tailEnd type="triangle"/>
+          </a:ln>
+        </p:spPr>
+        <p:style>
+          <a:lnRef idx="2">
+            <a:schemeClr val="accent1"/>
+          </a:lnRef>
+          <a:fillRef idx="0">
+            <a:schemeClr val="accent1"/>
+          </a:fillRef>
+          <a:effectRef idx="1">
+            <a:schemeClr val="accent1"/>
+          </a:effectRef>
+          <a:fontRef idx="minor">
+            <a:schemeClr val="tx1"/>
+          </a:fontRef>
+        </p:style>
+      </p:cxnSp>
+      <p:cxnSp>
+        <p:nvCxnSpPr>
+          <p:cNvPr id="19" name="Straight Arrow Connector 18">
+            <a:extLst>
+              <a:ext uri="{FF2B5EF4-FFF2-40B4-BE49-F238E27FC236}">
+                <a16:creationId xmlns:a16="http://schemas.microsoft.com/office/drawing/2014/main" id="{7FF75695-F7F4-5862-718E-9A5B30EE21FB}"/>
+              </a:ext>
+            </a:extLst>
+          </p:cNvPr>
+          <p:cNvCxnSpPr>
+            <a:cxnSpLocks/>
+            <a:stCxn id="15" idx="1"/>
+            <a:endCxn id="7" idx="3"/>
+          </p:cNvCxnSpPr>
+          <p:nvPr/>
+        </p:nvCxnSpPr>
+        <p:spPr>
+          <a:xfrm flipH="1">
+            <a:off x="6008086" y="3429000"/>
             <a:ext cx="1224051" cy="0"/>
           </a:xfrm>
           <a:prstGeom prst="straightConnector1">
@@ -5819,7 +3959,7 @@
         <p:spPr>
           <a:xfrm flipH="1" flipV="1">
             <a:off x="2436743" y="2855516"/>
-            <a:ext cx="1253869" cy="1099983"/>
+            <a:ext cx="1253869" cy="573484"/>
           </a:xfrm>
           <a:prstGeom prst="straightConnector1">
             <a:avLst/>
@@ -5933,120 +4073,6 @@
           </a:fontRef>
         </p:style>
       </p:cxnSp>
-      <p:sp>
-        <p:nvSpPr>
-          <p:cNvPr id="10" name="Rectangle 9">
-            <a:extLst>
-              <a:ext uri="{FF2B5EF4-FFF2-40B4-BE49-F238E27FC236}">
-                <a16:creationId xmlns:a16="http://schemas.microsoft.com/office/drawing/2014/main" id="{A3082C74-DDFE-BB79-27CB-99F35F673585}"/>
-              </a:ext>
-            </a:extLst>
-          </p:cNvPr>
-          <p:cNvSpPr/>
-          <p:nvPr/>
-        </p:nvSpPr>
-        <p:spPr>
-          <a:xfrm>
-            <a:off x="3378820" y="1690687"/>
-            <a:ext cx="6376437" cy="1553641"/>
-          </a:xfrm>
-          <a:prstGeom prst="rect">
-            <a:avLst/>
-          </a:prstGeom>
-          <a:noFill/>
-          <a:ln>
-            <a:prstDash val="sysDot"/>
-          </a:ln>
-        </p:spPr>
-        <p:style>
-          <a:lnRef idx="2">
-            <a:schemeClr val="accent1">
-              <a:shade val="15000"/>
-            </a:schemeClr>
-          </a:lnRef>
-          <a:fillRef idx="1">
-            <a:schemeClr val="accent1"/>
-          </a:fillRef>
-          <a:effectRef idx="0">
-            <a:schemeClr val="accent1"/>
-          </a:effectRef>
-          <a:fontRef idx="minor">
-            <a:schemeClr val="lt1"/>
-          </a:fontRef>
-        </p:style>
-        <p:txBody>
-          <a:bodyPr rtlCol="0" anchor="t" anchorCtr="0"/>
-          <a:lstStyle/>
-          <a:p>
-            <a:pPr algn="ctr"/>
-            <a:r>
-              <a:rPr lang="en-US" dirty="0">
-                <a:solidFill>
-                  <a:schemeClr val="tx1"/>
-                </a:solidFill>
-              </a:rPr>
-              <a:t>Serialization/Deserialization</a:t>
-            </a:r>
-          </a:p>
-        </p:txBody>
-      </p:sp>
-      <p:sp>
-        <p:nvSpPr>
-          <p:cNvPr id="16" name="Rectangle 15">
-            <a:extLst>
-              <a:ext uri="{FF2B5EF4-FFF2-40B4-BE49-F238E27FC236}">
-                <a16:creationId xmlns:a16="http://schemas.microsoft.com/office/drawing/2014/main" id="{A6BF0B90-8C55-7126-B20E-657EEAA28539}"/>
-              </a:ext>
-            </a:extLst>
-          </p:cNvPr>
-          <p:cNvSpPr/>
-          <p:nvPr/>
-        </p:nvSpPr>
-        <p:spPr>
-          <a:xfrm>
-            <a:off x="3356941" y="3382023"/>
-            <a:ext cx="6376437" cy="1004448"/>
-          </a:xfrm>
-          <a:prstGeom prst="rect">
-            <a:avLst/>
-          </a:prstGeom>
-          <a:noFill/>
-          <a:ln>
-            <a:prstDash val="sysDot"/>
-          </a:ln>
-        </p:spPr>
-        <p:style>
-          <a:lnRef idx="2">
-            <a:schemeClr val="accent1">
-              <a:shade val="15000"/>
-            </a:schemeClr>
-          </a:lnRef>
-          <a:fillRef idx="1">
-            <a:schemeClr val="accent1"/>
-          </a:fillRef>
-          <a:effectRef idx="0">
-            <a:schemeClr val="accent1"/>
-          </a:effectRef>
-          <a:fontRef idx="minor">
-            <a:schemeClr val="lt1"/>
-          </a:fontRef>
-        </p:style>
-        <p:txBody>
-          <a:bodyPr rtlCol="0" anchor="t" anchorCtr="0"/>
-          <a:lstStyle/>
-          <a:p>
-            <a:pPr algn="ctr"/>
-            <a:r>
-              <a:rPr lang="en-US" dirty="0">
-                <a:solidFill>
-                  <a:schemeClr val="tx1"/>
-                </a:solidFill>
-              </a:rPr>
-              <a:t>Game Pack</a:t>
-            </a:r>
-          </a:p>
-        </p:txBody>
-      </p:sp>
     </p:spTree>
     <p:extLst>
       <p:ext uri="{BB962C8B-B14F-4D97-AF65-F5344CB8AC3E}">
@@ -6091,8 +4117,8 @@
         </p:nvSpPr>
         <p:spPr>
           <a:xfrm>
-            <a:off x="730526" y="1548714"/>
-            <a:ext cx="10730948" cy="4678943"/>
+            <a:off x="730526" y="1690689"/>
+            <a:ext cx="10730948" cy="4536968"/>
           </a:xfrm>
           <a:prstGeom prst="rect">
             <a:avLst/>
@@ -6106,7 +4132,7 @@
         </p:spPr>
         <p:txBody>
           <a:bodyPr wrap="square" rtlCol="0">
-            <a:normAutofit fontScale="92500" lnSpcReduction="20000"/>
+            <a:normAutofit/>
           </a:bodyPr>
           <a:lstStyle/>
           <a:p>
@@ -6116,7 +4142,45 @@
             </a:pPr>
             <a:r>
               <a:rPr lang="en-US" dirty="0"/>
-              <a:t>Are internal classes.</a:t>
+              <a:t>Are heavy weight objects that often implement methods for functionality.  These methods:</a:t>
+            </a:r>
+          </a:p>
+          <a:p>
+            <a:pPr marL="800100" lvl="1" indent="-342900">
+              <a:buFont typeface="Arial" panose="020B0604020202020204" pitchFamily="34" charset="0"/>
+              <a:buChar char="•"/>
+            </a:pPr>
+            <a:r>
+              <a:rPr lang="en-US" dirty="0"/>
+              <a:t>Can have any access modifier (Typically, private, protected, internal or public),</a:t>
+            </a:r>
+          </a:p>
+          <a:p>
+            <a:pPr marL="800100" lvl="1" indent="-342900">
+              <a:buFont typeface="Arial" panose="020B0604020202020204" pitchFamily="34" charset="0"/>
+              <a:buChar char="•"/>
+            </a:pPr>
+            <a:r>
+              <a:rPr lang="en-US" dirty="0"/>
+              <a:t>Are not abstract or virtual.  This ensures derived objects are light-weight.</a:t>
+            </a:r>
+          </a:p>
+          <a:p>
+            <a:pPr marL="800100" lvl="1" indent="-342900">
+              <a:buFont typeface="Arial" panose="020B0604020202020204" pitchFamily="34" charset="0"/>
+              <a:buChar char="•"/>
+            </a:pPr>
+            <a:r>
+              <a:rPr lang="en-US" dirty="0"/>
+              <a:t>Optionally, should Seal base methods to further ensure derived generic objects conform the </a:t>
+            </a:r>
+            <a:r>
+              <a:rPr lang="en-US" dirty="0" err="1"/>
+              <a:t>the</a:t>
+            </a:r>
+            <a:r>
+              <a:rPr lang="en-US" dirty="0"/>
+              <a:t> light-weight standards.</a:t>
             </a:r>
           </a:p>
           <a:p>
@@ -6126,7 +4190,43 @@
             </a:pPr>
             <a:r>
               <a:rPr lang="en-US" dirty="0"/>
-              <a:t>Can, optionally, be derived from API Base Objects.</a:t>
+              <a:t>Must implement the </a:t>
+            </a:r>
+            <a:r>
+              <a:rPr lang="en-US" dirty="0" err="1"/>
+              <a:t>IGetKey</a:t>
+            </a:r>
+            <a:r>
+              <a:rPr lang="en-US" dirty="0"/>
+              <a:t> interface which declare:</a:t>
+            </a:r>
+          </a:p>
+          <a:p>
+            <a:pPr marL="800100" lvl="1" indent="-342900">
+              <a:buFont typeface="Arial" panose="020B0604020202020204" pitchFamily="34" charset="0"/>
+              <a:buChar char="•"/>
+            </a:pPr>
+            <a:r>
+              <a:rPr lang="en-US" dirty="0"/>
+              <a:t>A unique key for each instance (e.g. </a:t>
+            </a:r>
+            <a:r>
+              <a:rPr lang="en-US" dirty="0" err="1"/>
+              <a:t>GetKey</a:t>
+            </a:r>
+            <a:r>
+              <a:rPr lang="en-US" dirty="0"/>
+              <a:t>)</a:t>
+            </a:r>
+          </a:p>
+          <a:p>
+            <a:pPr marL="800100" lvl="1" indent="-342900">
+              <a:buFont typeface="Arial" panose="020B0604020202020204" pitchFamily="34" charset="0"/>
+              <a:buChar char="•"/>
+            </a:pPr>
+            <a:r>
+              <a:rPr lang="en-US" dirty="0"/>
+              <a:t>A bind property (e.g. Bind) that allows the object to bind to other objects.</a:t>
             </a:r>
           </a:p>
           <a:p>
@@ -6135,12 +4235,8 @@
               <a:buAutoNum type="arabicPeriod"/>
             </a:pPr>
             <a:r>
-              <a:rPr lang="en-US"/>
-              <a:t>Can </a:t>
-            </a:r>
-            <a:r>
               <a:rPr lang="en-US" dirty="0"/>
-              <a:t>maintain state.</a:t>
+              <a:t>Use abstract and virtual properties for derived objects to supply required values or override default behavior.  See the next slide for supported light-weight data-types.</a:t>
             </a:r>
           </a:p>
           <a:p>
@@ -6150,161 +4246,7 @@
             </a:pPr>
             <a:r>
               <a:rPr lang="en-US" dirty="0"/>
-              <a:t>Are always abstract because they require either a Game Pack Objects or a Generic API Objects for implementation.</a:t>
-            </a:r>
-          </a:p>
-          <a:p>
-            <a:pPr marL="342900" indent="-342900">
-              <a:buFont typeface="+mj-lt"/>
-              <a:buAutoNum type="arabicPeriod"/>
-            </a:pPr>
-            <a:r>
-              <a:rPr lang="en-US" dirty="0"/>
-              <a:t>Methods and properties may have any access modifier (Typically, private, protected, internal or public),</a:t>
-            </a:r>
-          </a:p>
-          <a:p>
-            <a:pPr marL="342900" indent="-342900">
-              <a:buFont typeface="+mj-lt"/>
-              <a:buAutoNum type="arabicPeriod"/>
-            </a:pPr>
-            <a:r>
-              <a:rPr lang="en-US" dirty="0"/>
-              <a:t>Are heavy weight objects that often implement methods for functionality and</a:t>
-            </a:r>
-          </a:p>
-          <a:p>
-            <a:pPr marL="800100" lvl="1" indent="-342900">
-              <a:buFont typeface="Arial" panose="020B0604020202020204" pitchFamily="34" charset="0"/>
-              <a:buChar char="•"/>
-            </a:pPr>
-            <a:r>
-              <a:rPr lang="en-US" dirty="0"/>
-              <a:t>Never declare new abstract or virtual methods to ensure derived objects are light-weight,</a:t>
-            </a:r>
-          </a:p>
-          <a:p>
-            <a:pPr marL="800100" lvl="1" indent="-342900">
-              <a:buFont typeface="Arial" panose="020B0604020202020204" pitchFamily="34" charset="0"/>
-              <a:buChar char="•"/>
-            </a:pPr>
-            <a:r>
-              <a:rPr lang="en-US" dirty="0"/>
-              <a:t>Optionally, Seal overridden base methods to further ensure derived generic objects conform to the light-weight standards.</a:t>
-            </a:r>
-          </a:p>
-          <a:p>
-            <a:pPr marL="342900" indent="-342900">
-              <a:buFont typeface="+mj-lt"/>
-              <a:buAutoNum type="arabicPeriod"/>
-            </a:pPr>
-            <a:r>
-              <a:rPr lang="en-US" dirty="0"/>
-              <a:t>Must implement the </a:t>
-            </a:r>
-            <a:r>
-              <a:rPr lang="en-US" dirty="0" err="1"/>
-              <a:t>IGetKey</a:t>
-            </a:r>
-            <a:r>
-              <a:rPr lang="en-US" dirty="0"/>
-              <a:t> interface which declare:</a:t>
-            </a:r>
-          </a:p>
-          <a:p>
-            <a:pPr marL="800100" lvl="1" indent="-342900">
-              <a:buFont typeface="Arial" panose="020B0604020202020204" pitchFamily="34" charset="0"/>
-              <a:buChar char="•"/>
-            </a:pPr>
-            <a:r>
-              <a:rPr lang="en-US" dirty="0"/>
-              <a:t>A unique key for each instance (e.g. </a:t>
-            </a:r>
-            <a:r>
-              <a:rPr lang="en-US" dirty="0" err="1"/>
-              <a:t>GetKey</a:t>
-            </a:r>
-            <a:r>
-              <a:rPr lang="en-US" dirty="0"/>
-              <a:t>), with a similar implementation to:</a:t>
-            </a:r>
-          </a:p>
-          <a:p>
-            <a:pPr marL="798513" lvl="1"/>
-            <a:r>
-              <a:rPr lang="en-US" sz="1800" dirty="0">
-                <a:solidFill>
-                  <a:srgbClr val="0000FF"/>
-                </a:solidFill>
-                <a:latin typeface="Cascadia Mono" panose="020B0609020000020004" pitchFamily="49" charset="0"/>
-              </a:rPr>
-              <a:t>public</a:t>
-            </a:r>
-            <a:r>
-              <a:rPr lang="en-US" sz="1800" dirty="0">
-                <a:solidFill>
-                  <a:srgbClr val="000000"/>
-                </a:solidFill>
-                <a:latin typeface="Cascadia Mono" panose="020B0609020000020004" pitchFamily="49" charset="0"/>
-              </a:rPr>
-              <a:t> </a:t>
-            </a:r>
-            <a:r>
-              <a:rPr lang="en-US" sz="1800" dirty="0">
-                <a:solidFill>
-                  <a:srgbClr val="0000FF"/>
-                </a:solidFill>
-                <a:latin typeface="Cascadia Mono" panose="020B0609020000020004" pitchFamily="49" charset="0"/>
-              </a:rPr>
-              <a:t>string</a:t>
-            </a:r>
-            <a:r>
-              <a:rPr lang="en-US" sz="1800" dirty="0">
-                <a:solidFill>
-                  <a:srgbClr val="000000"/>
-                </a:solidFill>
-                <a:latin typeface="Cascadia Mono" panose="020B0609020000020004" pitchFamily="49" charset="0"/>
-              </a:rPr>
-              <a:t> </a:t>
-            </a:r>
-            <a:r>
-              <a:rPr lang="en-US" sz="1800" dirty="0" err="1">
-                <a:solidFill>
-                  <a:srgbClr val="000000"/>
-                </a:solidFill>
-                <a:latin typeface="Cascadia Mono" panose="020B0609020000020004" pitchFamily="49" charset="0"/>
-              </a:rPr>
-              <a:t>GetKey</a:t>
-            </a:r>
-            <a:r>
-              <a:rPr lang="en-US" sz="1800" dirty="0">
-                <a:solidFill>
-                  <a:srgbClr val="000000"/>
-                </a:solidFill>
-                <a:latin typeface="Cascadia Mono" panose="020B0609020000020004" pitchFamily="49" charset="0"/>
-              </a:rPr>
-              <a:t> =&gt; Key;</a:t>
-            </a:r>
-            <a:endParaRPr lang="en-US" dirty="0"/>
-          </a:p>
-          <a:p>
-            <a:pPr marL="800100" lvl="1" indent="-342900">
-              <a:buFont typeface="Arial" panose="020B0604020202020204" pitchFamily="34" charset="0"/>
-              <a:buChar char="•"/>
-            </a:pPr>
-            <a:r>
-              <a:rPr lang="en-US" dirty="0"/>
-              <a:t>A bind property (e.g. Bind) that allows the object to bind to other objects.</a:t>
-            </a:r>
-          </a:p>
-          <a:p>
-            <a:pPr marL="342900" indent="-342900">
-              <a:buFont typeface="+mj-lt"/>
-              <a:buAutoNum type="arabicPeriod"/>
-            </a:pPr>
-            <a:r>
-              <a:rPr lang="en-US" dirty="0"/>
-              <a:t>Implement abstract and virtual read-only properties using the </a:t>
+              <a:t>Typically, do not maintain state.  Properties are implemented as read-only properties using the </a:t>
             </a:r>
             <a:r>
               <a:rPr lang="en-US" dirty="0">
@@ -6315,18 +4257,7 @@
             </a:r>
             <a:r>
               <a:rPr lang="en-US" dirty="0"/>
-              <a:t> syntax so that derived objects can supply required or override default values.  Virtual properties can use the go to (</a:t>
-            </a:r>
-            <a:r>
-              <a:rPr lang="en-US" dirty="0">
-                <a:latin typeface="Courier New" panose="02070309020205020404" pitchFamily="49" charset="0"/>
-                <a:cs typeface="Courier New" panose="02070309020205020404" pitchFamily="49" charset="0"/>
-              </a:rPr>
-              <a:t>=&gt;</a:t>
-            </a:r>
-            <a:r>
-              <a:rPr lang="en-US" dirty="0"/>
-              <a:t>) operator to provide a default value.  </a:t>
+              <a:t> syntax.  In other words, lambda =&gt; operator cannot be used.</a:t>
             </a:r>
           </a:p>
           <a:p>
@@ -8613,8 +6544,8 @@
               <a:buChar char="•"/>
             </a:pPr>
             <a:r>
-              <a:rPr lang="en-US" sz="2400" dirty="0"/>
-              <a:t>Are light-weight, by definition.</a:t>
+              <a:rPr lang="en-US" dirty="0"/>
+              <a:t>Are derived from API Objects.</a:t>
             </a:r>
           </a:p>
           <a:p>
@@ -8623,8 +6554,8 @@
               <a:buChar char="•"/>
             </a:pPr>
             <a:r>
-              <a:rPr lang="en-US" sz="2400" dirty="0"/>
-              <a:t>Implement an API Object as a base class.</a:t>
+              <a:rPr lang="en-US" dirty="0"/>
+              <a:t>Override all abstract and virtual properties of the base class.</a:t>
             </a:r>
           </a:p>
           <a:p>
@@ -8633,56 +6564,8 @@
               <a:buChar char="•"/>
             </a:pPr>
             <a:r>
-              <a:rPr lang="en-US" sz="2400" dirty="0"/>
-              <a:t>Override all abstract and virtual properties of the base class.</a:t>
-            </a:r>
-          </a:p>
-          <a:p>
-            <a:pPr marL="285750" indent="-285750">
-              <a:buFont typeface="Arial" panose="020B0604020202020204" pitchFamily="34" charset="0"/>
-              <a:buChar char="•"/>
-            </a:pPr>
-            <a:r>
-              <a:rPr lang="en-US" sz="2400" dirty="0"/>
-              <a:t>Implement the </a:t>
-            </a:r>
-            <a:r>
-              <a:rPr lang="en-US" sz="2400" dirty="0" err="1"/>
-              <a:t>IToJson</a:t>
-            </a:r>
-            <a:r>
-              <a:rPr lang="en-US" sz="2400" dirty="0"/>
-              <a:t> interface for serialization.</a:t>
-            </a:r>
-          </a:p>
-          <a:p>
-            <a:pPr marL="285750" indent="-285750">
-              <a:buFont typeface="Arial" panose="020B0604020202020204" pitchFamily="34" charset="0"/>
-              <a:buChar char="•"/>
-            </a:pPr>
-            <a:r>
-              <a:rPr lang="en-US" sz="2400" dirty="0"/>
+              <a:rPr lang="en-US" dirty="0"/>
               <a:t>Never maintain state.</a:t>
-            </a:r>
-          </a:p>
-          <a:p>
-            <a:pPr marL="285750" indent="-285750">
-              <a:buFont typeface="Arial" panose="020B0604020202020204" pitchFamily="34" charset="0"/>
-              <a:buChar char="•"/>
-            </a:pPr>
-            <a:r>
-              <a:rPr lang="en-US" sz="2400" dirty="0"/>
-              <a:t>Never have default property value assignments.</a:t>
-            </a:r>
-          </a:p>
-          <a:p>
-            <a:pPr marL="285750" indent="-285750">
-              <a:buFont typeface="Arial" panose="020B0604020202020204" pitchFamily="34" charset="0"/>
-              <a:buChar char="•"/>
-            </a:pPr>
-            <a:r>
-              <a:rPr lang="en-US" sz="2400" dirty="0"/>
-              <a:t>Shouldn’t need to include XML comments because they are all derived from the base API Object.</a:t>
             </a:r>
           </a:p>
           <a:p>
@@ -9592,23 +7475,7 @@
             </a:r>
             <a:r>
               <a:rPr lang="en-US" dirty="0"/>
-              <a:t> interface for serialization.  Eventually, the </a:t>
-            </a:r>
-            <a:r>
-              <a:rPr lang="en-US" dirty="0" err="1"/>
-              <a:t>IToJson</a:t>
-            </a:r>
-            <a:r>
-              <a:rPr lang="en-US" dirty="0"/>
-              <a:t> interface will be merged with the </a:t>
-            </a:r>
-            <a:r>
-              <a:rPr lang="en-US" dirty="0" err="1"/>
-              <a:t>IGetKey</a:t>
-            </a:r>
-            <a:r>
-              <a:rPr lang="en-US" dirty="0"/>
-              <a:t> interface.</a:t>
+              <a:t> interface for serialization.</a:t>
             </a:r>
           </a:p>
           <a:p>
@@ -9645,145 +7512,6 @@
     <p:extLst>
       <p:ext uri="{BB962C8B-B14F-4D97-AF65-F5344CB8AC3E}">
         <p14:creationId xmlns:p14="http://schemas.microsoft.com/office/powerpoint/2010/main" val="2117860929"/>
-      </p:ext>
-    </p:extLst>
-  </p:cSld>
-  <p:clrMapOvr>
-    <a:masterClrMapping/>
-  </p:clrMapOvr>
-</p:sld>
-</file>
-
-<file path=ppt/slides/slide9.xml><?xml version="1.0" encoding="utf-8"?>
-<p:sld xmlns:a="http://schemas.openxmlformats.org/drawingml/2006/main" xmlns:r="http://schemas.openxmlformats.org/officeDocument/2006/relationships" xmlns:p="http://schemas.openxmlformats.org/presentationml/2006/main">
-  <p:cSld>
-    <p:spTree>
-      <p:nvGrpSpPr>
-        <p:cNvPr id="1" name=""/>
-        <p:cNvGrpSpPr/>
-        <p:nvPr/>
-      </p:nvGrpSpPr>
-      <p:grpSpPr>
-        <a:xfrm>
-          <a:off x="0" y="0"/>
-          <a:ext cx="0" cy="0"/>
-          <a:chOff x="0" y="0"/>
-          <a:chExt cx="0" cy="0"/>
-        </a:xfrm>
-      </p:grpSpPr>
-      <p:sp>
-        <p:nvSpPr>
-          <p:cNvPr id="2" name="Title 1">
-            <a:extLst>
-              <a:ext uri="{FF2B5EF4-FFF2-40B4-BE49-F238E27FC236}">
-                <a16:creationId xmlns:a16="http://schemas.microsoft.com/office/drawing/2014/main" id="{73406A12-9689-1867-84F8-B9F88296B75E}"/>
-              </a:ext>
-            </a:extLst>
-          </p:cNvPr>
-          <p:cNvSpPr>
-            <a:spLocks noGrp="1"/>
-          </p:cNvSpPr>
-          <p:nvPr>
-            <p:ph type="title"/>
-          </p:nvPr>
-        </p:nvSpPr>
-        <p:spPr/>
-        <p:txBody>
-          <a:bodyPr/>
-          <a:lstStyle/>
-          <a:p>
-            <a:r>
-              <a:rPr lang="en-US" dirty="0"/>
-              <a:t>Game Pack Objects</a:t>
-            </a:r>
-          </a:p>
-        </p:txBody>
-      </p:sp>
-      <p:sp>
-        <p:nvSpPr>
-          <p:cNvPr id="3" name="Content Placeholder 2">
-            <a:extLst>
-              <a:ext uri="{FF2B5EF4-FFF2-40B4-BE49-F238E27FC236}">
-                <a16:creationId xmlns:a16="http://schemas.microsoft.com/office/drawing/2014/main" id="{FF9FAB0B-07FF-0D76-0D3F-A95780817835}"/>
-              </a:ext>
-            </a:extLst>
-          </p:cNvPr>
-          <p:cNvSpPr>
-            <a:spLocks noGrp="1"/>
-          </p:cNvSpPr>
-          <p:nvPr>
-            <p:ph idx="1"/>
-          </p:nvPr>
-        </p:nvSpPr>
-        <p:spPr/>
-        <p:txBody>
-          <a:bodyPr>
-            <a:normAutofit fontScale="85000" lnSpcReduction="10000"/>
-          </a:bodyPr>
-          <a:lstStyle/>
-          <a:p>
-            <a:r>
-              <a:rPr lang="en-US" dirty="0"/>
-              <a:t>Are light-weight, by definition.</a:t>
-            </a:r>
-          </a:p>
-          <a:p>
-            <a:r>
-              <a:rPr lang="en-US" dirty="0"/>
-              <a:t>Implement an API Object as a base class.</a:t>
-            </a:r>
-          </a:p>
-          <a:p>
-            <a:r>
-              <a:rPr lang="en-US" dirty="0"/>
-              <a:t>Cannot override API Object or API Base Object methods</a:t>
-            </a:r>
-          </a:p>
-          <a:p>
-            <a:r>
-              <a:rPr lang="en-US" dirty="0"/>
-              <a:t>Override all abstract properties to provide required values for functionality.</a:t>
-            </a:r>
-          </a:p>
-          <a:p>
-            <a:r>
-              <a:rPr lang="en-US" dirty="0"/>
-              <a:t>Optionally, override virtual properties to provide alternate values, as desired.</a:t>
-            </a:r>
-          </a:p>
-          <a:p>
-            <a:r>
-              <a:rPr lang="en-US" dirty="0"/>
-              <a:t>Must specify a private access modifier for the constructor.</a:t>
-            </a:r>
-          </a:p>
-          <a:p>
-            <a:r>
-              <a:rPr lang="en-US" dirty="0"/>
-              <a:t>Cannot have any other constructors.</a:t>
-            </a:r>
-          </a:p>
-          <a:p>
-            <a:r>
-              <a:rPr lang="en-US" dirty="0"/>
-              <a:t>Constructor must accept a single parameter for the Game and pass it to the base API object.</a:t>
-            </a:r>
-          </a:p>
-          <a:p>
-            <a:r>
-              <a:rPr lang="en-US" dirty="0"/>
-              <a:t>Never maintain state.</a:t>
-            </a:r>
-          </a:p>
-          <a:p>
-            <a:endParaRPr lang="en-US" dirty="0"/>
-          </a:p>
-        </p:txBody>
-      </p:sp>
-    </p:spTree>
-    <p:extLst>
-      <p:ext uri="{BB962C8B-B14F-4D97-AF65-F5344CB8AC3E}">
-        <p14:creationId xmlns:p14="http://schemas.microsoft.com/office/powerpoint/2010/main" val="2843370721"/>
       </p:ext>
     </p:extLst>
   </p:cSld>

</xml_diff>

<commit_message>
Updated binding slide to indicated properties used for binding are protected.
</commit_message>
<xml_diff>
--- a/Documents/Object Property Design and Binding.pptx
+++ b/Documents/Object Property Design and Binding.pptx
@@ -4259,7 +4259,15 @@
             <a:pPr lvl="1"/>
             <a:r>
               <a:rPr lang="en-US" dirty="0"/>
-              <a:t>Need to define an abstract property that returns a string value.  This property is considered light-weight for Generic API Objects and Game Pack objects.  The property name should have a suffix of "Key".   It should note, in the XML comments, which property receives the bound object during the bind phase.</a:t>
+              <a:t>Need to define </a:t>
+            </a:r>
+            <a:r>
+              <a:rPr lang="en-US"/>
+              <a:t>an protected abstract </a:t>
+            </a:r>
+            <a:r>
+              <a:rPr lang="en-US" dirty="0"/>
+              <a:t>property that returns a string value.  This property is considered light-weight for Generic API Objects and Game Pack objects.  The property name should have a suffix of "Key".   It should note, in the XML comments, which property receives the bound object during the bind phase.</a:t>
             </a:r>
           </a:p>
           <a:p>
@@ -4683,7 +4691,7 @@
                 </a:solidFill>
                 <a:latin typeface="Cascadia Mono" panose="020B0609020000020004" pitchFamily="49" charset="0"/>
               </a:rPr>
-              <a:t>public</a:t>
+              <a:t>protected</a:t>
             </a:r>
             <a:r>
               <a:rPr lang="en-US" sz="1100" dirty="0">

</xml_diff>

<commit_message>
Added regions for all of the item factory methods and properties. Added proper suffixes for Binding and Tuples. Updated the .pptx Fixed the take off logic for wear/wield. Added support for items to identify more than one slot so that rings can specify left and right hands, making the properties light-weight.
</commit_message>
<xml_diff>
--- a/Documents/Object Property Design and Binding.pptx
+++ b/Documents/Object Property Design and Binding.pptx
@@ -16,8 +16,10 @@
     <p:sldId id="264" r:id="rId10"/>
     <p:sldId id="265" r:id="rId11"/>
     <p:sldId id="266" r:id="rId12"/>
-    <p:sldId id="267" r:id="rId13"/>
-    <p:sldId id="268" r:id="rId14"/>
+    <p:sldId id="269" r:id="rId13"/>
+    <p:sldId id="267" r:id="rId14"/>
+    <p:sldId id="268" r:id="rId15"/>
+    <p:sldId id="270" r:id="rId16"/>
   </p:sldIdLst>
   <p:sldSz cx="12192000" cy="6858000"/>
   <p:notesSz cx="6858000" cy="9144000"/>
@@ -271,7 +273,7 @@
           <a:p>
             <a:fld id="{E7AEA4B1-7707-49BB-9265-EAC029350772}" type="datetimeFigureOut">
               <a:rPr lang="en-US" smtClean="0"/>
-              <a:t>11/13/2024</a:t>
+              <a:t>11/16/2024</a:t>
             </a:fld>
             <a:endParaRPr lang="en-US"/>
           </a:p>
@@ -469,7 +471,7 @@
           <a:p>
             <a:fld id="{E7AEA4B1-7707-49BB-9265-EAC029350772}" type="datetimeFigureOut">
               <a:rPr lang="en-US" smtClean="0"/>
-              <a:t>11/13/2024</a:t>
+              <a:t>11/16/2024</a:t>
             </a:fld>
             <a:endParaRPr lang="en-US"/>
           </a:p>
@@ -677,7 +679,7 @@
           <a:p>
             <a:fld id="{E7AEA4B1-7707-49BB-9265-EAC029350772}" type="datetimeFigureOut">
               <a:rPr lang="en-US" smtClean="0"/>
-              <a:t>11/13/2024</a:t>
+              <a:t>11/16/2024</a:t>
             </a:fld>
             <a:endParaRPr lang="en-US"/>
           </a:p>
@@ -875,7 +877,7 @@
           <a:p>
             <a:fld id="{E7AEA4B1-7707-49BB-9265-EAC029350772}" type="datetimeFigureOut">
               <a:rPr lang="en-US" smtClean="0"/>
-              <a:t>11/13/2024</a:t>
+              <a:t>11/16/2024</a:t>
             </a:fld>
             <a:endParaRPr lang="en-US"/>
           </a:p>
@@ -1150,7 +1152,7 @@
           <a:p>
             <a:fld id="{E7AEA4B1-7707-49BB-9265-EAC029350772}" type="datetimeFigureOut">
               <a:rPr lang="en-US" smtClean="0"/>
-              <a:t>11/13/2024</a:t>
+              <a:t>11/16/2024</a:t>
             </a:fld>
             <a:endParaRPr lang="en-US"/>
           </a:p>
@@ -1415,7 +1417,7 @@
           <a:p>
             <a:fld id="{E7AEA4B1-7707-49BB-9265-EAC029350772}" type="datetimeFigureOut">
               <a:rPr lang="en-US" smtClean="0"/>
-              <a:t>11/13/2024</a:t>
+              <a:t>11/16/2024</a:t>
             </a:fld>
             <a:endParaRPr lang="en-US"/>
           </a:p>
@@ -1827,7 +1829,7 @@
           <a:p>
             <a:fld id="{E7AEA4B1-7707-49BB-9265-EAC029350772}" type="datetimeFigureOut">
               <a:rPr lang="en-US" smtClean="0"/>
-              <a:t>11/13/2024</a:t>
+              <a:t>11/16/2024</a:t>
             </a:fld>
             <a:endParaRPr lang="en-US"/>
           </a:p>
@@ -1968,7 +1970,7 @@
           <a:p>
             <a:fld id="{E7AEA4B1-7707-49BB-9265-EAC029350772}" type="datetimeFigureOut">
               <a:rPr lang="en-US" smtClean="0"/>
-              <a:t>11/13/2024</a:t>
+              <a:t>11/16/2024</a:t>
             </a:fld>
             <a:endParaRPr lang="en-US"/>
           </a:p>
@@ -2081,7 +2083,7 @@
           <a:p>
             <a:fld id="{E7AEA4B1-7707-49BB-9265-EAC029350772}" type="datetimeFigureOut">
               <a:rPr lang="en-US" smtClean="0"/>
-              <a:t>11/13/2024</a:t>
+              <a:t>11/16/2024</a:t>
             </a:fld>
             <a:endParaRPr lang="en-US"/>
           </a:p>
@@ -2392,7 +2394,7 @@
           <a:p>
             <a:fld id="{E7AEA4B1-7707-49BB-9265-EAC029350772}" type="datetimeFigureOut">
               <a:rPr lang="en-US" smtClean="0"/>
-              <a:t>11/13/2024</a:t>
+              <a:t>11/16/2024</a:t>
             </a:fld>
             <a:endParaRPr lang="en-US"/>
           </a:p>
@@ -2680,7 +2682,7 @@
           <a:p>
             <a:fld id="{E7AEA4B1-7707-49BB-9265-EAC029350772}" type="datetimeFigureOut">
               <a:rPr lang="en-US" smtClean="0"/>
-              <a:t>11/13/2024</a:t>
+              <a:t>11/16/2024</a:t>
             </a:fld>
             <a:endParaRPr lang="en-US"/>
           </a:p>
@@ -2921,7 +2923,7 @@
           <a:p>
             <a:fld id="{E7AEA4B1-7707-49BB-9265-EAC029350772}" type="datetimeFigureOut">
               <a:rPr lang="en-US" smtClean="0"/>
-              <a:t>11/13/2024</a:t>
+              <a:t>11/16/2024</a:t>
             </a:fld>
             <a:endParaRPr lang="en-US"/>
           </a:p>
@@ -4357,7 +4359,7 @@
           <p:cNvPr id="2" name="Title 1">
             <a:extLst>
               <a:ext uri="{FF2B5EF4-FFF2-40B4-BE49-F238E27FC236}">
-                <a16:creationId xmlns:a16="http://schemas.microsoft.com/office/drawing/2014/main" id="{07B8008A-A924-EAFC-BE08-C2E5DD466393}"/>
+                <a16:creationId xmlns:a16="http://schemas.microsoft.com/office/drawing/2014/main" id="{E737CA20-4661-9E6B-799D-D1E05FEC65EC}"/>
               </a:ext>
             </a:extLst>
           </p:cNvPr>
@@ -4375,7 +4377,7 @@
           <a:p>
             <a:r>
               <a:rPr lang="en-US" dirty="0"/>
-              <a:t>Binding Implementation Example</a:t>
+              <a:t>Binding Naming Convention</a:t>
             </a:r>
           </a:p>
         </p:txBody>
@@ -4385,7 +4387,7 @@
           <p:cNvPr id="3" name="Content Placeholder 2">
             <a:extLst>
               <a:ext uri="{FF2B5EF4-FFF2-40B4-BE49-F238E27FC236}">
-                <a16:creationId xmlns:a16="http://schemas.microsoft.com/office/drawing/2014/main" id="{819B183C-CF60-6AB0-8CB3-0E0DF587FA80}"/>
+                <a16:creationId xmlns:a16="http://schemas.microsoft.com/office/drawing/2014/main" id="{2E6DB1DC-99F9-A998-F8E9-3FB138303A85}"/>
               </a:ext>
             </a:extLst>
           </p:cNvPr>
@@ -4399,7 +4401,7 @@
         <p:spPr/>
         <p:txBody>
           <a:bodyPr>
-            <a:normAutofit/>
+            <a:normAutofit fontScale="77500" lnSpcReduction="20000"/>
           </a:bodyPr>
           <a:lstStyle/>
           <a:p>
@@ -4407,40 +4409,8 @@
               <a:buNone/>
             </a:pPr>
             <a:r>
-              <a:rPr lang="en-US" sz="1100" dirty="0">
-                <a:solidFill>
-                  <a:srgbClr val="0000FF"/>
-                </a:solidFill>
-                <a:latin typeface="Cascadia Mono" panose="020B0609020000020004" pitchFamily="49" charset="0"/>
-              </a:rPr>
-              <a:t>public</a:t>
-            </a:r>
-            <a:r>
-              <a:rPr lang="en-US" sz="1100" dirty="0">
-                <a:solidFill>
-                  <a:srgbClr val="000000"/>
-                </a:solidFill>
-                <a:latin typeface="Cascadia Mono" panose="020B0609020000020004" pitchFamily="49" charset="0"/>
-              </a:rPr>
-              <a:t> </a:t>
-            </a:r>
-            <a:r>
-              <a:rPr lang="en-US" sz="1100" dirty="0">
-                <a:solidFill>
-                  <a:srgbClr val="0000FF"/>
-                </a:solidFill>
-                <a:latin typeface="Cascadia Mono" panose="020B0609020000020004" pitchFamily="49" charset="0"/>
-              </a:rPr>
-              <a:t>void</a:t>
-            </a:r>
-            <a:r>
-              <a:rPr lang="en-US" sz="1100" dirty="0">
-                <a:solidFill>
-                  <a:srgbClr val="000000"/>
-                </a:solidFill>
-                <a:latin typeface="Cascadia Mono" panose="020B0609020000020004" pitchFamily="49" charset="0"/>
-              </a:rPr>
-              <a:t> Bind()</a:t>
+              <a:rPr lang="en-US" dirty="0"/>
+              <a:t>Light-weight objects often need to specify light-weight property values that are used during the binding phase to generate actual game values or bind to other objects.</a:t>
             </a:r>
           </a:p>
           <a:p>
@@ -4448,587 +4418,99 @@
               <a:buNone/>
             </a:pPr>
             <a:r>
-              <a:rPr lang="en-US" sz="1100" dirty="0">
-                <a:solidFill>
-                  <a:srgbClr val="000000"/>
-                </a:solidFill>
-                <a:latin typeface="Cascadia Mono" panose="020B0609020000020004" pitchFamily="49" charset="0"/>
-              </a:rPr>
-              <a:t>{</a:t>
-            </a:r>
-          </a:p>
-          <a:p>
-            <a:pPr marL="0" indent="0">
-              <a:buNone/>
+              <a:rPr lang="en-US" dirty="0" err="1"/>
+              <a:t>AngbandOS</a:t>
+            </a:r>
+            <a:r>
+              <a:rPr lang="en-US" dirty="0"/>
+              <a:t> uses a couple naming conventions for the properties that participate in this binding convention.  </a:t>
+            </a:r>
+          </a:p>
+          <a:p>
+            <a:pPr marL="514350" indent="-514350">
+              <a:buAutoNum type="arabicPeriod"/>
             </a:pPr>
             <a:r>
-              <a:rPr lang="en-US" sz="1100" dirty="0">
-                <a:solidFill>
-                  <a:srgbClr val="000000"/>
-                </a:solidFill>
-                <a:latin typeface="Cascadia Mono" panose="020B0609020000020004" pitchFamily="49" charset="0"/>
-              </a:rPr>
-              <a:t>    </a:t>
-            </a:r>
-            <a:r>
-              <a:rPr lang="en-US" sz="1100" dirty="0" err="1">
-                <a:solidFill>
-                  <a:srgbClr val="000000"/>
-                </a:solidFill>
-                <a:latin typeface="Cascadia Mono" panose="020B0609020000020004" pitchFamily="49" charset="0"/>
-              </a:rPr>
-              <a:t>ExecuteOnPlayerScript</a:t>
-            </a:r>
-            <a:r>
-              <a:rPr lang="en-US" sz="1100" dirty="0">
-                <a:solidFill>
-                  <a:srgbClr val="000000"/>
-                </a:solidFill>
-                <a:latin typeface="Cascadia Mono" panose="020B0609020000020004" pitchFamily="49" charset="0"/>
-              </a:rPr>
-              <a:t> = </a:t>
-            </a:r>
-            <a:r>
-              <a:rPr lang="en-US" sz="1100" dirty="0" err="1">
-                <a:solidFill>
-                  <a:srgbClr val="000000"/>
-                </a:solidFill>
-                <a:latin typeface="Cascadia Mono" panose="020B0609020000020004" pitchFamily="49" charset="0"/>
-              </a:rPr>
-              <a:t>Game.SingletonRepository.Get</a:t>
-            </a:r>
-            <a:r>
-              <a:rPr lang="en-US" sz="1100" dirty="0">
-                <a:solidFill>
-                  <a:srgbClr val="000000"/>
-                </a:solidFill>
-                <a:latin typeface="Cascadia Mono" panose="020B0609020000020004" pitchFamily="49" charset="0"/>
-              </a:rPr>
-              <a:t>&lt;</a:t>
-            </a:r>
-            <a:r>
-              <a:rPr lang="en-US" sz="1100" dirty="0" err="1">
-                <a:solidFill>
-                  <a:srgbClr val="2B91AF"/>
-                </a:solidFill>
-                <a:latin typeface="Cascadia Mono" panose="020B0609020000020004" pitchFamily="49" charset="0"/>
-              </a:rPr>
-              <a:t>IScriptMonster</a:t>
-            </a:r>
-            <a:r>
-              <a:rPr lang="en-US" sz="1100" dirty="0">
-                <a:solidFill>
-                  <a:srgbClr val="000000"/>
-                </a:solidFill>
-                <a:latin typeface="Cascadia Mono" panose="020B0609020000020004" pitchFamily="49" charset="0"/>
-              </a:rPr>
-              <a:t>&gt;(</a:t>
-            </a:r>
-            <a:r>
-              <a:rPr lang="en-US" sz="1100" dirty="0" err="1">
-                <a:solidFill>
-                  <a:srgbClr val="000000"/>
-                </a:solidFill>
-                <a:latin typeface="Cascadia Mono" panose="020B0609020000020004" pitchFamily="49" charset="0"/>
-              </a:rPr>
-              <a:t>ExecuteOnPlayerScriptKey</a:t>
-            </a:r>
-            <a:r>
-              <a:rPr lang="en-US" sz="1100" dirty="0">
-                <a:solidFill>
-                  <a:srgbClr val="000000"/>
-                </a:solidFill>
-                <a:latin typeface="Cascadia Mono" panose="020B0609020000020004" pitchFamily="49" charset="0"/>
-              </a:rPr>
-              <a:t>);</a:t>
-            </a:r>
-          </a:p>
-          <a:p>
-            <a:pPr marL="0" indent="0">
-              <a:buNone/>
+              <a:rPr lang="en-US" dirty="0"/>
+              <a:t>Light-weight properties that use a string data-type to specify the key value of another object are given a suffix of "</a:t>
+            </a:r>
+            <a:r>
+              <a:rPr lang="en-US" dirty="0" err="1"/>
+              <a:t>BindingKey</a:t>
+            </a:r>
+            <a:r>
+              <a:rPr lang="en-US" dirty="0"/>
+              <a:t>" or "</a:t>
+            </a:r>
+            <a:r>
+              <a:rPr lang="en-US" dirty="0" err="1"/>
+              <a:t>BindingKeys</a:t>
+            </a:r>
+            <a:r>
+              <a:rPr lang="en-US" dirty="0"/>
+              <a:t>" if it is an array.  (e.g. </a:t>
+            </a:r>
+            <a:r>
+              <a:rPr lang="en-US" dirty="0" err="1"/>
+              <a:t>SymbolBindingKey</a:t>
+            </a:r>
+            <a:r>
+              <a:rPr lang="en-US" dirty="0"/>
+              <a:t> – specifies the key value for as object of the data-type Symbol to bound.</a:t>
+            </a:r>
+          </a:p>
+          <a:p>
+            <a:pPr marL="514350" indent="-514350">
+              <a:buAutoNum type="arabicPeriod"/>
             </a:pPr>
             <a:r>
-              <a:rPr lang="en-US" sz="1100" dirty="0">
-                <a:solidFill>
-                  <a:srgbClr val="000000"/>
-                </a:solidFill>
-                <a:latin typeface="Cascadia Mono" panose="020B0609020000020004" pitchFamily="49" charset="0"/>
-              </a:rPr>
-              <a:t>}</a:t>
-            </a:r>
-          </a:p>
-          <a:p>
-            <a:pPr marL="0" indent="0">
-              <a:buNone/>
+              <a:rPr lang="en-US" dirty="0"/>
+              <a:t>Light-weight properties that are used to generate a Roll are given the suffix of "Expression".  (e.g. </a:t>
+            </a:r>
+            <a:r>
+              <a:rPr lang="en-US" dirty="0" err="1"/>
+              <a:t>RollExpression</a:t>
+            </a:r>
+            <a:r>
+              <a:rPr lang="en-US" dirty="0"/>
+              <a:t>)</a:t>
+            </a:r>
+          </a:p>
+          <a:p>
+            <a:pPr marL="514350" indent="-514350">
+              <a:buAutoNum type="arabicPeriod"/>
             </a:pPr>
             <a:r>
-              <a:rPr lang="en-US" sz="1100" dirty="0">
-                <a:solidFill>
-                  <a:srgbClr val="808080"/>
-                </a:solidFill>
-                <a:latin typeface="Cascadia Mono" panose="020B0609020000020004" pitchFamily="49" charset="0"/>
-              </a:rPr>
-              <a:t>///</a:t>
-            </a:r>
-            <a:r>
-              <a:rPr lang="en-US" sz="1100" dirty="0">
-                <a:solidFill>
-                  <a:srgbClr val="008000"/>
-                </a:solidFill>
-                <a:latin typeface="Cascadia Mono" panose="020B0609020000020004" pitchFamily="49" charset="0"/>
-              </a:rPr>
-              <a:t> </a:t>
-            </a:r>
-            <a:r>
-              <a:rPr lang="en-US" sz="1100" dirty="0">
-                <a:solidFill>
-                  <a:srgbClr val="808080"/>
-                </a:solidFill>
-                <a:latin typeface="Cascadia Mono" panose="020B0609020000020004" pitchFamily="49" charset="0"/>
-              </a:rPr>
-              <a:t>&lt;summary&gt;</a:t>
-            </a:r>
-            <a:endParaRPr lang="en-US" sz="1100" dirty="0">
-              <a:solidFill>
-                <a:srgbClr val="000000"/>
-              </a:solidFill>
-              <a:latin typeface="Cascadia Mono" panose="020B0609020000020004" pitchFamily="49" charset="0"/>
-            </a:endParaRPr>
-          </a:p>
-          <a:p>
-            <a:pPr marL="0" indent="0">
-              <a:buNone/>
-            </a:pPr>
-            <a:r>
-              <a:rPr lang="en-US" sz="1100" dirty="0">
-                <a:solidFill>
-                  <a:srgbClr val="808080"/>
-                </a:solidFill>
-                <a:latin typeface="Cascadia Mono" panose="020B0609020000020004" pitchFamily="49" charset="0"/>
-              </a:rPr>
-              <a:t>///</a:t>
-            </a:r>
-            <a:r>
-              <a:rPr lang="en-US" sz="1100" dirty="0">
-                <a:solidFill>
-                  <a:srgbClr val="008000"/>
-                </a:solidFill>
-                <a:latin typeface="Cascadia Mono" panose="020B0609020000020004" pitchFamily="49" charset="0"/>
-              </a:rPr>
-              <a:t> Returns the key for the script to run when this spell is cast on the player.  This property is used to bind the </a:t>
-            </a:r>
-            <a:r>
-              <a:rPr lang="en-US" sz="1100" dirty="0" err="1">
-                <a:solidFill>
-                  <a:srgbClr val="008000"/>
-                </a:solidFill>
-                <a:latin typeface="Cascadia Mono" panose="020B0609020000020004" pitchFamily="49" charset="0"/>
-              </a:rPr>
-              <a:t>ExecuteOnPlayerScript</a:t>
-            </a:r>
-            <a:r>
-              <a:rPr lang="en-US" sz="1100" dirty="0">
-                <a:solidFill>
-                  <a:srgbClr val="008000"/>
-                </a:solidFill>
-                <a:latin typeface="Cascadia Mono" panose="020B0609020000020004" pitchFamily="49" charset="0"/>
-              </a:rPr>
-              <a:t> property during the bind phase.</a:t>
-            </a:r>
-            <a:endParaRPr lang="en-US" sz="1100" dirty="0">
-              <a:solidFill>
-                <a:srgbClr val="000000"/>
-              </a:solidFill>
-              <a:latin typeface="Cascadia Mono" panose="020B0609020000020004" pitchFamily="49" charset="0"/>
-            </a:endParaRPr>
-          </a:p>
-          <a:p>
-            <a:pPr marL="0" indent="0">
-              <a:buNone/>
-            </a:pPr>
-            <a:r>
-              <a:rPr lang="en-US" sz="1100" dirty="0">
-                <a:solidFill>
-                  <a:srgbClr val="808080"/>
-                </a:solidFill>
-                <a:latin typeface="Cascadia Mono" panose="020B0609020000020004" pitchFamily="49" charset="0"/>
-              </a:rPr>
-              <a:t>///</a:t>
-            </a:r>
-            <a:r>
-              <a:rPr lang="en-US" sz="1100" dirty="0">
-                <a:solidFill>
-                  <a:srgbClr val="008000"/>
-                </a:solidFill>
-                <a:latin typeface="Cascadia Mono" panose="020B0609020000020004" pitchFamily="49" charset="0"/>
-              </a:rPr>
-              <a:t> </a:t>
-            </a:r>
-            <a:r>
-              <a:rPr lang="en-US" sz="1100" dirty="0">
-                <a:solidFill>
-                  <a:srgbClr val="808080"/>
-                </a:solidFill>
-                <a:latin typeface="Cascadia Mono" panose="020B0609020000020004" pitchFamily="49" charset="0"/>
-              </a:rPr>
-              <a:t>&lt;/summary&gt;</a:t>
-            </a:r>
-            <a:endParaRPr lang="en-US" sz="1100" dirty="0">
-              <a:solidFill>
-                <a:srgbClr val="000000"/>
-              </a:solidFill>
-              <a:latin typeface="Cascadia Mono" panose="020B0609020000020004" pitchFamily="49" charset="0"/>
-            </a:endParaRPr>
-          </a:p>
-          <a:p>
-            <a:pPr marL="0" indent="0">
-              <a:buNone/>
-            </a:pPr>
-            <a:r>
-              <a:rPr lang="en-US" sz="1100" dirty="0">
-                <a:solidFill>
-                  <a:srgbClr val="0000FF"/>
-                </a:solidFill>
-                <a:latin typeface="Cascadia Mono" panose="020B0609020000020004" pitchFamily="49" charset="0"/>
-              </a:rPr>
-              <a:t>protected</a:t>
-            </a:r>
-            <a:r>
-              <a:rPr lang="en-US" sz="1100" dirty="0">
-                <a:solidFill>
-                  <a:srgbClr val="000000"/>
-                </a:solidFill>
-                <a:latin typeface="Cascadia Mono" panose="020B0609020000020004" pitchFamily="49" charset="0"/>
-              </a:rPr>
-              <a:t> </a:t>
-            </a:r>
-            <a:r>
-              <a:rPr lang="en-US" sz="1100" dirty="0">
-                <a:solidFill>
-                  <a:srgbClr val="0000FF"/>
-                </a:solidFill>
-                <a:latin typeface="Cascadia Mono" panose="020B0609020000020004" pitchFamily="49" charset="0"/>
-              </a:rPr>
-              <a:t>abstract</a:t>
-            </a:r>
-            <a:r>
-              <a:rPr lang="en-US" sz="1100" dirty="0">
-                <a:solidFill>
-                  <a:srgbClr val="000000"/>
-                </a:solidFill>
-                <a:latin typeface="Cascadia Mono" panose="020B0609020000020004" pitchFamily="49" charset="0"/>
-              </a:rPr>
-              <a:t> </a:t>
-            </a:r>
-            <a:r>
-              <a:rPr lang="en-US" sz="1100" dirty="0">
-                <a:solidFill>
-                  <a:srgbClr val="0000FF"/>
-                </a:solidFill>
-                <a:latin typeface="Cascadia Mono" panose="020B0609020000020004" pitchFamily="49" charset="0"/>
-              </a:rPr>
-              <a:t>string</a:t>
-            </a:r>
-            <a:r>
-              <a:rPr lang="en-US" sz="1100" dirty="0">
-                <a:solidFill>
-                  <a:srgbClr val="000000"/>
-                </a:solidFill>
-                <a:latin typeface="Cascadia Mono" panose="020B0609020000020004" pitchFamily="49" charset="0"/>
-              </a:rPr>
-              <a:t> </a:t>
-            </a:r>
-            <a:r>
-              <a:rPr lang="en-US" sz="1100" dirty="0" err="1">
-                <a:solidFill>
-                  <a:srgbClr val="000000"/>
-                </a:solidFill>
-                <a:latin typeface="Cascadia Mono" panose="020B0609020000020004" pitchFamily="49" charset="0"/>
-              </a:rPr>
-              <a:t>ExecuteOnPlayerScriptKey</a:t>
-            </a:r>
-            <a:r>
-              <a:rPr lang="en-US" sz="1100" dirty="0">
-                <a:solidFill>
-                  <a:srgbClr val="000000"/>
-                </a:solidFill>
-                <a:latin typeface="Cascadia Mono" panose="020B0609020000020004" pitchFamily="49" charset="0"/>
-              </a:rPr>
-              <a:t> { </a:t>
-            </a:r>
-            <a:r>
-              <a:rPr lang="en-US" sz="1100" dirty="0">
-                <a:solidFill>
-                  <a:srgbClr val="0000FF"/>
-                </a:solidFill>
-                <a:latin typeface="Cascadia Mono" panose="020B0609020000020004" pitchFamily="49" charset="0"/>
-              </a:rPr>
-              <a:t>get</a:t>
-            </a:r>
-            <a:r>
-              <a:rPr lang="en-US" sz="1100" dirty="0">
-                <a:solidFill>
-                  <a:srgbClr val="000000"/>
-                </a:solidFill>
-                <a:latin typeface="Cascadia Mono" panose="020B0609020000020004" pitchFamily="49" charset="0"/>
-              </a:rPr>
-              <a:t>; }</a:t>
-            </a:r>
-          </a:p>
-          <a:p>
-            <a:pPr marL="0" indent="0">
-              <a:buNone/>
-            </a:pPr>
-            <a:endParaRPr lang="en-US" sz="1100" dirty="0">
-              <a:solidFill>
-                <a:srgbClr val="000000"/>
-              </a:solidFill>
-              <a:latin typeface="Cascadia Mono" panose="020B0609020000020004" pitchFamily="49" charset="0"/>
-            </a:endParaRPr>
-          </a:p>
-          <a:p>
-            <a:pPr marL="0" indent="0">
-              <a:buNone/>
-            </a:pPr>
-            <a:r>
-              <a:rPr lang="en-US" sz="1100" dirty="0">
-                <a:solidFill>
-                  <a:srgbClr val="808080"/>
-                </a:solidFill>
-                <a:latin typeface="Cascadia Mono" panose="020B0609020000020004" pitchFamily="49" charset="0"/>
-              </a:rPr>
-              <a:t>///</a:t>
-            </a:r>
-            <a:r>
-              <a:rPr lang="en-US" sz="1100" dirty="0">
-                <a:solidFill>
-                  <a:srgbClr val="008000"/>
-                </a:solidFill>
-                <a:latin typeface="Cascadia Mono" panose="020B0609020000020004" pitchFamily="49" charset="0"/>
-              </a:rPr>
-              <a:t> </a:t>
-            </a:r>
-            <a:r>
-              <a:rPr lang="en-US" sz="1100" dirty="0">
-                <a:solidFill>
-                  <a:srgbClr val="808080"/>
-                </a:solidFill>
-                <a:latin typeface="Cascadia Mono" panose="020B0609020000020004" pitchFamily="49" charset="0"/>
-              </a:rPr>
-              <a:t>&lt;summary&gt;</a:t>
-            </a:r>
-            <a:endParaRPr lang="en-US" sz="1100" dirty="0">
-              <a:solidFill>
-                <a:srgbClr val="000000"/>
-              </a:solidFill>
-              <a:latin typeface="Cascadia Mono" panose="020B0609020000020004" pitchFamily="49" charset="0"/>
-            </a:endParaRPr>
-          </a:p>
-          <a:p>
-            <a:pPr marL="0" indent="0">
-              <a:buNone/>
-            </a:pPr>
-            <a:r>
-              <a:rPr lang="en-US" sz="1100" dirty="0">
-                <a:solidFill>
-                  <a:srgbClr val="808080"/>
-                </a:solidFill>
-                <a:latin typeface="Cascadia Mono" panose="020B0609020000020004" pitchFamily="49" charset="0"/>
-              </a:rPr>
-              <a:t>///</a:t>
-            </a:r>
-            <a:r>
-              <a:rPr lang="en-US" sz="1100" dirty="0">
-                <a:solidFill>
-                  <a:srgbClr val="008000"/>
-                </a:solidFill>
-                <a:latin typeface="Cascadia Mono" panose="020B0609020000020004" pitchFamily="49" charset="0"/>
-              </a:rPr>
-              <a:t> Returns the script to run when this spell is cast on the player.  This property is bound using the </a:t>
-            </a:r>
-            <a:r>
-              <a:rPr lang="en-US" sz="1100" dirty="0" err="1">
-                <a:solidFill>
-                  <a:srgbClr val="008000"/>
-                </a:solidFill>
-                <a:latin typeface="Cascadia Mono" panose="020B0609020000020004" pitchFamily="49" charset="0"/>
-              </a:rPr>
-              <a:t>ExecuteOnPlayerScriptKey</a:t>
-            </a:r>
-            <a:r>
-              <a:rPr lang="en-US" sz="1100" dirty="0">
-                <a:solidFill>
-                  <a:srgbClr val="008000"/>
-                </a:solidFill>
-                <a:latin typeface="Cascadia Mono" panose="020B0609020000020004" pitchFamily="49" charset="0"/>
-              </a:rPr>
-              <a:t> property during the bind phase.</a:t>
-            </a:r>
-            <a:endParaRPr lang="en-US" sz="1100" dirty="0">
-              <a:solidFill>
-                <a:srgbClr val="000000"/>
-              </a:solidFill>
-              <a:latin typeface="Cascadia Mono" panose="020B0609020000020004" pitchFamily="49" charset="0"/>
-            </a:endParaRPr>
-          </a:p>
-          <a:p>
-            <a:pPr marL="0" indent="0">
-              <a:buNone/>
-            </a:pPr>
-            <a:r>
-              <a:rPr lang="en-US" sz="1100" dirty="0">
-                <a:solidFill>
-                  <a:srgbClr val="808080"/>
-                </a:solidFill>
-                <a:latin typeface="Cascadia Mono" panose="020B0609020000020004" pitchFamily="49" charset="0"/>
-              </a:rPr>
-              <a:t>///</a:t>
-            </a:r>
-            <a:r>
-              <a:rPr lang="en-US" sz="1100" dirty="0">
-                <a:solidFill>
-                  <a:srgbClr val="008000"/>
-                </a:solidFill>
-                <a:latin typeface="Cascadia Mono" panose="020B0609020000020004" pitchFamily="49" charset="0"/>
-              </a:rPr>
-              <a:t> </a:t>
-            </a:r>
-            <a:r>
-              <a:rPr lang="en-US" sz="1100" dirty="0">
-                <a:solidFill>
-                  <a:srgbClr val="808080"/>
-                </a:solidFill>
-                <a:latin typeface="Cascadia Mono" panose="020B0609020000020004" pitchFamily="49" charset="0"/>
-              </a:rPr>
-              <a:t>&lt;/summary&gt;</a:t>
-            </a:r>
-            <a:endParaRPr lang="en-US" sz="1100" dirty="0">
-              <a:solidFill>
-                <a:srgbClr val="000000"/>
-              </a:solidFill>
-              <a:latin typeface="Cascadia Mono" panose="020B0609020000020004" pitchFamily="49" charset="0"/>
-            </a:endParaRPr>
-          </a:p>
-          <a:p>
-            <a:pPr marL="0" indent="0">
-              <a:buNone/>
-            </a:pPr>
-            <a:r>
-              <a:rPr lang="en-US" sz="1100" dirty="0">
-                <a:solidFill>
-                  <a:srgbClr val="0000FF"/>
-                </a:solidFill>
-                <a:latin typeface="Cascadia Mono" panose="020B0609020000020004" pitchFamily="49" charset="0"/>
-              </a:rPr>
-              <a:t>public</a:t>
-            </a:r>
-            <a:r>
-              <a:rPr lang="en-US" sz="1100" dirty="0">
-                <a:solidFill>
-                  <a:srgbClr val="000000"/>
-                </a:solidFill>
-                <a:latin typeface="Cascadia Mono" panose="020B0609020000020004" pitchFamily="49" charset="0"/>
-              </a:rPr>
-              <a:t> </a:t>
-            </a:r>
-            <a:r>
-              <a:rPr lang="en-US" sz="800" dirty="0" err="1">
-                <a:solidFill>
-                  <a:srgbClr val="2B91AF"/>
-                </a:solidFill>
-                <a:latin typeface="Cascadia Mono" panose="020B0609020000020004" pitchFamily="49" charset="0"/>
-              </a:rPr>
-              <a:t>IScriptMonster</a:t>
-            </a:r>
-            <a:r>
-              <a:rPr lang="en-US" sz="800" dirty="0">
-                <a:solidFill>
-                  <a:srgbClr val="000000"/>
-                </a:solidFill>
-                <a:latin typeface="Cascadia Mono" panose="020B0609020000020004" pitchFamily="49" charset="0"/>
-              </a:rPr>
-              <a:t> </a:t>
-            </a:r>
-            <a:r>
-              <a:rPr lang="en-US" sz="800" dirty="0" err="1">
-                <a:solidFill>
-                  <a:srgbClr val="000000"/>
-                </a:solidFill>
-                <a:latin typeface="Cascadia Mono" panose="020B0609020000020004" pitchFamily="49" charset="0"/>
-              </a:rPr>
-              <a:t>ExecuteOnPlayerScript</a:t>
-            </a:r>
-            <a:r>
-              <a:rPr lang="en-US" sz="800" dirty="0">
-                <a:solidFill>
-                  <a:srgbClr val="000000"/>
-                </a:solidFill>
-                <a:latin typeface="Cascadia Mono" panose="020B0609020000020004" pitchFamily="49" charset="0"/>
-              </a:rPr>
-              <a:t> { </a:t>
-            </a:r>
-            <a:r>
-              <a:rPr lang="en-US" sz="800" dirty="0">
-                <a:solidFill>
-                  <a:srgbClr val="0000FF"/>
-                </a:solidFill>
-                <a:latin typeface="Cascadia Mono" panose="020B0609020000020004" pitchFamily="49" charset="0"/>
-              </a:rPr>
-              <a:t>get</a:t>
-            </a:r>
-            <a:r>
-              <a:rPr lang="en-US" sz="800" dirty="0">
-                <a:solidFill>
-                  <a:srgbClr val="000000"/>
-                </a:solidFill>
-                <a:latin typeface="Cascadia Mono" panose="020B0609020000020004" pitchFamily="49" charset="0"/>
-              </a:rPr>
-              <a:t>; </a:t>
-            </a:r>
-            <a:r>
-              <a:rPr lang="en-US" sz="800" dirty="0">
-                <a:solidFill>
-                  <a:srgbClr val="0000FF"/>
-                </a:solidFill>
-                <a:latin typeface="Cascadia Mono" panose="020B0609020000020004" pitchFamily="49" charset="0"/>
-              </a:rPr>
-              <a:t>private</a:t>
-            </a:r>
-            <a:r>
-              <a:rPr lang="en-US" sz="800" dirty="0">
-                <a:solidFill>
-                  <a:srgbClr val="000000"/>
-                </a:solidFill>
-                <a:latin typeface="Cascadia Mono" panose="020B0609020000020004" pitchFamily="49" charset="0"/>
-              </a:rPr>
-              <a:t> </a:t>
-            </a:r>
-            <a:r>
-              <a:rPr lang="en-US" sz="800" dirty="0">
-                <a:solidFill>
-                  <a:srgbClr val="0000FF"/>
-                </a:solidFill>
-                <a:latin typeface="Cascadia Mono" panose="020B0609020000020004" pitchFamily="49" charset="0"/>
-              </a:rPr>
-              <a:t>set</a:t>
-            </a:r>
-            <a:r>
-              <a:rPr lang="en-US" sz="800" dirty="0">
-                <a:solidFill>
-                  <a:srgbClr val="000000"/>
-                </a:solidFill>
-                <a:latin typeface="Cascadia Mono" panose="020B0609020000020004" pitchFamily="49" charset="0"/>
-              </a:rPr>
-              <a:t>; }</a:t>
-            </a:r>
-            <a:endParaRPr lang="en-US" sz="800" dirty="0"/>
+              <a:rPr lang="en-US" dirty="0"/>
+              <a:t>API Object properties that are tuples will be given a suffix of "Tuple" or plural "Tuples" if it is an array.  If the tuple has elements that need to be bound, like expressions or other API Objects, a light-weight tuple property will be created and be given a suffix of "</a:t>
+            </a:r>
+            <a:r>
+              <a:rPr lang="en-US" dirty="0" err="1"/>
+              <a:t>BindingTuple</a:t>
+            </a:r>
+            <a:r>
+              <a:rPr lang="en-US" dirty="0"/>
+              <a:t>" or "</a:t>
+            </a:r>
+            <a:r>
+              <a:rPr lang="en-US" dirty="0" err="1"/>
+              <a:t>BindingTuples</a:t>
+            </a:r>
+            <a:r>
+              <a:rPr lang="en-US"/>
+              <a:t>", </a:t>
+            </a:r>
+            <a:r>
+              <a:rPr lang="en-US" dirty="0"/>
+              <a:t>if it is an array.</a:t>
+            </a:r>
           </a:p>
         </p:txBody>
       </p:sp>
     </p:spTree>
     <p:extLst>
       <p:ext uri="{BB962C8B-B14F-4D97-AF65-F5344CB8AC3E}">
-        <p14:creationId xmlns:p14="http://schemas.microsoft.com/office/powerpoint/2010/main" val="1074209003"/>
+        <p14:creationId xmlns:p14="http://schemas.microsoft.com/office/powerpoint/2010/main" val="2122439577"/>
       </p:ext>
     </p:extLst>
   </p:cSld>
@@ -5060,6 +4542,709 @@
           <p:cNvPr id="2" name="Title 1">
             <a:extLst>
               <a:ext uri="{FF2B5EF4-FFF2-40B4-BE49-F238E27FC236}">
+                <a16:creationId xmlns:a16="http://schemas.microsoft.com/office/drawing/2014/main" id="{07B8008A-A924-EAFC-BE08-C2E5DD466393}"/>
+              </a:ext>
+            </a:extLst>
+          </p:cNvPr>
+          <p:cNvSpPr>
+            <a:spLocks noGrp="1"/>
+          </p:cNvSpPr>
+          <p:nvPr>
+            <p:ph type="title"/>
+          </p:nvPr>
+        </p:nvSpPr>
+        <p:spPr/>
+        <p:txBody>
+          <a:bodyPr/>
+          <a:lstStyle/>
+          <a:p>
+            <a:r>
+              <a:rPr lang="en-US" dirty="0"/>
+              <a:t>Binding Implementation Example</a:t>
+            </a:r>
+          </a:p>
+        </p:txBody>
+      </p:sp>
+      <p:sp>
+        <p:nvSpPr>
+          <p:cNvPr id="3" name="Content Placeholder 2">
+            <a:extLst>
+              <a:ext uri="{FF2B5EF4-FFF2-40B4-BE49-F238E27FC236}">
+                <a16:creationId xmlns:a16="http://schemas.microsoft.com/office/drawing/2014/main" id="{819B183C-CF60-6AB0-8CB3-0E0DF587FA80}"/>
+              </a:ext>
+            </a:extLst>
+          </p:cNvPr>
+          <p:cNvSpPr>
+            <a:spLocks noGrp="1"/>
+          </p:cNvSpPr>
+          <p:nvPr>
+            <p:ph idx="1"/>
+          </p:nvPr>
+        </p:nvSpPr>
+        <p:spPr/>
+        <p:txBody>
+          <a:bodyPr>
+            <a:normAutofit/>
+          </a:bodyPr>
+          <a:lstStyle/>
+          <a:p>
+            <a:pPr marL="0" indent="0">
+              <a:buNone/>
+            </a:pPr>
+            <a:r>
+              <a:rPr lang="en-US" sz="1100" dirty="0">
+                <a:solidFill>
+                  <a:srgbClr val="0000FF"/>
+                </a:solidFill>
+                <a:latin typeface="Cascadia Mono" panose="020B0609020000020004" pitchFamily="49" charset="0"/>
+              </a:rPr>
+              <a:t>public</a:t>
+            </a:r>
+            <a:r>
+              <a:rPr lang="en-US" sz="1100" dirty="0">
+                <a:solidFill>
+                  <a:srgbClr val="000000"/>
+                </a:solidFill>
+                <a:latin typeface="Cascadia Mono" panose="020B0609020000020004" pitchFamily="49" charset="0"/>
+              </a:rPr>
+              <a:t> </a:t>
+            </a:r>
+            <a:r>
+              <a:rPr lang="en-US" sz="1100" dirty="0">
+                <a:solidFill>
+                  <a:srgbClr val="0000FF"/>
+                </a:solidFill>
+                <a:latin typeface="Cascadia Mono" panose="020B0609020000020004" pitchFamily="49" charset="0"/>
+              </a:rPr>
+              <a:t>void</a:t>
+            </a:r>
+            <a:r>
+              <a:rPr lang="en-US" sz="1100" dirty="0">
+                <a:solidFill>
+                  <a:srgbClr val="000000"/>
+                </a:solidFill>
+                <a:latin typeface="Cascadia Mono" panose="020B0609020000020004" pitchFamily="49" charset="0"/>
+              </a:rPr>
+              <a:t> Bind()</a:t>
+            </a:r>
+          </a:p>
+          <a:p>
+            <a:pPr marL="0" indent="0">
+              <a:buNone/>
+            </a:pPr>
+            <a:r>
+              <a:rPr lang="en-US" sz="1100" dirty="0">
+                <a:solidFill>
+                  <a:srgbClr val="000000"/>
+                </a:solidFill>
+                <a:latin typeface="Cascadia Mono" panose="020B0609020000020004" pitchFamily="49" charset="0"/>
+              </a:rPr>
+              <a:t>{</a:t>
+            </a:r>
+          </a:p>
+          <a:p>
+            <a:pPr marL="0" indent="0">
+              <a:buNone/>
+            </a:pPr>
+            <a:r>
+              <a:rPr lang="en-US" sz="1100" dirty="0">
+                <a:solidFill>
+                  <a:srgbClr val="000000"/>
+                </a:solidFill>
+                <a:latin typeface="Cascadia Mono" panose="020B0609020000020004" pitchFamily="49" charset="0"/>
+              </a:rPr>
+              <a:t>    </a:t>
+            </a:r>
+            <a:r>
+              <a:rPr lang="en-US" sz="1100" dirty="0" err="1">
+                <a:solidFill>
+                  <a:srgbClr val="000000"/>
+                </a:solidFill>
+                <a:latin typeface="Cascadia Mono" panose="020B0609020000020004" pitchFamily="49" charset="0"/>
+              </a:rPr>
+              <a:t>ExecuteOnPlayerScript</a:t>
+            </a:r>
+            <a:r>
+              <a:rPr lang="en-US" sz="1100" dirty="0">
+                <a:solidFill>
+                  <a:srgbClr val="000000"/>
+                </a:solidFill>
+                <a:latin typeface="Cascadia Mono" panose="020B0609020000020004" pitchFamily="49" charset="0"/>
+              </a:rPr>
+              <a:t> = </a:t>
+            </a:r>
+            <a:r>
+              <a:rPr lang="en-US" sz="1100" dirty="0" err="1">
+                <a:solidFill>
+                  <a:srgbClr val="000000"/>
+                </a:solidFill>
+                <a:latin typeface="Cascadia Mono" panose="020B0609020000020004" pitchFamily="49" charset="0"/>
+              </a:rPr>
+              <a:t>Game.SingletonRepository.Get</a:t>
+            </a:r>
+            <a:r>
+              <a:rPr lang="en-US" sz="1100" dirty="0">
+                <a:solidFill>
+                  <a:srgbClr val="000000"/>
+                </a:solidFill>
+                <a:latin typeface="Cascadia Mono" panose="020B0609020000020004" pitchFamily="49" charset="0"/>
+              </a:rPr>
+              <a:t>&lt;</a:t>
+            </a:r>
+            <a:r>
+              <a:rPr lang="en-US" sz="1100" dirty="0" err="1">
+                <a:solidFill>
+                  <a:srgbClr val="2B91AF"/>
+                </a:solidFill>
+                <a:latin typeface="Cascadia Mono" panose="020B0609020000020004" pitchFamily="49" charset="0"/>
+              </a:rPr>
+              <a:t>IScriptMonster</a:t>
+            </a:r>
+            <a:r>
+              <a:rPr lang="en-US" sz="1100" dirty="0">
+                <a:solidFill>
+                  <a:srgbClr val="000000"/>
+                </a:solidFill>
+                <a:latin typeface="Cascadia Mono" panose="020B0609020000020004" pitchFamily="49" charset="0"/>
+              </a:rPr>
+              <a:t>&gt;(</a:t>
+            </a:r>
+            <a:r>
+              <a:rPr lang="en-US" sz="1100" dirty="0" err="1">
+                <a:solidFill>
+                  <a:srgbClr val="000000"/>
+                </a:solidFill>
+                <a:latin typeface="Cascadia Mono" panose="020B0609020000020004" pitchFamily="49" charset="0"/>
+              </a:rPr>
+              <a:t>ExecuteOnPlayerScriptKey</a:t>
+            </a:r>
+            <a:r>
+              <a:rPr lang="en-US" sz="1100" dirty="0">
+                <a:solidFill>
+                  <a:srgbClr val="000000"/>
+                </a:solidFill>
+                <a:latin typeface="Cascadia Mono" panose="020B0609020000020004" pitchFamily="49" charset="0"/>
+              </a:rPr>
+              <a:t>);</a:t>
+            </a:r>
+          </a:p>
+          <a:p>
+            <a:pPr marL="0" indent="0">
+              <a:buNone/>
+            </a:pPr>
+            <a:r>
+              <a:rPr lang="en-US" sz="1100" dirty="0">
+                <a:solidFill>
+                  <a:srgbClr val="000000"/>
+                </a:solidFill>
+                <a:latin typeface="Cascadia Mono" panose="020B0609020000020004" pitchFamily="49" charset="0"/>
+              </a:rPr>
+              <a:t>}</a:t>
+            </a:r>
+          </a:p>
+          <a:p>
+            <a:pPr marL="0" indent="0">
+              <a:buNone/>
+            </a:pPr>
+            <a:r>
+              <a:rPr lang="en-US" sz="1100" dirty="0">
+                <a:solidFill>
+                  <a:srgbClr val="808080"/>
+                </a:solidFill>
+                <a:latin typeface="Cascadia Mono" panose="020B0609020000020004" pitchFamily="49" charset="0"/>
+              </a:rPr>
+              <a:t>///</a:t>
+            </a:r>
+            <a:r>
+              <a:rPr lang="en-US" sz="1100" dirty="0">
+                <a:solidFill>
+                  <a:srgbClr val="008000"/>
+                </a:solidFill>
+                <a:latin typeface="Cascadia Mono" panose="020B0609020000020004" pitchFamily="49" charset="0"/>
+              </a:rPr>
+              <a:t> </a:t>
+            </a:r>
+            <a:r>
+              <a:rPr lang="en-US" sz="1100" dirty="0">
+                <a:solidFill>
+                  <a:srgbClr val="808080"/>
+                </a:solidFill>
+                <a:latin typeface="Cascadia Mono" panose="020B0609020000020004" pitchFamily="49" charset="0"/>
+              </a:rPr>
+              <a:t>&lt;summary&gt;</a:t>
+            </a:r>
+            <a:endParaRPr lang="en-US" sz="1100" dirty="0">
+              <a:solidFill>
+                <a:srgbClr val="000000"/>
+              </a:solidFill>
+              <a:latin typeface="Cascadia Mono" panose="020B0609020000020004" pitchFamily="49" charset="0"/>
+            </a:endParaRPr>
+          </a:p>
+          <a:p>
+            <a:pPr marL="0" indent="0">
+              <a:buNone/>
+            </a:pPr>
+            <a:r>
+              <a:rPr lang="en-US" sz="1100" dirty="0">
+                <a:solidFill>
+                  <a:srgbClr val="808080"/>
+                </a:solidFill>
+                <a:latin typeface="Cascadia Mono" panose="020B0609020000020004" pitchFamily="49" charset="0"/>
+              </a:rPr>
+              <a:t>///</a:t>
+            </a:r>
+            <a:r>
+              <a:rPr lang="en-US" sz="1100" dirty="0">
+                <a:solidFill>
+                  <a:srgbClr val="008000"/>
+                </a:solidFill>
+                <a:latin typeface="Cascadia Mono" panose="020B0609020000020004" pitchFamily="49" charset="0"/>
+              </a:rPr>
+              <a:t> Returns the key for the script to run when this spell is cast on the player.  This property is used to bind the </a:t>
+            </a:r>
+            <a:r>
+              <a:rPr lang="en-US" sz="1100" dirty="0" err="1">
+                <a:solidFill>
+                  <a:srgbClr val="008000"/>
+                </a:solidFill>
+                <a:latin typeface="Cascadia Mono" panose="020B0609020000020004" pitchFamily="49" charset="0"/>
+              </a:rPr>
+              <a:t>ExecuteOnPlayerScript</a:t>
+            </a:r>
+            <a:r>
+              <a:rPr lang="en-US" sz="1100" dirty="0">
+                <a:solidFill>
+                  <a:srgbClr val="008000"/>
+                </a:solidFill>
+                <a:latin typeface="Cascadia Mono" panose="020B0609020000020004" pitchFamily="49" charset="0"/>
+              </a:rPr>
+              <a:t> property during the bind phase.</a:t>
+            </a:r>
+            <a:endParaRPr lang="en-US" sz="1100" dirty="0">
+              <a:solidFill>
+                <a:srgbClr val="000000"/>
+              </a:solidFill>
+              <a:latin typeface="Cascadia Mono" panose="020B0609020000020004" pitchFamily="49" charset="0"/>
+            </a:endParaRPr>
+          </a:p>
+          <a:p>
+            <a:pPr marL="0" indent="0">
+              <a:buNone/>
+            </a:pPr>
+            <a:r>
+              <a:rPr lang="en-US" sz="1100" dirty="0">
+                <a:solidFill>
+                  <a:srgbClr val="808080"/>
+                </a:solidFill>
+                <a:latin typeface="Cascadia Mono" panose="020B0609020000020004" pitchFamily="49" charset="0"/>
+              </a:rPr>
+              <a:t>///</a:t>
+            </a:r>
+            <a:r>
+              <a:rPr lang="en-US" sz="1100" dirty="0">
+                <a:solidFill>
+                  <a:srgbClr val="008000"/>
+                </a:solidFill>
+                <a:latin typeface="Cascadia Mono" panose="020B0609020000020004" pitchFamily="49" charset="0"/>
+              </a:rPr>
+              <a:t> </a:t>
+            </a:r>
+            <a:r>
+              <a:rPr lang="en-US" sz="1100" dirty="0">
+                <a:solidFill>
+                  <a:srgbClr val="808080"/>
+                </a:solidFill>
+                <a:latin typeface="Cascadia Mono" panose="020B0609020000020004" pitchFamily="49" charset="0"/>
+              </a:rPr>
+              <a:t>&lt;/summary&gt;</a:t>
+            </a:r>
+            <a:endParaRPr lang="en-US" sz="1100" dirty="0">
+              <a:solidFill>
+                <a:srgbClr val="000000"/>
+              </a:solidFill>
+              <a:latin typeface="Cascadia Mono" panose="020B0609020000020004" pitchFamily="49" charset="0"/>
+            </a:endParaRPr>
+          </a:p>
+          <a:p>
+            <a:pPr marL="0" indent="0">
+              <a:buNone/>
+            </a:pPr>
+            <a:r>
+              <a:rPr lang="en-US" sz="1100" dirty="0">
+                <a:solidFill>
+                  <a:srgbClr val="0000FF"/>
+                </a:solidFill>
+                <a:latin typeface="Cascadia Mono" panose="020B0609020000020004" pitchFamily="49" charset="0"/>
+              </a:rPr>
+              <a:t>protected</a:t>
+            </a:r>
+            <a:r>
+              <a:rPr lang="en-US" sz="1100" dirty="0">
+                <a:solidFill>
+                  <a:srgbClr val="000000"/>
+                </a:solidFill>
+                <a:latin typeface="Cascadia Mono" panose="020B0609020000020004" pitchFamily="49" charset="0"/>
+              </a:rPr>
+              <a:t> </a:t>
+            </a:r>
+            <a:r>
+              <a:rPr lang="en-US" sz="1100" dirty="0">
+                <a:solidFill>
+                  <a:srgbClr val="0000FF"/>
+                </a:solidFill>
+                <a:latin typeface="Cascadia Mono" panose="020B0609020000020004" pitchFamily="49" charset="0"/>
+              </a:rPr>
+              <a:t>abstract</a:t>
+            </a:r>
+            <a:r>
+              <a:rPr lang="en-US" sz="1100" dirty="0">
+                <a:solidFill>
+                  <a:srgbClr val="000000"/>
+                </a:solidFill>
+                <a:latin typeface="Cascadia Mono" panose="020B0609020000020004" pitchFamily="49" charset="0"/>
+              </a:rPr>
+              <a:t> </a:t>
+            </a:r>
+            <a:r>
+              <a:rPr lang="en-US" sz="1100" dirty="0">
+                <a:solidFill>
+                  <a:srgbClr val="0000FF"/>
+                </a:solidFill>
+                <a:latin typeface="Cascadia Mono" panose="020B0609020000020004" pitchFamily="49" charset="0"/>
+              </a:rPr>
+              <a:t>string</a:t>
+            </a:r>
+            <a:r>
+              <a:rPr lang="en-US" sz="1100" dirty="0">
+                <a:solidFill>
+                  <a:srgbClr val="000000"/>
+                </a:solidFill>
+                <a:latin typeface="Cascadia Mono" panose="020B0609020000020004" pitchFamily="49" charset="0"/>
+              </a:rPr>
+              <a:t> </a:t>
+            </a:r>
+            <a:r>
+              <a:rPr lang="en-US" sz="1100" dirty="0" err="1">
+                <a:solidFill>
+                  <a:srgbClr val="000000"/>
+                </a:solidFill>
+                <a:latin typeface="Cascadia Mono" panose="020B0609020000020004" pitchFamily="49" charset="0"/>
+              </a:rPr>
+              <a:t>ExecuteOnPlayerScriptKey</a:t>
+            </a:r>
+            <a:r>
+              <a:rPr lang="en-US" sz="1100" dirty="0">
+                <a:solidFill>
+                  <a:srgbClr val="000000"/>
+                </a:solidFill>
+                <a:latin typeface="Cascadia Mono" panose="020B0609020000020004" pitchFamily="49" charset="0"/>
+              </a:rPr>
+              <a:t> { </a:t>
+            </a:r>
+            <a:r>
+              <a:rPr lang="en-US" sz="1100" dirty="0">
+                <a:solidFill>
+                  <a:srgbClr val="0000FF"/>
+                </a:solidFill>
+                <a:latin typeface="Cascadia Mono" panose="020B0609020000020004" pitchFamily="49" charset="0"/>
+              </a:rPr>
+              <a:t>get</a:t>
+            </a:r>
+            <a:r>
+              <a:rPr lang="en-US" sz="1100" dirty="0">
+                <a:solidFill>
+                  <a:srgbClr val="000000"/>
+                </a:solidFill>
+                <a:latin typeface="Cascadia Mono" panose="020B0609020000020004" pitchFamily="49" charset="0"/>
+              </a:rPr>
+              <a:t>; }</a:t>
+            </a:r>
+          </a:p>
+          <a:p>
+            <a:pPr marL="0" indent="0">
+              <a:buNone/>
+            </a:pPr>
+            <a:endParaRPr lang="en-US" sz="1100" dirty="0">
+              <a:solidFill>
+                <a:srgbClr val="000000"/>
+              </a:solidFill>
+              <a:latin typeface="Cascadia Mono" panose="020B0609020000020004" pitchFamily="49" charset="0"/>
+            </a:endParaRPr>
+          </a:p>
+          <a:p>
+            <a:pPr marL="0" indent="0">
+              <a:buNone/>
+            </a:pPr>
+            <a:r>
+              <a:rPr lang="en-US" sz="1100" dirty="0">
+                <a:solidFill>
+                  <a:srgbClr val="808080"/>
+                </a:solidFill>
+                <a:latin typeface="Cascadia Mono" panose="020B0609020000020004" pitchFamily="49" charset="0"/>
+              </a:rPr>
+              <a:t>///</a:t>
+            </a:r>
+            <a:r>
+              <a:rPr lang="en-US" sz="1100" dirty="0">
+                <a:solidFill>
+                  <a:srgbClr val="008000"/>
+                </a:solidFill>
+                <a:latin typeface="Cascadia Mono" panose="020B0609020000020004" pitchFamily="49" charset="0"/>
+              </a:rPr>
+              <a:t> </a:t>
+            </a:r>
+            <a:r>
+              <a:rPr lang="en-US" sz="1100" dirty="0">
+                <a:solidFill>
+                  <a:srgbClr val="808080"/>
+                </a:solidFill>
+                <a:latin typeface="Cascadia Mono" panose="020B0609020000020004" pitchFamily="49" charset="0"/>
+              </a:rPr>
+              <a:t>&lt;summary&gt;</a:t>
+            </a:r>
+            <a:endParaRPr lang="en-US" sz="1100" dirty="0">
+              <a:solidFill>
+                <a:srgbClr val="000000"/>
+              </a:solidFill>
+              <a:latin typeface="Cascadia Mono" panose="020B0609020000020004" pitchFamily="49" charset="0"/>
+            </a:endParaRPr>
+          </a:p>
+          <a:p>
+            <a:pPr marL="0" indent="0">
+              <a:buNone/>
+            </a:pPr>
+            <a:r>
+              <a:rPr lang="en-US" sz="1100" dirty="0">
+                <a:solidFill>
+                  <a:srgbClr val="808080"/>
+                </a:solidFill>
+                <a:latin typeface="Cascadia Mono" panose="020B0609020000020004" pitchFamily="49" charset="0"/>
+              </a:rPr>
+              <a:t>///</a:t>
+            </a:r>
+            <a:r>
+              <a:rPr lang="en-US" sz="1100" dirty="0">
+                <a:solidFill>
+                  <a:srgbClr val="008000"/>
+                </a:solidFill>
+                <a:latin typeface="Cascadia Mono" panose="020B0609020000020004" pitchFamily="49" charset="0"/>
+              </a:rPr>
+              <a:t> Returns the script to run when this spell is cast on the player.  This property is bound using the </a:t>
+            </a:r>
+            <a:r>
+              <a:rPr lang="en-US" sz="1100" dirty="0" err="1">
+                <a:solidFill>
+                  <a:srgbClr val="008000"/>
+                </a:solidFill>
+                <a:latin typeface="Cascadia Mono" panose="020B0609020000020004" pitchFamily="49" charset="0"/>
+              </a:rPr>
+              <a:t>ExecuteOnPlayerScriptKey</a:t>
+            </a:r>
+            <a:r>
+              <a:rPr lang="en-US" sz="1100" dirty="0">
+                <a:solidFill>
+                  <a:srgbClr val="008000"/>
+                </a:solidFill>
+                <a:latin typeface="Cascadia Mono" panose="020B0609020000020004" pitchFamily="49" charset="0"/>
+              </a:rPr>
+              <a:t> property during the bind phase.</a:t>
+            </a:r>
+            <a:endParaRPr lang="en-US" sz="1100" dirty="0">
+              <a:solidFill>
+                <a:srgbClr val="000000"/>
+              </a:solidFill>
+              <a:latin typeface="Cascadia Mono" panose="020B0609020000020004" pitchFamily="49" charset="0"/>
+            </a:endParaRPr>
+          </a:p>
+          <a:p>
+            <a:pPr marL="0" indent="0">
+              <a:buNone/>
+            </a:pPr>
+            <a:r>
+              <a:rPr lang="en-US" sz="1100" dirty="0">
+                <a:solidFill>
+                  <a:srgbClr val="808080"/>
+                </a:solidFill>
+                <a:latin typeface="Cascadia Mono" panose="020B0609020000020004" pitchFamily="49" charset="0"/>
+              </a:rPr>
+              <a:t>///</a:t>
+            </a:r>
+            <a:r>
+              <a:rPr lang="en-US" sz="1100" dirty="0">
+                <a:solidFill>
+                  <a:srgbClr val="008000"/>
+                </a:solidFill>
+                <a:latin typeface="Cascadia Mono" panose="020B0609020000020004" pitchFamily="49" charset="0"/>
+              </a:rPr>
+              <a:t> </a:t>
+            </a:r>
+            <a:r>
+              <a:rPr lang="en-US" sz="1100" dirty="0">
+                <a:solidFill>
+                  <a:srgbClr val="808080"/>
+                </a:solidFill>
+                <a:latin typeface="Cascadia Mono" panose="020B0609020000020004" pitchFamily="49" charset="0"/>
+              </a:rPr>
+              <a:t>&lt;/summary&gt;</a:t>
+            </a:r>
+            <a:endParaRPr lang="en-US" sz="1100" dirty="0">
+              <a:solidFill>
+                <a:srgbClr val="000000"/>
+              </a:solidFill>
+              <a:latin typeface="Cascadia Mono" panose="020B0609020000020004" pitchFamily="49" charset="0"/>
+            </a:endParaRPr>
+          </a:p>
+          <a:p>
+            <a:pPr marL="0" indent="0">
+              <a:buNone/>
+            </a:pPr>
+            <a:r>
+              <a:rPr lang="en-US" sz="1100" dirty="0">
+                <a:solidFill>
+                  <a:srgbClr val="0000FF"/>
+                </a:solidFill>
+                <a:latin typeface="Cascadia Mono" panose="020B0609020000020004" pitchFamily="49" charset="0"/>
+              </a:rPr>
+              <a:t>public</a:t>
+            </a:r>
+            <a:r>
+              <a:rPr lang="en-US" sz="1100" dirty="0">
+                <a:solidFill>
+                  <a:srgbClr val="000000"/>
+                </a:solidFill>
+                <a:latin typeface="Cascadia Mono" panose="020B0609020000020004" pitchFamily="49" charset="0"/>
+              </a:rPr>
+              <a:t> </a:t>
+            </a:r>
+            <a:r>
+              <a:rPr lang="en-US" sz="800" dirty="0" err="1">
+                <a:solidFill>
+                  <a:srgbClr val="2B91AF"/>
+                </a:solidFill>
+                <a:latin typeface="Cascadia Mono" panose="020B0609020000020004" pitchFamily="49" charset="0"/>
+              </a:rPr>
+              <a:t>IScriptMonster</a:t>
+            </a:r>
+            <a:r>
+              <a:rPr lang="en-US" sz="800" dirty="0">
+                <a:solidFill>
+                  <a:srgbClr val="000000"/>
+                </a:solidFill>
+                <a:latin typeface="Cascadia Mono" panose="020B0609020000020004" pitchFamily="49" charset="0"/>
+              </a:rPr>
+              <a:t> </a:t>
+            </a:r>
+            <a:r>
+              <a:rPr lang="en-US" sz="800" dirty="0" err="1">
+                <a:solidFill>
+                  <a:srgbClr val="000000"/>
+                </a:solidFill>
+                <a:latin typeface="Cascadia Mono" panose="020B0609020000020004" pitchFamily="49" charset="0"/>
+              </a:rPr>
+              <a:t>ExecuteOnPlayerScript</a:t>
+            </a:r>
+            <a:r>
+              <a:rPr lang="en-US" sz="800" dirty="0">
+                <a:solidFill>
+                  <a:srgbClr val="000000"/>
+                </a:solidFill>
+                <a:latin typeface="Cascadia Mono" panose="020B0609020000020004" pitchFamily="49" charset="0"/>
+              </a:rPr>
+              <a:t> { </a:t>
+            </a:r>
+            <a:r>
+              <a:rPr lang="en-US" sz="800" dirty="0">
+                <a:solidFill>
+                  <a:srgbClr val="0000FF"/>
+                </a:solidFill>
+                <a:latin typeface="Cascadia Mono" panose="020B0609020000020004" pitchFamily="49" charset="0"/>
+              </a:rPr>
+              <a:t>get</a:t>
+            </a:r>
+            <a:r>
+              <a:rPr lang="en-US" sz="800" dirty="0">
+                <a:solidFill>
+                  <a:srgbClr val="000000"/>
+                </a:solidFill>
+                <a:latin typeface="Cascadia Mono" panose="020B0609020000020004" pitchFamily="49" charset="0"/>
+              </a:rPr>
+              <a:t>; </a:t>
+            </a:r>
+            <a:r>
+              <a:rPr lang="en-US" sz="800" dirty="0">
+                <a:solidFill>
+                  <a:srgbClr val="0000FF"/>
+                </a:solidFill>
+                <a:latin typeface="Cascadia Mono" panose="020B0609020000020004" pitchFamily="49" charset="0"/>
+              </a:rPr>
+              <a:t>private</a:t>
+            </a:r>
+            <a:r>
+              <a:rPr lang="en-US" sz="800" dirty="0">
+                <a:solidFill>
+                  <a:srgbClr val="000000"/>
+                </a:solidFill>
+                <a:latin typeface="Cascadia Mono" panose="020B0609020000020004" pitchFamily="49" charset="0"/>
+              </a:rPr>
+              <a:t> </a:t>
+            </a:r>
+            <a:r>
+              <a:rPr lang="en-US" sz="800" dirty="0">
+                <a:solidFill>
+                  <a:srgbClr val="0000FF"/>
+                </a:solidFill>
+                <a:latin typeface="Cascadia Mono" panose="020B0609020000020004" pitchFamily="49" charset="0"/>
+              </a:rPr>
+              <a:t>set</a:t>
+            </a:r>
+            <a:r>
+              <a:rPr lang="en-US" sz="800" dirty="0">
+                <a:solidFill>
+                  <a:srgbClr val="000000"/>
+                </a:solidFill>
+                <a:latin typeface="Cascadia Mono" panose="020B0609020000020004" pitchFamily="49" charset="0"/>
+              </a:rPr>
+              <a:t>; }</a:t>
+            </a:r>
+            <a:endParaRPr lang="en-US" sz="800" dirty="0"/>
+          </a:p>
+        </p:txBody>
+      </p:sp>
+    </p:spTree>
+    <p:extLst>
+      <p:ext uri="{BB962C8B-B14F-4D97-AF65-F5344CB8AC3E}">
+        <p14:creationId xmlns:p14="http://schemas.microsoft.com/office/powerpoint/2010/main" val="1074209003"/>
+      </p:ext>
+    </p:extLst>
+  </p:cSld>
+  <p:clrMapOvr>
+    <a:masterClrMapping/>
+  </p:clrMapOvr>
+</p:sld>
+</file>
+
+<file path=ppt/slides/slide14.xml><?xml version="1.0" encoding="utf-8"?>
+<p:sld xmlns:a="http://schemas.openxmlformats.org/drawingml/2006/main" xmlns:r="http://schemas.openxmlformats.org/officeDocument/2006/relationships" xmlns:p="http://schemas.openxmlformats.org/presentationml/2006/main">
+  <p:cSld>
+    <p:spTree>
+      <p:nvGrpSpPr>
+        <p:cNvPr id="1" name=""/>
+        <p:cNvGrpSpPr/>
+        <p:nvPr/>
+      </p:nvGrpSpPr>
+      <p:grpSpPr>
+        <a:xfrm>
+          <a:off x="0" y="0"/>
+          <a:ext cx="0" cy="0"/>
+          <a:chOff x="0" y="0"/>
+          <a:chExt cx="0" cy="0"/>
+        </a:xfrm>
+      </p:grpSpPr>
+      <p:sp>
+        <p:nvSpPr>
+          <p:cNvPr id="2" name="Title 1">
+            <a:extLst>
+              <a:ext uri="{FF2B5EF4-FFF2-40B4-BE49-F238E27FC236}">
                 <a16:creationId xmlns:a16="http://schemas.microsoft.com/office/drawing/2014/main" id="{D470675A-A7F2-6A4B-DE18-2B7A2079C63E}"/>
               </a:ext>
             </a:extLst>
@@ -5340,6 +5525,113 @@
     <p:extLst>
       <p:ext uri="{BB962C8B-B14F-4D97-AF65-F5344CB8AC3E}">
         <p14:creationId xmlns:p14="http://schemas.microsoft.com/office/powerpoint/2010/main" val="3999199384"/>
+      </p:ext>
+    </p:extLst>
+  </p:cSld>
+  <p:clrMapOvr>
+    <a:masterClrMapping/>
+  </p:clrMapOvr>
+</p:sld>
+</file>
+
+<file path=ppt/slides/slide15.xml><?xml version="1.0" encoding="utf-8"?>
+<p:sld xmlns:a="http://schemas.openxmlformats.org/drawingml/2006/main" xmlns:r="http://schemas.openxmlformats.org/officeDocument/2006/relationships" xmlns:p="http://schemas.openxmlformats.org/presentationml/2006/main">
+  <p:cSld>
+    <p:spTree>
+      <p:nvGrpSpPr>
+        <p:cNvPr id="1" name=""/>
+        <p:cNvGrpSpPr/>
+        <p:nvPr/>
+      </p:nvGrpSpPr>
+      <p:grpSpPr>
+        <a:xfrm>
+          <a:off x="0" y="0"/>
+          <a:ext cx="0" cy="0"/>
+          <a:chOff x="0" y="0"/>
+          <a:chExt cx="0" cy="0"/>
+        </a:xfrm>
+      </p:grpSpPr>
+      <p:sp>
+        <p:nvSpPr>
+          <p:cNvPr id="2" name="Title 1">
+            <a:extLst>
+              <a:ext uri="{FF2B5EF4-FFF2-40B4-BE49-F238E27FC236}">
+                <a16:creationId xmlns:a16="http://schemas.microsoft.com/office/drawing/2014/main" id="{F07C8ED8-F0D2-307B-7D9F-8C13F8211987}"/>
+              </a:ext>
+            </a:extLst>
+          </p:cNvPr>
+          <p:cNvSpPr>
+            <a:spLocks noGrp="1"/>
+          </p:cNvSpPr>
+          <p:nvPr>
+            <p:ph type="title"/>
+          </p:nvPr>
+        </p:nvSpPr>
+        <p:spPr/>
+        <p:txBody>
+          <a:bodyPr/>
+          <a:lstStyle/>
+          <a:p>
+            <a:r>
+              <a:rPr lang="en-US" dirty="0"/>
+              <a:t>Action Hooks</a:t>
+            </a:r>
+          </a:p>
+        </p:txBody>
+      </p:sp>
+      <p:sp>
+        <p:nvSpPr>
+          <p:cNvPr id="3" name="Content Placeholder 2">
+            <a:extLst>
+              <a:ext uri="{FF2B5EF4-FFF2-40B4-BE49-F238E27FC236}">
+                <a16:creationId xmlns:a16="http://schemas.microsoft.com/office/drawing/2014/main" id="{15A92EE3-5302-DFB8-585B-CDDF07C4EF58}"/>
+              </a:ext>
+            </a:extLst>
+          </p:cNvPr>
+          <p:cNvSpPr>
+            <a:spLocks noGrp="1"/>
+          </p:cNvSpPr>
+          <p:nvPr>
+            <p:ph idx="1"/>
+          </p:nvPr>
+        </p:nvSpPr>
+        <p:spPr/>
+        <p:txBody>
+          <a:bodyPr/>
+          <a:lstStyle/>
+          <a:p>
+            <a:pPr marL="0" indent="0">
+              <a:buNone/>
+            </a:pPr>
+            <a:r>
+              <a:rPr lang="en-US" dirty="0" err="1"/>
+              <a:t>AngbandOS</a:t>
+            </a:r>
+            <a:r>
+              <a:rPr lang="en-US" dirty="0"/>
+              <a:t> has predefined integration points where the action that is to be performed can be customized.  Configuring these actions will typically involve selecting another object (e.g. a script) for the appropriate functionality.  These properties are called "Action Hooks".</a:t>
+            </a:r>
+          </a:p>
+          <a:p>
+            <a:pPr marL="0" indent="0">
+              <a:buNone/>
+            </a:pPr>
+            <a:r>
+              <a:rPr lang="en-US" dirty="0"/>
+              <a:t>Properties that provide a value for predefined framework functionality are called </a:t>
+            </a:r>
+            <a:r>
+              <a:rPr lang="en-US"/>
+              <a:t>Behavior Modifiers.</a:t>
+            </a:r>
+            <a:endParaRPr lang="en-US" dirty="0"/>
+          </a:p>
+        </p:txBody>
+      </p:sp>
+    </p:spTree>
+    <p:extLst>
+      <p:ext uri="{BB962C8B-B14F-4D97-AF65-F5344CB8AC3E}">
+        <p14:creationId xmlns:p14="http://schemas.microsoft.com/office/powerpoint/2010/main" val="2624926685"/>
       </p:ext>
     </p:extLst>
   </p:cSld>

</xml_diff>

<commit_message>
Fixed bug with last input received not updated and input received event not triggered.
</commit_message>
<xml_diff>
--- a/Documents/Object Property Design and Binding.pptx
+++ b/Documents/Object Property Design and Binding.pptx
@@ -20,6 +20,7 @@
     <p:sldId id="267" r:id="rId14"/>
     <p:sldId id="268" r:id="rId15"/>
     <p:sldId id="270" r:id="rId16"/>
+    <p:sldId id="271" r:id="rId17"/>
   </p:sldIdLst>
   <p:sldSz cx="12192000" cy="6858000"/>
   <p:notesSz cx="6858000" cy="9144000"/>
@@ -273,7 +274,7 @@
           <a:p>
             <a:fld id="{E7AEA4B1-7707-49BB-9265-EAC029350772}" type="datetimeFigureOut">
               <a:rPr lang="en-US" smtClean="0"/>
-              <a:t>11/16/2024</a:t>
+              <a:t>11/18/2024</a:t>
             </a:fld>
             <a:endParaRPr lang="en-US"/>
           </a:p>
@@ -471,7 +472,7 @@
           <a:p>
             <a:fld id="{E7AEA4B1-7707-49BB-9265-EAC029350772}" type="datetimeFigureOut">
               <a:rPr lang="en-US" smtClean="0"/>
-              <a:t>11/16/2024</a:t>
+              <a:t>11/18/2024</a:t>
             </a:fld>
             <a:endParaRPr lang="en-US"/>
           </a:p>
@@ -679,7 +680,7 @@
           <a:p>
             <a:fld id="{E7AEA4B1-7707-49BB-9265-EAC029350772}" type="datetimeFigureOut">
               <a:rPr lang="en-US" smtClean="0"/>
-              <a:t>11/16/2024</a:t>
+              <a:t>11/18/2024</a:t>
             </a:fld>
             <a:endParaRPr lang="en-US"/>
           </a:p>
@@ -877,7 +878,7 @@
           <a:p>
             <a:fld id="{E7AEA4B1-7707-49BB-9265-EAC029350772}" type="datetimeFigureOut">
               <a:rPr lang="en-US" smtClean="0"/>
-              <a:t>11/16/2024</a:t>
+              <a:t>11/18/2024</a:t>
             </a:fld>
             <a:endParaRPr lang="en-US"/>
           </a:p>
@@ -1152,7 +1153,7 @@
           <a:p>
             <a:fld id="{E7AEA4B1-7707-49BB-9265-EAC029350772}" type="datetimeFigureOut">
               <a:rPr lang="en-US" smtClean="0"/>
-              <a:t>11/16/2024</a:t>
+              <a:t>11/18/2024</a:t>
             </a:fld>
             <a:endParaRPr lang="en-US"/>
           </a:p>
@@ -1417,7 +1418,7 @@
           <a:p>
             <a:fld id="{E7AEA4B1-7707-49BB-9265-EAC029350772}" type="datetimeFigureOut">
               <a:rPr lang="en-US" smtClean="0"/>
-              <a:t>11/16/2024</a:t>
+              <a:t>11/18/2024</a:t>
             </a:fld>
             <a:endParaRPr lang="en-US"/>
           </a:p>
@@ -1829,7 +1830,7 @@
           <a:p>
             <a:fld id="{E7AEA4B1-7707-49BB-9265-EAC029350772}" type="datetimeFigureOut">
               <a:rPr lang="en-US" smtClean="0"/>
-              <a:t>11/16/2024</a:t>
+              <a:t>11/18/2024</a:t>
             </a:fld>
             <a:endParaRPr lang="en-US"/>
           </a:p>
@@ -1970,7 +1971,7 @@
           <a:p>
             <a:fld id="{E7AEA4B1-7707-49BB-9265-EAC029350772}" type="datetimeFigureOut">
               <a:rPr lang="en-US" smtClean="0"/>
-              <a:t>11/16/2024</a:t>
+              <a:t>11/18/2024</a:t>
             </a:fld>
             <a:endParaRPr lang="en-US"/>
           </a:p>
@@ -2083,7 +2084,7 @@
           <a:p>
             <a:fld id="{E7AEA4B1-7707-49BB-9265-EAC029350772}" type="datetimeFigureOut">
               <a:rPr lang="en-US" smtClean="0"/>
-              <a:t>11/16/2024</a:t>
+              <a:t>11/18/2024</a:t>
             </a:fld>
             <a:endParaRPr lang="en-US"/>
           </a:p>
@@ -2394,7 +2395,7 @@
           <a:p>
             <a:fld id="{E7AEA4B1-7707-49BB-9265-EAC029350772}" type="datetimeFigureOut">
               <a:rPr lang="en-US" smtClean="0"/>
-              <a:t>11/16/2024</a:t>
+              <a:t>11/18/2024</a:t>
             </a:fld>
             <a:endParaRPr lang="en-US"/>
           </a:p>
@@ -2682,7 +2683,7 @@
           <a:p>
             <a:fld id="{E7AEA4B1-7707-49BB-9265-EAC029350772}" type="datetimeFigureOut">
               <a:rPr lang="en-US" smtClean="0"/>
-              <a:t>11/16/2024</a:t>
+              <a:t>11/18/2024</a:t>
             </a:fld>
             <a:endParaRPr lang="en-US"/>
           </a:p>
@@ -2923,7 +2924,7 @@
           <a:p>
             <a:fld id="{E7AEA4B1-7707-49BB-9265-EAC029350772}" type="datetimeFigureOut">
               <a:rPr lang="en-US" smtClean="0"/>
-              <a:t>11/16/2024</a:t>
+              <a:t>11/18/2024</a:t>
             </a:fld>
             <a:endParaRPr lang="en-US"/>
           </a:p>
@@ -5632,6 +5633,310 @@
     <p:extLst>
       <p:ext uri="{BB962C8B-B14F-4D97-AF65-F5344CB8AC3E}">
         <p14:creationId xmlns:p14="http://schemas.microsoft.com/office/powerpoint/2010/main" val="2624926685"/>
+      </p:ext>
+    </p:extLst>
+  </p:cSld>
+  <p:clrMapOvr>
+    <a:masterClrMapping/>
+  </p:clrMapOvr>
+</p:sld>
+</file>
+
+<file path=ppt/slides/slide16.xml><?xml version="1.0" encoding="utf-8"?>
+<p:sld xmlns:a="http://schemas.openxmlformats.org/drawingml/2006/main" xmlns:r="http://schemas.openxmlformats.org/officeDocument/2006/relationships" xmlns:p="http://schemas.openxmlformats.org/presentationml/2006/main">
+  <p:cSld>
+    <p:spTree>
+      <p:nvGrpSpPr>
+        <p:cNvPr id="1" name=""/>
+        <p:cNvGrpSpPr/>
+        <p:nvPr/>
+      </p:nvGrpSpPr>
+      <p:grpSpPr>
+        <a:xfrm>
+          <a:off x="0" y="0"/>
+          <a:ext cx="0" cy="0"/>
+          <a:chOff x="0" y="0"/>
+          <a:chExt cx="0" cy="0"/>
+        </a:xfrm>
+      </p:grpSpPr>
+      <p:sp>
+        <p:nvSpPr>
+          <p:cNvPr id="2" name="Title 1">
+            <a:extLst>
+              <a:ext uri="{FF2B5EF4-FFF2-40B4-BE49-F238E27FC236}">
+                <a16:creationId xmlns:a16="http://schemas.microsoft.com/office/drawing/2014/main" id="{A71FC331-05B9-D372-C71C-FA9E25E37DE1}"/>
+              </a:ext>
+            </a:extLst>
+          </p:cNvPr>
+          <p:cNvSpPr>
+            <a:spLocks noGrp="1"/>
+          </p:cNvSpPr>
+          <p:nvPr>
+            <p:ph type="title"/>
+          </p:nvPr>
+        </p:nvSpPr>
+        <p:spPr/>
+        <p:txBody>
+          <a:bodyPr/>
+          <a:lstStyle/>
+          <a:p>
+            <a:r>
+              <a:rPr lang="en-US" dirty="0"/>
+              <a:t>Keystrokes Design</a:t>
+            </a:r>
+          </a:p>
+        </p:txBody>
+      </p:sp>
+      <p:sp>
+        <p:nvSpPr>
+          <p:cNvPr id="4" name="Rectangle 3">
+            <a:extLst>
+              <a:ext uri="{FF2B5EF4-FFF2-40B4-BE49-F238E27FC236}">
+                <a16:creationId xmlns:a16="http://schemas.microsoft.com/office/drawing/2014/main" id="{49482C1B-9828-AD0C-46ED-A9B6982A7B3A}"/>
+              </a:ext>
+            </a:extLst>
+          </p:cNvPr>
+          <p:cNvSpPr/>
+          <p:nvPr/>
+        </p:nvSpPr>
+        <p:spPr>
+          <a:xfrm>
+            <a:off x="4391722" y="5705127"/>
+            <a:ext cx="3222702" cy="628766"/>
+          </a:xfrm>
+          <a:prstGeom prst="rect">
+            <a:avLst/>
+          </a:prstGeom>
+        </p:spPr>
+        <p:style>
+          <a:lnRef idx="2">
+            <a:schemeClr val="accent1">
+              <a:shade val="15000"/>
+            </a:schemeClr>
+          </a:lnRef>
+          <a:fillRef idx="1">
+            <a:schemeClr val="accent1"/>
+          </a:fillRef>
+          <a:effectRef idx="0">
+            <a:schemeClr val="accent1"/>
+          </a:effectRef>
+          <a:fontRef idx="minor">
+            <a:schemeClr val="lt1"/>
+          </a:fontRef>
+        </p:style>
+        <p:txBody>
+          <a:bodyPr rtlCol="0" anchor="ctr"/>
+          <a:lstStyle/>
+          <a:p>
+            <a:pPr algn="ctr"/>
+            <a:r>
+              <a:rPr lang="en-US" dirty="0" err="1"/>
+              <a:t>ConsoleViewPort.WaitForKey</a:t>
+            </a:r>
+            <a:endParaRPr lang="en-US" dirty="0"/>
+          </a:p>
+        </p:txBody>
+      </p:sp>
+      <p:sp>
+        <p:nvSpPr>
+          <p:cNvPr id="5" name="Rectangle 4">
+            <a:extLst>
+              <a:ext uri="{FF2B5EF4-FFF2-40B4-BE49-F238E27FC236}">
+                <a16:creationId xmlns:a16="http://schemas.microsoft.com/office/drawing/2014/main" id="{B864203C-C5B6-11D3-EAA9-4FCEBE0C1BEA}"/>
+              </a:ext>
+            </a:extLst>
+          </p:cNvPr>
+          <p:cNvSpPr/>
+          <p:nvPr/>
+        </p:nvSpPr>
+        <p:spPr>
+          <a:xfrm>
+            <a:off x="4391722" y="4634610"/>
+            <a:ext cx="3222702" cy="628766"/>
+          </a:xfrm>
+          <a:prstGeom prst="rect">
+            <a:avLst/>
+          </a:prstGeom>
+        </p:spPr>
+        <p:style>
+          <a:lnRef idx="2">
+            <a:schemeClr val="accent1">
+              <a:shade val="15000"/>
+            </a:schemeClr>
+          </a:lnRef>
+          <a:fillRef idx="1">
+            <a:schemeClr val="accent1"/>
+          </a:fillRef>
+          <a:effectRef idx="0">
+            <a:schemeClr val="accent1"/>
+          </a:effectRef>
+          <a:fontRef idx="minor">
+            <a:schemeClr val="lt1"/>
+          </a:fontRef>
+        </p:style>
+        <p:txBody>
+          <a:bodyPr rtlCol="0" anchor="ctr"/>
+          <a:lstStyle/>
+          <a:p>
+            <a:pPr algn="ctr"/>
+            <a:r>
+              <a:rPr lang="en-US" dirty="0" err="1"/>
+              <a:t>Game.GetKeypress</a:t>
+            </a:r>
+            <a:endParaRPr lang="en-US" dirty="0"/>
+          </a:p>
+        </p:txBody>
+      </p:sp>
+      <p:sp>
+        <p:nvSpPr>
+          <p:cNvPr id="6" name="Rectangle 5">
+            <a:extLst>
+              <a:ext uri="{FF2B5EF4-FFF2-40B4-BE49-F238E27FC236}">
+                <a16:creationId xmlns:a16="http://schemas.microsoft.com/office/drawing/2014/main" id="{460621F4-F5BD-A58F-35CA-16D61FE9F5AB}"/>
+              </a:ext>
+            </a:extLst>
+          </p:cNvPr>
+          <p:cNvSpPr/>
+          <p:nvPr/>
+        </p:nvSpPr>
+        <p:spPr>
+          <a:xfrm>
+            <a:off x="4391722" y="3660737"/>
+            <a:ext cx="3222702" cy="628766"/>
+          </a:xfrm>
+          <a:prstGeom prst="rect">
+            <a:avLst/>
+          </a:prstGeom>
+        </p:spPr>
+        <p:style>
+          <a:lnRef idx="2">
+            <a:schemeClr val="accent1">
+              <a:shade val="15000"/>
+            </a:schemeClr>
+          </a:lnRef>
+          <a:fillRef idx="1">
+            <a:schemeClr val="accent1"/>
+          </a:fillRef>
+          <a:effectRef idx="0">
+            <a:schemeClr val="accent1"/>
+          </a:effectRef>
+          <a:fontRef idx="minor">
+            <a:schemeClr val="lt1"/>
+          </a:fontRef>
+        </p:style>
+        <p:txBody>
+          <a:bodyPr rtlCol="0" anchor="ctr"/>
+          <a:lstStyle/>
+          <a:p>
+            <a:pPr algn="ctr"/>
+            <a:r>
+              <a:rPr lang="en-US" dirty="0" err="1"/>
+              <a:t>Game.Inkey</a:t>
+            </a:r>
+            <a:endParaRPr lang="en-US" dirty="0"/>
+          </a:p>
+        </p:txBody>
+      </p:sp>
+      <p:sp>
+        <p:nvSpPr>
+          <p:cNvPr id="7" name="Rectangle 6">
+            <a:extLst>
+              <a:ext uri="{FF2B5EF4-FFF2-40B4-BE49-F238E27FC236}">
+                <a16:creationId xmlns:a16="http://schemas.microsoft.com/office/drawing/2014/main" id="{3AA12C68-5FCE-EAD1-32E3-AD8E1FC7F373}"/>
+              </a:ext>
+            </a:extLst>
+          </p:cNvPr>
+          <p:cNvSpPr/>
+          <p:nvPr/>
+        </p:nvSpPr>
+        <p:spPr>
+          <a:xfrm>
+            <a:off x="8131098" y="3660737"/>
+            <a:ext cx="3222702" cy="628766"/>
+          </a:xfrm>
+          <a:prstGeom prst="rect">
+            <a:avLst/>
+          </a:prstGeom>
+        </p:spPr>
+        <p:style>
+          <a:lnRef idx="2">
+            <a:schemeClr val="accent1">
+              <a:shade val="15000"/>
+            </a:schemeClr>
+          </a:lnRef>
+          <a:fillRef idx="1">
+            <a:schemeClr val="accent1"/>
+          </a:fillRef>
+          <a:effectRef idx="0">
+            <a:schemeClr val="accent1"/>
+          </a:effectRef>
+          <a:fontRef idx="minor">
+            <a:schemeClr val="lt1"/>
+          </a:fontRef>
+        </p:style>
+        <p:txBody>
+          <a:bodyPr rtlCol="0" anchor="ctr"/>
+          <a:lstStyle/>
+          <a:p>
+            <a:pPr algn="ctr"/>
+            <a:r>
+              <a:rPr lang="en-US" dirty="0"/>
+              <a:t>_</a:t>
+            </a:r>
+            <a:r>
+              <a:rPr lang="en-US" dirty="0" err="1"/>
+              <a:t>artificialKeyBuffer</a:t>
+            </a:r>
+            <a:endParaRPr lang="en-US" dirty="0"/>
+          </a:p>
+        </p:txBody>
+      </p:sp>
+      <p:cxnSp>
+        <p:nvCxnSpPr>
+          <p:cNvPr id="9" name="Straight Arrow Connector 8">
+            <a:extLst>
+              <a:ext uri="{FF2B5EF4-FFF2-40B4-BE49-F238E27FC236}">
+                <a16:creationId xmlns:a16="http://schemas.microsoft.com/office/drawing/2014/main" id="{710880F4-33C3-8701-1508-274956FEFBC5}"/>
+              </a:ext>
+            </a:extLst>
+          </p:cNvPr>
+          <p:cNvCxnSpPr>
+            <a:stCxn id="7" idx="1"/>
+            <a:endCxn id="6" idx="3"/>
+          </p:cNvCxnSpPr>
+          <p:nvPr/>
+        </p:nvCxnSpPr>
+        <p:spPr>
+          <a:xfrm flipH="1">
+            <a:off x="7614424" y="3975120"/>
+            <a:ext cx="516674" cy="0"/>
+          </a:xfrm>
+          <a:prstGeom prst="straightConnector1">
+            <a:avLst/>
+          </a:prstGeom>
+          <a:ln>
+            <a:tailEnd type="triangle"/>
+          </a:ln>
+        </p:spPr>
+        <p:style>
+          <a:lnRef idx="2">
+            <a:schemeClr val="accent1"/>
+          </a:lnRef>
+          <a:fillRef idx="0">
+            <a:schemeClr val="accent1"/>
+          </a:fillRef>
+          <a:effectRef idx="1">
+            <a:schemeClr val="accent1"/>
+          </a:effectRef>
+          <a:fontRef idx="minor">
+            <a:schemeClr val="tx1"/>
+          </a:fontRef>
+        </p:style>
+      </p:cxnSp>
+    </p:spTree>
+    <p:extLst>
+      <p:ext uri="{BB962C8B-B14F-4D97-AF65-F5344CB8AC3E}">
+        <p14:creationId xmlns:p14="http://schemas.microsoft.com/office/powerpoint/2010/main" val="1595102834"/>
       </p:ext>
     </p:extLst>
   </p:cSld>

</xml_diff>

<commit_message>
Updated Keystroke and ItemCharacteristics slides.
</commit_message>
<xml_diff>
--- a/Documents/Object Property Design and Binding.pptx
+++ b/Documents/Object Property Design and Binding.pptx
@@ -21,6 +21,7 @@
     <p:sldId id="268" r:id="rId15"/>
     <p:sldId id="270" r:id="rId16"/>
     <p:sldId id="271" r:id="rId17"/>
+    <p:sldId id="272" r:id="rId18"/>
   </p:sldIdLst>
   <p:sldSz cx="12192000" cy="6858000"/>
   <p:notesSz cx="6858000" cy="9144000"/>
@@ -274,7 +275,7 @@
           <a:p>
             <a:fld id="{E7AEA4B1-7707-49BB-9265-EAC029350772}" type="datetimeFigureOut">
               <a:rPr lang="en-US" smtClean="0"/>
-              <a:t>11/18/2024</a:t>
+              <a:t>11/20/2024</a:t>
             </a:fld>
             <a:endParaRPr lang="en-US"/>
           </a:p>
@@ -472,7 +473,7 @@
           <a:p>
             <a:fld id="{E7AEA4B1-7707-49BB-9265-EAC029350772}" type="datetimeFigureOut">
               <a:rPr lang="en-US" smtClean="0"/>
-              <a:t>11/18/2024</a:t>
+              <a:t>11/20/2024</a:t>
             </a:fld>
             <a:endParaRPr lang="en-US"/>
           </a:p>
@@ -680,7 +681,7 @@
           <a:p>
             <a:fld id="{E7AEA4B1-7707-49BB-9265-EAC029350772}" type="datetimeFigureOut">
               <a:rPr lang="en-US" smtClean="0"/>
-              <a:t>11/18/2024</a:t>
+              <a:t>11/20/2024</a:t>
             </a:fld>
             <a:endParaRPr lang="en-US"/>
           </a:p>
@@ -878,7 +879,7 @@
           <a:p>
             <a:fld id="{E7AEA4B1-7707-49BB-9265-EAC029350772}" type="datetimeFigureOut">
               <a:rPr lang="en-US" smtClean="0"/>
-              <a:t>11/18/2024</a:t>
+              <a:t>11/20/2024</a:t>
             </a:fld>
             <a:endParaRPr lang="en-US"/>
           </a:p>
@@ -1153,7 +1154,7 @@
           <a:p>
             <a:fld id="{E7AEA4B1-7707-49BB-9265-EAC029350772}" type="datetimeFigureOut">
               <a:rPr lang="en-US" smtClean="0"/>
-              <a:t>11/18/2024</a:t>
+              <a:t>11/20/2024</a:t>
             </a:fld>
             <a:endParaRPr lang="en-US"/>
           </a:p>
@@ -1418,7 +1419,7 @@
           <a:p>
             <a:fld id="{E7AEA4B1-7707-49BB-9265-EAC029350772}" type="datetimeFigureOut">
               <a:rPr lang="en-US" smtClean="0"/>
-              <a:t>11/18/2024</a:t>
+              <a:t>11/20/2024</a:t>
             </a:fld>
             <a:endParaRPr lang="en-US"/>
           </a:p>
@@ -1830,7 +1831,7 @@
           <a:p>
             <a:fld id="{E7AEA4B1-7707-49BB-9265-EAC029350772}" type="datetimeFigureOut">
               <a:rPr lang="en-US" smtClean="0"/>
-              <a:t>11/18/2024</a:t>
+              <a:t>11/20/2024</a:t>
             </a:fld>
             <a:endParaRPr lang="en-US"/>
           </a:p>
@@ -1971,7 +1972,7 @@
           <a:p>
             <a:fld id="{E7AEA4B1-7707-49BB-9265-EAC029350772}" type="datetimeFigureOut">
               <a:rPr lang="en-US" smtClean="0"/>
-              <a:t>11/18/2024</a:t>
+              <a:t>11/20/2024</a:t>
             </a:fld>
             <a:endParaRPr lang="en-US"/>
           </a:p>
@@ -2084,7 +2085,7 @@
           <a:p>
             <a:fld id="{E7AEA4B1-7707-49BB-9265-EAC029350772}" type="datetimeFigureOut">
               <a:rPr lang="en-US" smtClean="0"/>
-              <a:t>11/18/2024</a:t>
+              <a:t>11/20/2024</a:t>
             </a:fld>
             <a:endParaRPr lang="en-US"/>
           </a:p>
@@ -2395,7 +2396,7 @@
           <a:p>
             <a:fld id="{E7AEA4B1-7707-49BB-9265-EAC029350772}" type="datetimeFigureOut">
               <a:rPr lang="en-US" smtClean="0"/>
-              <a:t>11/18/2024</a:t>
+              <a:t>11/20/2024</a:t>
             </a:fld>
             <a:endParaRPr lang="en-US"/>
           </a:p>
@@ -2683,7 +2684,7 @@
           <a:p>
             <a:fld id="{E7AEA4B1-7707-49BB-9265-EAC029350772}" type="datetimeFigureOut">
               <a:rPr lang="en-US" smtClean="0"/>
-              <a:t>11/18/2024</a:t>
+              <a:t>11/20/2024</a:t>
             </a:fld>
             <a:endParaRPr lang="en-US"/>
           </a:p>
@@ -2924,7 +2925,7 @@
           <a:p>
             <a:fld id="{E7AEA4B1-7707-49BB-9265-EAC029350772}" type="datetimeFigureOut">
               <a:rPr lang="en-US" smtClean="0"/>
-              <a:t>11/18/2024</a:t>
+              <a:t>11/20/2024</a:t>
             </a:fld>
             <a:endParaRPr lang="en-US"/>
           </a:p>
@@ -5682,7 +5683,7 @@
           <a:p>
             <a:r>
               <a:rPr lang="en-US" dirty="0"/>
-              <a:t>Keystrokes Design</a:t>
+              <a:t>Keystroke Driver</a:t>
             </a:r>
           </a:p>
         </p:txBody>
@@ -5701,7 +5702,254 @@
         </p:nvSpPr>
         <p:spPr>
           <a:xfrm>
-            <a:off x="4391722" y="5705127"/>
+            <a:off x="4391721" y="5705127"/>
+            <a:ext cx="4063165" cy="628766"/>
+          </a:xfrm>
+          <a:prstGeom prst="rect">
+            <a:avLst/>
+          </a:prstGeom>
+        </p:spPr>
+        <p:style>
+          <a:lnRef idx="2">
+            <a:schemeClr val="accent1">
+              <a:shade val="15000"/>
+            </a:schemeClr>
+          </a:lnRef>
+          <a:fillRef idx="1">
+            <a:schemeClr val="accent1"/>
+          </a:fillRef>
+          <a:effectRef idx="0">
+            <a:schemeClr val="accent1"/>
+          </a:effectRef>
+          <a:fontRef idx="minor">
+            <a:schemeClr val="lt1"/>
+          </a:fontRef>
+        </p:style>
+        <p:txBody>
+          <a:bodyPr rtlCol="0" anchor="ctr"/>
+          <a:lstStyle/>
+          <a:p>
+            <a:pPr algn="ctr"/>
+            <a:r>
+              <a:rPr lang="en-US" dirty="0" err="1"/>
+              <a:t>ConsoleViewPort.WaitAndEnqueueKey</a:t>
+            </a:r>
+            <a:endParaRPr lang="en-US" dirty="0"/>
+          </a:p>
+        </p:txBody>
+      </p:sp>
+      <p:sp>
+        <p:nvSpPr>
+          <p:cNvPr id="5" name="Rectangle 4">
+            <a:extLst>
+              <a:ext uri="{FF2B5EF4-FFF2-40B4-BE49-F238E27FC236}">
+                <a16:creationId xmlns:a16="http://schemas.microsoft.com/office/drawing/2014/main" id="{B864203C-C5B6-11D3-EAA9-4FCEBE0C1BEA}"/>
+              </a:ext>
+            </a:extLst>
+          </p:cNvPr>
+          <p:cNvSpPr/>
+          <p:nvPr/>
+        </p:nvSpPr>
+        <p:spPr>
+          <a:xfrm>
+            <a:off x="4391722" y="4315369"/>
+            <a:ext cx="4063164" cy="628766"/>
+          </a:xfrm>
+          <a:prstGeom prst="rect">
+            <a:avLst/>
+          </a:prstGeom>
+        </p:spPr>
+        <p:style>
+          <a:lnRef idx="2">
+            <a:schemeClr val="accent1">
+              <a:shade val="15000"/>
+            </a:schemeClr>
+          </a:lnRef>
+          <a:fillRef idx="1">
+            <a:schemeClr val="accent1"/>
+          </a:fillRef>
+          <a:effectRef idx="0">
+            <a:schemeClr val="accent1"/>
+          </a:effectRef>
+          <a:fontRef idx="minor">
+            <a:schemeClr val="lt1"/>
+          </a:fontRef>
+        </p:style>
+        <p:txBody>
+          <a:bodyPr rtlCol="0" anchor="ctr"/>
+          <a:lstStyle/>
+          <a:p>
+            <a:pPr algn="ctr"/>
+            <a:r>
+              <a:rPr lang="en-US" dirty="0" err="1"/>
+              <a:t>Game.GetKeypress</a:t>
+            </a:r>
+            <a:endParaRPr lang="en-US" dirty="0"/>
+          </a:p>
+        </p:txBody>
+      </p:sp>
+      <p:sp>
+        <p:nvSpPr>
+          <p:cNvPr id="6" name="Rectangle 5">
+            <a:extLst>
+              <a:ext uri="{FF2B5EF4-FFF2-40B4-BE49-F238E27FC236}">
+                <a16:creationId xmlns:a16="http://schemas.microsoft.com/office/drawing/2014/main" id="{460621F4-F5BD-A58F-35CA-16D61FE9F5AB}"/>
+              </a:ext>
+            </a:extLst>
+          </p:cNvPr>
+          <p:cNvSpPr/>
+          <p:nvPr/>
+        </p:nvSpPr>
+        <p:spPr>
+          <a:xfrm>
+            <a:off x="4391721" y="2938759"/>
+            <a:ext cx="4063164" cy="628766"/>
+          </a:xfrm>
+          <a:prstGeom prst="rect">
+            <a:avLst/>
+          </a:prstGeom>
+        </p:spPr>
+        <p:style>
+          <a:lnRef idx="2">
+            <a:schemeClr val="accent1">
+              <a:shade val="15000"/>
+            </a:schemeClr>
+          </a:lnRef>
+          <a:fillRef idx="1">
+            <a:schemeClr val="accent1"/>
+          </a:fillRef>
+          <a:effectRef idx="0">
+            <a:schemeClr val="accent1"/>
+          </a:effectRef>
+          <a:fontRef idx="minor">
+            <a:schemeClr val="lt1"/>
+          </a:fontRef>
+        </p:style>
+        <p:txBody>
+          <a:bodyPr rtlCol="0" anchor="ctr"/>
+          <a:lstStyle/>
+          <a:p>
+            <a:pPr algn="ctr"/>
+            <a:r>
+              <a:rPr lang="en-US" dirty="0" err="1"/>
+              <a:t>Game.Inkey</a:t>
+            </a:r>
+            <a:endParaRPr lang="en-US" dirty="0"/>
+          </a:p>
+        </p:txBody>
+      </p:sp>
+      <p:sp>
+        <p:nvSpPr>
+          <p:cNvPr id="7" name="Rectangle 6">
+            <a:extLst>
+              <a:ext uri="{FF2B5EF4-FFF2-40B4-BE49-F238E27FC236}">
+                <a16:creationId xmlns:a16="http://schemas.microsoft.com/office/drawing/2014/main" id="{3AA12C68-5FCE-EAD1-32E3-AD8E1FC7F373}"/>
+              </a:ext>
+            </a:extLst>
+          </p:cNvPr>
+          <p:cNvSpPr/>
+          <p:nvPr/>
+        </p:nvSpPr>
+        <p:spPr>
+          <a:xfrm>
+            <a:off x="9104241" y="2938759"/>
+            <a:ext cx="2249557" cy="628766"/>
+          </a:xfrm>
+          <a:prstGeom prst="rect">
+            <a:avLst/>
+          </a:prstGeom>
+        </p:spPr>
+        <p:style>
+          <a:lnRef idx="2">
+            <a:schemeClr val="accent1">
+              <a:shade val="15000"/>
+            </a:schemeClr>
+          </a:lnRef>
+          <a:fillRef idx="1">
+            <a:schemeClr val="accent1"/>
+          </a:fillRef>
+          <a:effectRef idx="0">
+            <a:schemeClr val="accent1"/>
+          </a:effectRef>
+          <a:fontRef idx="minor">
+            <a:schemeClr val="lt1"/>
+          </a:fontRef>
+        </p:style>
+        <p:txBody>
+          <a:bodyPr rtlCol="0" anchor="ctr"/>
+          <a:lstStyle/>
+          <a:p>
+            <a:pPr algn="ctr"/>
+            <a:r>
+              <a:rPr lang="en-US" dirty="0"/>
+              <a:t>_</a:t>
+            </a:r>
+            <a:r>
+              <a:rPr lang="en-US" dirty="0" err="1"/>
+              <a:t>artificialKeyBuffer</a:t>
+            </a:r>
+            <a:endParaRPr lang="en-US" dirty="0"/>
+          </a:p>
+        </p:txBody>
+      </p:sp>
+      <p:cxnSp>
+        <p:nvCxnSpPr>
+          <p:cNvPr id="9" name="Straight Arrow Connector 8">
+            <a:extLst>
+              <a:ext uri="{FF2B5EF4-FFF2-40B4-BE49-F238E27FC236}">
+                <a16:creationId xmlns:a16="http://schemas.microsoft.com/office/drawing/2014/main" id="{710880F4-33C3-8701-1508-274956FEFBC5}"/>
+              </a:ext>
+            </a:extLst>
+          </p:cNvPr>
+          <p:cNvCxnSpPr>
+            <a:cxnSpLocks/>
+            <a:stCxn id="7" idx="1"/>
+            <a:endCxn id="6" idx="3"/>
+          </p:cNvCxnSpPr>
+          <p:nvPr/>
+        </p:nvCxnSpPr>
+        <p:spPr>
+          <a:xfrm flipH="1">
+            <a:off x="8454885" y="3253142"/>
+            <a:ext cx="649356" cy="0"/>
+          </a:xfrm>
+          <a:prstGeom prst="straightConnector1">
+            <a:avLst/>
+          </a:prstGeom>
+          <a:ln>
+            <a:tailEnd type="triangle"/>
+          </a:ln>
+        </p:spPr>
+        <p:style>
+          <a:lnRef idx="2">
+            <a:schemeClr val="accent1"/>
+          </a:lnRef>
+          <a:fillRef idx="0">
+            <a:schemeClr val="accent1"/>
+          </a:fillRef>
+          <a:effectRef idx="1">
+            <a:schemeClr val="accent1"/>
+          </a:effectRef>
+          <a:fontRef idx="minor">
+            <a:schemeClr val="tx1"/>
+          </a:fontRef>
+        </p:style>
+      </p:cxnSp>
+      <p:sp>
+        <p:nvSpPr>
+          <p:cNvPr id="3" name="Rectangle 2">
+            <a:extLst>
+              <a:ext uri="{FF2B5EF4-FFF2-40B4-BE49-F238E27FC236}">
+                <a16:creationId xmlns:a16="http://schemas.microsoft.com/office/drawing/2014/main" id="{C8C75885-6259-EF1A-9736-C0F03591017B}"/>
+              </a:ext>
+            </a:extLst>
+          </p:cNvPr>
+          <p:cNvSpPr/>
+          <p:nvPr/>
+        </p:nvSpPr>
+        <p:spPr>
+          <a:xfrm>
+            <a:off x="4811952" y="1640779"/>
             <a:ext cx="3222702" cy="628766"/>
           </a:xfrm>
           <a:prstGeom prst="rect">
@@ -5730,186 +5978,32 @@
           <a:p>
             <a:pPr algn="ctr"/>
             <a:r>
-              <a:rPr lang="en-US" dirty="0" err="1"/>
-              <a:t>ConsoleViewPort.WaitForKey</a:t>
-            </a:r>
-            <a:endParaRPr lang="en-US" dirty="0"/>
-          </a:p>
-        </p:txBody>
-      </p:sp>
-      <p:sp>
-        <p:nvSpPr>
-          <p:cNvPr id="5" name="Rectangle 4">
-            <a:extLst>
-              <a:ext uri="{FF2B5EF4-FFF2-40B4-BE49-F238E27FC236}">
-                <a16:creationId xmlns:a16="http://schemas.microsoft.com/office/drawing/2014/main" id="{B864203C-C5B6-11D3-EAA9-4FCEBE0C1BEA}"/>
-              </a:ext>
-            </a:extLst>
-          </p:cNvPr>
-          <p:cNvSpPr/>
-          <p:nvPr/>
-        </p:nvSpPr>
-        <p:spPr>
-          <a:xfrm>
-            <a:off x="4391722" y="4634610"/>
-            <a:ext cx="3222702" cy="628766"/>
-          </a:xfrm>
-          <a:prstGeom prst="rect">
-            <a:avLst/>
-          </a:prstGeom>
-        </p:spPr>
-        <p:style>
-          <a:lnRef idx="2">
-            <a:schemeClr val="accent1">
-              <a:shade val="15000"/>
-            </a:schemeClr>
-          </a:lnRef>
-          <a:fillRef idx="1">
-            <a:schemeClr val="accent1"/>
-          </a:fillRef>
-          <a:effectRef idx="0">
-            <a:schemeClr val="accent1"/>
-          </a:effectRef>
-          <a:fontRef idx="minor">
-            <a:schemeClr val="lt1"/>
-          </a:fontRef>
-        </p:style>
-        <p:txBody>
-          <a:bodyPr rtlCol="0" anchor="ctr"/>
-          <a:lstStyle/>
-          <a:p>
-            <a:pPr algn="ctr"/>
-            <a:r>
-              <a:rPr lang="en-US" dirty="0" err="1"/>
-              <a:t>Game.GetKeypress</a:t>
-            </a:r>
-            <a:endParaRPr lang="en-US" dirty="0"/>
-          </a:p>
-        </p:txBody>
-      </p:sp>
-      <p:sp>
-        <p:nvSpPr>
-          <p:cNvPr id="6" name="Rectangle 5">
-            <a:extLst>
-              <a:ext uri="{FF2B5EF4-FFF2-40B4-BE49-F238E27FC236}">
-                <a16:creationId xmlns:a16="http://schemas.microsoft.com/office/drawing/2014/main" id="{460621F4-F5BD-A58F-35CA-16D61FE9F5AB}"/>
-              </a:ext>
-            </a:extLst>
-          </p:cNvPr>
-          <p:cNvSpPr/>
-          <p:nvPr/>
-        </p:nvSpPr>
-        <p:spPr>
-          <a:xfrm>
-            <a:off x="4391722" y="3660737"/>
-            <a:ext cx="3222702" cy="628766"/>
-          </a:xfrm>
-          <a:prstGeom prst="rect">
-            <a:avLst/>
-          </a:prstGeom>
-        </p:spPr>
-        <p:style>
-          <a:lnRef idx="2">
-            <a:schemeClr val="accent1">
-              <a:shade val="15000"/>
-            </a:schemeClr>
-          </a:lnRef>
-          <a:fillRef idx="1">
-            <a:schemeClr val="accent1"/>
-          </a:fillRef>
-          <a:effectRef idx="0">
-            <a:schemeClr val="accent1"/>
-          </a:effectRef>
-          <a:fontRef idx="minor">
-            <a:schemeClr val="lt1"/>
-          </a:fontRef>
-        </p:style>
-        <p:txBody>
-          <a:bodyPr rtlCol="0" anchor="ctr"/>
-          <a:lstStyle/>
-          <a:p>
-            <a:pPr algn="ctr"/>
-            <a:r>
-              <a:rPr lang="en-US" dirty="0" err="1"/>
-              <a:t>Game.Inkey</a:t>
-            </a:r>
-            <a:endParaRPr lang="en-US" dirty="0"/>
-          </a:p>
-        </p:txBody>
-      </p:sp>
-      <p:sp>
-        <p:nvSpPr>
-          <p:cNvPr id="7" name="Rectangle 6">
-            <a:extLst>
-              <a:ext uri="{FF2B5EF4-FFF2-40B4-BE49-F238E27FC236}">
-                <a16:creationId xmlns:a16="http://schemas.microsoft.com/office/drawing/2014/main" id="{3AA12C68-5FCE-EAD1-32E3-AD8E1FC7F373}"/>
-              </a:ext>
-            </a:extLst>
-          </p:cNvPr>
-          <p:cNvSpPr/>
-          <p:nvPr/>
-        </p:nvSpPr>
-        <p:spPr>
-          <a:xfrm>
-            <a:off x="8131098" y="3660737"/>
-            <a:ext cx="3222702" cy="628766"/>
-          </a:xfrm>
-          <a:prstGeom prst="rect">
-            <a:avLst/>
-          </a:prstGeom>
-        </p:spPr>
-        <p:style>
-          <a:lnRef idx="2">
-            <a:schemeClr val="accent1">
-              <a:shade val="15000"/>
-            </a:schemeClr>
-          </a:lnRef>
-          <a:fillRef idx="1">
-            <a:schemeClr val="accent1"/>
-          </a:fillRef>
-          <a:effectRef idx="0">
-            <a:schemeClr val="accent1"/>
-          </a:effectRef>
-          <a:fontRef idx="minor">
-            <a:schemeClr val="lt1"/>
-          </a:fontRef>
-        </p:style>
-        <p:txBody>
-          <a:bodyPr rtlCol="0" anchor="ctr"/>
-          <a:lstStyle/>
-          <a:p>
-            <a:pPr algn="ctr"/>
-            <a:r>
               <a:rPr lang="en-US" dirty="0"/>
-              <a:t>_</a:t>
-            </a:r>
-            <a:r>
-              <a:rPr lang="en-US" dirty="0" err="1"/>
-              <a:t>artificialKeyBuffer</a:t>
-            </a:r>
-            <a:endParaRPr lang="en-US" dirty="0"/>
+              <a:t>All Game Input</a:t>
+            </a:r>
           </a:p>
         </p:txBody>
       </p:sp>
       <p:cxnSp>
         <p:nvCxnSpPr>
-          <p:cNvPr id="9" name="Straight Arrow Connector 8">
-            <a:extLst>
-              <a:ext uri="{FF2B5EF4-FFF2-40B4-BE49-F238E27FC236}">
-                <a16:creationId xmlns:a16="http://schemas.microsoft.com/office/drawing/2014/main" id="{710880F4-33C3-8701-1508-274956FEFBC5}"/>
+          <p:cNvPr id="10" name="Straight Arrow Connector 9">
+            <a:extLst>
+              <a:ext uri="{FF2B5EF4-FFF2-40B4-BE49-F238E27FC236}">
+                <a16:creationId xmlns:a16="http://schemas.microsoft.com/office/drawing/2014/main" id="{E93CB2A0-10BF-5D0F-F9DC-42E3626A59B3}"/>
               </a:ext>
             </a:extLst>
           </p:cNvPr>
           <p:cNvCxnSpPr>
-            <a:stCxn id="7" idx="1"/>
-            <a:endCxn id="6" idx="3"/>
+            <a:cxnSpLocks/>
+            <a:stCxn id="6" idx="0"/>
+            <a:endCxn id="3" idx="2"/>
           </p:cNvCxnSpPr>
           <p:nvPr/>
         </p:nvCxnSpPr>
         <p:spPr>
-          <a:xfrm flipH="1">
-            <a:off x="7614424" y="3975120"/>
-            <a:ext cx="516674" cy="0"/>
+          <a:xfrm flipV="1">
+            <a:off x="6423303" y="2269545"/>
+            <a:ext cx="0" cy="669214"/>
           </a:xfrm>
           <a:prstGeom prst="straightConnector1">
             <a:avLst/>
@@ -5933,10 +6027,631 @@
           </a:fontRef>
         </p:style>
       </p:cxnSp>
+      <p:cxnSp>
+        <p:nvCxnSpPr>
+          <p:cNvPr id="12" name="Straight Arrow Connector 11">
+            <a:extLst>
+              <a:ext uri="{FF2B5EF4-FFF2-40B4-BE49-F238E27FC236}">
+                <a16:creationId xmlns:a16="http://schemas.microsoft.com/office/drawing/2014/main" id="{83E33658-4B2F-FE58-1CE9-4DF623B2BD4D}"/>
+              </a:ext>
+            </a:extLst>
+          </p:cNvPr>
+          <p:cNvCxnSpPr>
+            <a:cxnSpLocks/>
+            <a:stCxn id="5" idx="0"/>
+            <a:endCxn id="6" idx="2"/>
+          </p:cNvCxnSpPr>
+          <p:nvPr/>
+        </p:nvCxnSpPr>
+        <p:spPr>
+          <a:xfrm flipH="1" flipV="1">
+            <a:off x="6423303" y="3567525"/>
+            <a:ext cx="1" cy="747844"/>
+          </a:xfrm>
+          <a:prstGeom prst="straightConnector1">
+            <a:avLst/>
+          </a:prstGeom>
+          <a:ln>
+            <a:tailEnd type="triangle"/>
+          </a:ln>
+        </p:spPr>
+        <p:style>
+          <a:lnRef idx="2">
+            <a:schemeClr val="accent1"/>
+          </a:lnRef>
+          <a:fillRef idx="0">
+            <a:schemeClr val="accent1"/>
+          </a:fillRef>
+          <a:effectRef idx="1">
+            <a:schemeClr val="accent1"/>
+          </a:effectRef>
+          <a:fontRef idx="minor">
+            <a:schemeClr val="tx1"/>
+          </a:fontRef>
+        </p:style>
+      </p:cxnSp>
+      <p:cxnSp>
+        <p:nvCxnSpPr>
+          <p:cNvPr id="14" name="Straight Arrow Connector 13">
+            <a:extLst>
+              <a:ext uri="{FF2B5EF4-FFF2-40B4-BE49-F238E27FC236}">
+                <a16:creationId xmlns:a16="http://schemas.microsoft.com/office/drawing/2014/main" id="{7F10C484-75D0-9DE3-A4EC-937A156785FE}"/>
+              </a:ext>
+            </a:extLst>
+          </p:cNvPr>
+          <p:cNvCxnSpPr>
+            <a:cxnSpLocks/>
+            <a:stCxn id="4" idx="0"/>
+            <a:endCxn id="5" idx="2"/>
+          </p:cNvCxnSpPr>
+          <p:nvPr/>
+        </p:nvCxnSpPr>
+        <p:spPr>
+          <a:xfrm flipV="1">
+            <a:off x="6423304" y="4944135"/>
+            <a:ext cx="0" cy="760992"/>
+          </a:xfrm>
+          <a:prstGeom prst="straightConnector1">
+            <a:avLst/>
+          </a:prstGeom>
+          <a:ln>
+            <a:tailEnd type="triangle"/>
+          </a:ln>
+        </p:spPr>
+        <p:style>
+          <a:lnRef idx="2">
+            <a:schemeClr val="accent1"/>
+          </a:lnRef>
+          <a:fillRef idx="0">
+            <a:schemeClr val="accent1"/>
+          </a:fillRef>
+          <a:effectRef idx="1">
+            <a:schemeClr val="accent1"/>
+          </a:effectRef>
+          <a:fontRef idx="minor">
+            <a:schemeClr val="tx1"/>
+          </a:fontRef>
+        </p:style>
+      </p:cxnSp>
+      <p:sp>
+        <p:nvSpPr>
+          <p:cNvPr id="15" name="Rectangle 14">
+            <a:extLst>
+              <a:ext uri="{FF2B5EF4-FFF2-40B4-BE49-F238E27FC236}">
+                <a16:creationId xmlns:a16="http://schemas.microsoft.com/office/drawing/2014/main" id="{AEFA6FAB-8D2F-FB74-3FE3-840F2810A3D2}"/>
+              </a:ext>
+            </a:extLst>
+          </p:cNvPr>
+          <p:cNvSpPr/>
+          <p:nvPr/>
+        </p:nvSpPr>
+        <p:spPr>
+          <a:xfrm>
+            <a:off x="4025590" y="5242734"/>
+            <a:ext cx="6211226" cy="1250139"/>
+          </a:xfrm>
+          <a:prstGeom prst="rect">
+            <a:avLst/>
+          </a:prstGeom>
+          <a:noFill/>
+          <a:ln>
+            <a:prstDash val="sysDot"/>
+          </a:ln>
+        </p:spPr>
+        <p:style>
+          <a:lnRef idx="2">
+            <a:schemeClr val="accent1">
+              <a:shade val="15000"/>
+            </a:schemeClr>
+          </a:lnRef>
+          <a:fillRef idx="1">
+            <a:schemeClr val="accent1"/>
+          </a:fillRef>
+          <a:effectRef idx="0">
+            <a:schemeClr val="accent1"/>
+          </a:effectRef>
+          <a:fontRef idx="minor">
+            <a:schemeClr val="lt1"/>
+          </a:fontRef>
+        </p:style>
+        <p:txBody>
+          <a:bodyPr rtlCol="0" anchor="t" anchorCtr="0"/>
+          <a:lstStyle/>
+          <a:p>
+            <a:pPr algn="r"/>
+            <a:r>
+              <a:rPr lang="en-US" dirty="0">
+                <a:solidFill>
+                  <a:schemeClr val="tx1"/>
+                </a:solidFill>
+              </a:rPr>
+              <a:t>Replay and Physical</a:t>
+            </a:r>
+          </a:p>
+        </p:txBody>
+      </p:sp>
+      <p:sp>
+        <p:nvSpPr>
+          <p:cNvPr id="26" name="Rectangle 25">
+            <a:extLst>
+              <a:ext uri="{FF2B5EF4-FFF2-40B4-BE49-F238E27FC236}">
+                <a16:creationId xmlns:a16="http://schemas.microsoft.com/office/drawing/2014/main" id="{D12635CA-FE82-FAB5-B925-341DA7C02964}"/>
+              </a:ext>
+            </a:extLst>
+          </p:cNvPr>
+          <p:cNvSpPr/>
+          <p:nvPr/>
+        </p:nvSpPr>
+        <p:spPr>
+          <a:xfrm>
+            <a:off x="4025590" y="3877050"/>
+            <a:ext cx="6211226" cy="1236061"/>
+          </a:xfrm>
+          <a:prstGeom prst="rect">
+            <a:avLst/>
+          </a:prstGeom>
+          <a:noFill/>
+          <a:ln>
+            <a:prstDash val="sysDot"/>
+          </a:ln>
+        </p:spPr>
+        <p:style>
+          <a:lnRef idx="2">
+            <a:schemeClr val="accent1">
+              <a:shade val="15000"/>
+            </a:schemeClr>
+          </a:lnRef>
+          <a:fillRef idx="1">
+            <a:schemeClr val="accent1"/>
+          </a:fillRef>
+          <a:effectRef idx="0">
+            <a:schemeClr val="accent1"/>
+          </a:effectRef>
+          <a:fontRef idx="minor">
+            <a:schemeClr val="lt1"/>
+          </a:fontRef>
+        </p:style>
+        <p:txBody>
+          <a:bodyPr rtlCol="0" anchor="t" anchorCtr="0"/>
+          <a:lstStyle/>
+          <a:p>
+            <a:pPr algn="r"/>
+            <a:r>
+              <a:rPr lang="en-US" dirty="0">
+                <a:solidFill>
+                  <a:schemeClr val="tx1"/>
+                </a:solidFill>
+              </a:rPr>
+              <a:t>Wait and Peek</a:t>
+            </a:r>
+          </a:p>
+        </p:txBody>
+      </p:sp>
+      <p:sp>
+        <p:nvSpPr>
+          <p:cNvPr id="32" name="Rectangle 31">
+            <a:extLst>
+              <a:ext uri="{FF2B5EF4-FFF2-40B4-BE49-F238E27FC236}">
+                <a16:creationId xmlns:a16="http://schemas.microsoft.com/office/drawing/2014/main" id="{45F50E5C-9954-7FCE-F747-50941AB4F5BC}"/>
+              </a:ext>
+            </a:extLst>
+          </p:cNvPr>
+          <p:cNvSpPr/>
+          <p:nvPr/>
+        </p:nvSpPr>
+        <p:spPr>
+          <a:xfrm>
+            <a:off x="4025589" y="2500741"/>
+            <a:ext cx="7676067" cy="1236061"/>
+          </a:xfrm>
+          <a:prstGeom prst="rect">
+            <a:avLst/>
+          </a:prstGeom>
+          <a:noFill/>
+          <a:ln>
+            <a:prstDash val="sysDot"/>
+          </a:ln>
+        </p:spPr>
+        <p:style>
+          <a:lnRef idx="2">
+            <a:schemeClr val="accent1">
+              <a:shade val="15000"/>
+            </a:schemeClr>
+          </a:lnRef>
+          <a:fillRef idx="1">
+            <a:schemeClr val="accent1"/>
+          </a:fillRef>
+          <a:effectRef idx="0">
+            <a:schemeClr val="accent1"/>
+          </a:effectRef>
+          <a:fontRef idx="minor">
+            <a:schemeClr val="lt1"/>
+          </a:fontRef>
+        </p:style>
+        <p:txBody>
+          <a:bodyPr rtlCol="0" anchor="t" anchorCtr="0"/>
+          <a:lstStyle/>
+          <a:p>
+            <a:pPr algn="r"/>
+            <a:r>
+              <a:rPr lang="en-US" dirty="0">
+                <a:solidFill>
+                  <a:schemeClr val="tx1"/>
+                </a:solidFill>
+              </a:rPr>
+              <a:t>Keystroke Expansion and Translation</a:t>
+            </a:r>
+          </a:p>
+        </p:txBody>
+      </p:sp>
     </p:spTree>
     <p:extLst>
       <p:ext uri="{BB962C8B-B14F-4D97-AF65-F5344CB8AC3E}">
         <p14:creationId xmlns:p14="http://schemas.microsoft.com/office/powerpoint/2010/main" val="1595102834"/>
+      </p:ext>
+    </p:extLst>
+  </p:cSld>
+  <p:clrMapOvr>
+    <a:masterClrMapping/>
+  </p:clrMapOvr>
+</p:sld>
+</file>
+
+<file path=ppt/slides/slide17.xml><?xml version="1.0" encoding="utf-8"?>
+<p:sld xmlns:a="http://schemas.openxmlformats.org/drawingml/2006/main" xmlns:r="http://schemas.openxmlformats.org/officeDocument/2006/relationships" xmlns:p="http://schemas.openxmlformats.org/presentationml/2006/main">
+  <p:cSld>
+    <p:spTree>
+      <p:nvGrpSpPr>
+        <p:cNvPr id="1" name=""/>
+        <p:cNvGrpSpPr/>
+        <p:nvPr/>
+      </p:nvGrpSpPr>
+      <p:grpSpPr>
+        <a:xfrm>
+          <a:off x="0" y="0"/>
+          <a:ext cx="0" cy="0"/>
+          <a:chOff x="0" y="0"/>
+          <a:chExt cx="0" cy="0"/>
+        </a:xfrm>
+      </p:grpSpPr>
+      <p:sp>
+        <p:nvSpPr>
+          <p:cNvPr id="2" name="Title 1">
+            <a:extLst>
+              <a:ext uri="{FF2B5EF4-FFF2-40B4-BE49-F238E27FC236}">
+                <a16:creationId xmlns:a16="http://schemas.microsoft.com/office/drawing/2014/main" id="{8CC671EC-3B64-0F56-6B70-EEFCAFE9ED7C}"/>
+              </a:ext>
+            </a:extLst>
+          </p:cNvPr>
+          <p:cNvSpPr>
+            <a:spLocks noGrp="1"/>
+          </p:cNvSpPr>
+          <p:nvPr>
+            <p:ph type="title"/>
+          </p:nvPr>
+        </p:nvSpPr>
+        <p:spPr/>
+        <p:txBody>
+          <a:bodyPr/>
+          <a:lstStyle/>
+          <a:p>
+            <a:r>
+              <a:rPr lang="en-US" dirty="0"/>
+              <a:t>Item Characteristics</a:t>
+            </a:r>
+          </a:p>
+        </p:txBody>
+      </p:sp>
+      <p:sp>
+        <p:nvSpPr>
+          <p:cNvPr id="5" name="TextBox 4">
+            <a:extLst>
+              <a:ext uri="{FF2B5EF4-FFF2-40B4-BE49-F238E27FC236}">
+                <a16:creationId xmlns:a16="http://schemas.microsoft.com/office/drawing/2014/main" id="{9531B7B0-0732-178D-B451-E209ED53EC5D}"/>
+              </a:ext>
+            </a:extLst>
+          </p:cNvPr>
+          <p:cNvSpPr txBox="1"/>
+          <p:nvPr/>
+        </p:nvSpPr>
+        <p:spPr>
+          <a:xfrm>
+            <a:off x="838199" y="1948070"/>
+            <a:ext cx="10677939" cy="3505190"/>
+          </a:xfrm>
+          <a:prstGeom prst="rect">
+            <a:avLst/>
+          </a:prstGeom>
+          <a:noFill/>
+        </p:spPr>
+        <p:txBody>
+          <a:bodyPr wrap="square">
+            <a:spAutoFit/>
+          </a:bodyPr>
+          <a:lstStyle/>
+          <a:p>
+            <a:pPr marL="0" marR="0">
+              <a:lnSpc>
+                <a:spcPct val="107000"/>
+              </a:lnSpc>
+              <a:spcAft>
+                <a:spcPts val="800"/>
+              </a:spcAft>
+            </a:pPr>
+            <a:r>
+              <a:rPr lang="en-US" sz="1800" kern="100" dirty="0" err="1">
+                <a:effectLst/>
+                <a:latin typeface="Aptos" panose="020B0004020202020204" pitchFamily="34" charset="0"/>
+                <a:ea typeface="Aptos" panose="020B0004020202020204" pitchFamily="34" charset="0"/>
+                <a:cs typeface="Times New Roman" panose="02020603050405020304" pitchFamily="18" charset="0"/>
+              </a:rPr>
+              <a:t>ItemCharacteristics</a:t>
+            </a:r>
+            <a:r>
+              <a:rPr lang="en-US" sz="1800" kern="100" dirty="0">
+                <a:effectLst/>
+                <a:latin typeface="Aptos" panose="020B0004020202020204" pitchFamily="34" charset="0"/>
+                <a:ea typeface="Aptos" panose="020B0004020202020204" pitchFamily="34" charset="0"/>
+                <a:cs typeface="Times New Roman" panose="02020603050405020304" pitchFamily="18" charset="0"/>
+              </a:rPr>
+              <a:t> – Maintains state (has Copy, Merge</a:t>
+            </a:r>
+            <a:r>
+              <a:rPr lang="en-US" kern="100" dirty="0">
+                <a:latin typeface="Aptos" panose="020B0004020202020204" pitchFamily="34" charset="0"/>
+                <a:ea typeface="Aptos" panose="020B0004020202020204" pitchFamily="34" charset="0"/>
+                <a:cs typeface="Times New Roman" panose="02020603050405020304" pitchFamily="18" charset="0"/>
+              </a:rPr>
+              <a:t> and</a:t>
+            </a:r>
+            <a:r>
+              <a:rPr lang="en-US" sz="1800" kern="100" dirty="0">
+                <a:effectLst/>
+                <a:latin typeface="Aptos" panose="020B0004020202020204" pitchFamily="34" charset="0"/>
+                <a:ea typeface="Aptos" panose="020B0004020202020204" pitchFamily="34" charset="0"/>
+                <a:cs typeface="Times New Roman" panose="02020603050405020304" pitchFamily="18" charset="0"/>
+              </a:rPr>
+              <a:t> Equals)</a:t>
+            </a:r>
+            <a:endParaRPr lang="en-US" sz="900" kern="100" dirty="0">
+              <a:effectLst/>
+              <a:latin typeface="Aptos" panose="020B0004020202020204" pitchFamily="34" charset="0"/>
+              <a:ea typeface="Aptos" panose="020B0004020202020204" pitchFamily="34" charset="0"/>
+              <a:cs typeface="Times New Roman" panose="02020603050405020304" pitchFamily="18" charset="0"/>
+            </a:endParaRPr>
+          </a:p>
+          <a:p>
+            <a:pPr marL="0" marR="0">
+              <a:lnSpc>
+                <a:spcPct val="107000"/>
+              </a:lnSpc>
+              <a:spcAft>
+                <a:spcPts val="800"/>
+              </a:spcAft>
+            </a:pPr>
+            <a:r>
+              <a:rPr lang="en-US" sz="1800" kern="100" dirty="0" err="1">
+                <a:effectLst/>
+                <a:latin typeface="Aptos" panose="020B0004020202020204" pitchFamily="34" charset="0"/>
+                <a:ea typeface="Aptos" panose="020B0004020202020204" pitchFamily="34" charset="0"/>
+                <a:cs typeface="Times New Roman" panose="02020603050405020304" pitchFamily="18" charset="0"/>
+              </a:rPr>
+              <a:t>RandomArtifactCharacteristics</a:t>
+            </a:r>
+            <a:r>
+              <a:rPr lang="en-US" sz="1800" kern="100" dirty="0">
+                <a:effectLst/>
+                <a:latin typeface="Aptos" panose="020B0004020202020204" pitchFamily="34" charset="0"/>
+                <a:ea typeface="Aptos" panose="020B0004020202020204" pitchFamily="34" charset="0"/>
+                <a:cs typeface="Times New Roman" panose="02020603050405020304" pitchFamily="18" charset="0"/>
+              </a:rPr>
+              <a:t> – </a:t>
+            </a:r>
+            <a:r>
+              <a:rPr lang="en-US" kern="100" dirty="0">
+                <a:latin typeface="Aptos" panose="020B0004020202020204" pitchFamily="34" charset="0"/>
+                <a:ea typeface="Aptos" panose="020B0004020202020204" pitchFamily="34" charset="0"/>
+                <a:cs typeface="Times New Roman" panose="02020603050405020304" pitchFamily="18" charset="0"/>
+              </a:rPr>
+              <a:t>Maintains state (has Copy and Merge, </a:t>
+            </a:r>
+            <a:r>
+              <a:rPr lang="en-US" strike="sngStrike" kern="100" dirty="0">
+                <a:latin typeface="Aptos" panose="020B0004020202020204" pitchFamily="34" charset="0"/>
+                <a:ea typeface="Aptos" panose="020B0004020202020204" pitchFamily="34" charset="0"/>
+                <a:cs typeface="Times New Roman" panose="02020603050405020304" pitchFamily="18" charset="0"/>
+              </a:rPr>
+              <a:t>Equals</a:t>
+            </a:r>
+            <a:r>
+              <a:rPr lang="en-US" kern="100" dirty="0">
+                <a:latin typeface="Aptos" panose="020B0004020202020204" pitchFamily="34" charset="0"/>
+                <a:ea typeface="Aptos" panose="020B0004020202020204" pitchFamily="34" charset="0"/>
+                <a:cs typeface="Times New Roman" panose="02020603050405020304" pitchFamily="18" charset="0"/>
+              </a:rPr>
+              <a:t>)</a:t>
+            </a:r>
+            <a:endParaRPr lang="en-US" sz="900" kern="100" dirty="0">
+              <a:effectLst/>
+              <a:latin typeface="Aptos" panose="020B0004020202020204" pitchFamily="34" charset="0"/>
+              <a:ea typeface="Aptos" panose="020B0004020202020204" pitchFamily="34" charset="0"/>
+              <a:cs typeface="Times New Roman" panose="02020603050405020304" pitchFamily="18" charset="0"/>
+            </a:endParaRPr>
+          </a:p>
+          <a:p>
+            <a:r>
+              <a:rPr lang="en-US" dirty="0">
+                <a:latin typeface="Aptos" panose="020B0004020202020204" pitchFamily="34" charset="0"/>
+                <a:cs typeface="Times New Roman" panose="02020603050405020304" pitchFamily="18" charset="0"/>
+              </a:rPr>
+              <a:t>Item – has the missing Random properties (has Copy, </a:t>
+            </a:r>
+            <a:r>
+              <a:rPr lang="en-US" dirty="0" err="1">
+                <a:latin typeface="Aptos" panose="020B0004020202020204" pitchFamily="34" charset="0"/>
+                <a:cs typeface="Times New Roman" panose="02020603050405020304" pitchFamily="18" charset="0"/>
+              </a:rPr>
+              <a:t>GetRealValue</a:t>
+            </a:r>
+            <a:r>
+              <a:rPr lang="en-US" dirty="0">
+                <a:latin typeface="Aptos" panose="020B0004020202020204" pitchFamily="34" charset="0"/>
+                <a:cs typeface="Times New Roman" panose="02020603050405020304" pitchFamily="18" charset="0"/>
+              </a:rPr>
+              <a:t> merging, </a:t>
+            </a:r>
+            <a:r>
+              <a:rPr lang="en-US" dirty="0" err="1">
+                <a:latin typeface="Aptos" panose="020B0004020202020204" pitchFamily="34" charset="0"/>
+                <a:cs typeface="Times New Roman" panose="02020603050405020304" pitchFamily="18" charset="0"/>
+              </a:rPr>
+              <a:t>IdentifyFully</a:t>
+            </a:r>
+            <a:r>
+              <a:rPr lang="en-US" dirty="0">
+                <a:latin typeface="Aptos" panose="020B0004020202020204" pitchFamily="34" charset="0"/>
+                <a:cs typeface="Times New Roman" panose="02020603050405020304" pitchFamily="18" charset="0"/>
+              </a:rPr>
+              <a:t> merging, </a:t>
+            </a:r>
+            <a:r>
+              <a:rPr lang="en-US" dirty="0" err="1">
+                <a:latin typeface="Aptos" panose="020B0004020202020204" pitchFamily="34" charset="0"/>
+                <a:cs typeface="Times New Roman" panose="02020603050405020304" pitchFamily="18" charset="0"/>
+              </a:rPr>
+              <a:t>AdjustDamageForMonsterStype</a:t>
+            </a:r>
+            <a:r>
+              <a:rPr lang="en-US" dirty="0">
+                <a:latin typeface="Aptos" panose="020B0004020202020204" pitchFamily="34" charset="0"/>
+                <a:cs typeface="Times New Roman" panose="02020603050405020304" pitchFamily="18" charset="0"/>
+              </a:rPr>
+              <a:t>, </a:t>
+            </a:r>
+            <a:r>
+              <a:rPr lang="en-US" dirty="0" err="1">
+                <a:latin typeface="Aptos" panose="020B0004020202020204" pitchFamily="34" charset="0"/>
+                <a:cs typeface="Times New Roman" panose="02020603050405020304" pitchFamily="18" charset="0"/>
+              </a:rPr>
+              <a:t>GetMergedCharacteristics</a:t>
+            </a:r>
+            <a:r>
+              <a:rPr lang="en-US" dirty="0">
+                <a:latin typeface="Aptos" panose="020B0004020202020204" pitchFamily="34" charset="0"/>
+                <a:cs typeface="Times New Roman" panose="02020603050405020304" pitchFamily="18" charset="0"/>
+              </a:rPr>
+              <a:t>)</a:t>
+            </a:r>
+          </a:p>
+          <a:p>
+            <a:endParaRPr lang="en-US" dirty="0">
+              <a:latin typeface="Aptos" panose="020B0004020202020204" pitchFamily="34" charset="0"/>
+              <a:cs typeface="Times New Roman" panose="02020603050405020304" pitchFamily="18" charset="0"/>
+            </a:endParaRPr>
+          </a:p>
+          <a:p>
+            <a:r>
+              <a:rPr lang="en-US" dirty="0">
+                <a:latin typeface="Aptos" panose="020B0004020202020204" pitchFamily="34" charset="0"/>
+                <a:cs typeface="Times New Roman" panose="02020603050405020304" pitchFamily="18" charset="0"/>
+              </a:rPr>
+              <a:t>Game – </a:t>
+            </a:r>
+            <a:r>
+              <a:rPr lang="en-US" dirty="0" err="1">
+                <a:latin typeface="Aptos" panose="020B0004020202020204" pitchFamily="34" charset="0"/>
+                <a:cs typeface="Times New Roman" panose="02020603050405020304" pitchFamily="18" charset="0"/>
+              </a:rPr>
+              <a:t>GetAbilitiesAsItemFlags</a:t>
+            </a:r>
+            <a:endParaRPr lang="en-US" dirty="0">
+              <a:latin typeface="Aptos" panose="020B0004020202020204" pitchFamily="34" charset="0"/>
+              <a:cs typeface="Times New Roman" panose="02020603050405020304" pitchFamily="18" charset="0"/>
+            </a:endParaRPr>
+          </a:p>
+          <a:p>
+            <a:endParaRPr lang="en-US" dirty="0">
+              <a:latin typeface="Aptos" panose="020B0004020202020204" pitchFamily="34" charset="0"/>
+              <a:cs typeface="Times New Roman" panose="02020603050405020304" pitchFamily="18" charset="0"/>
+            </a:endParaRPr>
+          </a:p>
+          <a:p>
+            <a:endParaRPr lang="en-US" dirty="0">
+              <a:latin typeface="Aptos" panose="020B0004020202020204" pitchFamily="34" charset="0"/>
+              <a:cs typeface="Times New Roman" panose="02020603050405020304" pitchFamily="18" charset="0"/>
+            </a:endParaRPr>
+          </a:p>
+          <a:p>
+            <a:pPr marL="0" marR="0">
+              <a:lnSpc>
+                <a:spcPct val="107000"/>
+              </a:lnSpc>
+              <a:spcAft>
+                <a:spcPts val="800"/>
+              </a:spcAft>
+            </a:pPr>
+            <a:r>
+              <a:rPr lang="en-US" sz="1800" kern="100" dirty="0" err="1">
+                <a:effectLst/>
+                <a:latin typeface="Aptos" panose="020B0004020202020204" pitchFamily="34" charset="0"/>
+                <a:ea typeface="Aptos" panose="020B0004020202020204" pitchFamily="34" charset="0"/>
+                <a:cs typeface="Times New Roman" panose="02020603050405020304" pitchFamily="18" charset="0"/>
+              </a:rPr>
+              <a:t>ItemAdditiveBundles</a:t>
+            </a:r>
+            <a:r>
+              <a:rPr lang="en-US" sz="1800" kern="100" dirty="0">
+                <a:effectLst/>
+                <a:latin typeface="Aptos" panose="020B0004020202020204" pitchFamily="34" charset="0"/>
+                <a:ea typeface="Aptos" panose="020B0004020202020204" pitchFamily="34" charset="0"/>
+                <a:cs typeface="Times New Roman" panose="02020603050405020304" pitchFamily="18" charset="0"/>
+              </a:rPr>
+              <a:t> – These are immutable configuration singletons.</a:t>
+            </a:r>
+            <a:endParaRPr lang="en-US" sz="900" kern="100" dirty="0">
+              <a:effectLst/>
+              <a:latin typeface="Aptos" panose="020B0004020202020204" pitchFamily="34" charset="0"/>
+              <a:ea typeface="Aptos" panose="020B0004020202020204" pitchFamily="34" charset="0"/>
+              <a:cs typeface="Times New Roman" panose="02020603050405020304" pitchFamily="18" charset="0"/>
+            </a:endParaRPr>
+          </a:p>
+          <a:p>
+            <a:r>
+              <a:rPr lang="en-US" sz="1800" dirty="0" err="1">
+                <a:effectLst/>
+                <a:latin typeface="Aptos" panose="020B0004020202020204" pitchFamily="34" charset="0"/>
+                <a:ea typeface="Aptos" panose="020B0004020202020204" pitchFamily="34" charset="0"/>
+                <a:cs typeface="Times New Roman" panose="02020603050405020304" pitchFamily="18" charset="0"/>
+              </a:rPr>
+              <a:t>FixedArtifact</a:t>
+            </a:r>
+            <a:r>
+              <a:rPr lang="en-US" sz="1800" dirty="0">
+                <a:effectLst/>
+                <a:latin typeface="Aptos" panose="020B0004020202020204" pitchFamily="34" charset="0"/>
+                <a:ea typeface="Aptos" panose="020B0004020202020204" pitchFamily="34" charset="0"/>
+                <a:cs typeface="Times New Roman" panose="02020603050405020304" pitchFamily="18" charset="0"/>
+              </a:rPr>
+              <a:t> – This is an </a:t>
+            </a:r>
+            <a:r>
+              <a:rPr lang="en-US" dirty="0">
+                <a:latin typeface="Aptos" panose="020B0004020202020204" pitchFamily="34" charset="0"/>
+                <a:ea typeface="Aptos" panose="020B0004020202020204" pitchFamily="34" charset="0"/>
+                <a:cs typeface="Times New Roman" panose="02020603050405020304" pitchFamily="18" charset="0"/>
+              </a:rPr>
+              <a:t>immutable configuration singleton.</a:t>
+            </a:r>
+          </a:p>
+          <a:p>
+            <a:endParaRPr lang="en-US" dirty="0"/>
+          </a:p>
+        </p:txBody>
+      </p:sp>
+    </p:spTree>
+    <p:extLst>
+      <p:ext uri="{BB962C8B-B14F-4D97-AF65-F5344CB8AC3E}">
+        <p14:creationId xmlns:p14="http://schemas.microsoft.com/office/powerpoint/2010/main" val="2956748561"/>
       </p:ext>
     </p:extLst>
   </p:cSld>

</xml_diff>

<commit_message>
ProjectileScripts now incorporate the IIdentifableDirectionalScript, IIdentifiedAndUsedScriptItemDirection, IScript interfaces.
</commit_message>
<xml_diff>
--- a/Documents/Object Property Design and Binding.pptx
+++ b/Documents/Object Property Design and Binding.pptx
@@ -22,6 +22,7 @@
     <p:sldId id="270" r:id="rId16"/>
     <p:sldId id="271" r:id="rId17"/>
     <p:sldId id="272" r:id="rId18"/>
+    <p:sldId id="273" r:id="rId19"/>
   </p:sldIdLst>
   <p:sldSz cx="12192000" cy="6858000"/>
   <p:notesSz cx="6858000" cy="9144000"/>
@@ -275,7 +276,7 @@
           <a:p>
             <a:fld id="{E7AEA4B1-7707-49BB-9265-EAC029350772}" type="datetimeFigureOut">
               <a:rPr lang="en-US" smtClean="0"/>
-              <a:t>11/20/2024</a:t>
+              <a:t>12/29/2024</a:t>
             </a:fld>
             <a:endParaRPr lang="en-US"/>
           </a:p>
@@ -473,7 +474,7 @@
           <a:p>
             <a:fld id="{E7AEA4B1-7707-49BB-9265-EAC029350772}" type="datetimeFigureOut">
               <a:rPr lang="en-US" smtClean="0"/>
-              <a:t>11/20/2024</a:t>
+              <a:t>12/29/2024</a:t>
             </a:fld>
             <a:endParaRPr lang="en-US"/>
           </a:p>
@@ -681,7 +682,7 @@
           <a:p>
             <a:fld id="{E7AEA4B1-7707-49BB-9265-EAC029350772}" type="datetimeFigureOut">
               <a:rPr lang="en-US" smtClean="0"/>
-              <a:t>11/20/2024</a:t>
+              <a:t>12/29/2024</a:t>
             </a:fld>
             <a:endParaRPr lang="en-US"/>
           </a:p>
@@ -879,7 +880,7 @@
           <a:p>
             <a:fld id="{E7AEA4B1-7707-49BB-9265-EAC029350772}" type="datetimeFigureOut">
               <a:rPr lang="en-US" smtClean="0"/>
-              <a:t>11/20/2024</a:t>
+              <a:t>12/29/2024</a:t>
             </a:fld>
             <a:endParaRPr lang="en-US"/>
           </a:p>
@@ -1154,7 +1155,7 @@
           <a:p>
             <a:fld id="{E7AEA4B1-7707-49BB-9265-EAC029350772}" type="datetimeFigureOut">
               <a:rPr lang="en-US" smtClean="0"/>
-              <a:t>11/20/2024</a:t>
+              <a:t>12/29/2024</a:t>
             </a:fld>
             <a:endParaRPr lang="en-US"/>
           </a:p>
@@ -1419,7 +1420,7 @@
           <a:p>
             <a:fld id="{E7AEA4B1-7707-49BB-9265-EAC029350772}" type="datetimeFigureOut">
               <a:rPr lang="en-US" smtClean="0"/>
-              <a:t>11/20/2024</a:t>
+              <a:t>12/29/2024</a:t>
             </a:fld>
             <a:endParaRPr lang="en-US"/>
           </a:p>
@@ -1831,7 +1832,7 @@
           <a:p>
             <a:fld id="{E7AEA4B1-7707-49BB-9265-EAC029350772}" type="datetimeFigureOut">
               <a:rPr lang="en-US" smtClean="0"/>
-              <a:t>11/20/2024</a:t>
+              <a:t>12/29/2024</a:t>
             </a:fld>
             <a:endParaRPr lang="en-US"/>
           </a:p>
@@ -1972,7 +1973,7 @@
           <a:p>
             <a:fld id="{E7AEA4B1-7707-49BB-9265-EAC029350772}" type="datetimeFigureOut">
               <a:rPr lang="en-US" smtClean="0"/>
-              <a:t>11/20/2024</a:t>
+              <a:t>12/29/2024</a:t>
             </a:fld>
             <a:endParaRPr lang="en-US"/>
           </a:p>
@@ -2085,7 +2086,7 @@
           <a:p>
             <a:fld id="{E7AEA4B1-7707-49BB-9265-EAC029350772}" type="datetimeFigureOut">
               <a:rPr lang="en-US" smtClean="0"/>
-              <a:t>11/20/2024</a:t>
+              <a:t>12/29/2024</a:t>
             </a:fld>
             <a:endParaRPr lang="en-US"/>
           </a:p>
@@ -2396,7 +2397,7 @@
           <a:p>
             <a:fld id="{E7AEA4B1-7707-49BB-9265-EAC029350772}" type="datetimeFigureOut">
               <a:rPr lang="en-US" smtClean="0"/>
-              <a:t>11/20/2024</a:t>
+              <a:t>12/29/2024</a:t>
             </a:fld>
             <a:endParaRPr lang="en-US"/>
           </a:p>
@@ -2684,7 +2685,7 @@
           <a:p>
             <a:fld id="{E7AEA4B1-7707-49BB-9265-EAC029350772}" type="datetimeFigureOut">
               <a:rPr lang="en-US" smtClean="0"/>
-              <a:t>11/20/2024</a:t>
+              <a:t>12/29/2024</a:t>
             </a:fld>
             <a:endParaRPr lang="en-US"/>
           </a:p>
@@ -2925,7 +2926,7 @@
           <a:p>
             <a:fld id="{E7AEA4B1-7707-49BB-9265-EAC029350772}" type="datetimeFigureOut">
               <a:rPr lang="en-US" smtClean="0"/>
-              <a:t>11/20/2024</a:t>
+              <a:t>12/29/2024</a:t>
             </a:fld>
             <a:endParaRPr lang="en-US"/>
           </a:p>
@@ -6652,6 +6653,871 @@
     <p:extLst>
       <p:ext uri="{BB962C8B-B14F-4D97-AF65-F5344CB8AC3E}">
         <p14:creationId xmlns:p14="http://schemas.microsoft.com/office/powerpoint/2010/main" val="2956748561"/>
+      </p:ext>
+    </p:extLst>
+  </p:cSld>
+  <p:clrMapOvr>
+    <a:masterClrMapping/>
+  </p:clrMapOvr>
+</p:sld>
+</file>
+
+<file path=ppt/slides/slide18.xml><?xml version="1.0" encoding="utf-8"?>
+<p:sld xmlns:a="http://schemas.openxmlformats.org/drawingml/2006/main" xmlns:r="http://schemas.openxmlformats.org/officeDocument/2006/relationships" xmlns:p="http://schemas.openxmlformats.org/presentationml/2006/main">
+  <p:cSld>
+    <p:spTree>
+      <p:nvGrpSpPr>
+        <p:cNvPr id="1" name=""/>
+        <p:cNvGrpSpPr/>
+        <p:nvPr/>
+      </p:nvGrpSpPr>
+      <p:grpSpPr>
+        <a:xfrm>
+          <a:off x="0" y="0"/>
+          <a:ext cx="0" cy="0"/>
+          <a:chOff x="0" y="0"/>
+          <a:chExt cx="0" cy="0"/>
+        </a:xfrm>
+      </p:grpSpPr>
+      <p:sp>
+        <p:nvSpPr>
+          <p:cNvPr id="2" name="Title 1">
+            <a:extLst>
+              <a:ext uri="{FF2B5EF4-FFF2-40B4-BE49-F238E27FC236}">
+                <a16:creationId xmlns:a16="http://schemas.microsoft.com/office/drawing/2014/main" id="{8111FD78-63DC-B138-7805-A670EDAE193E}"/>
+              </a:ext>
+            </a:extLst>
+          </p:cNvPr>
+          <p:cNvSpPr>
+            <a:spLocks noGrp="1"/>
+          </p:cNvSpPr>
+          <p:nvPr>
+            <p:ph type="title"/>
+          </p:nvPr>
+        </p:nvSpPr>
+        <p:spPr/>
+        <p:txBody>
+          <a:bodyPr/>
+          <a:lstStyle/>
+          <a:p>
+            <a:r>
+              <a:rPr lang="en-US" dirty="0"/>
+              <a:t>Tuple XML Commenting</a:t>
+            </a:r>
+          </a:p>
+        </p:txBody>
+      </p:sp>
+      <p:sp>
+        <p:nvSpPr>
+          <p:cNvPr id="3" name="Content Placeholder 2">
+            <a:extLst>
+              <a:ext uri="{FF2B5EF4-FFF2-40B4-BE49-F238E27FC236}">
+                <a16:creationId xmlns:a16="http://schemas.microsoft.com/office/drawing/2014/main" id="{1F0849C0-BA64-8C16-30A2-A52B38410062}"/>
+              </a:ext>
+            </a:extLst>
+          </p:cNvPr>
+          <p:cNvSpPr>
+            <a:spLocks noGrp="1"/>
+          </p:cNvSpPr>
+          <p:nvPr>
+            <p:ph idx="1"/>
+          </p:nvPr>
+        </p:nvSpPr>
+        <p:spPr/>
+        <p:txBody>
+          <a:bodyPr>
+            <a:normAutofit/>
+          </a:bodyPr>
+          <a:lstStyle/>
+          <a:p>
+            <a:pPr marL="0" indent="0">
+              <a:buNone/>
+            </a:pPr>
+            <a:r>
+              <a:rPr lang="en-US" dirty="0"/>
+              <a:t>As of C# 9, XML comments do not support tuples.  The metadata scaffolding needs descriptions and data type definitions for each tuple element.  To support this, </a:t>
+            </a:r>
+            <a:r>
+              <a:rPr lang="en-US" dirty="0" err="1"/>
+              <a:t>AngbandOS</a:t>
+            </a:r>
+            <a:r>
+              <a:rPr lang="en-US" dirty="0"/>
+              <a:t> has a special XML comment format.</a:t>
+            </a:r>
+          </a:p>
+          <a:p>
+            <a:pPr marL="0" indent="0">
+              <a:buNone/>
+            </a:pPr>
+            <a:r>
+              <a:rPr lang="en-US" sz="900" dirty="0">
+                <a:solidFill>
+                  <a:srgbClr val="000000"/>
+                </a:solidFill>
+                <a:highlight>
+                  <a:srgbClr val="FFFFFF"/>
+                </a:highlight>
+                <a:latin typeface="Cascadia Mono" panose="020B0609020000020004" pitchFamily="49" charset="0"/>
+              </a:rPr>
+              <a:t> </a:t>
+            </a:r>
+            <a:r>
+              <a:rPr lang="en-US" sz="900" dirty="0">
+                <a:solidFill>
+                  <a:srgbClr val="808080"/>
+                </a:solidFill>
+                <a:highlight>
+                  <a:srgbClr val="FFFFFF"/>
+                </a:highlight>
+                <a:latin typeface="Cascadia Mono" panose="020B0609020000020004" pitchFamily="49" charset="0"/>
+              </a:rPr>
+              <a:t>///</a:t>
+            </a:r>
+            <a:r>
+              <a:rPr lang="en-US" sz="900" dirty="0">
+                <a:solidFill>
+                  <a:srgbClr val="008000"/>
+                </a:solidFill>
+                <a:highlight>
+                  <a:srgbClr val="FFFFFF"/>
+                </a:highlight>
+                <a:latin typeface="Cascadia Mono" panose="020B0609020000020004" pitchFamily="49" charset="0"/>
+              </a:rPr>
+              <a:t> </a:t>
+            </a:r>
+            <a:r>
+              <a:rPr lang="en-US" sz="900" dirty="0">
+                <a:solidFill>
+                  <a:srgbClr val="808080"/>
+                </a:solidFill>
+                <a:highlight>
+                  <a:srgbClr val="FFFFFF"/>
+                </a:highlight>
+                <a:latin typeface="Cascadia Mono" panose="020B0609020000020004" pitchFamily="49" charset="0"/>
+              </a:rPr>
+              <a:t>&lt;summary&gt;</a:t>
+            </a:r>
+            <a:br>
+              <a:rPr lang="en-US" sz="900" dirty="0">
+                <a:solidFill>
+                  <a:srgbClr val="808080"/>
+                </a:solidFill>
+                <a:highlight>
+                  <a:srgbClr val="FFFFFF"/>
+                </a:highlight>
+                <a:latin typeface="Cascadia Mono" panose="020B0609020000020004" pitchFamily="49" charset="0"/>
+              </a:rPr>
+            </a:br>
+            <a:r>
+              <a:rPr lang="en-US" sz="900" dirty="0">
+                <a:solidFill>
+                  <a:srgbClr val="000000"/>
+                </a:solidFill>
+                <a:highlight>
+                  <a:srgbClr val="FFFFFF"/>
+                </a:highlight>
+                <a:latin typeface="Cascadia Mono" panose="020B0609020000020004" pitchFamily="49" charset="0"/>
+              </a:rPr>
+              <a:t> </a:t>
+            </a:r>
+            <a:r>
+              <a:rPr lang="en-US" sz="900" dirty="0">
+                <a:solidFill>
+                  <a:srgbClr val="808080"/>
+                </a:solidFill>
+                <a:highlight>
+                  <a:srgbClr val="FFFFFF"/>
+                </a:highlight>
+                <a:latin typeface="Cascadia Mono" panose="020B0609020000020004" pitchFamily="49" charset="0"/>
+              </a:rPr>
+              <a:t>///</a:t>
+            </a:r>
+            <a:r>
+              <a:rPr lang="en-US" sz="900" dirty="0">
+                <a:solidFill>
+                  <a:srgbClr val="008000"/>
+                </a:solidFill>
+                <a:highlight>
+                  <a:srgbClr val="FFFFFF"/>
+                </a:highlight>
+                <a:latin typeface="Cascadia Mono" panose="020B0609020000020004" pitchFamily="49" charset="0"/>
+              </a:rPr>
+              <a:t> Returns the manifests used to stock the store.  These manifests specify which item factories the store stocks and an </a:t>
+            </a:r>
+            <a:r>
+              <a:rPr lang="en-US" sz="900" dirty="0" err="1">
+                <a:solidFill>
+                  <a:srgbClr val="008000"/>
+                </a:solidFill>
+                <a:highlight>
+                  <a:srgbClr val="FFFFFF"/>
+                </a:highlight>
+                <a:latin typeface="Cascadia Mono" panose="020B0609020000020004" pitchFamily="49" charset="0"/>
+              </a:rPr>
+              <a:t>assocated</a:t>
+            </a:r>
+            <a:r>
+              <a:rPr lang="en-US" sz="900" dirty="0">
+                <a:solidFill>
+                  <a:srgbClr val="008000"/>
+                </a:solidFill>
+                <a:highlight>
+                  <a:srgbClr val="FFFFFF"/>
+                </a:highlight>
+                <a:latin typeface="Cascadia Mono" panose="020B0609020000020004" pitchFamily="49" charset="0"/>
+              </a:rPr>
+              <a:t> distribution weight for each item factory.</a:t>
+            </a:r>
+            <a:br>
+              <a:rPr lang="en-US" sz="900" dirty="0">
+                <a:solidFill>
+                  <a:srgbClr val="008000"/>
+                </a:solidFill>
+                <a:highlight>
+                  <a:srgbClr val="FFFFFF"/>
+                </a:highlight>
+                <a:latin typeface="Cascadia Mono" panose="020B0609020000020004" pitchFamily="49" charset="0"/>
+              </a:rPr>
+            </a:br>
+            <a:r>
+              <a:rPr lang="en-US" sz="900" dirty="0">
+                <a:solidFill>
+                  <a:srgbClr val="000000"/>
+                </a:solidFill>
+                <a:highlight>
+                  <a:srgbClr val="FFFFFF"/>
+                </a:highlight>
+                <a:latin typeface="Cascadia Mono" panose="020B0609020000020004" pitchFamily="49" charset="0"/>
+              </a:rPr>
+              <a:t> </a:t>
+            </a:r>
+            <a:r>
+              <a:rPr lang="en-US" sz="900" dirty="0">
+                <a:solidFill>
+                  <a:srgbClr val="808080"/>
+                </a:solidFill>
+                <a:highlight>
+                  <a:srgbClr val="FFFFFF"/>
+                </a:highlight>
+                <a:latin typeface="Cascadia Mono" panose="020B0609020000020004" pitchFamily="49" charset="0"/>
+              </a:rPr>
+              <a:t>///</a:t>
+            </a:r>
+            <a:r>
+              <a:rPr lang="en-US" sz="900" dirty="0">
+                <a:solidFill>
+                  <a:srgbClr val="008000"/>
+                </a:solidFill>
+                <a:highlight>
+                  <a:srgbClr val="FFFFFF"/>
+                </a:highlight>
+                <a:latin typeface="Cascadia Mono" panose="020B0609020000020004" pitchFamily="49" charset="0"/>
+              </a:rPr>
+              <a:t> </a:t>
+            </a:r>
+            <a:r>
+              <a:rPr lang="en-US" sz="900" dirty="0">
+                <a:solidFill>
+                  <a:srgbClr val="808080"/>
+                </a:solidFill>
+                <a:highlight>
+                  <a:srgbClr val="FFFFFF"/>
+                </a:highlight>
+                <a:latin typeface="Cascadia Mono" panose="020B0609020000020004" pitchFamily="49" charset="0"/>
+              </a:rPr>
+              <a:t>&lt;/summary&gt;</a:t>
+            </a:r>
+            <a:br>
+              <a:rPr lang="en-US" sz="900" dirty="0">
+                <a:solidFill>
+                  <a:srgbClr val="808080"/>
+                </a:solidFill>
+                <a:highlight>
+                  <a:srgbClr val="FFFFFF"/>
+                </a:highlight>
+                <a:latin typeface="Cascadia Mono" panose="020B0609020000020004" pitchFamily="49" charset="0"/>
+              </a:rPr>
+            </a:br>
+            <a:r>
+              <a:rPr lang="en-US" sz="900" dirty="0">
+                <a:solidFill>
+                  <a:srgbClr val="000000"/>
+                </a:solidFill>
+                <a:highlight>
+                  <a:srgbClr val="FFFFFF"/>
+                </a:highlight>
+                <a:latin typeface="Cascadia Mono" panose="020B0609020000020004" pitchFamily="49" charset="0"/>
+              </a:rPr>
+              <a:t> </a:t>
+            </a:r>
+            <a:r>
+              <a:rPr lang="en-US" sz="900" dirty="0">
+                <a:solidFill>
+                  <a:srgbClr val="808080"/>
+                </a:solidFill>
+                <a:highlight>
+                  <a:srgbClr val="FFFFFF"/>
+                </a:highlight>
+                <a:latin typeface="Cascadia Mono" panose="020B0609020000020004" pitchFamily="49" charset="0"/>
+              </a:rPr>
+              <a:t>///</a:t>
+            </a:r>
+            <a:r>
+              <a:rPr lang="en-US" sz="900" dirty="0">
+                <a:solidFill>
+                  <a:srgbClr val="008000"/>
+                </a:solidFill>
+                <a:highlight>
+                  <a:srgbClr val="FFFFFF"/>
+                </a:highlight>
+                <a:latin typeface="Cascadia Mono" panose="020B0609020000020004" pitchFamily="49" charset="0"/>
+              </a:rPr>
+              <a:t> </a:t>
+            </a:r>
+            <a:r>
+              <a:rPr lang="en-US" sz="900" dirty="0">
+                <a:solidFill>
+                  <a:srgbClr val="808080"/>
+                </a:solidFill>
+                <a:highlight>
+                  <a:srgbClr val="FFFFFF"/>
+                </a:highlight>
+                <a:latin typeface="Cascadia Mono" panose="020B0609020000020004" pitchFamily="49" charset="0"/>
+              </a:rPr>
+              <a:t>&lt;returns&gt;</a:t>
+            </a:r>
+            <a:br>
+              <a:rPr lang="en-US" sz="900" dirty="0">
+                <a:solidFill>
+                  <a:srgbClr val="808080"/>
+                </a:solidFill>
+                <a:highlight>
+                  <a:srgbClr val="FFFFFF"/>
+                </a:highlight>
+                <a:latin typeface="Cascadia Mono" panose="020B0609020000020004" pitchFamily="49" charset="0"/>
+              </a:rPr>
+            </a:br>
+            <a:r>
+              <a:rPr lang="en-US" sz="900" dirty="0">
+                <a:solidFill>
+                  <a:srgbClr val="000000"/>
+                </a:solidFill>
+                <a:highlight>
+                  <a:srgbClr val="FFFFFF"/>
+                </a:highlight>
+                <a:latin typeface="Cascadia Mono" panose="020B0609020000020004" pitchFamily="49" charset="0"/>
+              </a:rPr>
+              <a:t> </a:t>
+            </a:r>
+            <a:r>
+              <a:rPr lang="en-US" sz="900" dirty="0">
+                <a:solidFill>
+                  <a:srgbClr val="808080"/>
+                </a:solidFill>
+                <a:highlight>
+                  <a:srgbClr val="FFFFFF"/>
+                </a:highlight>
+                <a:latin typeface="Cascadia Mono" panose="020B0609020000020004" pitchFamily="49" charset="0"/>
+              </a:rPr>
+              <a:t>///</a:t>
+            </a:r>
+            <a:r>
+              <a:rPr lang="en-US" sz="900" dirty="0">
+                <a:solidFill>
+                  <a:srgbClr val="008000"/>
+                </a:solidFill>
+                <a:highlight>
+                  <a:srgbClr val="FFFFFF"/>
+                </a:highlight>
+                <a:latin typeface="Cascadia Mono" panose="020B0609020000020004" pitchFamily="49" charset="0"/>
+              </a:rPr>
+              <a:t> </a:t>
+            </a:r>
+            <a:r>
+              <a:rPr lang="en-US" sz="900" dirty="0" err="1">
+                <a:solidFill>
+                  <a:srgbClr val="008000"/>
+                </a:solidFill>
+                <a:highlight>
+                  <a:srgbClr val="FFFFFF"/>
+                </a:highlight>
+                <a:latin typeface="Cascadia Mono" panose="020B0609020000020004" pitchFamily="49" charset="0"/>
+              </a:rPr>
+              <a:t>ItemFactoryName:description</a:t>
+            </a:r>
+            <a:r>
+              <a:rPr lang="en-US" sz="900" dirty="0">
+                <a:solidFill>
+                  <a:srgbClr val="008000"/>
+                </a:solidFill>
+                <a:highlight>
+                  <a:srgbClr val="FFFFFF"/>
+                </a:highlight>
+                <a:latin typeface="Cascadia Mono" panose="020B0609020000020004" pitchFamily="49" charset="0"/>
+              </a:rPr>
+              <a:t>: The name of the item factory.</a:t>
+            </a:r>
+            <a:br>
+              <a:rPr lang="en-US" sz="900" dirty="0">
+                <a:solidFill>
+                  <a:srgbClr val="008000"/>
+                </a:solidFill>
+                <a:highlight>
+                  <a:srgbClr val="FFFFFF"/>
+                </a:highlight>
+                <a:latin typeface="Cascadia Mono" panose="020B0609020000020004" pitchFamily="49" charset="0"/>
+              </a:rPr>
+            </a:br>
+            <a:r>
+              <a:rPr lang="en-US" sz="900" dirty="0">
+                <a:solidFill>
+                  <a:srgbClr val="000000"/>
+                </a:solidFill>
+                <a:highlight>
+                  <a:srgbClr val="FFFFFF"/>
+                </a:highlight>
+                <a:latin typeface="Cascadia Mono" panose="020B0609020000020004" pitchFamily="49" charset="0"/>
+              </a:rPr>
+              <a:t> </a:t>
+            </a:r>
+            <a:r>
+              <a:rPr lang="en-US" sz="900" dirty="0">
+                <a:solidFill>
+                  <a:srgbClr val="808080"/>
+                </a:solidFill>
+                <a:highlight>
+                  <a:srgbClr val="FFFFFF"/>
+                </a:highlight>
+                <a:latin typeface="Cascadia Mono" panose="020B0609020000020004" pitchFamily="49" charset="0"/>
+              </a:rPr>
+              <a:t>///</a:t>
+            </a:r>
+            <a:r>
+              <a:rPr lang="en-US" sz="900" dirty="0">
+                <a:solidFill>
+                  <a:srgbClr val="008000"/>
+                </a:solidFill>
+                <a:highlight>
+                  <a:srgbClr val="FFFFFF"/>
+                </a:highlight>
+                <a:latin typeface="Cascadia Mono" panose="020B0609020000020004" pitchFamily="49" charset="0"/>
+              </a:rPr>
+              <a:t> </a:t>
+            </a:r>
+            <a:r>
+              <a:rPr lang="en-US" sz="900" dirty="0" err="1">
+                <a:solidFill>
+                  <a:srgbClr val="008000"/>
+                </a:solidFill>
+                <a:highlight>
+                  <a:srgbClr val="FFFFFF"/>
+                </a:highlight>
+                <a:latin typeface="Cascadia Mono" panose="020B0609020000020004" pitchFamily="49" charset="0"/>
+              </a:rPr>
+              <a:t>ItemFactoryName:foreign-collection-name</a:t>
+            </a:r>
+            <a:r>
+              <a:rPr lang="en-US" sz="900" dirty="0">
+                <a:solidFill>
+                  <a:srgbClr val="008000"/>
+                </a:solidFill>
+                <a:highlight>
+                  <a:srgbClr val="FFFFFF"/>
+                </a:highlight>
+                <a:latin typeface="Cascadia Mono" panose="020B0609020000020004" pitchFamily="49" charset="0"/>
+              </a:rPr>
+              <a:t>: </a:t>
+            </a:r>
+            <a:r>
+              <a:rPr lang="en-US" sz="900" dirty="0" err="1">
+                <a:solidFill>
+                  <a:srgbClr val="008000"/>
+                </a:solidFill>
+                <a:highlight>
+                  <a:srgbClr val="FFFFFF"/>
+                </a:highlight>
+                <a:latin typeface="Cascadia Mono" panose="020B0609020000020004" pitchFamily="49" charset="0"/>
+              </a:rPr>
+              <a:t>ItemFactories</a:t>
+            </a:r>
+            <a:br>
+              <a:rPr lang="en-US" sz="900" dirty="0">
+                <a:solidFill>
+                  <a:srgbClr val="008000"/>
+                </a:solidFill>
+                <a:highlight>
+                  <a:srgbClr val="FFFFFF"/>
+                </a:highlight>
+                <a:latin typeface="Cascadia Mono" panose="020B0609020000020004" pitchFamily="49" charset="0"/>
+              </a:rPr>
+            </a:br>
+            <a:r>
+              <a:rPr lang="en-US" sz="900" dirty="0">
+                <a:solidFill>
+                  <a:srgbClr val="000000"/>
+                </a:solidFill>
+                <a:highlight>
+                  <a:srgbClr val="FFFFFF"/>
+                </a:highlight>
+                <a:latin typeface="Cascadia Mono" panose="020B0609020000020004" pitchFamily="49" charset="0"/>
+              </a:rPr>
+              <a:t> </a:t>
+            </a:r>
+            <a:r>
+              <a:rPr lang="en-US" sz="900" dirty="0">
+                <a:solidFill>
+                  <a:srgbClr val="808080"/>
+                </a:solidFill>
+                <a:highlight>
+                  <a:srgbClr val="FFFFFF"/>
+                </a:highlight>
+                <a:latin typeface="Cascadia Mono" panose="020B0609020000020004" pitchFamily="49" charset="0"/>
+              </a:rPr>
+              <a:t>///</a:t>
+            </a:r>
+            <a:r>
+              <a:rPr lang="en-US" sz="900" dirty="0">
+                <a:solidFill>
+                  <a:srgbClr val="008000"/>
+                </a:solidFill>
+                <a:highlight>
+                  <a:srgbClr val="FFFFFF"/>
+                </a:highlight>
+                <a:latin typeface="Cascadia Mono" panose="020B0609020000020004" pitchFamily="49" charset="0"/>
+              </a:rPr>
+              <a:t> </a:t>
+            </a:r>
+            <a:r>
+              <a:rPr lang="en-US" sz="900" dirty="0" err="1">
+                <a:solidFill>
+                  <a:srgbClr val="008000"/>
+                </a:solidFill>
+                <a:highlight>
+                  <a:srgbClr val="FFFFFF"/>
+                </a:highlight>
+                <a:latin typeface="Cascadia Mono" panose="020B0609020000020004" pitchFamily="49" charset="0"/>
+              </a:rPr>
+              <a:t>Weight:Description</a:t>
+            </a:r>
+            <a:r>
+              <a:rPr lang="en-US" sz="900" dirty="0">
+                <a:solidFill>
+                  <a:srgbClr val="008000"/>
+                </a:solidFill>
+                <a:highlight>
+                  <a:srgbClr val="FFFFFF"/>
+                </a:highlight>
+                <a:latin typeface="Cascadia Mono" panose="020B0609020000020004" pitchFamily="49" charset="0"/>
+              </a:rPr>
+              <a:t>: The associated distribution weight for the item factory.</a:t>
+            </a:r>
+            <a:br>
+              <a:rPr lang="en-US" sz="900" dirty="0">
+                <a:solidFill>
+                  <a:srgbClr val="008000"/>
+                </a:solidFill>
+                <a:highlight>
+                  <a:srgbClr val="FFFFFF"/>
+                </a:highlight>
+                <a:latin typeface="Cascadia Mono" panose="020B0609020000020004" pitchFamily="49" charset="0"/>
+              </a:rPr>
+            </a:br>
+            <a:r>
+              <a:rPr lang="en-US" sz="900" dirty="0">
+                <a:solidFill>
+                  <a:srgbClr val="000000"/>
+                </a:solidFill>
+                <a:highlight>
+                  <a:srgbClr val="FFFFFF"/>
+                </a:highlight>
+                <a:latin typeface="Cascadia Mono" panose="020B0609020000020004" pitchFamily="49" charset="0"/>
+              </a:rPr>
+              <a:t> </a:t>
+            </a:r>
+            <a:r>
+              <a:rPr lang="en-US" sz="900" dirty="0">
+                <a:solidFill>
+                  <a:srgbClr val="808080"/>
+                </a:solidFill>
+                <a:highlight>
+                  <a:srgbClr val="FFFFFF"/>
+                </a:highlight>
+                <a:latin typeface="Cascadia Mono" panose="020B0609020000020004" pitchFamily="49" charset="0"/>
+              </a:rPr>
+              <a:t>///</a:t>
+            </a:r>
+            <a:r>
+              <a:rPr lang="en-US" sz="900" dirty="0">
+                <a:solidFill>
+                  <a:srgbClr val="008000"/>
+                </a:solidFill>
+                <a:highlight>
+                  <a:srgbClr val="FFFFFF"/>
+                </a:highlight>
+                <a:latin typeface="Cascadia Mono" panose="020B0609020000020004" pitchFamily="49" charset="0"/>
+              </a:rPr>
+              <a:t> </a:t>
+            </a:r>
+            <a:r>
+              <a:rPr lang="en-US" sz="900" dirty="0">
+                <a:solidFill>
+                  <a:srgbClr val="808080"/>
+                </a:solidFill>
+                <a:highlight>
+                  <a:srgbClr val="FFFFFF"/>
+                </a:highlight>
+                <a:latin typeface="Cascadia Mono" panose="020B0609020000020004" pitchFamily="49" charset="0"/>
+              </a:rPr>
+              <a:t>&lt;/returns&gt;</a:t>
+            </a:r>
+            <a:br>
+              <a:rPr lang="en-US" sz="900" dirty="0">
+                <a:solidFill>
+                  <a:srgbClr val="808080"/>
+                </a:solidFill>
+                <a:highlight>
+                  <a:srgbClr val="FFFFFF"/>
+                </a:highlight>
+                <a:latin typeface="Cascadia Mono" panose="020B0609020000020004" pitchFamily="49" charset="0"/>
+              </a:rPr>
+            </a:br>
+            <a:r>
+              <a:rPr lang="en-US" sz="900" dirty="0">
+                <a:solidFill>
+                  <a:srgbClr val="000000"/>
+                </a:solidFill>
+                <a:highlight>
+                  <a:srgbClr val="FFFFFF"/>
+                </a:highlight>
+                <a:latin typeface="Cascadia Mono" panose="020B0609020000020004" pitchFamily="49" charset="0"/>
+              </a:rPr>
+              <a:t> </a:t>
+            </a:r>
+            <a:r>
+              <a:rPr lang="en-US" sz="900" dirty="0">
+                <a:solidFill>
+                  <a:srgbClr val="0000FF"/>
+                </a:solidFill>
+                <a:highlight>
+                  <a:srgbClr val="FFFFFF"/>
+                </a:highlight>
+                <a:latin typeface="Cascadia Mono" panose="020B0609020000020004" pitchFamily="49" charset="0"/>
+              </a:rPr>
+              <a:t>public</a:t>
+            </a:r>
+            <a:r>
+              <a:rPr lang="en-US" sz="900" dirty="0">
+                <a:solidFill>
+                  <a:srgbClr val="000000"/>
+                </a:solidFill>
+                <a:highlight>
+                  <a:srgbClr val="FFFFFF"/>
+                </a:highlight>
+                <a:latin typeface="Cascadia Mono" panose="020B0609020000020004" pitchFamily="49" charset="0"/>
+              </a:rPr>
+              <a:t> </a:t>
+            </a:r>
+            <a:r>
+              <a:rPr lang="en-US" sz="900" dirty="0">
+                <a:solidFill>
+                  <a:srgbClr val="0000FF"/>
+                </a:solidFill>
+                <a:highlight>
+                  <a:srgbClr val="FFFFFF"/>
+                </a:highlight>
+                <a:latin typeface="Cascadia Mono" panose="020B0609020000020004" pitchFamily="49" charset="0"/>
+              </a:rPr>
+              <a:t>virtual</a:t>
+            </a:r>
+            <a:r>
+              <a:rPr lang="en-US" sz="900" dirty="0">
+                <a:solidFill>
+                  <a:srgbClr val="000000"/>
+                </a:solidFill>
+                <a:highlight>
+                  <a:srgbClr val="FFFFFF"/>
+                </a:highlight>
+                <a:latin typeface="Cascadia Mono" panose="020B0609020000020004" pitchFamily="49" charset="0"/>
+              </a:rPr>
+              <a:t> (</a:t>
+            </a:r>
+            <a:r>
+              <a:rPr lang="en-US" sz="900" dirty="0">
+                <a:solidFill>
+                  <a:srgbClr val="0000FF"/>
+                </a:solidFill>
+                <a:highlight>
+                  <a:srgbClr val="FFFFFF"/>
+                </a:highlight>
+                <a:latin typeface="Cascadia Mono" panose="020B0609020000020004" pitchFamily="49" charset="0"/>
+              </a:rPr>
+              <a:t>string</a:t>
+            </a:r>
+            <a:r>
+              <a:rPr lang="en-US" sz="900" dirty="0">
+                <a:solidFill>
+                  <a:srgbClr val="000000"/>
+                </a:solidFill>
+                <a:highlight>
+                  <a:srgbClr val="FFFFFF"/>
+                </a:highlight>
+                <a:latin typeface="Cascadia Mono" panose="020B0609020000020004" pitchFamily="49" charset="0"/>
+              </a:rPr>
+              <a:t> </a:t>
+            </a:r>
+            <a:r>
+              <a:rPr lang="en-US" sz="900" dirty="0" err="1">
+                <a:solidFill>
+                  <a:srgbClr val="000000"/>
+                </a:solidFill>
+                <a:highlight>
+                  <a:srgbClr val="FFFFFF"/>
+                </a:highlight>
+                <a:latin typeface="Cascadia Mono" panose="020B0609020000020004" pitchFamily="49" charset="0"/>
+              </a:rPr>
+              <a:t>ItemFactoryName</a:t>
+            </a:r>
+            <a:r>
+              <a:rPr lang="en-US" sz="900" dirty="0">
+                <a:solidFill>
+                  <a:srgbClr val="000000"/>
+                </a:solidFill>
+                <a:highlight>
+                  <a:srgbClr val="FFFFFF"/>
+                </a:highlight>
+                <a:latin typeface="Cascadia Mono" panose="020B0609020000020004" pitchFamily="49" charset="0"/>
+              </a:rPr>
+              <a:t>, </a:t>
+            </a:r>
+            <a:r>
+              <a:rPr lang="en-US" sz="900" dirty="0">
+                <a:solidFill>
+                  <a:srgbClr val="0000FF"/>
+                </a:solidFill>
+                <a:highlight>
+                  <a:srgbClr val="FFFFFF"/>
+                </a:highlight>
+                <a:latin typeface="Cascadia Mono" panose="020B0609020000020004" pitchFamily="49" charset="0"/>
+              </a:rPr>
+              <a:t>int</a:t>
+            </a:r>
+            <a:r>
+              <a:rPr lang="en-US" sz="900" dirty="0">
+                <a:solidFill>
+                  <a:srgbClr val="000000"/>
+                </a:solidFill>
+                <a:highlight>
+                  <a:srgbClr val="FFFFFF"/>
+                </a:highlight>
+                <a:latin typeface="Cascadia Mono" panose="020B0609020000020004" pitchFamily="49" charset="0"/>
+              </a:rPr>
+              <a:t> Weight)[]? </a:t>
+            </a:r>
+            <a:r>
+              <a:rPr lang="en-US" sz="900" dirty="0" err="1">
+                <a:solidFill>
+                  <a:srgbClr val="000000"/>
+                </a:solidFill>
+                <a:highlight>
+                  <a:srgbClr val="FFFFFF"/>
+                </a:highlight>
+                <a:latin typeface="Cascadia Mono" panose="020B0609020000020004" pitchFamily="49" charset="0"/>
+              </a:rPr>
+              <a:t>StoreStockManifestDefinitions</a:t>
+            </a:r>
+            <a:r>
+              <a:rPr lang="en-US" sz="900" dirty="0">
+                <a:solidFill>
+                  <a:srgbClr val="000000"/>
+                </a:solidFill>
+                <a:highlight>
+                  <a:srgbClr val="FFFFFF"/>
+                </a:highlight>
+                <a:latin typeface="Cascadia Mono" panose="020B0609020000020004" pitchFamily="49" charset="0"/>
+              </a:rPr>
+              <a:t> { </a:t>
+            </a:r>
+            <a:r>
+              <a:rPr lang="en-US" sz="900" dirty="0">
+                <a:solidFill>
+                  <a:srgbClr val="0000FF"/>
+                </a:solidFill>
+                <a:highlight>
+                  <a:srgbClr val="FFFFFF"/>
+                </a:highlight>
+                <a:latin typeface="Cascadia Mono" panose="020B0609020000020004" pitchFamily="49" charset="0"/>
+              </a:rPr>
+              <a:t>get</a:t>
+            </a:r>
+            <a:r>
+              <a:rPr lang="en-US" sz="900" dirty="0">
+                <a:solidFill>
+                  <a:srgbClr val="000000"/>
+                </a:solidFill>
+                <a:highlight>
+                  <a:srgbClr val="FFFFFF"/>
+                </a:highlight>
+                <a:latin typeface="Cascadia Mono" panose="020B0609020000020004" pitchFamily="49" charset="0"/>
+              </a:rPr>
+              <a:t>; </a:t>
+            </a:r>
+            <a:r>
+              <a:rPr lang="en-US" sz="900" dirty="0">
+                <a:solidFill>
+                  <a:srgbClr val="0000FF"/>
+                </a:solidFill>
+                <a:highlight>
+                  <a:srgbClr val="FFFFFF"/>
+                </a:highlight>
+                <a:latin typeface="Cascadia Mono" panose="020B0609020000020004" pitchFamily="49" charset="0"/>
+              </a:rPr>
+              <a:t>set</a:t>
+            </a:r>
+            <a:r>
+              <a:rPr lang="en-US" sz="900" dirty="0">
+                <a:solidFill>
+                  <a:srgbClr val="000000"/>
+                </a:solidFill>
+                <a:highlight>
+                  <a:srgbClr val="FFFFFF"/>
+                </a:highlight>
+                <a:latin typeface="Cascadia Mono" panose="020B0609020000020004" pitchFamily="49" charset="0"/>
+              </a:rPr>
+              <a:t>; } = </a:t>
+            </a:r>
+            <a:r>
+              <a:rPr lang="en-US" sz="900" dirty="0">
+                <a:solidFill>
+                  <a:srgbClr val="0000FF"/>
+                </a:solidFill>
+                <a:highlight>
+                  <a:srgbClr val="FFFFFF"/>
+                </a:highlight>
+                <a:latin typeface="Cascadia Mono" panose="020B0609020000020004" pitchFamily="49" charset="0"/>
+              </a:rPr>
+              <a:t>null</a:t>
+            </a:r>
+            <a:r>
+              <a:rPr lang="en-US" sz="900" dirty="0">
+                <a:solidFill>
+                  <a:srgbClr val="000000"/>
+                </a:solidFill>
+                <a:highlight>
+                  <a:srgbClr val="FFFFFF"/>
+                </a:highlight>
+                <a:latin typeface="Cascadia Mono" panose="020B0609020000020004" pitchFamily="49" charset="0"/>
+              </a:rPr>
+              <a:t>;</a:t>
+            </a:r>
+            <a:endParaRPr lang="en-US" sz="900" dirty="0"/>
+          </a:p>
+        </p:txBody>
+      </p:sp>
+    </p:spTree>
+    <p:extLst>
+      <p:ext uri="{BB962C8B-B14F-4D97-AF65-F5344CB8AC3E}">
+        <p14:creationId xmlns:p14="http://schemas.microsoft.com/office/powerpoint/2010/main" val="846826830"/>
       </p:ext>
     </p:extLst>
   </p:cSld>

</xml_diff>